<commit_message>
Anwendung in Komponenten aufgeteilt
</commit_message>
<xml_diff>
--- a/docs/Angular-Workshop-20.10.pptx
+++ b/docs/Angular-Workshop-20.10.pptx
@@ -8,10 +8,10 @@
     <p:sldMasterId id="2147483721" r:id="rId4"/>
   </p:sldMasterIdLst>
   <p:notesMasterIdLst>
-    <p:notesMasterId r:id="rId25"/>
+    <p:notesMasterId r:id="rId27"/>
   </p:notesMasterIdLst>
   <p:handoutMasterIdLst>
-    <p:handoutMasterId r:id="rId26"/>
+    <p:handoutMasterId r:id="rId28"/>
   </p:handoutMasterIdLst>
   <p:sldIdLst>
     <p:sldId id="256" r:id="rId5"/>
@@ -28,12 +28,14 @@
     <p:sldId id="275" r:id="rId16"/>
     <p:sldId id="271" r:id="rId17"/>
     <p:sldId id="276" r:id="rId18"/>
-    <p:sldId id="272" r:id="rId19"/>
-    <p:sldId id="277" r:id="rId20"/>
-    <p:sldId id="273" r:id="rId21"/>
-    <p:sldId id="274" r:id="rId22"/>
-    <p:sldId id="278" r:id="rId23"/>
-    <p:sldId id="279" r:id="rId24"/>
+    <p:sldId id="273" r:id="rId19"/>
+    <p:sldId id="274" r:id="rId20"/>
+    <p:sldId id="278" r:id="rId21"/>
+    <p:sldId id="283" r:id="rId22"/>
+    <p:sldId id="284" r:id="rId23"/>
+    <p:sldId id="285" r:id="rId24"/>
+    <p:sldId id="286" r:id="rId25"/>
+    <p:sldId id="279" r:id="rId26"/>
   </p:sldIdLst>
   <p:sldSz cx="13004800" cy="7315200"/>
   <p:notesSz cx="6858000" cy="9144000"/>
@@ -257,7 +259,7 @@
                 <a:latin typeface="Segoe UI" pitchFamily="34" charset="0"/>
               </a:rPr>
               <a:pPr/>
-              <a:t>15.10.17</a:t>
+              <a:t>18.10.17</a:t>
             </a:fld>
             <a:endParaRPr lang="de-DE" dirty="0">
               <a:latin typeface="Segoe UI" pitchFamily="34" charset="0"/>
@@ -436,7 +438,7 @@
             <a:fld id="{D2E1CCC5-01B8-284F-B77B-84D835A7601B}" type="datetimeFigureOut">
               <a:rPr lang="de-DE" smtClean="0"/>
               <a:pPr/>
-              <a:t>15.10.17</a:t>
+              <a:t>18.10.17</a:t>
             </a:fld>
             <a:endParaRPr lang="de-DE" dirty="0"/>
           </a:p>
@@ -1332,6 +1334,763 @@
 </p:notes>
 </file>
 
+<file path=ppt/notesSlides/notesSlide4.xml><?xml version="1.0" encoding="utf-8"?>
+<p:notes xmlns:a="http://schemas.openxmlformats.org/drawingml/2006/main" xmlns:r="http://schemas.openxmlformats.org/officeDocument/2006/relationships" xmlns:p="http://schemas.openxmlformats.org/presentationml/2006/main">
+  <p:cSld>
+    <p:spTree>
+      <p:nvGrpSpPr>
+        <p:cNvPr id="1" name=""/>
+        <p:cNvGrpSpPr/>
+        <p:nvPr/>
+      </p:nvGrpSpPr>
+      <p:grpSpPr>
+        <a:xfrm>
+          <a:off x="0" y="0"/>
+          <a:ext cx="0" cy="0"/>
+          <a:chOff x="0" y="0"/>
+          <a:chExt cx="0" cy="0"/>
+        </a:xfrm>
+      </p:grpSpPr>
+      <p:sp>
+        <p:nvSpPr>
+          <p:cNvPr id="2" name="Folienbildplatzhalter 1"/>
+          <p:cNvSpPr>
+            <a:spLocks noGrp="1" noRot="1" noChangeAspect="1"/>
+          </p:cNvSpPr>
+          <p:nvPr>
+            <p:ph type="sldImg"/>
+          </p:nvPr>
+        </p:nvSpPr>
+        <p:spPr/>
+      </p:sp>
+      <p:sp>
+        <p:nvSpPr>
+          <p:cNvPr id="3" name="Notizenplatzhalter 2"/>
+          <p:cNvSpPr>
+            <a:spLocks noGrp="1"/>
+          </p:cNvSpPr>
+          <p:nvPr>
+            <p:ph type="body" idx="1"/>
+          </p:nvPr>
+        </p:nvSpPr>
+        <p:spPr/>
+        <p:txBody>
+          <a:bodyPr/>
+          <a:lstStyle/>
+          <a:p>
+            <a:r>
+              <a:rPr lang="de-DE" sz="1700" b="0" i="0" kern="1200" dirty="0" smtClean="0">
+                <a:solidFill>
+                  <a:schemeClr val="tx1"/>
+                </a:solidFill>
+                <a:effectLst/>
+                <a:latin typeface="Segoe UI" pitchFamily="34" charset="0"/>
+                <a:ea typeface="+mn-ea"/>
+                <a:cs typeface="+mn-cs"/>
+              </a:rPr>
+              <a:t>The </a:t>
+            </a:r>
+            <a:r>
+              <a:rPr lang="de-DE" sz="1700" b="1" i="0" kern="1200" dirty="0" err="1" smtClean="0">
+                <a:solidFill>
+                  <a:schemeClr val="tx1"/>
+                </a:solidFill>
+                <a:effectLst/>
+                <a:latin typeface="Segoe UI" pitchFamily="34" charset="0"/>
+                <a:ea typeface="+mn-ea"/>
+                <a:cs typeface="+mn-cs"/>
+              </a:rPr>
+              <a:t>History</a:t>
+            </a:r>
+            <a:r>
+              <a:rPr lang="de-DE" sz="1700" b="0" i="0" kern="1200" dirty="0" smtClean="0">
+                <a:solidFill>
+                  <a:schemeClr val="tx1"/>
+                </a:solidFill>
+                <a:effectLst/>
+                <a:latin typeface="Segoe UI" pitchFamily="34" charset="0"/>
+                <a:ea typeface="+mn-ea"/>
+                <a:cs typeface="+mn-cs"/>
+              </a:rPr>
+              <a:t> </a:t>
+            </a:r>
+            <a:r>
+              <a:rPr lang="de-DE" sz="1700" b="0" i="0" kern="1200" dirty="0" err="1" smtClean="0">
+                <a:solidFill>
+                  <a:schemeClr val="tx1"/>
+                </a:solidFill>
+                <a:effectLst/>
+                <a:latin typeface="Segoe UI" pitchFamily="34" charset="0"/>
+                <a:ea typeface="+mn-ea"/>
+                <a:cs typeface="+mn-cs"/>
+              </a:rPr>
+              <a:t>interface</a:t>
+            </a:r>
+            <a:r>
+              <a:rPr lang="de-DE" sz="1700" b="0" i="0" kern="1200" dirty="0" smtClean="0">
+                <a:solidFill>
+                  <a:schemeClr val="tx1"/>
+                </a:solidFill>
+                <a:effectLst/>
+                <a:latin typeface="Segoe UI" pitchFamily="34" charset="0"/>
+                <a:ea typeface="+mn-ea"/>
+                <a:cs typeface="+mn-cs"/>
+              </a:rPr>
+              <a:t> </a:t>
+            </a:r>
+            <a:r>
+              <a:rPr lang="de-DE" sz="1700" b="0" i="0" kern="1200" dirty="0" err="1" smtClean="0">
+                <a:solidFill>
+                  <a:schemeClr val="tx1"/>
+                </a:solidFill>
+                <a:effectLst/>
+                <a:latin typeface="Segoe UI" pitchFamily="34" charset="0"/>
+                <a:ea typeface="+mn-ea"/>
+                <a:cs typeface="+mn-cs"/>
+              </a:rPr>
+              <a:t>allows</a:t>
+            </a:r>
+            <a:r>
+              <a:rPr lang="de-DE" sz="1700" b="0" i="0" kern="1200" dirty="0" smtClean="0">
+                <a:solidFill>
+                  <a:schemeClr val="tx1"/>
+                </a:solidFill>
+                <a:effectLst/>
+                <a:latin typeface="Segoe UI" pitchFamily="34" charset="0"/>
+                <a:ea typeface="+mn-ea"/>
+                <a:cs typeface="+mn-cs"/>
+              </a:rPr>
+              <a:t> </a:t>
+            </a:r>
+            <a:r>
+              <a:rPr lang="de-DE" sz="1700" b="0" i="0" kern="1200" dirty="0" err="1" smtClean="0">
+                <a:solidFill>
+                  <a:schemeClr val="tx1"/>
+                </a:solidFill>
+                <a:effectLst/>
+                <a:latin typeface="Segoe UI" pitchFamily="34" charset="0"/>
+                <a:ea typeface="+mn-ea"/>
+                <a:cs typeface="+mn-cs"/>
+              </a:rPr>
+              <a:t>manipulation</a:t>
+            </a:r>
+            <a:r>
+              <a:rPr lang="de-DE" sz="1700" b="0" i="0" kern="1200" dirty="0" smtClean="0">
+                <a:solidFill>
+                  <a:schemeClr val="tx1"/>
+                </a:solidFill>
+                <a:effectLst/>
+                <a:latin typeface="Segoe UI" pitchFamily="34" charset="0"/>
+                <a:ea typeface="+mn-ea"/>
+                <a:cs typeface="+mn-cs"/>
+              </a:rPr>
+              <a:t> </a:t>
+            </a:r>
+            <a:r>
+              <a:rPr lang="de-DE" sz="1700" b="0" i="0" kern="1200" dirty="0" err="1" smtClean="0">
+                <a:solidFill>
+                  <a:schemeClr val="tx1"/>
+                </a:solidFill>
+                <a:effectLst/>
+                <a:latin typeface="Segoe UI" pitchFamily="34" charset="0"/>
+                <a:ea typeface="+mn-ea"/>
+                <a:cs typeface="+mn-cs"/>
+              </a:rPr>
+              <a:t>of</a:t>
+            </a:r>
+            <a:r>
+              <a:rPr lang="de-DE" sz="1700" b="0" i="0" kern="1200" dirty="0" smtClean="0">
+                <a:solidFill>
+                  <a:schemeClr val="tx1"/>
+                </a:solidFill>
+                <a:effectLst/>
+                <a:latin typeface="Segoe UI" pitchFamily="34" charset="0"/>
+                <a:ea typeface="+mn-ea"/>
+                <a:cs typeface="+mn-cs"/>
+              </a:rPr>
+              <a:t> </a:t>
+            </a:r>
+            <a:r>
+              <a:rPr lang="de-DE" sz="1700" b="0" i="0" kern="1200" dirty="0" err="1" smtClean="0">
+                <a:solidFill>
+                  <a:schemeClr val="tx1"/>
+                </a:solidFill>
+                <a:effectLst/>
+                <a:latin typeface="Segoe UI" pitchFamily="34" charset="0"/>
+                <a:ea typeface="+mn-ea"/>
+                <a:cs typeface="+mn-cs"/>
+              </a:rPr>
+              <a:t>the</a:t>
+            </a:r>
+            <a:r>
+              <a:rPr lang="de-DE" sz="1700" b="0" i="0" kern="1200" dirty="0" smtClean="0">
+                <a:solidFill>
+                  <a:schemeClr val="tx1"/>
+                </a:solidFill>
+                <a:effectLst/>
+                <a:latin typeface="Segoe UI" pitchFamily="34" charset="0"/>
+                <a:ea typeface="+mn-ea"/>
+                <a:cs typeface="+mn-cs"/>
+              </a:rPr>
+              <a:t> </a:t>
+            </a:r>
+            <a:r>
+              <a:rPr lang="de-DE" sz="1700" b="0" i="0" kern="1200" dirty="0" err="1" smtClean="0">
+                <a:solidFill>
+                  <a:schemeClr val="tx1"/>
+                </a:solidFill>
+                <a:effectLst/>
+                <a:latin typeface="Segoe UI" pitchFamily="34" charset="0"/>
+                <a:ea typeface="+mn-ea"/>
+                <a:cs typeface="+mn-cs"/>
+              </a:rPr>
+              <a:t>browser</a:t>
+            </a:r>
+            <a:r>
+              <a:rPr lang="de-DE" sz="1700" b="0" i="0" kern="1200" dirty="0" smtClean="0">
+                <a:solidFill>
+                  <a:schemeClr val="tx1"/>
+                </a:solidFill>
+                <a:effectLst/>
+                <a:latin typeface="Segoe UI" pitchFamily="34" charset="0"/>
+                <a:ea typeface="+mn-ea"/>
+                <a:cs typeface="+mn-cs"/>
+              </a:rPr>
+              <a:t> </a:t>
+            </a:r>
+            <a:r>
+              <a:rPr lang="de-DE" sz="1700" b="0" i="1" kern="1200" dirty="0" err="1" smtClean="0">
+                <a:solidFill>
+                  <a:schemeClr val="tx1"/>
+                </a:solidFill>
+                <a:effectLst/>
+                <a:latin typeface="Segoe UI" pitchFamily="34" charset="0"/>
+                <a:ea typeface="+mn-ea"/>
+                <a:cs typeface="+mn-cs"/>
+              </a:rPr>
+              <a:t>session</a:t>
+            </a:r>
+            <a:r>
+              <a:rPr lang="de-DE" sz="1700" b="0" i="1" kern="1200" dirty="0" smtClean="0">
+                <a:solidFill>
+                  <a:schemeClr val="tx1"/>
+                </a:solidFill>
+                <a:effectLst/>
+                <a:latin typeface="Segoe UI" pitchFamily="34" charset="0"/>
+                <a:ea typeface="+mn-ea"/>
+                <a:cs typeface="+mn-cs"/>
+              </a:rPr>
+              <a:t> </a:t>
+            </a:r>
+            <a:r>
+              <a:rPr lang="de-DE" sz="1700" b="0" i="1" kern="1200" dirty="0" err="1" smtClean="0">
+                <a:solidFill>
+                  <a:schemeClr val="tx1"/>
+                </a:solidFill>
+                <a:effectLst/>
+                <a:latin typeface="Segoe UI" pitchFamily="34" charset="0"/>
+                <a:ea typeface="+mn-ea"/>
+                <a:cs typeface="+mn-cs"/>
+              </a:rPr>
+              <a:t>history</a:t>
+            </a:r>
+            <a:r>
+              <a:rPr lang="de-DE" sz="1700" b="0" i="0" kern="1200" dirty="0" smtClean="0">
+                <a:solidFill>
+                  <a:schemeClr val="tx1"/>
+                </a:solidFill>
+                <a:effectLst/>
+                <a:latin typeface="Segoe UI" pitchFamily="34" charset="0"/>
+                <a:ea typeface="+mn-ea"/>
+                <a:cs typeface="+mn-cs"/>
+              </a:rPr>
+              <a:t>, </a:t>
+            </a:r>
+            <a:r>
+              <a:rPr lang="de-DE" sz="1700" b="0" i="0" kern="1200" dirty="0" err="1" smtClean="0">
+                <a:solidFill>
+                  <a:schemeClr val="tx1"/>
+                </a:solidFill>
+                <a:effectLst/>
+                <a:latin typeface="Segoe UI" pitchFamily="34" charset="0"/>
+                <a:ea typeface="+mn-ea"/>
+                <a:cs typeface="+mn-cs"/>
+              </a:rPr>
+              <a:t>that</a:t>
+            </a:r>
+            <a:r>
+              <a:rPr lang="de-DE" sz="1700" b="0" i="0" kern="1200" dirty="0" smtClean="0">
+                <a:solidFill>
+                  <a:schemeClr val="tx1"/>
+                </a:solidFill>
+                <a:effectLst/>
+                <a:latin typeface="Segoe UI" pitchFamily="34" charset="0"/>
+                <a:ea typeface="+mn-ea"/>
+                <a:cs typeface="+mn-cs"/>
+              </a:rPr>
+              <a:t> </a:t>
+            </a:r>
+            <a:r>
+              <a:rPr lang="de-DE" sz="1700" b="0" i="0" kern="1200" dirty="0" err="1" smtClean="0">
+                <a:solidFill>
+                  <a:schemeClr val="tx1"/>
+                </a:solidFill>
+                <a:effectLst/>
+                <a:latin typeface="Segoe UI" pitchFamily="34" charset="0"/>
+                <a:ea typeface="+mn-ea"/>
+                <a:cs typeface="+mn-cs"/>
+              </a:rPr>
+              <a:t>is</a:t>
+            </a:r>
+            <a:r>
+              <a:rPr lang="de-DE" sz="1700" b="0" i="0" kern="1200" dirty="0" smtClean="0">
+                <a:solidFill>
+                  <a:schemeClr val="tx1"/>
+                </a:solidFill>
+                <a:effectLst/>
+                <a:latin typeface="Segoe UI" pitchFamily="34" charset="0"/>
+                <a:ea typeface="+mn-ea"/>
+                <a:cs typeface="+mn-cs"/>
+              </a:rPr>
+              <a:t> </a:t>
+            </a:r>
+            <a:r>
+              <a:rPr lang="de-DE" sz="1700" b="0" i="0" kern="1200" dirty="0" err="1" smtClean="0">
+                <a:solidFill>
+                  <a:schemeClr val="tx1"/>
+                </a:solidFill>
+                <a:effectLst/>
+                <a:latin typeface="Segoe UI" pitchFamily="34" charset="0"/>
+                <a:ea typeface="+mn-ea"/>
+                <a:cs typeface="+mn-cs"/>
+              </a:rPr>
+              <a:t>the</a:t>
+            </a:r>
+            <a:r>
+              <a:rPr lang="de-DE" sz="1700" b="0" i="0" kern="1200" dirty="0" smtClean="0">
+                <a:solidFill>
+                  <a:schemeClr val="tx1"/>
+                </a:solidFill>
+                <a:effectLst/>
+                <a:latin typeface="Segoe UI" pitchFamily="34" charset="0"/>
+                <a:ea typeface="+mn-ea"/>
+                <a:cs typeface="+mn-cs"/>
+              </a:rPr>
+              <a:t> </a:t>
+            </a:r>
+            <a:r>
+              <a:rPr lang="de-DE" sz="1700" b="0" i="0" kern="1200" dirty="0" err="1" smtClean="0">
+                <a:solidFill>
+                  <a:schemeClr val="tx1"/>
+                </a:solidFill>
+                <a:effectLst/>
+                <a:latin typeface="Segoe UI" pitchFamily="34" charset="0"/>
+                <a:ea typeface="+mn-ea"/>
+                <a:cs typeface="+mn-cs"/>
+              </a:rPr>
+              <a:t>pages</a:t>
+            </a:r>
+            <a:r>
+              <a:rPr lang="de-DE" sz="1700" b="0" i="0" kern="1200" dirty="0" smtClean="0">
+                <a:solidFill>
+                  <a:schemeClr val="tx1"/>
+                </a:solidFill>
+                <a:effectLst/>
+                <a:latin typeface="Segoe UI" pitchFamily="34" charset="0"/>
+                <a:ea typeface="+mn-ea"/>
+                <a:cs typeface="+mn-cs"/>
+              </a:rPr>
+              <a:t> </a:t>
+            </a:r>
+            <a:r>
+              <a:rPr lang="de-DE" sz="1700" b="0" i="0" kern="1200" dirty="0" err="1" smtClean="0">
+                <a:solidFill>
+                  <a:schemeClr val="tx1"/>
+                </a:solidFill>
+                <a:effectLst/>
+                <a:latin typeface="Segoe UI" pitchFamily="34" charset="0"/>
+                <a:ea typeface="+mn-ea"/>
+                <a:cs typeface="+mn-cs"/>
+              </a:rPr>
+              <a:t>visited</a:t>
+            </a:r>
+            <a:r>
+              <a:rPr lang="de-DE" sz="1700" b="0" i="0" kern="1200" dirty="0" smtClean="0">
+                <a:solidFill>
+                  <a:schemeClr val="tx1"/>
+                </a:solidFill>
+                <a:effectLst/>
+                <a:latin typeface="Segoe UI" pitchFamily="34" charset="0"/>
+                <a:ea typeface="+mn-ea"/>
+                <a:cs typeface="+mn-cs"/>
+              </a:rPr>
+              <a:t> in </a:t>
+            </a:r>
+            <a:r>
+              <a:rPr lang="de-DE" sz="1700" b="0" i="0" kern="1200" dirty="0" err="1" smtClean="0">
+                <a:solidFill>
+                  <a:schemeClr val="tx1"/>
+                </a:solidFill>
+                <a:effectLst/>
+                <a:latin typeface="Segoe UI" pitchFamily="34" charset="0"/>
+                <a:ea typeface="+mn-ea"/>
+                <a:cs typeface="+mn-cs"/>
+              </a:rPr>
+              <a:t>the</a:t>
+            </a:r>
+            <a:r>
+              <a:rPr lang="de-DE" sz="1700" b="0" i="0" kern="1200" dirty="0" smtClean="0">
+                <a:solidFill>
+                  <a:schemeClr val="tx1"/>
+                </a:solidFill>
+                <a:effectLst/>
+                <a:latin typeface="Segoe UI" pitchFamily="34" charset="0"/>
+                <a:ea typeface="+mn-ea"/>
+                <a:cs typeface="+mn-cs"/>
+              </a:rPr>
+              <a:t> </a:t>
+            </a:r>
+            <a:r>
+              <a:rPr lang="de-DE" sz="1700" b="0" i="0" kern="1200" dirty="0" err="1" smtClean="0">
+                <a:solidFill>
+                  <a:schemeClr val="tx1"/>
+                </a:solidFill>
+                <a:effectLst/>
+                <a:latin typeface="Segoe UI" pitchFamily="34" charset="0"/>
+                <a:ea typeface="+mn-ea"/>
+                <a:cs typeface="+mn-cs"/>
+              </a:rPr>
+              <a:t>tab</a:t>
+            </a:r>
+            <a:r>
+              <a:rPr lang="de-DE" sz="1700" b="0" i="0" kern="1200" dirty="0" smtClean="0">
+                <a:solidFill>
+                  <a:schemeClr val="tx1"/>
+                </a:solidFill>
+                <a:effectLst/>
+                <a:latin typeface="Segoe UI" pitchFamily="34" charset="0"/>
+                <a:ea typeface="+mn-ea"/>
+                <a:cs typeface="+mn-cs"/>
+              </a:rPr>
+              <a:t> </a:t>
+            </a:r>
+            <a:r>
+              <a:rPr lang="de-DE" sz="1700" b="0" i="0" kern="1200" dirty="0" err="1" smtClean="0">
+                <a:solidFill>
+                  <a:schemeClr val="tx1"/>
+                </a:solidFill>
+                <a:effectLst/>
+                <a:latin typeface="Segoe UI" pitchFamily="34" charset="0"/>
+                <a:ea typeface="+mn-ea"/>
+                <a:cs typeface="+mn-cs"/>
+              </a:rPr>
+              <a:t>or</a:t>
+            </a:r>
+            <a:r>
+              <a:rPr lang="de-DE" sz="1700" b="0" i="0" kern="1200" dirty="0" smtClean="0">
+                <a:solidFill>
+                  <a:schemeClr val="tx1"/>
+                </a:solidFill>
+                <a:effectLst/>
+                <a:latin typeface="Segoe UI" pitchFamily="34" charset="0"/>
+                <a:ea typeface="+mn-ea"/>
+                <a:cs typeface="+mn-cs"/>
+              </a:rPr>
+              <a:t> </a:t>
+            </a:r>
+            <a:r>
+              <a:rPr lang="de-DE" sz="1700" b="0" i="0" kern="1200" dirty="0" err="1" smtClean="0">
+                <a:solidFill>
+                  <a:schemeClr val="tx1"/>
+                </a:solidFill>
+                <a:effectLst/>
+                <a:latin typeface="Segoe UI" pitchFamily="34" charset="0"/>
+                <a:ea typeface="+mn-ea"/>
+                <a:cs typeface="+mn-cs"/>
+              </a:rPr>
+              <a:t>frame</a:t>
+            </a:r>
+            <a:r>
+              <a:rPr lang="de-DE" sz="1700" b="0" i="0" kern="1200" dirty="0" smtClean="0">
+                <a:solidFill>
+                  <a:schemeClr val="tx1"/>
+                </a:solidFill>
+                <a:effectLst/>
+                <a:latin typeface="Segoe UI" pitchFamily="34" charset="0"/>
+                <a:ea typeface="+mn-ea"/>
+                <a:cs typeface="+mn-cs"/>
+              </a:rPr>
+              <a:t> </a:t>
+            </a:r>
+            <a:r>
+              <a:rPr lang="de-DE" sz="1700" b="0" i="0" kern="1200" dirty="0" err="1" smtClean="0">
+                <a:solidFill>
+                  <a:schemeClr val="tx1"/>
+                </a:solidFill>
+                <a:effectLst/>
+                <a:latin typeface="Segoe UI" pitchFamily="34" charset="0"/>
+                <a:ea typeface="+mn-ea"/>
+                <a:cs typeface="+mn-cs"/>
+              </a:rPr>
+              <a:t>that</a:t>
+            </a:r>
+            <a:r>
+              <a:rPr lang="de-DE" sz="1700" b="0" i="0" kern="1200" dirty="0" smtClean="0">
+                <a:solidFill>
+                  <a:schemeClr val="tx1"/>
+                </a:solidFill>
+                <a:effectLst/>
+                <a:latin typeface="Segoe UI" pitchFamily="34" charset="0"/>
+                <a:ea typeface="+mn-ea"/>
+                <a:cs typeface="+mn-cs"/>
+              </a:rPr>
+              <a:t> </a:t>
+            </a:r>
+            <a:r>
+              <a:rPr lang="de-DE" sz="1700" b="0" i="0" kern="1200" dirty="0" err="1" smtClean="0">
+                <a:solidFill>
+                  <a:schemeClr val="tx1"/>
+                </a:solidFill>
+                <a:effectLst/>
+                <a:latin typeface="Segoe UI" pitchFamily="34" charset="0"/>
+                <a:ea typeface="+mn-ea"/>
+                <a:cs typeface="+mn-cs"/>
+              </a:rPr>
+              <a:t>the</a:t>
+            </a:r>
+            <a:r>
+              <a:rPr lang="de-DE" sz="1700" b="0" i="0" kern="1200" dirty="0" smtClean="0">
+                <a:solidFill>
+                  <a:schemeClr val="tx1"/>
+                </a:solidFill>
+                <a:effectLst/>
+                <a:latin typeface="Segoe UI" pitchFamily="34" charset="0"/>
+                <a:ea typeface="+mn-ea"/>
+                <a:cs typeface="+mn-cs"/>
+              </a:rPr>
+              <a:t> </a:t>
+            </a:r>
+            <a:r>
+              <a:rPr lang="de-DE" sz="1700" b="0" i="0" kern="1200" dirty="0" err="1" smtClean="0">
+                <a:solidFill>
+                  <a:schemeClr val="tx1"/>
+                </a:solidFill>
+                <a:effectLst/>
+                <a:latin typeface="Segoe UI" pitchFamily="34" charset="0"/>
+                <a:ea typeface="+mn-ea"/>
+                <a:cs typeface="+mn-cs"/>
+              </a:rPr>
+              <a:t>current</a:t>
+            </a:r>
+            <a:r>
+              <a:rPr lang="de-DE" sz="1700" b="0" i="0" kern="1200" dirty="0" smtClean="0">
+                <a:solidFill>
+                  <a:schemeClr val="tx1"/>
+                </a:solidFill>
+                <a:effectLst/>
+                <a:latin typeface="Segoe UI" pitchFamily="34" charset="0"/>
+                <a:ea typeface="+mn-ea"/>
+                <a:cs typeface="+mn-cs"/>
+              </a:rPr>
+              <a:t> </a:t>
+            </a:r>
+            <a:r>
+              <a:rPr lang="de-DE" sz="1700" b="0" i="0" kern="1200" dirty="0" err="1" smtClean="0">
+                <a:solidFill>
+                  <a:schemeClr val="tx1"/>
+                </a:solidFill>
+                <a:effectLst/>
+                <a:latin typeface="Segoe UI" pitchFamily="34" charset="0"/>
+                <a:ea typeface="+mn-ea"/>
+                <a:cs typeface="+mn-cs"/>
+              </a:rPr>
+              <a:t>page</a:t>
+            </a:r>
+            <a:r>
+              <a:rPr lang="de-DE" sz="1700" b="0" i="0" kern="1200" dirty="0" smtClean="0">
+                <a:solidFill>
+                  <a:schemeClr val="tx1"/>
+                </a:solidFill>
+                <a:effectLst/>
+                <a:latin typeface="Segoe UI" pitchFamily="34" charset="0"/>
+                <a:ea typeface="+mn-ea"/>
+                <a:cs typeface="+mn-cs"/>
+              </a:rPr>
+              <a:t> </a:t>
+            </a:r>
+            <a:r>
+              <a:rPr lang="de-DE" sz="1700" b="0" i="0" kern="1200" dirty="0" err="1" smtClean="0">
+                <a:solidFill>
+                  <a:schemeClr val="tx1"/>
+                </a:solidFill>
+                <a:effectLst/>
+                <a:latin typeface="Segoe UI" pitchFamily="34" charset="0"/>
+                <a:ea typeface="+mn-ea"/>
+                <a:cs typeface="+mn-cs"/>
+              </a:rPr>
+              <a:t>is</a:t>
+            </a:r>
+            <a:r>
+              <a:rPr lang="de-DE" sz="1700" b="0" i="0" kern="1200" dirty="0" smtClean="0">
+                <a:solidFill>
+                  <a:schemeClr val="tx1"/>
+                </a:solidFill>
+                <a:effectLst/>
+                <a:latin typeface="Segoe UI" pitchFamily="34" charset="0"/>
+                <a:ea typeface="+mn-ea"/>
+                <a:cs typeface="+mn-cs"/>
+              </a:rPr>
+              <a:t> </a:t>
+            </a:r>
+            <a:r>
+              <a:rPr lang="de-DE" sz="1700" b="0" i="0" kern="1200" dirty="0" err="1" smtClean="0">
+                <a:solidFill>
+                  <a:schemeClr val="tx1"/>
+                </a:solidFill>
+                <a:effectLst/>
+                <a:latin typeface="Segoe UI" pitchFamily="34" charset="0"/>
+                <a:ea typeface="+mn-ea"/>
+                <a:cs typeface="+mn-cs"/>
+              </a:rPr>
+              <a:t>loaded</a:t>
+            </a:r>
+            <a:r>
+              <a:rPr lang="de-DE" sz="1700" b="0" i="0" kern="1200" dirty="0" smtClean="0">
+                <a:solidFill>
+                  <a:schemeClr val="tx1"/>
+                </a:solidFill>
+                <a:effectLst/>
+                <a:latin typeface="Segoe UI" pitchFamily="34" charset="0"/>
+                <a:ea typeface="+mn-ea"/>
+                <a:cs typeface="+mn-cs"/>
+              </a:rPr>
+              <a:t> in. (Quelle:</a:t>
+            </a:r>
+            <a:r>
+              <a:rPr lang="de-DE" sz="1700" b="0" i="0" kern="1200" baseline="0" dirty="0" smtClean="0">
+                <a:solidFill>
+                  <a:schemeClr val="tx1"/>
+                </a:solidFill>
+                <a:effectLst/>
+                <a:latin typeface="Segoe UI" pitchFamily="34" charset="0"/>
+                <a:ea typeface="+mn-ea"/>
+                <a:cs typeface="+mn-cs"/>
+              </a:rPr>
+              <a:t> https://</a:t>
+            </a:r>
+            <a:r>
+              <a:rPr lang="de-DE" sz="1700" b="0" i="0" kern="1200" baseline="0" dirty="0" err="1" smtClean="0">
+                <a:solidFill>
+                  <a:schemeClr val="tx1"/>
+                </a:solidFill>
+                <a:effectLst/>
+                <a:latin typeface="Segoe UI" pitchFamily="34" charset="0"/>
+                <a:ea typeface="+mn-ea"/>
+                <a:cs typeface="+mn-cs"/>
+              </a:rPr>
+              <a:t>developer.mozilla.org</a:t>
+            </a:r>
+            <a:r>
+              <a:rPr lang="de-DE" sz="1700" b="0" i="0" kern="1200" baseline="0" dirty="0" smtClean="0">
+                <a:solidFill>
+                  <a:schemeClr val="tx1"/>
+                </a:solidFill>
+                <a:effectLst/>
+                <a:latin typeface="Segoe UI" pitchFamily="34" charset="0"/>
+                <a:ea typeface="+mn-ea"/>
+                <a:cs typeface="+mn-cs"/>
+              </a:rPr>
+              <a:t>/de/</a:t>
+            </a:r>
+            <a:r>
+              <a:rPr lang="de-DE" sz="1700" b="0" i="0" kern="1200" baseline="0" dirty="0" err="1" smtClean="0">
+                <a:solidFill>
+                  <a:schemeClr val="tx1"/>
+                </a:solidFill>
+                <a:effectLst/>
+                <a:latin typeface="Segoe UI" pitchFamily="34" charset="0"/>
+                <a:ea typeface="+mn-ea"/>
+                <a:cs typeface="+mn-cs"/>
+              </a:rPr>
+              <a:t>docs</a:t>
+            </a:r>
+            <a:r>
+              <a:rPr lang="de-DE" sz="1700" b="0" i="0" kern="1200" baseline="0" dirty="0" smtClean="0">
+                <a:solidFill>
+                  <a:schemeClr val="tx1"/>
+                </a:solidFill>
+                <a:effectLst/>
+                <a:latin typeface="Segoe UI" pitchFamily="34" charset="0"/>
+                <a:ea typeface="+mn-ea"/>
+                <a:cs typeface="+mn-cs"/>
+              </a:rPr>
+              <a:t>/Web/API/</a:t>
+            </a:r>
+            <a:r>
+              <a:rPr lang="de-DE" sz="1700" b="0" i="0" kern="1200" baseline="0" dirty="0" err="1" smtClean="0">
+                <a:solidFill>
+                  <a:schemeClr val="tx1"/>
+                </a:solidFill>
+                <a:effectLst/>
+                <a:latin typeface="Segoe UI" pitchFamily="34" charset="0"/>
+                <a:ea typeface="+mn-ea"/>
+                <a:cs typeface="+mn-cs"/>
+              </a:rPr>
+              <a:t>History</a:t>
+            </a:r>
+            <a:r>
+              <a:rPr lang="de-DE" sz="1700" b="0" i="0" kern="1200" baseline="0" dirty="0" smtClean="0">
+                <a:solidFill>
+                  <a:schemeClr val="tx1"/>
+                </a:solidFill>
+                <a:effectLst/>
+                <a:latin typeface="Segoe UI" pitchFamily="34" charset="0"/>
+                <a:ea typeface="+mn-ea"/>
+                <a:cs typeface="+mn-cs"/>
+              </a:rPr>
+              <a:t>)</a:t>
+            </a:r>
+            <a:endParaRPr lang="de-DE" dirty="0"/>
+          </a:p>
+        </p:txBody>
+      </p:sp>
+      <p:sp>
+        <p:nvSpPr>
+          <p:cNvPr id="4" name="Foliennummernplatzhalter 3"/>
+          <p:cNvSpPr>
+            <a:spLocks noGrp="1"/>
+          </p:cNvSpPr>
+          <p:nvPr>
+            <p:ph type="sldNum" sz="quarter" idx="10"/>
+          </p:nvPr>
+        </p:nvSpPr>
+        <p:spPr/>
+        <p:txBody>
+          <a:bodyPr/>
+          <a:lstStyle/>
+          <a:p>
+            <a:fld id="{C873CC87-18E6-904B-91DF-7AB1BE26DDED}" type="slidenum">
+              <a:rPr lang="de-DE" smtClean="0"/>
+              <a:pPr/>
+              <a:t>20</a:t>
+            </a:fld>
+            <a:endParaRPr lang="de-DE" dirty="0"/>
+          </a:p>
+        </p:txBody>
+      </p:sp>
+    </p:spTree>
+    <p:extLst>
+      <p:ext uri="{BB962C8B-B14F-4D97-AF65-F5344CB8AC3E}">
+        <p14:creationId xmlns:p14="http://schemas.microsoft.com/office/powerpoint/2010/main" val="2112649886"/>
+      </p:ext>
+    </p:extLst>
+  </p:cSld>
+  <p:clrMapOvr>
+    <a:masterClrMapping/>
+  </p:clrMapOvr>
+</p:notes>
+</file>
+
 <file path=ppt/slideLayouts/slideLayout1.xml><?xml version="1.0" encoding="utf-8"?>
 <p:sldLayout xmlns:a="http://schemas.openxmlformats.org/drawingml/2006/main" xmlns:r="http://schemas.openxmlformats.org/officeDocument/2006/relationships" xmlns:p="http://schemas.openxmlformats.org/presentationml/2006/main" preserve="1" userDrawn="1">
   <p:cSld name="Titel-Variation_#1">
@@ -1474,7 +2233,7 @@
           <a:noFill/>
           <a:extLst>
             <a:ext uri="{909E8E84-426E-40dd-AFC4-6F175D3DCCD1}">
-              <a14:hiddenFill xmlns="" xmlns:a14="http://schemas.microsoft.com/office/drawing/2010/main">
+              <a14:hiddenFill xmlns:a14="http://schemas.microsoft.com/office/drawing/2010/main" xmlns="">
                 <a:solidFill>
                   <a:srgbClr val="FFFFFF"/>
                 </a:solidFill>
@@ -1674,7 +2433,7 @@
           <p:cNvPr id="2" name="Datumsplatzhalter 1">
             <a:extLst>
               <a:ext uri="{FF2B5EF4-FFF2-40B4-BE49-F238E27FC236}">
-                <a16:creationId xmlns="" xmlns:a16="http://schemas.microsoft.com/office/drawing/2014/main" id="{0EE9CECA-FE53-4E0D-AD22-D4AB49ECF809}"/>
+                <a16:creationId xmlns:a16="http://schemas.microsoft.com/office/drawing/2014/main" xmlns="" id="{0EE9CECA-FE53-4E0D-AD22-D4AB49ECF809}"/>
               </a:ext>
             </a:extLst>
           </p:cNvPr>
@@ -1693,7 +2452,7 @@
             <a:fld id="{17C2562E-359A-3C42-BBEF-E02CE97BECB1}" type="datetimeFigureOut">
               <a:rPr lang="de-DE" smtClean="0"/>
               <a:pPr/>
-              <a:t>15.10.17</a:t>
+              <a:t>18.10.17</a:t>
             </a:fld>
             <a:endParaRPr lang="de-DE" dirty="0"/>
           </a:p>
@@ -1704,7 +2463,7 @@
           <p:cNvPr id="7" name="Fußzeilenplatzhalter 6">
             <a:extLst>
               <a:ext uri="{FF2B5EF4-FFF2-40B4-BE49-F238E27FC236}">
-                <a16:creationId xmlns="" xmlns:a16="http://schemas.microsoft.com/office/drawing/2014/main" id="{C07A299E-41A7-4A08-81FA-6FBA6806F0A5}"/>
+                <a16:creationId xmlns:a16="http://schemas.microsoft.com/office/drawing/2014/main" xmlns="" id="{C07A299E-41A7-4A08-81FA-6FBA6806F0A5}"/>
               </a:ext>
             </a:extLst>
           </p:cNvPr>
@@ -1729,7 +2488,7 @@
           <p:cNvPr id="8" name="Foliennummernplatzhalter 7">
             <a:extLst>
               <a:ext uri="{FF2B5EF4-FFF2-40B4-BE49-F238E27FC236}">
-                <a16:creationId xmlns="" xmlns:a16="http://schemas.microsoft.com/office/drawing/2014/main" id="{9151A28C-FF21-4CC9-B28E-CF780807FE34}"/>
+                <a16:creationId xmlns:a16="http://schemas.microsoft.com/office/drawing/2014/main" xmlns="" id="{9151A28C-FF21-4CC9-B28E-CF780807FE34}"/>
               </a:ext>
             </a:extLst>
           </p:cNvPr>
@@ -1984,7 +2743,7 @@
           <p:cNvPr id="3" name="Datumsplatzhalter 2">
             <a:extLst>
               <a:ext uri="{FF2B5EF4-FFF2-40B4-BE49-F238E27FC236}">
-                <a16:creationId xmlns="" xmlns:a16="http://schemas.microsoft.com/office/drawing/2014/main" id="{3D332A91-9158-4543-9295-8484F133E109}"/>
+                <a16:creationId xmlns:a16="http://schemas.microsoft.com/office/drawing/2014/main" xmlns="" id="{3D332A91-9158-4543-9295-8484F133E109}"/>
               </a:ext>
             </a:extLst>
           </p:cNvPr>
@@ -2003,7 +2762,7 @@
             <a:fld id="{17C2562E-359A-3C42-BBEF-E02CE97BECB1}" type="datetimeFigureOut">
               <a:rPr lang="de-DE" smtClean="0"/>
               <a:pPr/>
-              <a:t>15.10.17</a:t>
+              <a:t>18.10.17</a:t>
             </a:fld>
             <a:endParaRPr lang="de-DE" dirty="0"/>
           </a:p>
@@ -2014,7 +2773,7 @@
           <p:cNvPr id="7" name="Fußzeilenplatzhalter 6">
             <a:extLst>
               <a:ext uri="{FF2B5EF4-FFF2-40B4-BE49-F238E27FC236}">
-                <a16:creationId xmlns="" xmlns:a16="http://schemas.microsoft.com/office/drawing/2014/main" id="{C426E4CE-7F9D-4A7E-A795-EDD7185E3A7A}"/>
+                <a16:creationId xmlns:a16="http://schemas.microsoft.com/office/drawing/2014/main" xmlns="" id="{C426E4CE-7F9D-4A7E-A795-EDD7185E3A7A}"/>
               </a:ext>
             </a:extLst>
           </p:cNvPr>
@@ -2039,7 +2798,7 @@
           <p:cNvPr id="8" name="Foliennummernplatzhalter 7">
             <a:extLst>
               <a:ext uri="{FF2B5EF4-FFF2-40B4-BE49-F238E27FC236}">
-                <a16:creationId xmlns="" xmlns:a16="http://schemas.microsoft.com/office/drawing/2014/main" id="{73459CEF-058C-4C7D-9907-D7A5E4B23A28}"/>
+                <a16:creationId xmlns:a16="http://schemas.microsoft.com/office/drawing/2014/main" xmlns="" id="{73459CEF-058C-4C7D-9907-D7A5E4B23A28}"/>
               </a:ext>
             </a:extLst>
           </p:cNvPr>
@@ -2287,7 +3046,7 @@
           <p:cNvPr id="2" name="Datumsplatzhalter 1">
             <a:extLst>
               <a:ext uri="{FF2B5EF4-FFF2-40B4-BE49-F238E27FC236}">
-                <a16:creationId xmlns="" xmlns:a16="http://schemas.microsoft.com/office/drawing/2014/main" id="{64A9B900-82AE-4D1E-B11E-155C1B825004}"/>
+                <a16:creationId xmlns:a16="http://schemas.microsoft.com/office/drawing/2014/main" xmlns="" id="{64A9B900-82AE-4D1E-B11E-155C1B825004}"/>
               </a:ext>
             </a:extLst>
           </p:cNvPr>
@@ -2306,7 +3065,7 @@
             <a:fld id="{17C2562E-359A-3C42-BBEF-E02CE97BECB1}" type="datetimeFigureOut">
               <a:rPr lang="de-DE" smtClean="0"/>
               <a:pPr/>
-              <a:t>15.10.17</a:t>
+              <a:t>18.10.17</a:t>
             </a:fld>
             <a:endParaRPr lang="de-DE" dirty="0"/>
           </a:p>
@@ -2317,7 +3076,7 @@
           <p:cNvPr id="7" name="Fußzeilenplatzhalter 6">
             <a:extLst>
               <a:ext uri="{FF2B5EF4-FFF2-40B4-BE49-F238E27FC236}">
-                <a16:creationId xmlns="" xmlns:a16="http://schemas.microsoft.com/office/drawing/2014/main" id="{41953AE8-A571-4BCE-AF9C-CC7A649DD8C5}"/>
+                <a16:creationId xmlns:a16="http://schemas.microsoft.com/office/drawing/2014/main" xmlns="" id="{41953AE8-A571-4BCE-AF9C-CC7A649DD8C5}"/>
               </a:ext>
             </a:extLst>
           </p:cNvPr>
@@ -2342,7 +3101,7 @@
           <p:cNvPr id="8" name="Foliennummernplatzhalter 7">
             <a:extLst>
               <a:ext uri="{FF2B5EF4-FFF2-40B4-BE49-F238E27FC236}">
-                <a16:creationId xmlns="" xmlns:a16="http://schemas.microsoft.com/office/drawing/2014/main" id="{6DCAD949-98D9-4F76-BE67-6629B37422CB}"/>
+                <a16:creationId xmlns:a16="http://schemas.microsoft.com/office/drawing/2014/main" xmlns="" id="{6DCAD949-98D9-4F76-BE67-6629B37422CB}"/>
               </a:ext>
             </a:extLst>
           </p:cNvPr>
@@ -2443,7 +3202,7 @@
           <p:cNvPr id="2" name="Datumsplatzhalter 1">
             <a:extLst>
               <a:ext uri="{FF2B5EF4-FFF2-40B4-BE49-F238E27FC236}">
-                <a16:creationId xmlns="" xmlns:a16="http://schemas.microsoft.com/office/drawing/2014/main" id="{0F48F7B5-AF2D-4886-B660-ACFD0F3CA06C}"/>
+                <a16:creationId xmlns:a16="http://schemas.microsoft.com/office/drawing/2014/main" xmlns="" id="{0F48F7B5-AF2D-4886-B660-ACFD0F3CA06C}"/>
               </a:ext>
             </a:extLst>
           </p:cNvPr>
@@ -2462,7 +3221,7 @@
             <a:fld id="{17C2562E-359A-3C42-BBEF-E02CE97BECB1}" type="datetimeFigureOut">
               <a:rPr lang="de-DE" smtClean="0"/>
               <a:pPr/>
-              <a:t>15.10.17</a:t>
+              <a:t>18.10.17</a:t>
             </a:fld>
             <a:endParaRPr lang="de-DE" dirty="0"/>
           </a:p>
@@ -2473,7 +3232,7 @@
           <p:cNvPr id="7" name="Fußzeilenplatzhalter 6">
             <a:extLst>
               <a:ext uri="{FF2B5EF4-FFF2-40B4-BE49-F238E27FC236}">
-                <a16:creationId xmlns="" xmlns:a16="http://schemas.microsoft.com/office/drawing/2014/main" id="{C01D3F89-6DF4-4DC1-ABFC-4B69E0299624}"/>
+                <a16:creationId xmlns:a16="http://schemas.microsoft.com/office/drawing/2014/main" xmlns="" id="{C01D3F89-6DF4-4DC1-ABFC-4B69E0299624}"/>
               </a:ext>
             </a:extLst>
           </p:cNvPr>
@@ -2498,7 +3257,7 @@
           <p:cNvPr id="8" name="Foliennummernplatzhalter 7">
             <a:extLst>
               <a:ext uri="{FF2B5EF4-FFF2-40B4-BE49-F238E27FC236}">
-                <a16:creationId xmlns="" xmlns:a16="http://schemas.microsoft.com/office/drawing/2014/main" id="{BFD42FBE-0754-4285-A3CE-566D22A33C59}"/>
+                <a16:creationId xmlns:a16="http://schemas.microsoft.com/office/drawing/2014/main" xmlns="" id="{BFD42FBE-0754-4285-A3CE-566D22A33C59}"/>
               </a:ext>
             </a:extLst>
           </p:cNvPr>
@@ -2739,7 +3498,7 @@
           <p:cNvPr id="3" name="Datumsplatzhalter 2">
             <a:extLst>
               <a:ext uri="{FF2B5EF4-FFF2-40B4-BE49-F238E27FC236}">
-                <a16:creationId xmlns="" xmlns:a16="http://schemas.microsoft.com/office/drawing/2014/main" id="{434AC82E-1F55-4D6D-B12A-7355E3927B04}"/>
+                <a16:creationId xmlns:a16="http://schemas.microsoft.com/office/drawing/2014/main" xmlns="" id="{434AC82E-1F55-4D6D-B12A-7355E3927B04}"/>
               </a:ext>
             </a:extLst>
           </p:cNvPr>
@@ -2758,7 +3517,7 @@
             <a:fld id="{17C2562E-359A-3C42-BBEF-E02CE97BECB1}" type="datetimeFigureOut">
               <a:rPr lang="de-DE" smtClean="0"/>
               <a:pPr/>
-              <a:t>15.10.17</a:t>
+              <a:t>18.10.17</a:t>
             </a:fld>
             <a:endParaRPr lang="de-DE" dirty="0"/>
           </a:p>
@@ -2769,7 +3528,7 @@
           <p:cNvPr id="7" name="Fußzeilenplatzhalter 6">
             <a:extLst>
               <a:ext uri="{FF2B5EF4-FFF2-40B4-BE49-F238E27FC236}">
-                <a16:creationId xmlns="" xmlns:a16="http://schemas.microsoft.com/office/drawing/2014/main" id="{95F90759-2A54-4A06-B304-DFA3C45AF309}"/>
+                <a16:creationId xmlns:a16="http://schemas.microsoft.com/office/drawing/2014/main" xmlns="" id="{95F90759-2A54-4A06-B304-DFA3C45AF309}"/>
               </a:ext>
             </a:extLst>
           </p:cNvPr>
@@ -2794,7 +3553,7 @@
           <p:cNvPr id="8" name="Foliennummernplatzhalter 7">
             <a:extLst>
               <a:ext uri="{FF2B5EF4-FFF2-40B4-BE49-F238E27FC236}">
-                <a16:creationId xmlns="" xmlns:a16="http://schemas.microsoft.com/office/drawing/2014/main" id="{AAA489C6-E63E-4078-89A4-7CC1709D7206}"/>
+                <a16:creationId xmlns:a16="http://schemas.microsoft.com/office/drawing/2014/main" xmlns="" id="{AAA489C6-E63E-4078-89A4-7CC1709D7206}"/>
               </a:ext>
             </a:extLst>
           </p:cNvPr>
@@ -3076,7 +3835,7 @@
           <p:cNvPr id="3" name="Datumsplatzhalter 2">
             <a:extLst>
               <a:ext uri="{FF2B5EF4-FFF2-40B4-BE49-F238E27FC236}">
-                <a16:creationId xmlns="" xmlns:a16="http://schemas.microsoft.com/office/drawing/2014/main" id="{24A5A6B0-652D-48FC-AF73-17BD8D217D8E}"/>
+                <a16:creationId xmlns:a16="http://schemas.microsoft.com/office/drawing/2014/main" xmlns="" id="{24A5A6B0-652D-48FC-AF73-17BD8D217D8E}"/>
               </a:ext>
             </a:extLst>
           </p:cNvPr>
@@ -3095,7 +3854,7 @@
             <a:fld id="{17C2562E-359A-3C42-BBEF-E02CE97BECB1}" type="datetimeFigureOut">
               <a:rPr lang="de-DE" smtClean="0"/>
               <a:pPr/>
-              <a:t>15.10.17</a:t>
+              <a:t>18.10.17</a:t>
             </a:fld>
             <a:endParaRPr lang="de-DE" dirty="0"/>
           </a:p>
@@ -3106,7 +3865,7 @@
           <p:cNvPr id="7" name="Fußzeilenplatzhalter 6">
             <a:extLst>
               <a:ext uri="{FF2B5EF4-FFF2-40B4-BE49-F238E27FC236}">
-                <a16:creationId xmlns="" xmlns:a16="http://schemas.microsoft.com/office/drawing/2014/main" id="{239BA7E1-F103-432E-BC27-0127D2228DA4}"/>
+                <a16:creationId xmlns:a16="http://schemas.microsoft.com/office/drawing/2014/main" xmlns="" id="{239BA7E1-F103-432E-BC27-0127D2228DA4}"/>
               </a:ext>
             </a:extLst>
           </p:cNvPr>
@@ -3131,7 +3890,7 @@
           <p:cNvPr id="9" name="Foliennummernplatzhalter 8">
             <a:extLst>
               <a:ext uri="{FF2B5EF4-FFF2-40B4-BE49-F238E27FC236}">
-                <a16:creationId xmlns="" xmlns:a16="http://schemas.microsoft.com/office/drawing/2014/main" id="{E398A7F9-A765-46A7-B1D7-8FF6247ED6E8}"/>
+                <a16:creationId xmlns:a16="http://schemas.microsoft.com/office/drawing/2014/main" xmlns="" id="{E398A7F9-A765-46A7-B1D7-8FF6247ED6E8}"/>
               </a:ext>
             </a:extLst>
           </p:cNvPr>
@@ -3552,7 +4311,7 @@
           <p:cNvPr id="3" name="Datumsplatzhalter 2">
             <a:extLst>
               <a:ext uri="{FF2B5EF4-FFF2-40B4-BE49-F238E27FC236}">
-                <a16:creationId xmlns="" xmlns:a16="http://schemas.microsoft.com/office/drawing/2014/main" id="{E251BDE8-F6CD-4379-B02C-D58055E91CB7}"/>
+                <a16:creationId xmlns:a16="http://schemas.microsoft.com/office/drawing/2014/main" xmlns="" id="{E251BDE8-F6CD-4379-B02C-D58055E91CB7}"/>
               </a:ext>
             </a:extLst>
           </p:cNvPr>
@@ -3571,7 +4330,7 @@
             <a:fld id="{17C2562E-359A-3C42-BBEF-E02CE97BECB1}" type="datetimeFigureOut">
               <a:rPr lang="de-DE" smtClean="0"/>
               <a:pPr/>
-              <a:t>15.10.17</a:t>
+              <a:t>18.10.17</a:t>
             </a:fld>
             <a:endParaRPr lang="de-DE" dirty="0"/>
           </a:p>
@@ -3582,7 +4341,7 @@
           <p:cNvPr id="7" name="Fußzeilenplatzhalter 6">
             <a:extLst>
               <a:ext uri="{FF2B5EF4-FFF2-40B4-BE49-F238E27FC236}">
-                <a16:creationId xmlns="" xmlns:a16="http://schemas.microsoft.com/office/drawing/2014/main" id="{F684EDD4-7234-4CF4-A5B8-FCC6419FE199}"/>
+                <a16:creationId xmlns:a16="http://schemas.microsoft.com/office/drawing/2014/main" xmlns="" id="{F684EDD4-7234-4CF4-A5B8-FCC6419FE199}"/>
               </a:ext>
             </a:extLst>
           </p:cNvPr>
@@ -3607,7 +4366,7 @@
           <p:cNvPr id="8" name="Foliennummernplatzhalter 7">
             <a:extLst>
               <a:ext uri="{FF2B5EF4-FFF2-40B4-BE49-F238E27FC236}">
-                <a16:creationId xmlns="" xmlns:a16="http://schemas.microsoft.com/office/drawing/2014/main" id="{81EB7AF2-AEA0-439E-B5DA-DF760778341F}"/>
+                <a16:creationId xmlns:a16="http://schemas.microsoft.com/office/drawing/2014/main" xmlns="" id="{81EB7AF2-AEA0-439E-B5DA-DF760778341F}"/>
               </a:ext>
             </a:extLst>
           </p:cNvPr>
@@ -3935,7 +4694,7 @@
           <p:cNvPr id="3" name="Datumsplatzhalter 2">
             <a:extLst>
               <a:ext uri="{FF2B5EF4-FFF2-40B4-BE49-F238E27FC236}">
-                <a16:creationId xmlns="" xmlns:a16="http://schemas.microsoft.com/office/drawing/2014/main" id="{C2E5ECD2-BEB5-47D1-A89E-69496048A8D5}"/>
+                <a16:creationId xmlns:a16="http://schemas.microsoft.com/office/drawing/2014/main" xmlns="" id="{C2E5ECD2-BEB5-47D1-A89E-69496048A8D5}"/>
               </a:ext>
             </a:extLst>
           </p:cNvPr>
@@ -3954,7 +4713,7 @@
             <a:fld id="{17C2562E-359A-3C42-BBEF-E02CE97BECB1}" type="datetimeFigureOut">
               <a:rPr lang="de-DE" smtClean="0"/>
               <a:pPr/>
-              <a:t>15.10.17</a:t>
+              <a:t>18.10.17</a:t>
             </a:fld>
             <a:endParaRPr lang="de-DE" dirty="0"/>
           </a:p>
@@ -3965,7 +4724,7 @@
           <p:cNvPr id="7" name="Fußzeilenplatzhalter 6">
             <a:extLst>
               <a:ext uri="{FF2B5EF4-FFF2-40B4-BE49-F238E27FC236}">
-                <a16:creationId xmlns="" xmlns:a16="http://schemas.microsoft.com/office/drawing/2014/main" id="{8DADA64D-3A7A-4438-9197-BD2830657223}"/>
+                <a16:creationId xmlns:a16="http://schemas.microsoft.com/office/drawing/2014/main" xmlns="" id="{8DADA64D-3A7A-4438-9197-BD2830657223}"/>
               </a:ext>
             </a:extLst>
           </p:cNvPr>
@@ -3990,7 +4749,7 @@
           <p:cNvPr id="9" name="Foliennummernplatzhalter 8">
             <a:extLst>
               <a:ext uri="{FF2B5EF4-FFF2-40B4-BE49-F238E27FC236}">
-                <a16:creationId xmlns="" xmlns:a16="http://schemas.microsoft.com/office/drawing/2014/main" id="{3D8A091A-178E-435F-9EA9-84BA66D378CC}"/>
+                <a16:creationId xmlns:a16="http://schemas.microsoft.com/office/drawing/2014/main" xmlns="" id="{3D8A091A-178E-435F-9EA9-84BA66D378CC}"/>
               </a:ext>
             </a:extLst>
           </p:cNvPr>
@@ -4621,7 +5380,7 @@
           <p:cNvPr id="6" name="Datumsplatzhalter 5">
             <a:extLst>
               <a:ext uri="{FF2B5EF4-FFF2-40B4-BE49-F238E27FC236}">
-                <a16:creationId xmlns="" xmlns:a16="http://schemas.microsoft.com/office/drawing/2014/main" id="{E75B6010-F5BB-4F22-8221-D75D21F6EB55}"/>
+                <a16:creationId xmlns:a16="http://schemas.microsoft.com/office/drawing/2014/main" xmlns="" id="{E75B6010-F5BB-4F22-8221-D75D21F6EB55}"/>
               </a:ext>
             </a:extLst>
           </p:cNvPr>
@@ -4640,7 +5399,7 @@
             <a:fld id="{17C2562E-359A-3C42-BBEF-E02CE97BECB1}" type="datetimeFigureOut">
               <a:rPr lang="de-DE" smtClean="0"/>
               <a:pPr/>
-              <a:t>15.10.17</a:t>
+              <a:t>18.10.17</a:t>
             </a:fld>
             <a:endParaRPr lang="de-DE" dirty="0"/>
           </a:p>
@@ -4651,7 +5410,7 @@
           <p:cNvPr id="7" name="Fußzeilenplatzhalter 6">
             <a:extLst>
               <a:ext uri="{FF2B5EF4-FFF2-40B4-BE49-F238E27FC236}">
-                <a16:creationId xmlns="" xmlns:a16="http://schemas.microsoft.com/office/drawing/2014/main" id="{26547C97-5C9B-4C14-8D49-A5E83DFFB45A}"/>
+                <a16:creationId xmlns:a16="http://schemas.microsoft.com/office/drawing/2014/main" xmlns="" id="{26547C97-5C9B-4C14-8D49-A5E83DFFB45A}"/>
               </a:ext>
             </a:extLst>
           </p:cNvPr>
@@ -4676,7 +5435,7 @@
           <p:cNvPr id="11" name="Foliennummernplatzhalter 10">
             <a:extLst>
               <a:ext uri="{FF2B5EF4-FFF2-40B4-BE49-F238E27FC236}">
-                <a16:creationId xmlns="" xmlns:a16="http://schemas.microsoft.com/office/drawing/2014/main" id="{98B57AAA-67F4-4EFE-A062-411C04E4F8A2}"/>
+                <a16:creationId xmlns:a16="http://schemas.microsoft.com/office/drawing/2014/main" xmlns="" id="{98B57AAA-67F4-4EFE-A062-411C04E4F8A2}"/>
               </a:ext>
             </a:extLst>
           </p:cNvPr>
@@ -5215,7 +5974,7 @@
           <p:cNvPr id="5" name="Datumsplatzhalter 4">
             <a:extLst>
               <a:ext uri="{FF2B5EF4-FFF2-40B4-BE49-F238E27FC236}">
-                <a16:creationId xmlns="" xmlns:a16="http://schemas.microsoft.com/office/drawing/2014/main" id="{0C7C8404-609B-40A1-85F0-0C1D3C5C6357}"/>
+                <a16:creationId xmlns:a16="http://schemas.microsoft.com/office/drawing/2014/main" xmlns="" id="{0C7C8404-609B-40A1-85F0-0C1D3C5C6357}"/>
               </a:ext>
             </a:extLst>
           </p:cNvPr>
@@ -5234,7 +5993,7 @@
             <a:fld id="{17C2562E-359A-3C42-BBEF-E02CE97BECB1}" type="datetimeFigureOut">
               <a:rPr lang="de-DE" smtClean="0"/>
               <a:pPr/>
-              <a:t>15.10.17</a:t>
+              <a:t>18.10.17</a:t>
             </a:fld>
             <a:endParaRPr lang="de-DE" dirty="0"/>
           </a:p>
@@ -5245,7 +6004,7 @@
           <p:cNvPr id="8" name="Fußzeilenplatzhalter 7">
             <a:extLst>
               <a:ext uri="{FF2B5EF4-FFF2-40B4-BE49-F238E27FC236}">
-                <a16:creationId xmlns="" xmlns:a16="http://schemas.microsoft.com/office/drawing/2014/main" id="{3C29D00E-B305-494B-A605-238A832848F3}"/>
+                <a16:creationId xmlns:a16="http://schemas.microsoft.com/office/drawing/2014/main" xmlns="" id="{3C29D00E-B305-494B-A605-238A832848F3}"/>
               </a:ext>
             </a:extLst>
           </p:cNvPr>
@@ -5270,7 +6029,7 @@
           <p:cNvPr id="9" name="Foliennummernplatzhalter 8">
             <a:extLst>
               <a:ext uri="{FF2B5EF4-FFF2-40B4-BE49-F238E27FC236}">
-                <a16:creationId xmlns="" xmlns:a16="http://schemas.microsoft.com/office/drawing/2014/main" id="{7FC7C27A-51A6-4577-BAAE-22B90EFD1D16}"/>
+                <a16:creationId xmlns:a16="http://schemas.microsoft.com/office/drawing/2014/main" xmlns="" id="{7FC7C27A-51A6-4577-BAAE-22B90EFD1D16}"/>
               </a:ext>
             </a:extLst>
           </p:cNvPr>
@@ -6039,7 +6798,7 @@
           <p:cNvPr id="5" name="Datumsplatzhalter 4">
             <a:extLst>
               <a:ext uri="{FF2B5EF4-FFF2-40B4-BE49-F238E27FC236}">
-                <a16:creationId xmlns="" xmlns:a16="http://schemas.microsoft.com/office/drawing/2014/main" id="{33D616DE-E3B4-4D35-BB61-A1FFAD7A5AAF}"/>
+                <a16:creationId xmlns:a16="http://schemas.microsoft.com/office/drawing/2014/main" xmlns="" id="{33D616DE-E3B4-4D35-BB61-A1FFAD7A5AAF}"/>
               </a:ext>
             </a:extLst>
           </p:cNvPr>
@@ -6058,7 +6817,7 @@
             <a:fld id="{17C2562E-359A-3C42-BBEF-E02CE97BECB1}" type="datetimeFigureOut">
               <a:rPr lang="de-DE" smtClean="0"/>
               <a:pPr/>
-              <a:t>15.10.17</a:t>
+              <a:t>18.10.17</a:t>
             </a:fld>
             <a:endParaRPr lang="de-DE" dirty="0"/>
           </a:p>
@@ -6069,7 +6828,7 @@
           <p:cNvPr id="7" name="Fußzeilenplatzhalter 6">
             <a:extLst>
               <a:ext uri="{FF2B5EF4-FFF2-40B4-BE49-F238E27FC236}">
-                <a16:creationId xmlns="" xmlns:a16="http://schemas.microsoft.com/office/drawing/2014/main" id="{009571DE-76C3-4B92-A98C-31AD1C84E96F}"/>
+                <a16:creationId xmlns:a16="http://schemas.microsoft.com/office/drawing/2014/main" xmlns="" id="{009571DE-76C3-4B92-A98C-31AD1C84E96F}"/>
               </a:ext>
             </a:extLst>
           </p:cNvPr>
@@ -6094,7 +6853,7 @@
           <p:cNvPr id="10" name="Foliennummernplatzhalter 9">
             <a:extLst>
               <a:ext uri="{FF2B5EF4-FFF2-40B4-BE49-F238E27FC236}">
-                <a16:creationId xmlns="" xmlns:a16="http://schemas.microsoft.com/office/drawing/2014/main" id="{A873DEEA-A3E3-4201-A6F9-C92D0EB9E730}"/>
+                <a16:creationId xmlns:a16="http://schemas.microsoft.com/office/drawing/2014/main" xmlns="" id="{A873DEEA-A3E3-4201-A6F9-C92D0EB9E730}"/>
               </a:ext>
             </a:extLst>
           </p:cNvPr>
@@ -6519,7 +7278,7 @@
           <p:cNvPr id="6" name="Datumsplatzhalter 5">
             <a:extLst>
               <a:ext uri="{FF2B5EF4-FFF2-40B4-BE49-F238E27FC236}">
-                <a16:creationId xmlns="" xmlns:a16="http://schemas.microsoft.com/office/drawing/2014/main" id="{BE1F9E44-CCA9-4032-B773-94D7E2DF8ED5}"/>
+                <a16:creationId xmlns:a16="http://schemas.microsoft.com/office/drawing/2014/main" xmlns="" id="{BE1F9E44-CCA9-4032-B773-94D7E2DF8ED5}"/>
               </a:ext>
             </a:extLst>
           </p:cNvPr>
@@ -6538,7 +7297,7 @@
             <a:fld id="{17C2562E-359A-3C42-BBEF-E02CE97BECB1}" type="datetimeFigureOut">
               <a:rPr lang="de-DE" smtClean="0"/>
               <a:pPr/>
-              <a:t>15.10.17</a:t>
+              <a:t>18.10.17</a:t>
             </a:fld>
             <a:endParaRPr lang="de-DE" dirty="0"/>
           </a:p>
@@ -6549,7 +7308,7 @@
           <p:cNvPr id="7" name="Fußzeilenplatzhalter 6">
             <a:extLst>
               <a:ext uri="{FF2B5EF4-FFF2-40B4-BE49-F238E27FC236}">
-                <a16:creationId xmlns="" xmlns:a16="http://schemas.microsoft.com/office/drawing/2014/main" id="{4D3B4066-4E5D-4AAB-A33C-01B8A1CAA20D}"/>
+                <a16:creationId xmlns:a16="http://schemas.microsoft.com/office/drawing/2014/main" xmlns="" id="{4D3B4066-4E5D-4AAB-A33C-01B8A1CAA20D}"/>
               </a:ext>
             </a:extLst>
           </p:cNvPr>
@@ -6574,7 +7333,7 @@
           <p:cNvPr id="8" name="Foliennummernplatzhalter 7">
             <a:extLst>
               <a:ext uri="{FF2B5EF4-FFF2-40B4-BE49-F238E27FC236}">
-                <a16:creationId xmlns="" xmlns:a16="http://schemas.microsoft.com/office/drawing/2014/main" id="{52AE4811-CB7B-4E63-92A7-E2967B6AEBEE}"/>
+                <a16:creationId xmlns:a16="http://schemas.microsoft.com/office/drawing/2014/main" xmlns="" id="{52AE4811-CB7B-4E63-92A7-E2967B6AEBEE}"/>
               </a:ext>
             </a:extLst>
           </p:cNvPr>
@@ -7361,7 +8120,7 @@
           <p:cNvPr id="5" name="Datumsplatzhalter 4">
             <a:extLst>
               <a:ext uri="{FF2B5EF4-FFF2-40B4-BE49-F238E27FC236}">
-                <a16:creationId xmlns="" xmlns:a16="http://schemas.microsoft.com/office/drawing/2014/main" id="{7AEDF8C5-F6FB-4119-B6A3-908B246DAB0B}"/>
+                <a16:creationId xmlns:a16="http://schemas.microsoft.com/office/drawing/2014/main" xmlns="" id="{7AEDF8C5-F6FB-4119-B6A3-908B246DAB0B}"/>
               </a:ext>
             </a:extLst>
           </p:cNvPr>
@@ -7380,7 +8139,7 @@
             <a:fld id="{17C2562E-359A-3C42-BBEF-E02CE97BECB1}" type="datetimeFigureOut">
               <a:rPr lang="de-DE" smtClean="0"/>
               <a:pPr/>
-              <a:t>15.10.17</a:t>
+              <a:t>18.10.17</a:t>
             </a:fld>
             <a:endParaRPr lang="de-DE" dirty="0"/>
           </a:p>
@@ -7391,7 +8150,7 @@
           <p:cNvPr id="7" name="Fußzeilenplatzhalter 6">
             <a:extLst>
               <a:ext uri="{FF2B5EF4-FFF2-40B4-BE49-F238E27FC236}">
-                <a16:creationId xmlns="" xmlns:a16="http://schemas.microsoft.com/office/drawing/2014/main" id="{4CCDEB9D-85DD-4CF0-96C7-BA711D11F2BE}"/>
+                <a16:creationId xmlns:a16="http://schemas.microsoft.com/office/drawing/2014/main" xmlns="" id="{4CCDEB9D-85DD-4CF0-96C7-BA711D11F2BE}"/>
               </a:ext>
             </a:extLst>
           </p:cNvPr>
@@ -7416,7 +8175,7 @@
           <p:cNvPr id="9" name="Foliennummernplatzhalter 8">
             <a:extLst>
               <a:ext uri="{FF2B5EF4-FFF2-40B4-BE49-F238E27FC236}">
-                <a16:creationId xmlns="" xmlns:a16="http://schemas.microsoft.com/office/drawing/2014/main" id="{418E80D9-3450-43BD-94A9-22C9BF91B1C0}"/>
+                <a16:creationId xmlns:a16="http://schemas.microsoft.com/office/drawing/2014/main" xmlns="" id="{418E80D9-3450-43BD-94A9-22C9BF91B1C0}"/>
               </a:ext>
             </a:extLst>
           </p:cNvPr>
@@ -8162,7 +8921,7 @@
           <p:cNvPr id="3" name="Datumsplatzhalter 2">
             <a:extLst>
               <a:ext uri="{FF2B5EF4-FFF2-40B4-BE49-F238E27FC236}">
-                <a16:creationId xmlns="" xmlns:a16="http://schemas.microsoft.com/office/drawing/2014/main" id="{25D8C277-6F42-4B11-AB90-EBE3A1238A85}"/>
+                <a16:creationId xmlns:a16="http://schemas.microsoft.com/office/drawing/2014/main" xmlns="" id="{25D8C277-6F42-4B11-AB90-EBE3A1238A85}"/>
               </a:ext>
             </a:extLst>
           </p:cNvPr>
@@ -8181,7 +8940,7 @@
             <a:fld id="{17C2562E-359A-3C42-BBEF-E02CE97BECB1}" type="datetimeFigureOut">
               <a:rPr lang="de-DE" smtClean="0"/>
               <a:pPr/>
-              <a:t>15.10.17</a:t>
+              <a:t>18.10.17</a:t>
             </a:fld>
             <a:endParaRPr lang="de-DE" dirty="0"/>
           </a:p>
@@ -8192,7 +8951,7 @@
           <p:cNvPr id="4" name="Fußzeilenplatzhalter 3">
             <a:extLst>
               <a:ext uri="{FF2B5EF4-FFF2-40B4-BE49-F238E27FC236}">
-                <a16:creationId xmlns="" xmlns:a16="http://schemas.microsoft.com/office/drawing/2014/main" id="{4815A052-9443-41A9-9F46-0AA437EEDDA5}"/>
+                <a16:creationId xmlns:a16="http://schemas.microsoft.com/office/drawing/2014/main" xmlns="" id="{4815A052-9443-41A9-9F46-0AA437EEDDA5}"/>
               </a:ext>
             </a:extLst>
           </p:cNvPr>
@@ -8217,7 +8976,7 @@
           <p:cNvPr id="5" name="Foliennummernplatzhalter 4">
             <a:extLst>
               <a:ext uri="{FF2B5EF4-FFF2-40B4-BE49-F238E27FC236}">
-                <a16:creationId xmlns="" xmlns:a16="http://schemas.microsoft.com/office/drawing/2014/main" id="{5F7C50D9-9DEA-4EFD-ACE3-677BBD4DEB55}"/>
+                <a16:creationId xmlns:a16="http://schemas.microsoft.com/office/drawing/2014/main" xmlns="" id="{5F7C50D9-9DEA-4EFD-ACE3-677BBD4DEB55}"/>
               </a:ext>
             </a:extLst>
           </p:cNvPr>
@@ -8683,7 +9442,7 @@
           <p:cNvPr id="5" name="Datumsplatzhalter 4">
             <a:extLst>
               <a:ext uri="{FF2B5EF4-FFF2-40B4-BE49-F238E27FC236}">
-                <a16:creationId xmlns="" xmlns:a16="http://schemas.microsoft.com/office/drawing/2014/main" id="{6B4135B1-E114-41F0-9C64-3A26186B834F}"/>
+                <a16:creationId xmlns:a16="http://schemas.microsoft.com/office/drawing/2014/main" xmlns="" id="{6B4135B1-E114-41F0-9C64-3A26186B834F}"/>
               </a:ext>
             </a:extLst>
           </p:cNvPr>
@@ -8702,7 +9461,7 @@
             <a:fld id="{17C2562E-359A-3C42-BBEF-E02CE97BECB1}" type="datetimeFigureOut">
               <a:rPr lang="de-DE" smtClean="0"/>
               <a:pPr/>
-              <a:t>15.10.17</a:t>
+              <a:t>18.10.17</a:t>
             </a:fld>
             <a:endParaRPr lang="de-DE" dirty="0"/>
           </a:p>
@@ -8713,7 +9472,7 @@
           <p:cNvPr id="7" name="Fußzeilenplatzhalter 6">
             <a:extLst>
               <a:ext uri="{FF2B5EF4-FFF2-40B4-BE49-F238E27FC236}">
-                <a16:creationId xmlns="" xmlns:a16="http://schemas.microsoft.com/office/drawing/2014/main" id="{84D81854-B37F-4ADF-A34F-BF0CCA2926F2}"/>
+                <a16:creationId xmlns:a16="http://schemas.microsoft.com/office/drawing/2014/main" xmlns="" id="{84D81854-B37F-4ADF-A34F-BF0CCA2926F2}"/>
               </a:ext>
             </a:extLst>
           </p:cNvPr>
@@ -8738,7 +9497,7 @@
           <p:cNvPr id="9" name="Foliennummernplatzhalter 8">
             <a:extLst>
               <a:ext uri="{FF2B5EF4-FFF2-40B4-BE49-F238E27FC236}">
-                <a16:creationId xmlns="" xmlns:a16="http://schemas.microsoft.com/office/drawing/2014/main" id="{2EE17D9C-06FE-45C8-B312-4C5617C49000}"/>
+                <a16:creationId xmlns:a16="http://schemas.microsoft.com/office/drawing/2014/main" xmlns="" id="{2EE17D9C-06FE-45C8-B312-4C5617C49000}"/>
               </a:ext>
             </a:extLst>
           </p:cNvPr>
@@ -9163,7 +9922,7 @@
           <p:cNvPr id="10" name="Datumsplatzhalter 9">
             <a:extLst>
               <a:ext uri="{FF2B5EF4-FFF2-40B4-BE49-F238E27FC236}">
-                <a16:creationId xmlns="" xmlns:a16="http://schemas.microsoft.com/office/drawing/2014/main" id="{F92E0490-C295-4C99-B9D1-6310B9164EDD}"/>
+                <a16:creationId xmlns:a16="http://schemas.microsoft.com/office/drawing/2014/main" xmlns="" id="{F92E0490-C295-4C99-B9D1-6310B9164EDD}"/>
               </a:ext>
             </a:extLst>
           </p:cNvPr>
@@ -9182,7 +9941,7 @@
             <a:fld id="{17C2562E-359A-3C42-BBEF-E02CE97BECB1}" type="datetimeFigureOut">
               <a:rPr lang="de-DE" smtClean="0"/>
               <a:pPr/>
-              <a:t>15.10.17</a:t>
+              <a:t>18.10.17</a:t>
             </a:fld>
             <a:endParaRPr lang="de-DE" dirty="0"/>
           </a:p>
@@ -9193,7 +9952,7 @@
           <p:cNvPr id="11" name="Fußzeilenplatzhalter 10">
             <a:extLst>
               <a:ext uri="{FF2B5EF4-FFF2-40B4-BE49-F238E27FC236}">
-                <a16:creationId xmlns="" xmlns:a16="http://schemas.microsoft.com/office/drawing/2014/main" id="{DD98C48F-3C69-4703-B4CC-632DDDDB497C}"/>
+                <a16:creationId xmlns:a16="http://schemas.microsoft.com/office/drawing/2014/main" xmlns="" id="{DD98C48F-3C69-4703-B4CC-632DDDDB497C}"/>
               </a:ext>
             </a:extLst>
           </p:cNvPr>
@@ -9218,7 +9977,7 @@
           <p:cNvPr id="15" name="Foliennummernplatzhalter 14">
             <a:extLst>
               <a:ext uri="{FF2B5EF4-FFF2-40B4-BE49-F238E27FC236}">
-                <a16:creationId xmlns="" xmlns:a16="http://schemas.microsoft.com/office/drawing/2014/main" id="{1968527D-44A1-407F-99A6-2ACAB46FBD28}"/>
+                <a16:creationId xmlns:a16="http://schemas.microsoft.com/office/drawing/2014/main" xmlns="" id="{1968527D-44A1-407F-99A6-2ACAB46FBD28}"/>
               </a:ext>
             </a:extLst>
           </p:cNvPr>
@@ -10005,7 +10764,7 @@
           <p:cNvPr id="5" name="Datumsplatzhalter 4">
             <a:extLst>
               <a:ext uri="{FF2B5EF4-FFF2-40B4-BE49-F238E27FC236}">
-                <a16:creationId xmlns="" xmlns:a16="http://schemas.microsoft.com/office/drawing/2014/main" id="{8AFAB162-0FDB-4A37-A4FD-CBFC89474486}"/>
+                <a16:creationId xmlns:a16="http://schemas.microsoft.com/office/drawing/2014/main" xmlns="" id="{8AFAB162-0FDB-4A37-A4FD-CBFC89474486}"/>
               </a:ext>
             </a:extLst>
           </p:cNvPr>
@@ -10024,7 +10783,7 @@
             <a:fld id="{17C2562E-359A-3C42-BBEF-E02CE97BECB1}" type="datetimeFigureOut">
               <a:rPr lang="de-DE" smtClean="0"/>
               <a:pPr/>
-              <a:t>15.10.17</a:t>
+              <a:t>18.10.17</a:t>
             </a:fld>
             <a:endParaRPr lang="de-DE" dirty="0"/>
           </a:p>
@@ -10035,7 +10794,7 @@
           <p:cNvPr id="7" name="Fußzeilenplatzhalter 6">
             <a:extLst>
               <a:ext uri="{FF2B5EF4-FFF2-40B4-BE49-F238E27FC236}">
-                <a16:creationId xmlns="" xmlns:a16="http://schemas.microsoft.com/office/drawing/2014/main" id="{46B12C25-0691-43C5-8596-6B8AD0039874}"/>
+                <a16:creationId xmlns:a16="http://schemas.microsoft.com/office/drawing/2014/main" xmlns="" id="{46B12C25-0691-43C5-8596-6B8AD0039874}"/>
               </a:ext>
             </a:extLst>
           </p:cNvPr>
@@ -10060,7 +10819,7 @@
           <p:cNvPr id="9" name="Foliennummernplatzhalter 8">
             <a:extLst>
               <a:ext uri="{FF2B5EF4-FFF2-40B4-BE49-F238E27FC236}">
-                <a16:creationId xmlns="" xmlns:a16="http://schemas.microsoft.com/office/drawing/2014/main" id="{7C5C2594-4A54-4AE0-88EE-FB17FDD4570C}"/>
+                <a16:creationId xmlns:a16="http://schemas.microsoft.com/office/drawing/2014/main" xmlns="" id="{7C5C2594-4A54-4AE0-88EE-FB17FDD4570C}"/>
               </a:ext>
             </a:extLst>
           </p:cNvPr>
@@ -10806,7 +11565,7 @@
           <p:cNvPr id="5" name="Datumsplatzhalter 4">
             <a:extLst>
               <a:ext uri="{FF2B5EF4-FFF2-40B4-BE49-F238E27FC236}">
-                <a16:creationId xmlns="" xmlns:a16="http://schemas.microsoft.com/office/drawing/2014/main" id="{D1D6952B-45CB-46FF-9F9B-1F98CC255417}"/>
+                <a16:creationId xmlns:a16="http://schemas.microsoft.com/office/drawing/2014/main" xmlns="" id="{D1D6952B-45CB-46FF-9F9B-1F98CC255417}"/>
               </a:ext>
             </a:extLst>
           </p:cNvPr>
@@ -10825,7 +11584,7 @@
             <a:fld id="{17C2562E-359A-3C42-BBEF-E02CE97BECB1}" type="datetimeFigureOut">
               <a:rPr lang="de-DE" smtClean="0"/>
               <a:pPr/>
-              <a:t>15.10.17</a:t>
+              <a:t>18.10.17</a:t>
             </a:fld>
             <a:endParaRPr lang="de-DE" dirty="0"/>
           </a:p>
@@ -10836,7 +11595,7 @@
           <p:cNvPr id="7" name="Fußzeilenplatzhalter 6">
             <a:extLst>
               <a:ext uri="{FF2B5EF4-FFF2-40B4-BE49-F238E27FC236}">
-                <a16:creationId xmlns="" xmlns:a16="http://schemas.microsoft.com/office/drawing/2014/main" id="{3C08D0C6-0E40-46E2-9D6C-74181D953DFE}"/>
+                <a16:creationId xmlns:a16="http://schemas.microsoft.com/office/drawing/2014/main" xmlns="" id="{3C08D0C6-0E40-46E2-9D6C-74181D953DFE}"/>
               </a:ext>
             </a:extLst>
           </p:cNvPr>
@@ -10861,7 +11620,7 @@
           <p:cNvPr id="8" name="Foliennummernplatzhalter 7">
             <a:extLst>
               <a:ext uri="{FF2B5EF4-FFF2-40B4-BE49-F238E27FC236}">
-                <a16:creationId xmlns="" xmlns:a16="http://schemas.microsoft.com/office/drawing/2014/main" id="{EA500A2A-E0AD-4AD6-AB58-61BF900F0E2C}"/>
+                <a16:creationId xmlns:a16="http://schemas.microsoft.com/office/drawing/2014/main" xmlns="" id="{EA500A2A-E0AD-4AD6-AB58-61BF900F0E2C}"/>
               </a:ext>
             </a:extLst>
           </p:cNvPr>
@@ -10965,7 +11724,7 @@
           <p:cNvPr id="5" name="Datumsplatzhalter 4">
             <a:extLst>
               <a:ext uri="{FF2B5EF4-FFF2-40B4-BE49-F238E27FC236}">
-                <a16:creationId xmlns="" xmlns:a16="http://schemas.microsoft.com/office/drawing/2014/main" id="{A181F7F8-D379-4070-8216-3B81228BAEC6}"/>
+                <a16:creationId xmlns:a16="http://schemas.microsoft.com/office/drawing/2014/main" xmlns="" id="{A181F7F8-D379-4070-8216-3B81228BAEC6}"/>
               </a:ext>
             </a:extLst>
           </p:cNvPr>
@@ -10984,7 +11743,7 @@
             <a:fld id="{17C2562E-359A-3C42-BBEF-E02CE97BECB1}" type="datetimeFigureOut">
               <a:rPr lang="de-DE" smtClean="0"/>
               <a:pPr/>
-              <a:t>15.10.17</a:t>
+              <a:t>18.10.17</a:t>
             </a:fld>
             <a:endParaRPr lang="de-DE" dirty="0"/>
           </a:p>
@@ -10995,7 +11754,7 @@
           <p:cNvPr id="7" name="Fußzeilenplatzhalter 6">
             <a:extLst>
               <a:ext uri="{FF2B5EF4-FFF2-40B4-BE49-F238E27FC236}">
-                <a16:creationId xmlns="" xmlns:a16="http://schemas.microsoft.com/office/drawing/2014/main" id="{D8E0E4FD-5CC1-4D23-A3E8-7DAB1134A4FA}"/>
+                <a16:creationId xmlns:a16="http://schemas.microsoft.com/office/drawing/2014/main" xmlns="" id="{D8E0E4FD-5CC1-4D23-A3E8-7DAB1134A4FA}"/>
               </a:ext>
             </a:extLst>
           </p:cNvPr>
@@ -11020,7 +11779,7 @@
           <p:cNvPr id="8" name="Foliennummernplatzhalter 7">
             <a:extLst>
               <a:ext uri="{FF2B5EF4-FFF2-40B4-BE49-F238E27FC236}">
-                <a16:creationId xmlns="" xmlns:a16="http://schemas.microsoft.com/office/drawing/2014/main" id="{6D72C792-B02A-4A44-BF65-9B261DE5D43D}"/>
+                <a16:creationId xmlns:a16="http://schemas.microsoft.com/office/drawing/2014/main" xmlns="" id="{6D72C792-B02A-4A44-BF65-9B261DE5D43D}"/>
               </a:ext>
             </a:extLst>
           </p:cNvPr>
@@ -11417,7 +12176,7 @@
           <p:cNvPr id="2" name="Datumsplatzhalter 1">
             <a:extLst>
               <a:ext uri="{FF2B5EF4-FFF2-40B4-BE49-F238E27FC236}">
-                <a16:creationId xmlns="" xmlns:a16="http://schemas.microsoft.com/office/drawing/2014/main" id="{B1E6CA30-BA19-47F1-BFEE-B5E43CCEC731}"/>
+                <a16:creationId xmlns:a16="http://schemas.microsoft.com/office/drawing/2014/main" xmlns="" id="{B1E6CA30-BA19-47F1-BFEE-B5E43CCEC731}"/>
               </a:ext>
             </a:extLst>
           </p:cNvPr>
@@ -11436,7 +12195,7 @@
             <a:fld id="{17C2562E-359A-3C42-BBEF-E02CE97BECB1}" type="datetimeFigureOut">
               <a:rPr lang="de-DE" smtClean="0"/>
               <a:pPr/>
-              <a:t>15.10.17</a:t>
+              <a:t>18.10.17</a:t>
             </a:fld>
             <a:endParaRPr lang="de-DE" dirty="0"/>
           </a:p>
@@ -11447,7 +12206,7 @@
           <p:cNvPr id="14" name="Fußzeilenplatzhalter 13">
             <a:extLst>
               <a:ext uri="{FF2B5EF4-FFF2-40B4-BE49-F238E27FC236}">
-                <a16:creationId xmlns="" xmlns:a16="http://schemas.microsoft.com/office/drawing/2014/main" id="{06236A5B-AF48-4E5C-BD02-27BC73328D88}"/>
+                <a16:creationId xmlns:a16="http://schemas.microsoft.com/office/drawing/2014/main" xmlns="" id="{06236A5B-AF48-4E5C-BD02-27BC73328D88}"/>
               </a:ext>
             </a:extLst>
           </p:cNvPr>
@@ -11472,7 +12231,7 @@
           <p:cNvPr id="15" name="Foliennummernplatzhalter 14">
             <a:extLst>
               <a:ext uri="{FF2B5EF4-FFF2-40B4-BE49-F238E27FC236}">
-                <a16:creationId xmlns="" xmlns:a16="http://schemas.microsoft.com/office/drawing/2014/main" id="{6C539E6F-C163-4DFD-A93D-F463843C6D4E}"/>
+                <a16:creationId xmlns:a16="http://schemas.microsoft.com/office/drawing/2014/main" xmlns="" id="{6C539E6F-C163-4DFD-A93D-F463843C6D4E}"/>
               </a:ext>
             </a:extLst>
           </p:cNvPr>
@@ -11788,7 +12547,7 @@
           <p:cNvPr id="7" name="Datumsplatzhalter 6">
             <a:extLst>
               <a:ext uri="{FF2B5EF4-FFF2-40B4-BE49-F238E27FC236}">
-                <a16:creationId xmlns="" xmlns:a16="http://schemas.microsoft.com/office/drawing/2014/main" id="{E9F2D5EB-EB07-4AC4-94D4-FA6BD7E87398}"/>
+                <a16:creationId xmlns:a16="http://schemas.microsoft.com/office/drawing/2014/main" xmlns="" id="{E9F2D5EB-EB07-4AC4-94D4-FA6BD7E87398}"/>
               </a:ext>
             </a:extLst>
           </p:cNvPr>
@@ -11807,7 +12566,7 @@
             <a:fld id="{17C2562E-359A-3C42-BBEF-E02CE97BECB1}" type="datetimeFigureOut">
               <a:rPr lang="de-DE" smtClean="0"/>
               <a:pPr/>
-              <a:t>15.10.17</a:t>
+              <a:t>18.10.17</a:t>
             </a:fld>
             <a:endParaRPr lang="de-DE" dirty="0"/>
           </a:p>
@@ -11818,7 +12577,7 @@
           <p:cNvPr id="8" name="Fußzeilenplatzhalter 7">
             <a:extLst>
               <a:ext uri="{FF2B5EF4-FFF2-40B4-BE49-F238E27FC236}">
-                <a16:creationId xmlns="" xmlns:a16="http://schemas.microsoft.com/office/drawing/2014/main" id="{947F1BF2-5B5A-4E3F-9A69-A7FC06CEE6DA}"/>
+                <a16:creationId xmlns:a16="http://schemas.microsoft.com/office/drawing/2014/main" xmlns="" id="{947F1BF2-5B5A-4E3F-9A69-A7FC06CEE6DA}"/>
               </a:ext>
             </a:extLst>
           </p:cNvPr>
@@ -11843,7 +12602,7 @@
           <p:cNvPr id="9" name="Foliennummernplatzhalter 8">
             <a:extLst>
               <a:ext uri="{FF2B5EF4-FFF2-40B4-BE49-F238E27FC236}">
-                <a16:creationId xmlns="" xmlns:a16="http://schemas.microsoft.com/office/drawing/2014/main" id="{B0D6E36A-E68C-4CFF-A1B3-ADE80884E18E}"/>
+                <a16:creationId xmlns:a16="http://schemas.microsoft.com/office/drawing/2014/main" xmlns="" id="{B0D6E36A-E68C-4CFF-A1B3-ADE80884E18E}"/>
               </a:ext>
             </a:extLst>
           </p:cNvPr>
@@ -11934,7 +12693,7 @@
           <a:noFill/>
           <a:extLst>
             <a:ext uri="{909E8E84-426E-40dd-AFC4-6F175D3DCCD1}">
-              <a14:hiddenFill xmlns="" xmlns:a14="http://schemas.microsoft.com/office/drawing/2010/main">
+              <a14:hiddenFill xmlns:a14="http://schemas.microsoft.com/office/drawing/2010/main" xmlns="">
                 <a:solidFill>
                   <a:srgbClr val="FFFFFF"/>
                 </a:solidFill>
@@ -12014,7 +12773,7 @@
           <a:noFill/>
           <a:extLst>
             <a:ext uri="{909E8E84-426E-40dd-AFC4-6F175D3DCCD1}">
-              <a14:hiddenFill xmlns="" xmlns:a14="http://schemas.microsoft.com/office/drawing/2010/main">
+              <a14:hiddenFill xmlns:a14="http://schemas.microsoft.com/office/drawing/2010/main" xmlns="">
                 <a:solidFill>
                   <a:srgbClr val="FFFFFF"/>
                 </a:solidFill>
@@ -12317,7 +13076,7 @@
           <p:cNvPr id="5" name="Datumsplatzhalter 4">
             <a:extLst>
               <a:ext uri="{FF2B5EF4-FFF2-40B4-BE49-F238E27FC236}">
-                <a16:creationId xmlns="" xmlns:a16="http://schemas.microsoft.com/office/drawing/2014/main" id="{368DD9D8-7FE8-48F0-AE91-AE98EA3DCA20}"/>
+                <a16:creationId xmlns:a16="http://schemas.microsoft.com/office/drawing/2014/main" xmlns="" id="{368DD9D8-7FE8-48F0-AE91-AE98EA3DCA20}"/>
               </a:ext>
             </a:extLst>
           </p:cNvPr>
@@ -12336,7 +13095,7 @@
             <a:fld id="{17C2562E-359A-3C42-BBEF-E02CE97BECB1}" type="datetimeFigureOut">
               <a:rPr lang="de-DE" smtClean="0"/>
               <a:pPr/>
-              <a:t>15.10.17</a:t>
+              <a:t>18.10.17</a:t>
             </a:fld>
             <a:endParaRPr lang="de-DE" dirty="0"/>
           </a:p>
@@ -12347,7 +13106,7 @@
           <p:cNvPr id="7" name="Fußzeilenplatzhalter 6">
             <a:extLst>
               <a:ext uri="{FF2B5EF4-FFF2-40B4-BE49-F238E27FC236}">
-                <a16:creationId xmlns="" xmlns:a16="http://schemas.microsoft.com/office/drawing/2014/main" id="{DD743ADB-89F1-48B5-A397-7FB83734730F}"/>
+                <a16:creationId xmlns:a16="http://schemas.microsoft.com/office/drawing/2014/main" xmlns="" id="{DD743ADB-89F1-48B5-A397-7FB83734730F}"/>
               </a:ext>
             </a:extLst>
           </p:cNvPr>
@@ -12372,7 +13131,7 @@
           <p:cNvPr id="8" name="Foliennummernplatzhalter 7">
             <a:extLst>
               <a:ext uri="{FF2B5EF4-FFF2-40B4-BE49-F238E27FC236}">
-                <a16:creationId xmlns="" xmlns:a16="http://schemas.microsoft.com/office/drawing/2014/main" id="{E9AACC46-EA1E-4E6F-8F9D-AC4B57F09904}"/>
+                <a16:creationId xmlns:a16="http://schemas.microsoft.com/office/drawing/2014/main" xmlns="" id="{E9AACC46-EA1E-4E6F-8F9D-AC4B57F09904}"/>
               </a:ext>
             </a:extLst>
           </p:cNvPr>
@@ -12679,7 +13438,7 @@
           <p:cNvPr id="6" name="Datumsplatzhalter 5">
             <a:extLst>
               <a:ext uri="{FF2B5EF4-FFF2-40B4-BE49-F238E27FC236}">
-                <a16:creationId xmlns="" xmlns:a16="http://schemas.microsoft.com/office/drawing/2014/main" id="{39EC82D5-F468-46F1-8BE2-F62E4D04C5CD}"/>
+                <a16:creationId xmlns:a16="http://schemas.microsoft.com/office/drawing/2014/main" xmlns="" id="{39EC82D5-F468-46F1-8BE2-F62E4D04C5CD}"/>
               </a:ext>
             </a:extLst>
           </p:cNvPr>
@@ -12698,7 +13457,7 @@
             <a:fld id="{17C2562E-359A-3C42-BBEF-E02CE97BECB1}" type="datetimeFigureOut">
               <a:rPr lang="de-DE" smtClean="0"/>
               <a:pPr/>
-              <a:t>15.10.17</a:t>
+              <a:t>18.10.17</a:t>
             </a:fld>
             <a:endParaRPr lang="de-DE" dirty="0"/>
           </a:p>
@@ -12709,7 +13468,7 @@
           <p:cNvPr id="7" name="Fußzeilenplatzhalter 6">
             <a:extLst>
               <a:ext uri="{FF2B5EF4-FFF2-40B4-BE49-F238E27FC236}">
-                <a16:creationId xmlns="" xmlns:a16="http://schemas.microsoft.com/office/drawing/2014/main" id="{32A29AE2-1FA8-458C-9BDD-E35CA69A9340}"/>
+                <a16:creationId xmlns:a16="http://schemas.microsoft.com/office/drawing/2014/main" xmlns="" id="{32A29AE2-1FA8-458C-9BDD-E35CA69A9340}"/>
               </a:ext>
             </a:extLst>
           </p:cNvPr>
@@ -12734,7 +13493,7 @@
           <p:cNvPr id="8" name="Foliennummernplatzhalter 7">
             <a:extLst>
               <a:ext uri="{FF2B5EF4-FFF2-40B4-BE49-F238E27FC236}">
-                <a16:creationId xmlns="" xmlns:a16="http://schemas.microsoft.com/office/drawing/2014/main" id="{DC4135BE-88E8-4C4B-B3FF-FC61855E0C9F}"/>
+                <a16:creationId xmlns:a16="http://schemas.microsoft.com/office/drawing/2014/main" xmlns="" id="{DC4135BE-88E8-4C4B-B3FF-FC61855E0C9F}"/>
               </a:ext>
             </a:extLst>
           </p:cNvPr>
@@ -13045,7 +13804,7 @@
           <p:cNvPr id="5" name="Datumsplatzhalter 4">
             <a:extLst>
               <a:ext uri="{FF2B5EF4-FFF2-40B4-BE49-F238E27FC236}">
-                <a16:creationId xmlns="" xmlns:a16="http://schemas.microsoft.com/office/drawing/2014/main" id="{42621BA8-D298-4AAA-B27E-2D5702596736}"/>
+                <a16:creationId xmlns:a16="http://schemas.microsoft.com/office/drawing/2014/main" xmlns="" id="{42621BA8-D298-4AAA-B27E-2D5702596736}"/>
               </a:ext>
             </a:extLst>
           </p:cNvPr>
@@ -13064,7 +13823,7 @@
             <a:fld id="{17C2562E-359A-3C42-BBEF-E02CE97BECB1}" type="datetimeFigureOut">
               <a:rPr lang="de-DE" smtClean="0"/>
               <a:pPr/>
-              <a:t>15.10.17</a:t>
+              <a:t>18.10.17</a:t>
             </a:fld>
             <a:endParaRPr lang="de-DE" dirty="0"/>
           </a:p>
@@ -13075,7 +13834,7 @@
           <p:cNvPr id="6" name="Fußzeilenplatzhalter 5">
             <a:extLst>
               <a:ext uri="{FF2B5EF4-FFF2-40B4-BE49-F238E27FC236}">
-                <a16:creationId xmlns="" xmlns:a16="http://schemas.microsoft.com/office/drawing/2014/main" id="{59687A69-8E9C-4168-AA2A-7D487587D19D}"/>
+                <a16:creationId xmlns:a16="http://schemas.microsoft.com/office/drawing/2014/main" xmlns="" id="{59687A69-8E9C-4168-AA2A-7D487587D19D}"/>
               </a:ext>
             </a:extLst>
           </p:cNvPr>
@@ -13100,7 +13859,7 @@
           <p:cNvPr id="7" name="Foliennummernplatzhalter 6">
             <a:extLst>
               <a:ext uri="{FF2B5EF4-FFF2-40B4-BE49-F238E27FC236}">
-                <a16:creationId xmlns="" xmlns:a16="http://schemas.microsoft.com/office/drawing/2014/main" id="{536244A4-4C24-4CD2-82E9-C547A6F8C84B}"/>
+                <a16:creationId xmlns:a16="http://schemas.microsoft.com/office/drawing/2014/main" xmlns="" id="{536244A4-4C24-4CD2-82E9-C547A6F8C84B}"/>
               </a:ext>
             </a:extLst>
           </p:cNvPr>
@@ -13404,7 +14163,7 @@
           <p:cNvPr id="6" name="Datumsplatzhalter 5">
             <a:extLst>
               <a:ext uri="{FF2B5EF4-FFF2-40B4-BE49-F238E27FC236}">
-                <a16:creationId xmlns="" xmlns:a16="http://schemas.microsoft.com/office/drawing/2014/main" id="{BF6F2AC7-7673-45B2-B727-C8AE32F0AB56}"/>
+                <a16:creationId xmlns:a16="http://schemas.microsoft.com/office/drawing/2014/main" xmlns="" id="{BF6F2AC7-7673-45B2-B727-C8AE32F0AB56}"/>
               </a:ext>
             </a:extLst>
           </p:cNvPr>
@@ -13423,7 +14182,7 @@
             <a:fld id="{17C2562E-359A-3C42-BBEF-E02CE97BECB1}" type="datetimeFigureOut">
               <a:rPr lang="de-DE" smtClean="0"/>
               <a:pPr/>
-              <a:t>15.10.17</a:t>
+              <a:t>18.10.17</a:t>
             </a:fld>
             <a:endParaRPr lang="de-DE" dirty="0"/>
           </a:p>
@@ -13434,7 +14193,7 @@
           <p:cNvPr id="7" name="Fußzeilenplatzhalter 6">
             <a:extLst>
               <a:ext uri="{FF2B5EF4-FFF2-40B4-BE49-F238E27FC236}">
-                <a16:creationId xmlns="" xmlns:a16="http://schemas.microsoft.com/office/drawing/2014/main" id="{92A772BA-DCE7-4C4E-83BA-CF4FFCC183EE}"/>
+                <a16:creationId xmlns:a16="http://schemas.microsoft.com/office/drawing/2014/main" xmlns="" id="{92A772BA-DCE7-4C4E-83BA-CF4FFCC183EE}"/>
               </a:ext>
             </a:extLst>
           </p:cNvPr>
@@ -13459,7 +14218,7 @@
           <p:cNvPr id="8" name="Foliennummernplatzhalter 7">
             <a:extLst>
               <a:ext uri="{FF2B5EF4-FFF2-40B4-BE49-F238E27FC236}">
-                <a16:creationId xmlns="" xmlns:a16="http://schemas.microsoft.com/office/drawing/2014/main" id="{E51D4D1D-A3D0-476F-93F4-F41207D05396}"/>
+                <a16:creationId xmlns:a16="http://schemas.microsoft.com/office/drawing/2014/main" xmlns="" id="{E51D4D1D-A3D0-476F-93F4-F41207D05396}"/>
               </a:ext>
             </a:extLst>
           </p:cNvPr>
@@ -13759,7 +14518,7 @@
           <p:cNvPr id="4" name="Datumsplatzhalter 3">
             <a:extLst>
               <a:ext uri="{FF2B5EF4-FFF2-40B4-BE49-F238E27FC236}">
-                <a16:creationId xmlns="" xmlns:a16="http://schemas.microsoft.com/office/drawing/2014/main" id="{37D39D12-6498-4172-8CA5-163DBEBBD0CB}"/>
+                <a16:creationId xmlns:a16="http://schemas.microsoft.com/office/drawing/2014/main" xmlns="" id="{37D39D12-6498-4172-8CA5-163DBEBBD0CB}"/>
               </a:ext>
             </a:extLst>
           </p:cNvPr>
@@ -13778,7 +14537,7 @@
             <a:fld id="{17C2562E-359A-3C42-BBEF-E02CE97BECB1}" type="datetimeFigureOut">
               <a:rPr lang="de-DE" smtClean="0"/>
               <a:pPr/>
-              <a:t>15.10.17</a:t>
+              <a:t>18.10.17</a:t>
             </a:fld>
             <a:endParaRPr lang="de-DE" dirty="0"/>
           </a:p>
@@ -13789,7 +14548,7 @@
           <p:cNvPr id="7" name="Fußzeilenplatzhalter 6">
             <a:extLst>
               <a:ext uri="{FF2B5EF4-FFF2-40B4-BE49-F238E27FC236}">
-                <a16:creationId xmlns="" xmlns:a16="http://schemas.microsoft.com/office/drawing/2014/main" id="{F310451D-2AF2-4222-AA5C-04DDCF6CA55F}"/>
+                <a16:creationId xmlns:a16="http://schemas.microsoft.com/office/drawing/2014/main" xmlns="" id="{F310451D-2AF2-4222-AA5C-04DDCF6CA55F}"/>
               </a:ext>
             </a:extLst>
           </p:cNvPr>
@@ -13814,7 +14573,7 @@
           <p:cNvPr id="8" name="Foliennummernplatzhalter 7">
             <a:extLst>
               <a:ext uri="{FF2B5EF4-FFF2-40B4-BE49-F238E27FC236}">
-                <a16:creationId xmlns="" xmlns:a16="http://schemas.microsoft.com/office/drawing/2014/main" id="{8546ADD4-A434-4A15-B639-BB0897136588}"/>
+                <a16:creationId xmlns:a16="http://schemas.microsoft.com/office/drawing/2014/main" xmlns="" id="{8546ADD4-A434-4A15-B639-BB0897136588}"/>
               </a:ext>
             </a:extLst>
           </p:cNvPr>
@@ -14053,7 +14812,7 @@
           <p:cNvPr id="2" name="Datumsplatzhalter 1">
             <a:extLst>
               <a:ext uri="{FF2B5EF4-FFF2-40B4-BE49-F238E27FC236}">
-                <a16:creationId xmlns="" xmlns:a16="http://schemas.microsoft.com/office/drawing/2014/main" id="{A19FBC2B-4138-47A7-96C3-6075667C774D}"/>
+                <a16:creationId xmlns:a16="http://schemas.microsoft.com/office/drawing/2014/main" xmlns="" id="{A19FBC2B-4138-47A7-96C3-6075667C774D}"/>
               </a:ext>
             </a:extLst>
           </p:cNvPr>
@@ -14072,7 +14831,7 @@
             <a:fld id="{17C2562E-359A-3C42-BBEF-E02CE97BECB1}" type="datetimeFigureOut">
               <a:rPr lang="de-DE" smtClean="0"/>
               <a:pPr/>
-              <a:t>15.10.17</a:t>
+              <a:t>18.10.17</a:t>
             </a:fld>
             <a:endParaRPr lang="de-DE" dirty="0"/>
           </a:p>
@@ -14083,7 +14842,7 @@
           <p:cNvPr id="8" name="Fußzeilenplatzhalter 7">
             <a:extLst>
               <a:ext uri="{FF2B5EF4-FFF2-40B4-BE49-F238E27FC236}">
-                <a16:creationId xmlns="" xmlns:a16="http://schemas.microsoft.com/office/drawing/2014/main" id="{193B0760-28CB-4559-9AEF-4866F2FCE0E4}"/>
+                <a16:creationId xmlns:a16="http://schemas.microsoft.com/office/drawing/2014/main" xmlns="" id="{193B0760-28CB-4559-9AEF-4866F2FCE0E4}"/>
               </a:ext>
             </a:extLst>
           </p:cNvPr>
@@ -14108,7 +14867,7 @@
           <p:cNvPr id="11" name="Foliennummernplatzhalter 10">
             <a:extLst>
               <a:ext uri="{FF2B5EF4-FFF2-40B4-BE49-F238E27FC236}">
-                <a16:creationId xmlns="" xmlns:a16="http://schemas.microsoft.com/office/drawing/2014/main" id="{A263DBAA-5BAE-421E-BCAE-39992A39B610}"/>
+                <a16:creationId xmlns:a16="http://schemas.microsoft.com/office/drawing/2014/main" xmlns="" id="{A263DBAA-5BAE-421E-BCAE-39992A39B610}"/>
               </a:ext>
             </a:extLst>
           </p:cNvPr>
@@ -14315,7 +15074,7 @@
             <a:fld id="{17C2562E-359A-3C42-BBEF-E02CE97BECB1}" type="datetimeFigureOut">
               <a:rPr lang="de-DE" smtClean="0"/>
               <a:pPr/>
-              <a:t>15.10.17</a:t>
+              <a:t>18.10.17</a:t>
             </a:fld>
             <a:endParaRPr lang="de-DE" dirty="0"/>
           </a:p>
@@ -14890,7 +15649,7 @@
             <a:fld id="{17C2562E-359A-3C42-BBEF-E02CE97BECB1}" type="datetimeFigureOut">
               <a:rPr lang="de-DE" smtClean="0"/>
               <a:pPr/>
-              <a:t>15.10.17</a:t>
+              <a:t>18.10.17</a:t>
             </a:fld>
             <a:endParaRPr lang="de-DE" dirty="0"/>
           </a:p>
@@ -15014,7 +15773,7 @@
           <p:cNvPr id="11" name="Titel 1">
             <a:extLst>
               <a:ext uri="{FF2B5EF4-FFF2-40B4-BE49-F238E27FC236}">
-                <a16:creationId xmlns="" xmlns:a16="http://schemas.microsoft.com/office/drawing/2014/main" id="{251058B0-31BE-410A-BE50-41D5389B0AAB}"/>
+                <a16:creationId xmlns:a16="http://schemas.microsoft.com/office/drawing/2014/main" xmlns="" id="{251058B0-31BE-410A-BE50-41D5389B0AAB}"/>
               </a:ext>
             </a:extLst>
           </p:cNvPr>
@@ -16479,7 +17238,7 @@
           <p:cNvPr id="2" name="Textplatzhalter 1">
             <a:extLst>
               <a:ext uri="{FF2B5EF4-FFF2-40B4-BE49-F238E27FC236}">
-                <a16:creationId xmlns="" xmlns:a16="http://schemas.microsoft.com/office/drawing/2014/main" id="{45003885-0277-4A8A-9B32-2C0872306E13}"/>
+                <a16:creationId xmlns:a16="http://schemas.microsoft.com/office/drawing/2014/main" xmlns="" id="{45003885-0277-4A8A-9B32-2C0872306E13}"/>
               </a:ext>
             </a:extLst>
           </p:cNvPr>
@@ -16519,7 +17278,7 @@
           <p:cNvPr id="3" name="Titel 2">
             <a:extLst>
               <a:ext uri="{FF2B5EF4-FFF2-40B4-BE49-F238E27FC236}">
-                <a16:creationId xmlns="" xmlns:a16="http://schemas.microsoft.com/office/drawing/2014/main" id="{EA92ABC8-8A1F-45BA-8C5F-D5DEF58C8920}"/>
+                <a16:creationId xmlns:a16="http://schemas.microsoft.com/office/drawing/2014/main" xmlns="" id="{EA92ABC8-8A1F-45BA-8C5F-D5DEF58C8920}"/>
               </a:ext>
             </a:extLst>
           </p:cNvPr>
@@ -16635,7 +17394,7 @@
             <a:fld id="{17C2562E-359A-3C42-BBEF-E02CE97BECB1}" type="datetimeFigureOut">
               <a:rPr lang="de-DE" smtClean="0"/>
               <a:pPr/>
-              <a:t>15.10.17</a:t>
+              <a:t>18.10.17</a:t>
             </a:fld>
             <a:endParaRPr lang="de-DE" dirty="0"/>
           </a:p>
@@ -17017,7 +17776,7 @@
             <a:fld id="{17C2562E-359A-3C42-BBEF-E02CE97BECB1}" type="datetimeFigureOut">
               <a:rPr lang="de-DE" smtClean="0"/>
               <a:pPr/>
-              <a:t>15.10.17</a:t>
+              <a:t>18.10.17</a:t>
             </a:fld>
             <a:endParaRPr lang="de-DE" dirty="0"/>
           </a:p>
@@ -17197,7 +17956,7 @@
             <a:fld id="{17C2562E-359A-3C42-BBEF-E02CE97BECB1}" type="datetimeFigureOut">
               <a:rPr lang="de-DE" smtClean="0"/>
               <a:pPr/>
-              <a:t>15.10.17</a:t>
+              <a:t>18.10.17</a:t>
             </a:fld>
             <a:endParaRPr lang="de-DE" dirty="0"/>
           </a:p>
@@ -17446,7 +18205,7 @@
             <a:fld id="{17C2562E-359A-3C42-BBEF-E02CE97BECB1}" type="datetimeFigureOut">
               <a:rPr lang="de-DE" smtClean="0"/>
               <a:pPr/>
-              <a:t>15.10.17</a:t>
+              <a:t>18.10.17</a:t>
             </a:fld>
             <a:endParaRPr lang="de-DE" dirty="0"/>
           </a:p>
@@ -17717,7 +18476,7 @@
             <a:fld id="{17C2562E-359A-3C42-BBEF-E02CE97BECB1}" type="datetimeFigureOut">
               <a:rPr lang="de-DE" smtClean="0"/>
               <a:pPr/>
-              <a:t>15.10.17</a:t>
+              <a:t>18.10.17</a:t>
             </a:fld>
             <a:endParaRPr lang="de-DE" dirty="0"/>
           </a:p>
@@ -17823,10 +18582,9 @@
           <a:lstStyle/>
           <a:p>
             <a:r>
-              <a:rPr lang="de-DE" dirty="0" smtClean="0"/>
-              <a:t>Service</a:t>
-            </a:r>
-            <a:endParaRPr lang="de-DE" dirty="0"/>
+              <a:rPr lang="de-DE" dirty="0"/>
+              <a:t>Formulare in Angular</a:t>
+            </a:r>
           </a:p>
         </p:txBody>
       </p:sp>
@@ -17840,126 +18598,154 @@
             <p:ph type="body" sz="quarter" idx="30"/>
           </p:nvPr>
         </p:nvSpPr>
-        <p:spPr>
-          <a:xfrm>
-            <a:off x="381600" y="1569368"/>
-            <a:ext cx="7812000" cy="5050507"/>
-          </a:xfrm>
-        </p:spPr>
+        <p:spPr/>
         <p:txBody>
           <a:bodyPr/>
           <a:lstStyle/>
           <a:p>
-            <a:r>
-              <a:rPr lang="de-DE" dirty="0" smtClean="0"/>
-              <a:t>Service enthält Businesslogik</a:t>
-            </a:r>
-          </a:p>
-          <a:p>
-            <a:endParaRPr lang="de-DE" dirty="0"/>
-          </a:p>
-          <a:p>
-            <a:r>
-              <a:rPr lang="de-DE" dirty="0" smtClean="0"/>
-              <a:t>Bietet Daten, Funktionen und Features anwendungsübergreifend an</a:t>
-            </a:r>
-          </a:p>
-          <a:p>
+            <a:pPr>
+              <a:lnSpc>
+                <a:spcPct val="150000"/>
+              </a:lnSpc>
+            </a:pPr>
+            <a:r>
+              <a:rPr lang="de-DE" dirty="0"/>
+              <a:t>Eigenständiges </a:t>
+            </a:r>
+            <a:r>
+              <a:rPr lang="de-DE" dirty="0" err="1"/>
+              <a:t>npm</a:t>
+            </a:r>
+            <a:r>
+              <a:rPr lang="de-DE" dirty="0"/>
+              <a:t>-Paket: </a:t>
+            </a:r>
+            <a:r>
+              <a:rPr lang="de-DE" dirty="0">
+                <a:latin typeface="Consolas" panose="020B0609020204030204" pitchFamily="49" charset="0"/>
+                <a:cs typeface="Consolas" panose="020B0609020204030204" pitchFamily="49" charset="0"/>
+              </a:rPr>
+              <a:t>@angular/</a:t>
+            </a:r>
+            <a:r>
+              <a:rPr lang="de-DE" dirty="0" err="1">
+                <a:latin typeface="Consolas" panose="020B0609020204030204" pitchFamily="49" charset="0"/>
+                <a:cs typeface="Consolas" panose="020B0609020204030204" pitchFamily="49" charset="0"/>
+              </a:rPr>
+              <a:t>forms</a:t>
+            </a:r>
+            <a:endParaRPr lang="de-DE" dirty="0">
+              <a:latin typeface="Consolas" panose="020B0609020204030204" pitchFamily="49" charset="0"/>
+              <a:cs typeface="Consolas" panose="020B0609020204030204" pitchFamily="49" charset="0"/>
+            </a:endParaRPr>
+          </a:p>
+          <a:p>
+            <a:pPr>
+              <a:lnSpc>
+                <a:spcPct val="150000"/>
+              </a:lnSpc>
+            </a:pPr>
+            <a:r>
+              <a:rPr lang="de-DE" dirty="0"/>
+              <a:t>Zentraler Anwendungsfall für Data-Binding (</a:t>
+            </a:r>
+            <a:r>
+              <a:rPr lang="de-DE" dirty="0" err="1"/>
+              <a:t>One</a:t>
+            </a:r>
+            <a:r>
+              <a:rPr lang="de-DE" dirty="0"/>
+              <a:t>-Way / </a:t>
+            </a:r>
+            <a:r>
+              <a:rPr lang="de-DE" dirty="0" err="1"/>
+              <a:t>Two</a:t>
+            </a:r>
+            <a:r>
+              <a:rPr lang="de-DE" dirty="0"/>
+              <a:t>-Way)</a:t>
+            </a:r>
+          </a:p>
+          <a:p>
+            <a:pPr>
+              <a:lnSpc>
+                <a:spcPct val="150000"/>
+              </a:lnSpc>
+            </a:pPr>
+            <a:r>
+              <a:rPr lang="de-DE" dirty="0"/>
+              <a:t>Zwei grundsätzlich unterschiedliche Entwicklungsverfahren</a:t>
+            </a:r>
+          </a:p>
+          <a:p>
+            <a:pPr lvl="1">
+              <a:lnSpc>
+                <a:spcPct val="150000"/>
+              </a:lnSpc>
+            </a:pPr>
+            <a:r>
+              <a:rPr lang="de-DE" b="1" dirty="0"/>
+              <a:t>Template-</a:t>
+            </a:r>
+            <a:r>
+              <a:rPr lang="de-DE" b="1" dirty="0" err="1"/>
+              <a:t>Driven</a:t>
+            </a:r>
+            <a:r>
+              <a:rPr lang="de-DE" dirty="0"/>
+              <a:t>: Deklarative (Markup-orientierte) Umsetzung</a:t>
+            </a:r>
+          </a:p>
+          <a:p>
+            <a:pPr lvl="1">
+              <a:lnSpc>
+                <a:spcPct val="150000"/>
+              </a:lnSpc>
+            </a:pPr>
+            <a:r>
+              <a:rPr lang="de-DE" b="1" dirty="0"/>
+              <a:t>Model-</a:t>
+            </a:r>
+            <a:r>
+              <a:rPr lang="de-DE" b="1" dirty="0" err="1"/>
+              <a:t>Driven</a:t>
+            </a:r>
+            <a:r>
+              <a:rPr lang="de-DE" dirty="0"/>
+              <a:t>: Programmatische (Code-orientierte) Umsetzung</a:t>
+            </a:r>
+          </a:p>
+          <a:p>
+            <a:pPr>
+              <a:lnSpc>
+                <a:spcPct val="150000"/>
+              </a:lnSpc>
+            </a:pPr>
+            <a:r>
+              <a:rPr lang="de-DE" dirty="0"/>
+              <a:t>Praxisbeispiel: </a:t>
+            </a:r>
+            <a:r>
+              <a:rPr lang="de-DE" dirty="0">
+                <a:hlinkClick r:id="rId2"/>
+              </a:rPr>
+              <a:t>https://</a:t>
+            </a:r>
+            <a:r>
+              <a:rPr lang="de-DE" dirty="0" smtClean="0">
+                <a:hlinkClick r:id="rId2"/>
+              </a:rPr>
+              <a:t>github.com/aawada78/angular-workshop.git</a:t>
+            </a:r>
             <a:endParaRPr lang="de-DE" dirty="0" smtClean="0"/>
           </a:p>
           <a:p>
-            <a:r>
-              <a:rPr lang="de-DE" dirty="0" smtClean="0"/>
-              <a:t>Ein Service wird per </a:t>
-            </a:r>
-            <a:r>
-              <a:rPr lang="de-DE" i="1" dirty="0" err="1" smtClean="0"/>
-              <a:t>Dependency</a:t>
-            </a:r>
-            <a:r>
-              <a:rPr lang="de-DE" i="1" dirty="0" smtClean="0"/>
-              <a:t> </a:t>
-            </a:r>
-            <a:r>
-              <a:rPr lang="de-DE" i="1" dirty="0" err="1" smtClean="0"/>
-              <a:t>Injection</a:t>
-            </a:r>
-            <a:r>
-              <a:rPr lang="de-DE" dirty="0" smtClean="0"/>
-              <a:t> in eine Komponente injiziert</a:t>
-            </a:r>
-          </a:p>
-          <a:p>
-            <a:endParaRPr lang="de-DE" dirty="0" smtClean="0"/>
-          </a:p>
-          <a:p>
-            <a:pPr lvl="0"/>
-            <a:r>
-              <a:rPr lang="de-DE" dirty="0" smtClean="0"/>
-              <a:t>Ist ein </a:t>
-            </a:r>
-            <a:r>
-              <a:rPr lang="de-DE" dirty="0" err="1" smtClean="0"/>
-              <a:t>Singelton</a:t>
-            </a:r>
-            <a:endParaRPr lang="de-DE" dirty="0"/>
-          </a:p>
-          <a:p>
-            <a:pPr lvl="0"/>
-            <a:endParaRPr lang="de-DE" dirty="0"/>
-          </a:p>
-          <a:p>
-            <a:pPr lvl="0"/>
-            <a:r>
-              <a:rPr lang="de-DE" dirty="0"/>
-              <a:t>Anlegen </a:t>
-            </a:r>
-            <a:r>
-              <a:rPr lang="de-DE" dirty="0" smtClean="0"/>
-              <a:t>eines Services mittels </a:t>
-            </a:r>
-            <a:r>
-              <a:rPr lang="de-DE" dirty="0"/>
-              <a:t>CLI </a:t>
-            </a:r>
-          </a:p>
-          <a:p>
-            <a:pPr lvl="1"/>
-            <a:r>
-              <a:rPr lang="de-DE" dirty="0" err="1"/>
-              <a:t>ng</a:t>
-            </a:r>
-            <a:r>
-              <a:rPr lang="de-DE" dirty="0"/>
-              <a:t> </a:t>
-            </a:r>
-            <a:r>
-              <a:rPr lang="de-DE" dirty="0" err="1"/>
-              <a:t>g</a:t>
-            </a:r>
-            <a:r>
-              <a:rPr lang="de-DE" dirty="0"/>
-              <a:t> </a:t>
-            </a:r>
-            <a:r>
-              <a:rPr lang="de-DE" dirty="0" err="1"/>
-              <a:t>service</a:t>
-            </a:r>
-            <a:r>
-              <a:rPr lang="de-DE" dirty="0"/>
-              <a:t> &lt;</a:t>
-            </a:r>
-            <a:r>
-              <a:rPr lang="de-DE" dirty="0" err="1"/>
-              <a:t>name</a:t>
-            </a:r>
-            <a:r>
-              <a:rPr lang="de-DE" dirty="0"/>
-              <a:t>&gt; </a:t>
-            </a:r>
-          </a:p>
-          <a:p>
-            <a:endParaRPr lang="de-DE" dirty="0"/>
+            <a:pPr>
+              <a:lnSpc>
+                <a:spcPct val="150000"/>
+              </a:lnSpc>
+            </a:pPr>
+            <a:endParaRPr lang="de-DE" sz="2000" dirty="0"/>
           </a:p>
         </p:txBody>
       </p:sp>
@@ -17981,7 +18767,7 @@
             <a:fld id="{17C2562E-359A-3C42-BBEF-E02CE97BECB1}" type="datetimeFigureOut">
               <a:rPr lang="de-DE" smtClean="0"/>
               <a:pPr/>
-              <a:t>15.10.17</a:t>
+              <a:t>18.10.17</a:t>
             </a:fld>
             <a:endParaRPr lang="de-DE" dirty="0"/>
           </a:p>
@@ -18034,68 +18820,10 @@
           </a:p>
         </p:txBody>
       </p:sp>
-      <p:pic>
-        <p:nvPicPr>
-          <p:cNvPr id="7" name="Bild 6"/>
-          <p:cNvPicPr>
-            <a:picLocks noChangeAspect="1"/>
-          </p:cNvPicPr>
-          <p:nvPr/>
-        </p:nvPicPr>
-        <p:blipFill>
-          <a:blip r:embed="rId2"/>
-          <a:stretch>
-            <a:fillRect/>
-          </a:stretch>
-        </p:blipFill>
-        <p:spPr>
-          <a:xfrm>
-            <a:off x="8549251" y="1387777"/>
-            <a:ext cx="3360565" cy="2609134"/>
-          </a:xfrm>
-          <a:prstGeom prst="rect">
-            <a:avLst/>
-          </a:prstGeom>
-        </p:spPr>
-      </p:pic>
-      <p:sp>
-        <p:nvSpPr>
-          <p:cNvPr id="8" name="Textfeld 7"/>
-          <p:cNvSpPr txBox="1"/>
-          <p:nvPr/>
-        </p:nvSpPr>
-        <p:spPr>
-          <a:xfrm>
-            <a:off x="11184004" y="6568223"/>
-            <a:ext cx="1465145" cy="307777"/>
-          </a:xfrm>
-          <a:prstGeom prst="rect">
-            <a:avLst/>
-          </a:prstGeom>
-          <a:noFill/>
-        </p:spPr>
-        <p:txBody>
-          <a:bodyPr wrap="none" rtlCol="0">
-            <a:spAutoFit/>
-          </a:bodyPr>
-          <a:lstStyle/>
-          <a:p>
-            <a:r>
-              <a:rPr lang="de-DE" sz="1400" dirty="0" smtClean="0"/>
-              <a:t>Quelle: </a:t>
-            </a:r>
-            <a:r>
-              <a:rPr lang="de-DE" sz="1400" dirty="0" err="1" smtClean="0"/>
-              <a:t>angular.io</a:t>
-            </a:r>
-            <a:endParaRPr lang="de-DE" sz="1400" dirty="0"/>
-          </a:p>
-        </p:txBody>
-      </p:sp>
     </p:spTree>
     <p:extLst>
       <p:ext uri="{BB962C8B-B14F-4D97-AF65-F5344CB8AC3E}">
-        <p14:creationId xmlns:p14="http://schemas.microsoft.com/office/powerpoint/2010/main" val="1932745049"/>
+        <p14:creationId xmlns:p14="http://schemas.microsoft.com/office/powerpoint/2010/main" val="195296844"/>
       </p:ext>
     </p:extLst>
   </p:cSld>
@@ -18145,55 +18873,190 @@
           <a:lstStyle/>
           <a:p>
             <a:r>
-              <a:rPr lang="de-DE" dirty="0" smtClean="0"/>
-              <a:t>Service</a:t>
+              <a:rPr lang="de-DE" dirty="0"/>
+              <a:t>Template-</a:t>
+            </a:r>
+            <a:r>
+              <a:rPr lang="de-DE" dirty="0" err="1"/>
+              <a:t>Driven</a:t>
+            </a:r>
+            <a:r>
+              <a:rPr lang="de-DE" dirty="0"/>
+              <a:t> Forms</a:t>
+            </a:r>
+          </a:p>
+        </p:txBody>
+      </p:sp>
+      <p:sp>
+        <p:nvSpPr>
+          <p:cNvPr id="3" name="Textplatzhalter 2"/>
+          <p:cNvSpPr>
+            <a:spLocks noGrp="1"/>
+          </p:cNvSpPr>
+          <p:nvPr>
+            <p:ph type="body" sz="quarter" idx="30"/>
+          </p:nvPr>
+        </p:nvSpPr>
+        <p:spPr/>
+        <p:txBody>
+          <a:bodyPr/>
+          <a:lstStyle/>
+          <a:p>
+            <a:pPr>
+              <a:lnSpc>
+                <a:spcPct val="150000"/>
+              </a:lnSpc>
+            </a:pPr>
+            <a:r>
+              <a:rPr lang="de-DE" dirty="0"/>
+              <a:t>Integration mittels </a:t>
+            </a:r>
+            <a:r>
+              <a:rPr lang="de-DE" dirty="0">
+                <a:latin typeface="Consolas" panose="020B0609020204030204" pitchFamily="49" charset="0"/>
+                <a:cs typeface="Consolas" panose="020B0609020204030204" pitchFamily="49" charset="0"/>
+              </a:rPr>
+              <a:t>@</a:t>
+            </a:r>
+            <a:r>
+              <a:rPr lang="de-DE" dirty="0" err="1">
+                <a:latin typeface="Consolas" panose="020B0609020204030204" pitchFamily="49" charset="0"/>
+                <a:cs typeface="Consolas" panose="020B0609020204030204" pitchFamily="49" charset="0"/>
+              </a:rPr>
+              <a:t>NgModule</a:t>
+            </a:r>
+            <a:r>
+              <a:rPr lang="de-DE" dirty="0">
+                <a:latin typeface="Consolas" panose="020B0609020204030204" pitchFamily="49" charset="0"/>
+                <a:cs typeface="Consolas" panose="020B0609020204030204" pitchFamily="49" charset="0"/>
+              </a:rPr>
+              <a:t> </a:t>
+            </a:r>
+            <a:r>
+              <a:rPr lang="de-DE" dirty="0" err="1">
+                <a:latin typeface="Consolas" panose="020B0609020204030204" pitchFamily="49" charset="0"/>
+                <a:cs typeface="Consolas" panose="020B0609020204030204" pitchFamily="49" charset="0"/>
+              </a:rPr>
+              <a:t>FormsModule</a:t>
+            </a:r>
+            <a:endParaRPr lang="de-DE" dirty="0">
+              <a:latin typeface="Consolas" panose="020B0609020204030204" pitchFamily="49" charset="0"/>
+              <a:cs typeface="Consolas" panose="020B0609020204030204" pitchFamily="49" charset="0"/>
+            </a:endParaRPr>
+          </a:p>
+          <a:p>
+            <a:pPr>
+              <a:lnSpc>
+                <a:spcPct val="150000"/>
+              </a:lnSpc>
+            </a:pPr>
+            <a:r>
+              <a:rPr lang="de-DE" dirty="0">
+                <a:cs typeface="Consolas" panose="020B0609020204030204" pitchFamily="49" charset="0"/>
+              </a:rPr>
+              <a:t>Rein deklarative Realisierung im Markup durch Direktiven und lokale Template-Variablen</a:t>
+            </a:r>
+          </a:p>
+          <a:p>
+            <a:pPr>
+              <a:lnSpc>
+                <a:spcPct val="150000"/>
+              </a:lnSpc>
+            </a:pPr>
+            <a:r>
+              <a:rPr lang="de-DE" dirty="0"/>
+              <a:t>Grundlage: </a:t>
+            </a:r>
+            <a:r>
+              <a:rPr lang="de-DE" dirty="0" err="1"/>
+              <a:t>Two</a:t>
+            </a:r>
+            <a:r>
+              <a:rPr lang="de-DE" dirty="0"/>
+              <a:t>-Way-Data-Binding via </a:t>
+            </a:r>
+            <a:r>
+              <a:rPr lang="de-DE" dirty="0">
+                <a:latin typeface="Consolas" panose="020B0609020204030204" pitchFamily="49" charset="0"/>
+                <a:cs typeface="Consolas" panose="020B0609020204030204" pitchFamily="49" charset="0"/>
+              </a:rPr>
+              <a:t>[(</a:t>
+            </a:r>
+            <a:r>
+              <a:rPr lang="de-DE" dirty="0" err="1">
+                <a:latin typeface="Consolas" panose="020B0609020204030204" pitchFamily="49" charset="0"/>
+                <a:cs typeface="Consolas" panose="020B0609020204030204" pitchFamily="49" charset="0"/>
+              </a:rPr>
+              <a:t>ngModel</a:t>
+            </a:r>
+            <a:r>
+              <a:rPr lang="de-DE" dirty="0">
+                <a:latin typeface="Consolas" panose="020B0609020204030204" pitchFamily="49" charset="0"/>
+                <a:cs typeface="Consolas" panose="020B0609020204030204" pitchFamily="49" charset="0"/>
+              </a:rPr>
+              <a:t>)]</a:t>
+            </a:r>
+          </a:p>
+          <a:p>
+            <a:pPr>
+              <a:lnSpc>
+                <a:spcPct val="150000"/>
+              </a:lnSpc>
+            </a:pPr>
+            <a:r>
+              <a:rPr lang="de-DE" dirty="0"/>
+              <a:t>Verringerung des Testaufwands durch Verlagerung der Logik ins Markup</a:t>
+            </a:r>
+          </a:p>
+          <a:p>
+            <a:pPr>
+              <a:lnSpc>
+                <a:spcPct val="150000"/>
+              </a:lnSpc>
+            </a:pPr>
+            <a:r>
+              <a:rPr lang="de-DE" dirty="0"/>
+              <a:t>Geeignet für schnelle Umsetzung einfacher Formulare</a:t>
+            </a:r>
+          </a:p>
+          <a:p>
+            <a:pPr>
+              <a:lnSpc>
+                <a:spcPct val="150000"/>
+              </a:lnSpc>
+            </a:pPr>
+            <a:r>
+              <a:rPr lang="de-DE" dirty="0"/>
+              <a:t>Unterstützung für Property-Binding von </a:t>
+            </a:r>
+            <a:r>
+              <a:rPr lang="de-DE" dirty="0" err="1">
+                <a:latin typeface="Consolas" panose="020B0609020204030204" pitchFamily="49" charset="0"/>
+                <a:cs typeface="Consolas" panose="020B0609020204030204" pitchFamily="49" charset="0"/>
+              </a:rPr>
+              <a:t>disabled</a:t>
+            </a:r>
+            <a:endParaRPr lang="de-DE" dirty="0">
+              <a:latin typeface="Consolas" panose="020B0609020204030204" pitchFamily="49" charset="0"/>
+              <a:cs typeface="Consolas" panose="020B0609020204030204" pitchFamily="49" charset="0"/>
+            </a:endParaRPr>
+          </a:p>
+          <a:p>
+            <a:pPr>
+              <a:lnSpc>
+                <a:spcPct val="150000"/>
+              </a:lnSpc>
+            </a:pPr>
+            <a:r>
+              <a:rPr lang="de-DE" dirty="0">
+                <a:cs typeface="Consolas" panose="020B0609020204030204" pitchFamily="49" charset="0"/>
+              </a:rPr>
+              <a:t>Keine Direktive für Form Arrays</a:t>
             </a:r>
             <a:endParaRPr lang="de-DE" dirty="0"/>
           </a:p>
-        </p:txBody>
-      </p:sp>
-      <p:sp>
-        <p:nvSpPr>
-          <p:cNvPr id="3" name="Textplatzhalter 2"/>
-          <p:cNvSpPr>
-            <a:spLocks noGrp="1"/>
-          </p:cNvSpPr>
-          <p:nvPr>
-            <p:ph type="body" sz="quarter" idx="30"/>
-          </p:nvPr>
-        </p:nvSpPr>
-        <p:spPr/>
-        <p:txBody>
-          <a:bodyPr anchor="ctr"/>
-          <a:lstStyle/>
-          <a:p>
-            <a:pPr marL="0" indent="0" algn="ctr">
-              <a:buNone/>
-            </a:pPr>
-            <a:r>
-              <a:rPr lang="de-DE" sz="6600" dirty="0">
-                <a:solidFill>
-                  <a:schemeClr val="tx2"/>
-                </a:solidFill>
-                <a:latin typeface="+mj-lt"/>
-              </a:rPr>
-              <a:t>Live </a:t>
-            </a:r>
-            <a:r>
-              <a:rPr lang="de-DE" sz="6600" dirty="0" err="1">
-                <a:solidFill>
-                  <a:schemeClr val="tx2"/>
-                </a:solidFill>
-                <a:latin typeface="+mj-lt"/>
-              </a:rPr>
-              <a:t>Coding</a:t>
-            </a:r>
-            <a:endParaRPr lang="de-DE" sz="6600" dirty="0">
-              <a:solidFill>
-                <a:schemeClr val="tx2"/>
-              </a:solidFill>
-              <a:latin typeface="+mj-lt"/>
-            </a:endParaRPr>
+          <a:p>
+            <a:endParaRPr lang="de-DE" dirty="0"/>
           </a:p>
         </p:txBody>
       </p:sp>
@@ -18215,7 +19078,7 @@
             <a:fld id="{17C2562E-359A-3C42-BBEF-E02CE97BECB1}" type="datetimeFigureOut">
               <a:rPr lang="de-DE" smtClean="0"/>
               <a:pPr/>
-              <a:t>15.10.17</a:t>
+              <a:t>18.10.17</a:t>
             </a:fld>
             <a:endParaRPr lang="de-DE" dirty="0"/>
           </a:p>
@@ -18271,7 +19134,7 @@
     </p:spTree>
     <p:extLst>
       <p:ext uri="{BB962C8B-B14F-4D97-AF65-F5344CB8AC3E}">
-        <p14:creationId xmlns:p14="http://schemas.microsoft.com/office/powerpoint/2010/main" val="1910797794"/>
+        <p14:creationId xmlns:p14="http://schemas.microsoft.com/office/powerpoint/2010/main" val="1657213088"/>
       </p:ext>
     </p:extLst>
   </p:cSld>
@@ -18322,7 +19185,15 @@
           <a:p>
             <a:r>
               <a:rPr lang="de-DE" dirty="0"/>
-              <a:t>Formulare in Angular</a:t>
+              <a:t>Template-</a:t>
+            </a:r>
+            <a:r>
+              <a:rPr lang="de-DE" dirty="0" err="1"/>
+              <a:t>Driven</a:t>
+            </a:r>
+            <a:r>
+              <a:rPr lang="de-DE" dirty="0"/>
+              <a:t> Forms</a:t>
             </a:r>
           </a:p>
         </p:txBody>
@@ -18339,152 +19210,36 @@
         </p:nvSpPr>
         <p:spPr/>
         <p:txBody>
-          <a:bodyPr/>
+          <a:bodyPr anchor="ctr"/>
           <a:lstStyle/>
           <a:p>
-            <a:pPr>
-              <a:lnSpc>
-                <a:spcPct val="150000"/>
-              </a:lnSpc>
+            <a:pPr marL="0" indent="0" algn="ctr">
+              <a:buNone/>
             </a:pPr>
             <a:r>
-              <a:rPr lang="de-DE" dirty="0"/>
-              <a:t>Eigenständiges </a:t>
-            </a:r>
-            <a:r>
-              <a:rPr lang="de-DE" dirty="0" err="1"/>
-              <a:t>npm</a:t>
-            </a:r>
-            <a:r>
-              <a:rPr lang="de-DE" dirty="0"/>
-              <a:t>-Paket: </a:t>
-            </a:r>
-            <a:r>
-              <a:rPr lang="de-DE" dirty="0">
-                <a:latin typeface="Consolas" panose="020B0609020204030204" pitchFamily="49" charset="0"/>
-                <a:cs typeface="Consolas" panose="020B0609020204030204" pitchFamily="49" charset="0"/>
+              <a:rPr lang="de-DE" sz="6600" dirty="0">
+                <a:solidFill>
+                  <a:schemeClr val="tx2"/>
+                </a:solidFill>
+                <a:latin typeface="+mj-lt"/>
               </a:rPr>
-              <a:t>@angular/</a:t>
-            </a:r>
-            <a:r>
-              <a:rPr lang="de-DE" dirty="0" err="1">
-                <a:latin typeface="Consolas" panose="020B0609020204030204" pitchFamily="49" charset="0"/>
-                <a:cs typeface="Consolas" panose="020B0609020204030204" pitchFamily="49" charset="0"/>
+              <a:t>Live </a:t>
+            </a:r>
+            <a:r>
+              <a:rPr lang="de-DE" sz="6600" dirty="0" err="1">
+                <a:solidFill>
+                  <a:schemeClr val="tx2"/>
+                </a:solidFill>
+                <a:latin typeface="+mj-lt"/>
               </a:rPr>
-              <a:t>forms</a:t>
-            </a:r>
-            <a:endParaRPr lang="de-DE" dirty="0">
-              <a:latin typeface="Consolas" panose="020B0609020204030204" pitchFamily="49" charset="0"/>
-              <a:cs typeface="Consolas" panose="020B0609020204030204" pitchFamily="49" charset="0"/>
+              <a:t>Coding</a:t>
+            </a:r>
+            <a:endParaRPr lang="de-DE" sz="6600" dirty="0">
+              <a:solidFill>
+                <a:schemeClr val="tx2"/>
+              </a:solidFill>
+              <a:latin typeface="+mj-lt"/>
             </a:endParaRPr>
-          </a:p>
-          <a:p>
-            <a:pPr>
-              <a:lnSpc>
-                <a:spcPct val="150000"/>
-              </a:lnSpc>
-            </a:pPr>
-            <a:r>
-              <a:rPr lang="de-DE" dirty="0"/>
-              <a:t>Zentraler Anwendungsfall für Data-Binding (</a:t>
-            </a:r>
-            <a:r>
-              <a:rPr lang="de-DE" dirty="0" err="1"/>
-              <a:t>One</a:t>
-            </a:r>
-            <a:r>
-              <a:rPr lang="de-DE" dirty="0"/>
-              <a:t>-Way / </a:t>
-            </a:r>
-            <a:r>
-              <a:rPr lang="de-DE" dirty="0" err="1"/>
-              <a:t>Two</a:t>
-            </a:r>
-            <a:r>
-              <a:rPr lang="de-DE" dirty="0"/>
-              <a:t>-Way)</a:t>
-            </a:r>
-          </a:p>
-          <a:p>
-            <a:pPr>
-              <a:lnSpc>
-                <a:spcPct val="150000"/>
-              </a:lnSpc>
-            </a:pPr>
-            <a:r>
-              <a:rPr lang="de-DE" dirty="0"/>
-              <a:t>Zwei grundsätzlich unterschiedliche Entwicklungsverfahren</a:t>
-            </a:r>
-          </a:p>
-          <a:p>
-            <a:pPr lvl="1">
-              <a:lnSpc>
-                <a:spcPct val="150000"/>
-              </a:lnSpc>
-            </a:pPr>
-            <a:r>
-              <a:rPr lang="de-DE" b="1" dirty="0"/>
-              <a:t>Template-</a:t>
-            </a:r>
-            <a:r>
-              <a:rPr lang="de-DE" b="1" dirty="0" err="1"/>
-              <a:t>Driven</a:t>
-            </a:r>
-            <a:r>
-              <a:rPr lang="de-DE" dirty="0"/>
-              <a:t>: Deklarative (Markup-orientierte) Umsetzung</a:t>
-            </a:r>
-          </a:p>
-          <a:p>
-            <a:pPr lvl="1">
-              <a:lnSpc>
-                <a:spcPct val="150000"/>
-              </a:lnSpc>
-            </a:pPr>
-            <a:r>
-              <a:rPr lang="de-DE" b="1" dirty="0"/>
-              <a:t>Model-</a:t>
-            </a:r>
-            <a:r>
-              <a:rPr lang="de-DE" b="1" dirty="0" err="1"/>
-              <a:t>Driven</a:t>
-            </a:r>
-            <a:r>
-              <a:rPr lang="de-DE" dirty="0"/>
-              <a:t>: Programmatische (Code-orientierte) Umsetzung</a:t>
-            </a:r>
-          </a:p>
-          <a:p>
-            <a:pPr>
-              <a:lnSpc>
-                <a:spcPct val="150000"/>
-              </a:lnSpc>
-            </a:pPr>
-            <a:r>
-              <a:rPr lang="de-DE" dirty="0"/>
-              <a:t>Praxisbeispiel: </a:t>
-            </a:r>
-            <a:r>
-              <a:rPr lang="de-DE" dirty="0">
-                <a:hlinkClick r:id="rId2"/>
-              </a:rPr>
-              <a:t>https://</a:t>
-            </a:r>
-            <a:r>
-              <a:rPr lang="de-DE" dirty="0" smtClean="0">
-                <a:hlinkClick r:id="rId2"/>
-              </a:rPr>
-              <a:t>github.com/aawada78/angular-workshop.git</a:t>
-            </a:r>
-            <a:endParaRPr lang="de-DE" dirty="0" smtClean="0"/>
-          </a:p>
-          <a:p>
-            <a:pPr>
-              <a:lnSpc>
-                <a:spcPct val="150000"/>
-              </a:lnSpc>
-            </a:pPr>
-            <a:endParaRPr lang="de-DE" sz="2000" dirty="0"/>
           </a:p>
         </p:txBody>
       </p:sp>
@@ -18506,7 +19261,7 @@
             <a:fld id="{17C2562E-359A-3C42-BBEF-E02CE97BECB1}" type="datetimeFigureOut">
               <a:rPr lang="de-DE" smtClean="0"/>
               <a:pPr/>
-              <a:t>15.10.17</a:t>
+              <a:t>18.10.17</a:t>
             </a:fld>
             <a:endParaRPr lang="de-DE" dirty="0"/>
           </a:p>
@@ -18562,7 +19317,7 @@
     </p:spTree>
     <p:extLst>
       <p:ext uri="{BB962C8B-B14F-4D97-AF65-F5344CB8AC3E}">
-        <p14:creationId xmlns:p14="http://schemas.microsoft.com/office/powerpoint/2010/main" val="195296844"/>
+        <p14:creationId xmlns:p14="http://schemas.microsoft.com/office/powerpoint/2010/main" val="1308066520"/>
       </p:ext>
     </p:extLst>
   </p:cSld>
@@ -18612,17 +19367,10 @@
           <a:lstStyle/>
           <a:p>
             <a:r>
-              <a:rPr lang="de-DE" dirty="0"/>
-              <a:t>Template-</a:t>
-            </a:r>
-            <a:r>
-              <a:rPr lang="de-DE" dirty="0" err="1"/>
-              <a:t>Driven</a:t>
-            </a:r>
-            <a:r>
-              <a:rPr lang="de-DE" dirty="0"/>
-              <a:t> Forms</a:t>
-            </a:r>
+              <a:rPr lang="de-DE" dirty="0" smtClean="0"/>
+              <a:t>Service</a:t>
+            </a:r>
+            <a:endParaRPr lang="de-DE" dirty="0"/>
           </a:p>
         </p:txBody>
       </p:sp>
@@ -18636,7 +19384,12 @@
             <p:ph type="body" sz="quarter" idx="30"/>
           </p:nvPr>
         </p:nvSpPr>
-        <p:spPr/>
+        <p:spPr>
+          <a:xfrm>
+            <a:off x="381600" y="1569368"/>
+            <a:ext cx="7812000" cy="5050507"/>
+          </a:xfrm>
+        </p:spPr>
         <p:txBody>
           <a:bodyPr/>
           <a:lstStyle/>
@@ -18647,41 +19400,14 @@
               </a:lnSpc>
             </a:pPr>
             <a:r>
-              <a:rPr lang="de-DE" dirty="0"/>
-              <a:t>Integration mittels </a:t>
-            </a:r>
-            <a:r>
-              <a:rPr lang="de-DE" dirty="0">
-                <a:latin typeface="Consolas" panose="020B0609020204030204" pitchFamily="49" charset="0"/>
-                <a:cs typeface="Consolas" panose="020B0609020204030204" pitchFamily="49" charset="0"/>
-              </a:rPr>
-              <a:t>@</a:t>
-            </a:r>
-            <a:r>
-              <a:rPr lang="de-DE" dirty="0" err="1">
-                <a:latin typeface="Consolas" panose="020B0609020204030204" pitchFamily="49" charset="0"/>
-                <a:cs typeface="Consolas" panose="020B0609020204030204" pitchFamily="49" charset="0"/>
-              </a:rPr>
-              <a:t>NgModule</a:t>
-            </a:r>
-            <a:r>
-              <a:rPr lang="de-DE" dirty="0">
-                <a:latin typeface="Consolas" panose="020B0609020204030204" pitchFamily="49" charset="0"/>
-                <a:cs typeface="Consolas" panose="020B0609020204030204" pitchFamily="49" charset="0"/>
-              </a:rPr>
-              <a:t> </a:t>
-            </a:r>
-            <a:r>
-              <a:rPr lang="de-DE" dirty="0" err="1">
-                <a:latin typeface="Consolas" panose="020B0609020204030204" pitchFamily="49" charset="0"/>
-                <a:cs typeface="Consolas" panose="020B0609020204030204" pitchFamily="49" charset="0"/>
-              </a:rPr>
-              <a:t>FormsModule</a:t>
-            </a:r>
-            <a:endParaRPr lang="de-DE" dirty="0">
-              <a:latin typeface="Consolas" panose="020B0609020204030204" pitchFamily="49" charset="0"/>
-              <a:cs typeface="Consolas" panose="020B0609020204030204" pitchFamily="49" charset="0"/>
-            </a:endParaRPr>
+              <a:rPr lang="de-DE" dirty="0" smtClean="0"/>
+              <a:t>Service enthält </a:t>
+            </a:r>
+            <a:r>
+              <a:rPr lang="de-DE" dirty="0" smtClean="0"/>
+              <a:t>Businesslogik</a:t>
+            </a:r>
+            <a:endParaRPr lang="de-DE" dirty="0"/>
           </a:p>
           <a:p>
             <a:pPr>
@@ -18690,11 +19416,14 @@
               </a:lnSpc>
             </a:pPr>
             <a:r>
-              <a:rPr lang="de-DE" dirty="0">
-                <a:cs typeface="Consolas" panose="020B0609020204030204" pitchFamily="49" charset="0"/>
-              </a:rPr>
-              <a:t>Rein deklarative Realisierung im Markup durch Direktiven und lokale Template-Variablen</a:t>
-            </a:r>
+              <a:rPr lang="de-DE" dirty="0" smtClean="0"/>
+              <a:t>Bietet Daten, Funktionen und Features anwendungsübergreifend </a:t>
+            </a:r>
+            <a:r>
+              <a:rPr lang="de-DE" dirty="0" smtClean="0"/>
+              <a:t>an</a:t>
+            </a:r>
+            <a:endParaRPr lang="de-DE" dirty="0" smtClean="0"/>
           </a:p>
           <a:p>
             <a:pPr>
@@ -18703,99 +19432,104 @@
               </a:lnSpc>
             </a:pPr>
             <a:r>
-              <a:rPr lang="de-DE" dirty="0"/>
-              <a:t>Grundlage: </a:t>
-            </a:r>
-            <a:r>
-              <a:rPr lang="de-DE" dirty="0" err="1"/>
-              <a:t>Two</a:t>
-            </a:r>
-            <a:r>
-              <a:rPr lang="de-DE" dirty="0"/>
-              <a:t>-Way-Data-Binding via </a:t>
-            </a:r>
-            <a:r>
-              <a:rPr lang="de-DE" dirty="0">
-                <a:latin typeface="Consolas" panose="020B0609020204030204" pitchFamily="49" charset="0"/>
-                <a:cs typeface="Consolas" panose="020B0609020204030204" pitchFamily="49" charset="0"/>
-              </a:rPr>
-              <a:t>[(</a:t>
-            </a:r>
-            <a:r>
-              <a:rPr lang="de-DE" dirty="0" err="1">
-                <a:latin typeface="Consolas" panose="020B0609020204030204" pitchFamily="49" charset="0"/>
-                <a:cs typeface="Consolas" panose="020B0609020204030204" pitchFamily="49" charset="0"/>
-              </a:rPr>
-              <a:t>ngModel</a:t>
-            </a:r>
-            <a:r>
-              <a:rPr lang="de-DE" dirty="0">
-                <a:latin typeface="Consolas" panose="020B0609020204030204" pitchFamily="49" charset="0"/>
-                <a:cs typeface="Consolas" panose="020B0609020204030204" pitchFamily="49" charset="0"/>
-              </a:rPr>
-              <a:t>)]</a:t>
-            </a:r>
-          </a:p>
-          <a:p>
-            <a:pPr>
+              <a:rPr lang="de-DE" dirty="0" smtClean="0"/>
+              <a:t>Ein Service wird per </a:t>
+            </a:r>
+            <a:r>
+              <a:rPr lang="de-DE" i="1" dirty="0" err="1" smtClean="0"/>
+              <a:t>Dependency</a:t>
+            </a:r>
+            <a:r>
+              <a:rPr lang="de-DE" i="1" dirty="0" smtClean="0"/>
+              <a:t> </a:t>
+            </a:r>
+            <a:r>
+              <a:rPr lang="de-DE" i="1" dirty="0" err="1" smtClean="0"/>
+              <a:t>Injection</a:t>
+            </a:r>
+            <a:r>
+              <a:rPr lang="de-DE" dirty="0" smtClean="0"/>
+              <a:t> in eine Komponente </a:t>
+            </a:r>
+            <a:r>
+              <a:rPr lang="de-DE" dirty="0" smtClean="0"/>
+              <a:t>injiziert</a:t>
+            </a:r>
+            <a:endParaRPr lang="de-DE" dirty="0" smtClean="0"/>
+          </a:p>
+          <a:p>
+            <a:pPr lvl="0">
               <a:lnSpc>
                 <a:spcPct val="150000"/>
               </a:lnSpc>
             </a:pPr>
             <a:r>
-              <a:rPr lang="de-DE" dirty="0"/>
-              <a:t>Verringerung des Testaufwands durch Verlagerung der Logik ins Markup</a:t>
-            </a:r>
-          </a:p>
-          <a:p>
-            <a:pPr>
+              <a:rPr lang="de-DE" dirty="0" smtClean="0"/>
+              <a:t>Ist ein </a:t>
+            </a:r>
+            <a:r>
+              <a:rPr lang="de-DE" dirty="0" err="1" smtClean="0"/>
+              <a:t>Singelton</a:t>
+            </a:r>
+            <a:endParaRPr lang="de-DE" dirty="0"/>
+          </a:p>
+          <a:p>
+            <a:pPr lvl="0">
               <a:lnSpc>
                 <a:spcPct val="150000"/>
               </a:lnSpc>
             </a:pPr>
             <a:r>
               <a:rPr lang="de-DE" dirty="0"/>
-              <a:t>Geeignet für schnelle Umsetzung einfacher Formulare</a:t>
-            </a:r>
-          </a:p>
-          <a:p>
-            <a:pPr>
+              <a:t>Anlegen </a:t>
+            </a:r>
+            <a:r>
+              <a:rPr lang="de-DE" dirty="0" smtClean="0"/>
+              <a:t>eines Services mittels </a:t>
+            </a:r>
+            <a:r>
+              <a:rPr lang="de-DE" dirty="0"/>
+              <a:t>CLI </a:t>
+            </a:r>
+          </a:p>
+          <a:p>
+            <a:pPr lvl="1">
               <a:lnSpc>
                 <a:spcPct val="150000"/>
               </a:lnSpc>
             </a:pPr>
             <a:r>
-              <a:rPr lang="de-DE" dirty="0"/>
-              <a:t>Unterstützung für Property-Binding von </a:t>
-            </a:r>
-            <a:r>
-              <a:rPr lang="de-DE" dirty="0" err="1">
-                <a:latin typeface="Consolas" panose="020B0609020204030204" pitchFamily="49" charset="0"/>
-                <a:cs typeface="Consolas" panose="020B0609020204030204" pitchFamily="49" charset="0"/>
-              </a:rPr>
-              <a:t>disabled</a:t>
-            </a:r>
-            <a:endParaRPr lang="de-DE" dirty="0">
-              <a:latin typeface="Consolas" panose="020B0609020204030204" pitchFamily="49" charset="0"/>
-              <a:cs typeface="Consolas" panose="020B0609020204030204" pitchFamily="49" charset="0"/>
-            </a:endParaRPr>
-          </a:p>
-          <a:p>
-            <a:pPr>
-              <a:lnSpc>
-                <a:spcPct val="150000"/>
-              </a:lnSpc>
-            </a:pPr>
-            <a:r>
-              <a:rPr lang="de-DE" dirty="0">
-                <a:cs typeface="Consolas" panose="020B0609020204030204" pitchFamily="49" charset="0"/>
-              </a:rPr>
-              <a:t>Keine Direktive für Form Arrays</a:t>
-            </a:r>
-            <a:endParaRPr lang="de-DE" dirty="0"/>
-          </a:p>
-          <a:p>
-            <a:endParaRPr lang="de-DE" dirty="0"/>
+              <a:rPr lang="de-DE" dirty="0" err="1"/>
+              <a:t>ng</a:t>
+            </a:r>
+            <a:r>
+              <a:rPr lang="de-DE" dirty="0"/>
+              <a:t> </a:t>
+            </a:r>
+            <a:r>
+              <a:rPr lang="de-DE" dirty="0" err="1"/>
+              <a:t>g</a:t>
+            </a:r>
+            <a:r>
+              <a:rPr lang="de-DE" dirty="0"/>
+              <a:t> </a:t>
+            </a:r>
+            <a:r>
+              <a:rPr lang="de-DE" dirty="0" err="1"/>
+              <a:t>service</a:t>
+            </a:r>
+            <a:r>
+              <a:rPr lang="de-DE" dirty="0"/>
+              <a:t> &lt;</a:t>
+            </a:r>
+            <a:r>
+              <a:rPr lang="de-DE" dirty="0" err="1"/>
+              <a:t>name</a:t>
+            </a:r>
+            <a:r>
+              <a:rPr lang="de-DE" dirty="0"/>
+              <a:t>&gt; </a:t>
+            </a:r>
           </a:p>
         </p:txBody>
       </p:sp>
@@ -18817,7 +19551,7 @@
             <a:fld id="{17C2562E-359A-3C42-BBEF-E02CE97BECB1}" type="datetimeFigureOut">
               <a:rPr lang="de-DE" smtClean="0"/>
               <a:pPr/>
-              <a:t>15.10.17</a:t>
+              <a:t>18.10.17</a:t>
             </a:fld>
             <a:endParaRPr lang="de-DE" dirty="0"/>
           </a:p>
@@ -18870,10 +19604,68 @@
           </a:p>
         </p:txBody>
       </p:sp>
+      <p:pic>
+        <p:nvPicPr>
+          <p:cNvPr id="7" name="Bild 6"/>
+          <p:cNvPicPr>
+            <a:picLocks noChangeAspect="1"/>
+          </p:cNvPicPr>
+          <p:nvPr/>
+        </p:nvPicPr>
+        <p:blipFill>
+          <a:blip r:embed="rId2"/>
+          <a:stretch>
+            <a:fillRect/>
+          </a:stretch>
+        </p:blipFill>
+        <p:spPr>
+          <a:xfrm>
+            <a:off x="8549251" y="1387777"/>
+            <a:ext cx="3360565" cy="2609134"/>
+          </a:xfrm>
+          <a:prstGeom prst="rect">
+            <a:avLst/>
+          </a:prstGeom>
+        </p:spPr>
+      </p:pic>
+      <p:sp>
+        <p:nvSpPr>
+          <p:cNvPr id="8" name="Textfeld 7"/>
+          <p:cNvSpPr txBox="1"/>
+          <p:nvPr/>
+        </p:nvSpPr>
+        <p:spPr>
+          <a:xfrm>
+            <a:off x="11184004" y="6568223"/>
+            <a:ext cx="1465145" cy="307777"/>
+          </a:xfrm>
+          <a:prstGeom prst="rect">
+            <a:avLst/>
+          </a:prstGeom>
+          <a:noFill/>
+        </p:spPr>
+        <p:txBody>
+          <a:bodyPr wrap="none" rtlCol="0">
+            <a:spAutoFit/>
+          </a:bodyPr>
+          <a:lstStyle/>
+          <a:p>
+            <a:r>
+              <a:rPr lang="de-DE" sz="1400" dirty="0" smtClean="0"/>
+              <a:t>Quelle: </a:t>
+            </a:r>
+            <a:r>
+              <a:rPr lang="de-DE" sz="1400" dirty="0" err="1" smtClean="0"/>
+              <a:t>angular.io</a:t>
+            </a:r>
+            <a:endParaRPr lang="de-DE" sz="1400" dirty="0"/>
+          </a:p>
+        </p:txBody>
+      </p:sp>
     </p:spTree>
     <p:extLst>
       <p:ext uri="{BB962C8B-B14F-4D97-AF65-F5344CB8AC3E}">
-        <p14:creationId xmlns:p14="http://schemas.microsoft.com/office/powerpoint/2010/main" val="1657213088"/>
+        <p14:creationId xmlns:p14="http://schemas.microsoft.com/office/powerpoint/2010/main" val="23653658"/>
       </p:ext>
     </p:extLst>
   </p:cSld>
@@ -18923,17 +19715,10 @@
           <a:lstStyle/>
           <a:p>
             <a:r>
-              <a:rPr lang="de-DE" dirty="0"/>
-              <a:t>Template-</a:t>
-            </a:r>
-            <a:r>
-              <a:rPr lang="de-DE" dirty="0" err="1"/>
-              <a:t>Driven</a:t>
-            </a:r>
-            <a:r>
-              <a:rPr lang="de-DE" dirty="0"/>
-              <a:t> Forms</a:t>
-            </a:r>
+              <a:rPr lang="de-DE" dirty="0" smtClean="0"/>
+              <a:t>Service</a:t>
+            </a:r>
+            <a:endParaRPr lang="de-DE" dirty="0"/>
           </a:p>
         </p:txBody>
       </p:sp>
@@ -19000,7 +19785,7 @@
             <a:fld id="{17C2562E-359A-3C42-BBEF-E02CE97BECB1}" type="datetimeFigureOut">
               <a:rPr lang="de-DE" smtClean="0"/>
               <a:pPr/>
-              <a:t>15.10.17</a:t>
+              <a:t>18.10.17</a:t>
             </a:fld>
             <a:endParaRPr lang="de-DE" dirty="0"/>
           </a:p>
@@ -19056,7 +19841,7 @@
     </p:spTree>
     <p:extLst>
       <p:ext uri="{BB962C8B-B14F-4D97-AF65-F5344CB8AC3E}">
-        <p14:creationId xmlns:p14="http://schemas.microsoft.com/office/powerpoint/2010/main" val="1308066520"/>
+        <p14:creationId xmlns:p14="http://schemas.microsoft.com/office/powerpoint/2010/main" val="262555311"/>
       </p:ext>
     </p:extLst>
   </p:cSld>
@@ -19273,7 +20058,7 @@
           <p:cNvPr id="5" name="Datumsplatzhalter 4">
             <a:extLst>
               <a:ext uri="{FF2B5EF4-FFF2-40B4-BE49-F238E27FC236}">
-                <a16:creationId xmlns="" xmlns:a16="http://schemas.microsoft.com/office/drawing/2014/main" id="{D471591C-E430-45E7-A587-2CEC0AF88DA0}"/>
+                <a16:creationId xmlns:a16="http://schemas.microsoft.com/office/drawing/2014/main" xmlns="" id="{D471591C-E430-45E7-A587-2CEC0AF88DA0}"/>
               </a:ext>
             </a:extLst>
           </p:cNvPr>
@@ -19291,7 +20076,7 @@
           <a:p>
             <a:fld id="{D3ADFBD6-4690-496C-B9C9-0BEF0B938F74}" type="datetime1">
               <a:rPr lang="de-DE" smtClean="0"/>
-              <a:t>15.10.17</a:t>
+              <a:t>18.10.17</a:t>
             </a:fld>
             <a:endParaRPr lang="de-DE" dirty="0"/>
           </a:p>
@@ -19302,7 +20087,7 @@
           <p:cNvPr id="6" name="Fußzeilenplatzhalter 5">
             <a:extLst>
               <a:ext uri="{FF2B5EF4-FFF2-40B4-BE49-F238E27FC236}">
-                <a16:creationId xmlns="" xmlns:a16="http://schemas.microsoft.com/office/drawing/2014/main" id="{B488671B-A101-43AC-84F6-1F2F8515424C}"/>
+                <a16:creationId xmlns:a16="http://schemas.microsoft.com/office/drawing/2014/main" xmlns="" id="{B488671B-A101-43AC-84F6-1F2F8515424C}"/>
               </a:ext>
             </a:extLst>
           </p:cNvPr>
@@ -19327,7 +20112,7 @@
           <p:cNvPr id="7" name="Foliennummernplatzhalter 6">
             <a:extLst>
               <a:ext uri="{FF2B5EF4-FFF2-40B4-BE49-F238E27FC236}">
-                <a16:creationId xmlns="" xmlns:a16="http://schemas.microsoft.com/office/drawing/2014/main" id="{8E977D85-C22B-4016-AC2C-F3FDCE1BCBEB}"/>
+                <a16:creationId xmlns:a16="http://schemas.microsoft.com/office/drawing/2014/main" xmlns="" id="{8E977D85-C22B-4016-AC2C-F3FDCE1BCBEB}"/>
               </a:ext>
             </a:extLst>
           </p:cNvPr>
@@ -19408,6 +20193,494 @@
           <a:bodyPr/>
           <a:lstStyle/>
           <a:p>
+            <a:r>
+              <a:rPr lang="de-DE" dirty="0" smtClean="0"/>
+              <a:t>Routing</a:t>
+            </a:r>
+            <a:endParaRPr lang="de-DE" dirty="0"/>
+          </a:p>
+        </p:txBody>
+      </p:sp>
+      <p:sp>
+        <p:nvSpPr>
+          <p:cNvPr id="3" name="Textplatzhalter 2"/>
+          <p:cNvSpPr>
+            <a:spLocks noGrp="1"/>
+          </p:cNvSpPr>
+          <p:nvPr>
+            <p:ph type="body" sz="quarter" idx="30"/>
+          </p:nvPr>
+        </p:nvSpPr>
+        <p:spPr>
+          <a:xfrm>
+            <a:off x="381599" y="1569368"/>
+            <a:ext cx="12267549" cy="5050507"/>
+          </a:xfrm>
+        </p:spPr>
+        <p:txBody>
+          <a:bodyPr/>
+          <a:lstStyle/>
+          <a:p>
+            <a:pPr>
+              <a:lnSpc>
+                <a:spcPct val="150000"/>
+              </a:lnSpc>
+            </a:pPr>
+            <a:r>
+              <a:rPr lang="de-DE" dirty="0"/>
+              <a:t>Eigenständiges </a:t>
+            </a:r>
+            <a:r>
+              <a:rPr lang="de-DE" dirty="0" err="1"/>
+              <a:t>npm</a:t>
+            </a:r>
+            <a:r>
+              <a:rPr lang="de-DE" dirty="0"/>
+              <a:t>-Paket: </a:t>
+            </a:r>
+            <a:r>
+              <a:rPr lang="de-DE" dirty="0">
+                <a:latin typeface="Consolas" panose="020B0609020204030204" pitchFamily="49" charset="0"/>
+                <a:cs typeface="Consolas" panose="020B0609020204030204" pitchFamily="49" charset="0"/>
+              </a:rPr>
+              <a:t>@</a:t>
+            </a:r>
+            <a:r>
+              <a:rPr lang="de-DE" dirty="0" smtClean="0">
+                <a:latin typeface="Consolas" panose="020B0609020204030204" pitchFamily="49" charset="0"/>
+                <a:cs typeface="Consolas" panose="020B0609020204030204" pitchFamily="49" charset="0"/>
+              </a:rPr>
+              <a:t>angular/</a:t>
+            </a:r>
+            <a:r>
+              <a:rPr lang="de-DE" dirty="0" err="1" smtClean="0">
+                <a:latin typeface="Consolas" panose="020B0609020204030204" pitchFamily="49" charset="0"/>
+                <a:cs typeface="Consolas" panose="020B0609020204030204" pitchFamily="49" charset="0"/>
+              </a:rPr>
+              <a:t>router</a:t>
+            </a:r>
+            <a:endParaRPr lang="de-DE" dirty="0">
+              <a:latin typeface="Consolas" panose="020B0609020204030204" pitchFamily="49" charset="0"/>
+              <a:cs typeface="Consolas" panose="020B0609020204030204" pitchFamily="49" charset="0"/>
+            </a:endParaRPr>
+          </a:p>
+          <a:p>
+            <a:pPr>
+              <a:lnSpc>
+                <a:spcPct val="150000"/>
+              </a:lnSpc>
+            </a:pPr>
+            <a:r>
+              <a:rPr lang="de-DE" dirty="0" smtClean="0"/>
+              <a:t>Navigation im Browser</a:t>
+            </a:r>
+          </a:p>
+          <a:p>
+            <a:pPr lvl="1">
+              <a:lnSpc>
+                <a:spcPct val="150000"/>
+              </a:lnSpc>
+            </a:pPr>
+            <a:r>
+              <a:rPr lang="de-DE" dirty="0" smtClean="0"/>
+              <a:t>In der Regel mittels Hyperlinks</a:t>
+            </a:r>
+          </a:p>
+          <a:p>
+            <a:pPr lvl="1">
+              <a:lnSpc>
+                <a:spcPct val="150000"/>
+              </a:lnSpc>
+            </a:pPr>
+            <a:r>
+              <a:rPr lang="de-DE" dirty="0" smtClean="0"/>
+              <a:t>Lesezeichen können gesetzt und geteilt werden</a:t>
+            </a:r>
+            <a:endParaRPr lang="de-DE" dirty="0" smtClean="0"/>
+          </a:p>
+          <a:p>
+            <a:pPr>
+              <a:lnSpc>
+                <a:spcPct val="150000"/>
+              </a:lnSpc>
+            </a:pPr>
+            <a:r>
+              <a:rPr lang="de-DE" dirty="0" smtClean="0"/>
+              <a:t>Angular Router ermöglicht die Navigation innerhalb der Anwendung</a:t>
+            </a:r>
+            <a:endParaRPr lang="de-DE" dirty="0"/>
+          </a:p>
+          <a:p>
+            <a:pPr lvl="1">
+              <a:lnSpc>
+                <a:spcPct val="150000"/>
+              </a:lnSpc>
+            </a:pPr>
+            <a:r>
+              <a:rPr lang="de-DE" dirty="0" smtClean="0"/>
+              <a:t>Server liefert die </a:t>
+            </a:r>
+            <a:r>
+              <a:rPr lang="de-DE" dirty="0" err="1" smtClean="0"/>
+              <a:t>index.html</a:t>
+            </a:r>
+            <a:r>
+              <a:rPr lang="de-DE" dirty="0" smtClean="0"/>
+              <a:t>, A</a:t>
+            </a:r>
+            <a:r>
+              <a:rPr lang="de-DE" dirty="0" smtClean="0"/>
+              <a:t>ngular analysiert den Rest der Route und löst diese auf</a:t>
+            </a:r>
+          </a:p>
+          <a:p>
+            <a:pPr lvl="1">
+              <a:lnSpc>
+                <a:spcPct val="150000"/>
+              </a:lnSpc>
+            </a:pPr>
+            <a:r>
+              <a:rPr lang="de-DE" dirty="0" smtClean="0"/>
+              <a:t>Klinkt sich in die </a:t>
+            </a:r>
+            <a:r>
+              <a:rPr lang="de-DE" dirty="0" err="1" smtClean="0">
+                <a:hlinkClick r:id="rId3"/>
+              </a:rPr>
+              <a:t>History</a:t>
+            </a:r>
+            <a:r>
+              <a:rPr lang="de-DE" dirty="0" smtClean="0">
+                <a:hlinkClick r:id="rId3"/>
+              </a:rPr>
+              <a:t>-API</a:t>
+            </a:r>
+            <a:r>
+              <a:rPr lang="de-DE" dirty="0" smtClean="0"/>
+              <a:t> des Browsers ein </a:t>
+            </a:r>
+          </a:p>
+          <a:p>
+            <a:pPr lvl="1">
+              <a:lnSpc>
+                <a:spcPct val="150000"/>
+              </a:lnSpc>
+            </a:pPr>
+            <a:r>
+              <a:rPr lang="de-DE" dirty="0" smtClean="0"/>
+              <a:t>Bildet das Navigationskonzept des Browsers für </a:t>
+            </a:r>
+            <a:r>
+              <a:rPr lang="de-DE" dirty="0" err="1" smtClean="0"/>
+              <a:t>SPA‘s</a:t>
+            </a:r>
+            <a:r>
+              <a:rPr lang="de-DE" dirty="0" smtClean="0"/>
+              <a:t> nach</a:t>
+            </a:r>
+            <a:endParaRPr lang="de-DE" dirty="0"/>
+          </a:p>
+        </p:txBody>
+      </p:sp>
+      <p:sp>
+        <p:nvSpPr>
+          <p:cNvPr id="4" name="Datumsplatzhalter 3"/>
+          <p:cNvSpPr>
+            <a:spLocks noGrp="1"/>
+          </p:cNvSpPr>
+          <p:nvPr>
+            <p:ph type="dt" sz="half" idx="31"/>
+          </p:nvPr>
+        </p:nvSpPr>
+        <p:spPr/>
+        <p:txBody>
+          <a:bodyPr/>
+          <a:lstStyle/>
+          <a:p>
+            <a:fld id="{17C2562E-359A-3C42-BBEF-E02CE97BECB1}" type="datetimeFigureOut">
+              <a:rPr lang="de-DE" smtClean="0"/>
+              <a:pPr/>
+              <a:t>19.10.17</a:t>
+            </a:fld>
+            <a:endParaRPr lang="de-DE" dirty="0"/>
+          </a:p>
+        </p:txBody>
+      </p:sp>
+      <p:sp>
+        <p:nvSpPr>
+          <p:cNvPr id="5" name="Fußzeilenplatzhalter 4"/>
+          <p:cNvSpPr>
+            <a:spLocks noGrp="1"/>
+          </p:cNvSpPr>
+          <p:nvPr>
+            <p:ph type="ftr" sz="quarter" idx="32"/>
+          </p:nvPr>
+        </p:nvSpPr>
+        <p:spPr/>
+        <p:txBody>
+          <a:bodyPr/>
+          <a:lstStyle/>
+          <a:p>
+            <a:endParaRPr lang="de-DE" dirty="0"/>
+          </a:p>
+        </p:txBody>
+      </p:sp>
+      <p:sp>
+        <p:nvSpPr>
+          <p:cNvPr id="6" name="Foliennummernplatzhalter 5"/>
+          <p:cNvSpPr>
+            <a:spLocks noGrp="1"/>
+          </p:cNvSpPr>
+          <p:nvPr>
+            <p:ph type="sldNum" sz="quarter" idx="33"/>
+          </p:nvPr>
+        </p:nvSpPr>
+        <p:spPr/>
+        <p:txBody>
+          <a:bodyPr/>
+          <a:lstStyle/>
+          <a:p>
+            <a:r>
+              <a:rPr lang="de-DE"/>
+              <a:t>Seite </a:t>
+            </a:r>
+            <a:fld id="{38661448-4A48-D446-A2DB-27E795148D92}" type="slidenum">
+              <a:rPr lang="de-DE" smtClean="0"/>
+              <a:pPr/>
+              <a:t>20</a:t>
+            </a:fld>
+            <a:endParaRPr lang="de-DE" dirty="0"/>
+          </a:p>
+        </p:txBody>
+      </p:sp>
+    </p:spTree>
+    <p:extLst>
+      <p:ext uri="{BB962C8B-B14F-4D97-AF65-F5344CB8AC3E}">
+        <p14:creationId xmlns:p14="http://schemas.microsoft.com/office/powerpoint/2010/main" val="1835701039"/>
+      </p:ext>
+    </p:extLst>
+  </p:cSld>
+  <p:clrMapOvr>
+    <a:masterClrMapping/>
+  </p:clrMapOvr>
+  <p:timing>
+    <p:tnLst>
+      <p:par>
+        <p:cTn id="1" dur="indefinite" restart="never" nodeType="tmRoot"/>
+      </p:par>
+    </p:tnLst>
+  </p:timing>
+</p:sld>
+</file>
+
+<file path=ppt/slides/slide21.xml><?xml version="1.0" encoding="utf-8"?>
+<p:sld xmlns:a="http://schemas.openxmlformats.org/drawingml/2006/main" xmlns:r="http://schemas.openxmlformats.org/officeDocument/2006/relationships" xmlns:p="http://schemas.openxmlformats.org/presentationml/2006/main">
+  <p:cSld>
+    <p:spTree>
+      <p:nvGrpSpPr>
+        <p:cNvPr id="1" name=""/>
+        <p:cNvGrpSpPr/>
+        <p:nvPr/>
+      </p:nvGrpSpPr>
+      <p:grpSpPr>
+        <a:xfrm>
+          <a:off x="0" y="0"/>
+          <a:ext cx="0" cy="0"/>
+          <a:chOff x="0" y="0"/>
+          <a:chExt cx="0" cy="0"/>
+        </a:xfrm>
+      </p:grpSpPr>
+      <p:sp>
+        <p:nvSpPr>
+          <p:cNvPr id="2" name="Titel 1"/>
+          <p:cNvSpPr>
+            <a:spLocks noGrp="1"/>
+          </p:cNvSpPr>
+          <p:nvPr>
+            <p:ph type="title"/>
+          </p:nvPr>
+        </p:nvSpPr>
+        <p:spPr/>
+        <p:txBody>
+          <a:bodyPr/>
+          <a:lstStyle/>
+          <a:p>
+            <a:r>
+              <a:rPr lang="de-DE" dirty="0" smtClean="0"/>
+              <a:t>Routing</a:t>
+            </a:r>
+            <a:endParaRPr lang="de-DE" dirty="0"/>
+          </a:p>
+        </p:txBody>
+      </p:sp>
+      <p:sp>
+        <p:nvSpPr>
+          <p:cNvPr id="3" name="Textplatzhalter 2"/>
+          <p:cNvSpPr>
+            <a:spLocks noGrp="1"/>
+          </p:cNvSpPr>
+          <p:nvPr>
+            <p:ph type="body" sz="quarter" idx="30"/>
+          </p:nvPr>
+        </p:nvSpPr>
+        <p:spPr/>
+        <p:txBody>
+          <a:bodyPr anchor="ctr"/>
+          <a:lstStyle/>
+          <a:p>
+            <a:pPr marL="0" indent="0" algn="ctr">
+              <a:buNone/>
+            </a:pPr>
+            <a:r>
+              <a:rPr lang="de-DE" sz="6600" dirty="0">
+                <a:solidFill>
+                  <a:schemeClr val="tx2"/>
+                </a:solidFill>
+                <a:latin typeface="+mj-lt"/>
+              </a:rPr>
+              <a:t>Live </a:t>
+            </a:r>
+            <a:r>
+              <a:rPr lang="de-DE" sz="6600" dirty="0" err="1">
+                <a:solidFill>
+                  <a:schemeClr val="tx2"/>
+                </a:solidFill>
+                <a:latin typeface="+mj-lt"/>
+              </a:rPr>
+              <a:t>Coding</a:t>
+            </a:r>
+            <a:endParaRPr lang="de-DE" sz="6600" dirty="0">
+              <a:solidFill>
+                <a:schemeClr val="tx2"/>
+              </a:solidFill>
+              <a:latin typeface="+mj-lt"/>
+            </a:endParaRPr>
+          </a:p>
+        </p:txBody>
+      </p:sp>
+      <p:sp>
+        <p:nvSpPr>
+          <p:cNvPr id="4" name="Datumsplatzhalter 3"/>
+          <p:cNvSpPr>
+            <a:spLocks noGrp="1"/>
+          </p:cNvSpPr>
+          <p:nvPr>
+            <p:ph type="dt" sz="half" idx="31"/>
+          </p:nvPr>
+        </p:nvSpPr>
+        <p:spPr/>
+        <p:txBody>
+          <a:bodyPr/>
+          <a:lstStyle/>
+          <a:p>
+            <a:fld id="{17C2562E-359A-3C42-BBEF-E02CE97BECB1}" type="datetimeFigureOut">
+              <a:rPr lang="de-DE" smtClean="0"/>
+              <a:pPr/>
+              <a:t>18.10.17</a:t>
+            </a:fld>
+            <a:endParaRPr lang="de-DE" dirty="0"/>
+          </a:p>
+        </p:txBody>
+      </p:sp>
+      <p:sp>
+        <p:nvSpPr>
+          <p:cNvPr id="5" name="Fußzeilenplatzhalter 4"/>
+          <p:cNvSpPr>
+            <a:spLocks noGrp="1"/>
+          </p:cNvSpPr>
+          <p:nvPr>
+            <p:ph type="ftr" sz="quarter" idx="32"/>
+          </p:nvPr>
+        </p:nvSpPr>
+        <p:spPr/>
+        <p:txBody>
+          <a:bodyPr/>
+          <a:lstStyle/>
+          <a:p>
+            <a:endParaRPr lang="de-DE" dirty="0"/>
+          </a:p>
+        </p:txBody>
+      </p:sp>
+      <p:sp>
+        <p:nvSpPr>
+          <p:cNvPr id="6" name="Foliennummernplatzhalter 5"/>
+          <p:cNvSpPr>
+            <a:spLocks noGrp="1"/>
+          </p:cNvSpPr>
+          <p:nvPr>
+            <p:ph type="sldNum" sz="quarter" idx="33"/>
+          </p:nvPr>
+        </p:nvSpPr>
+        <p:spPr/>
+        <p:txBody>
+          <a:bodyPr/>
+          <a:lstStyle/>
+          <a:p>
+            <a:r>
+              <a:rPr lang="de-DE"/>
+              <a:t>Seite </a:t>
+            </a:r>
+            <a:fld id="{38661448-4A48-D446-A2DB-27E795148D92}" type="slidenum">
+              <a:rPr lang="de-DE" smtClean="0"/>
+              <a:pPr/>
+              <a:t>21</a:t>
+            </a:fld>
+            <a:endParaRPr lang="de-DE" dirty="0"/>
+          </a:p>
+        </p:txBody>
+      </p:sp>
+    </p:spTree>
+    <p:extLst>
+      <p:ext uri="{BB962C8B-B14F-4D97-AF65-F5344CB8AC3E}">
+        <p14:creationId xmlns:p14="http://schemas.microsoft.com/office/powerpoint/2010/main" val="1877289671"/>
+      </p:ext>
+    </p:extLst>
+  </p:cSld>
+  <p:clrMapOvr>
+    <a:masterClrMapping/>
+  </p:clrMapOvr>
+  <p:timing>
+    <p:tnLst>
+      <p:par>
+        <p:cTn id="1" dur="indefinite" restart="never" nodeType="tmRoot"/>
+      </p:par>
+    </p:tnLst>
+  </p:timing>
+</p:sld>
+</file>
+
+<file path=ppt/slides/slide22.xml><?xml version="1.0" encoding="utf-8"?>
+<p:sld xmlns:a="http://schemas.openxmlformats.org/drawingml/2006/main" xmlns:r="http://schemas.openxmlformats.org/officeDocument/2006/relationships" xmlns:p="http://schemas.openxmlformats.org/presentationml/2006/main">
+  <p:cSld>
+    <p:spTree>
+      <p:nvGrpSpPr>
+        <p:cNvPr id="1" name=""/>
+        <p:cNvGrpSpPr/>
+        <p:nvPr/>
+      </p:nvGrpSpPr>
+      <p:grpSpPr>
+        <a:xfrm>
+          <a:off x="0" y="0"/>
+          <a:ext cx="0" cy="0"/>
+          <a:chOff x="0" y="0"/>
+          <a:chExt cx="0" cy="0"/>
+        </a:xfrm>
+      </p:grpSpPr>
+      <p:sp>
+        <p:nvSpPr>
+          <p:cNvPr id="2" name="Titel 1"/>
+          <p:cNvSpPr>
+            <a:spLocks noGrp="1"/>
+          </p:cNvSpPr>
+          <p:nvPr>
+            <p:ph type="title"/>
+          </p:nvPr>
+        </p:nvSpPr>
+        <p:spPr/>
+        <p:txBody>
+          <a:bodyPr/>
+          <a:lstStyle/>
+          <a:p>
             <a:endParaRPr lang="de-DE" dirty="0"/>
           </a:p>
         </p:txBody>
@@ -19460,7 +20733,7 @@
             <a:fld id="{17C2562E-359A-3C42-BBEF-E02CE97BECB1}" type="datetimeFigureOut">
               <a:rPr lang="de-DE" smtClean="0"/>
               <a:pPr/>
-              <a:t>15.10.17</a:t>
+              <a:t>18.10.17</a:t>
             </a:fld>
             <a:endParaRPr lang="de-DE" dirty="0"/>
           </a:p>
@@ -19507,7 +20780,7 @@
             <a:fld id="{38661448-4A48-D446-A2DB-27E795148D92}" type="slidenum">
               <a:rPr lang="de-DE" smtClean="0"/>
               <a:pPr/>
-              <a:t>20</a:t>
+              <a:t>22</a:t>
             </a:fld>
             <a:endParaRPr lang="de-DE" dirty="0"/>
           </a:p>
@@ -19650,9 +20923,8 @@
             </a:pPr>
             <a:r>
               <a:rPr lang="de-DE" dirty="0" smtClean="0"/>
-              <a:t>Service</a:t>
-            </a:r>
-            <a:endParaRPr lang="de-DE" dirty="0"/>
+              <a:t>Formulare in Angular</a:t>
+            </a:r>
           </a:p>
           <a:p>
             <a:pPr>
@@ -19661,8 +20933,16 @@
               </a:lnSpc>
             </a:pPr>
             <a:r>
-              <a:rPr lang="de-DE" dirty="0"/>
-              <a:t>Formulare in Angular</a:t>
+              <a:rPr lang="de-DE" dirty="0" smtClean="0"/>
+              <a:t>Template-</a:t>
+            </a:r>
+            <a:r>
+              <a:rPr lang="de-DE" dirty="0" err="1" smtClean="0"/>
+              <a:t>Driven</a:t>
+            </a:r>
+            <a:r>
+              <a:rPr lang="de-DE" dirty="0" smtClean="0"/>
+              <a:t> Forms</a:t>
             </a:r>
           </a:p>
           <a:p>
@@ -19672,17 +20952,10 @@
               </a:lnSpc>
             </a:pPr>
             <a:r>
-              <a:rPr lang="de-DE" dirty="0"/>
-              <a:t>Template-</a:t>
-            </a:r>
-            <a:r>
-              <a:rPr lang="de-DE" dirty="0" err="1"/>
-              <a:t>Driven</a:t>
-            </a:r>
-            <a:r>
-              <a:rPr lang="de-DE" dirty="0"/>
-              <a:t> Forms</a:t>
-            </a:r>
+              <a:rPr lang="de-DE" dirty="0" smtClean="0"/>
+              <a:t>Service</a:t>
+            </a:r>
+            <a:endParaRPr lang="de-DE" dirty="0"/>
           </a:p>
         </p:txBody>
       </p:sp>
@@ -19704,7 +20977,7 @@
             <a:fld id="{17C2562E-359A-3C42-BBEF-E02CE97BECB1}" type="datetimeFigureOut">
               <a:rPr lang="de-DE" smtClean="0"/>
               <a:pPr/>
-              <a:t>15.10.17</a:t>
+              <a:t>18.10.17</a:t>
             </a:fld>
             <a:endParaRPr lang="de-DE" dirty="0"/>
           </a:p>
@@ -20056,7 +21329,7 @@
             <a:fld id="{17C2562E-359A-3C42-BBEF-E02CE97BECB1}" type="datetimeFigureOut">
               <a:rPr lang="de-DE" smtClean="0"/>
               <a:pPr/>
-              <a:t>15.10.17</a:t>
+              <a:t>18.10.17</a:t>
             </a:fld>
             <a:endParaRPr lang="de-DE" dirty="0"/>
           </a:p>
@@ -20355,7 +21628,7 @@
             <a:fld id="{17C2562E-359A-3C42-BBEF-E02CE97BECB1}" type="datetimeFigureOut">
               <a:rPr lang="de-DE" smtClean="0"/>
               <a:pPr/>
-              <a:t>15.10.17</a:t>
+              <a:t>18.10.17</a:t>
             </a:fld>
             <a:endParaRPr lang="de-DE" dirty="0"/>
           </a:p>
@@ -20614,7 +21887,7 @@
             <a:fld id="{17C2562E-359A-3C42-BBEF-E02CE97BECB1}" type="datetimeFigureOut">
               <a:rPr lang="de-DE" smtClean="0"/>
               <a:pPr/>
-              <a:t>15.10.17</a:t>
+              <a:t>18.10.17</a:t>
             </a:fld>
             <a:endParaRPr lang="de-DE" dirty="0"/>
           </a:p>
@@ -20923,7 +22196,7 @@
             <a:fld id="{17C2562E-359A-3C42-BBEF-E02CE97BECB1}" type="datetimeFigureOut">
               <a:rPr lang="de-DE" smtClean="0"/>
               <a:pPr/>
-              <a:t>15.10.17</a:t>
+              <a:t>18.10.17</a:t>
             </a:fld>
             <a:endParaRPr lang="de-DE" dirty="0"/>
           </a:p>
@@ -21186,7 +22459,7 @@
             <a:fld id="{17C2562E-359A-3C42-BBEF-E02CE97BECB1}" type="datetimeFigureOut">
               <a:rPr lang="de-DE" smtClean="0"/>
               <a:pPr/>
-              <a:t>15.10.17</a:t>
+              <a:t>18.10.17</a:t>
             </a:fld>
             <a:endParaRPr lang="de-DE" dirty="0"/>
           </a:p>
@@ -21378,7 +22651,7 @@
             <a:fld id="{17C2562E-359A-3C42-BBEF-E02CE97BECB1}" type="datetimeFigureOut">
               <a:rPr lang="de-DE" smtClean="0"/>
               <a:pPr/>
-              <a:t>15.10.17</a:t>
+              <a:t>18.10.17</a:t>
             </a:fld>
             <a:endParaRPr lang="de-DE" dirty="0"/>
           </a:p>

</xml_diff>

<commit_message>
Folien mit SCC Infos ergänzt
</commit_message>
<xml_diff>
--- a/docs/Angular-Workshop-20.10.pptx
+++ b/docs/Angular-Workshop-20.10.pptx
@@ -6267,8 +6267,8 @@
   <dgm:cxnLst>
     <dgm:cxn modelId="{B0721CA3-19A8-D04D-857E-407EB9BC671A}" type="presOf" srcId="{9E409708-FC7B-604D-AE00-C59A3BC6C774}" destId="{AC19049A-FF2E-864B-A995-C88CCE14464E}" srcOrd="0" destOrd="0" presId="urn:microsoft.com/office/officeart/2005/8/layout/process1"/>
     <dgm:cxn modelId="{E198D6D4-91AD-F643-8652-6843F8F235B1}" srcId="{82BD223D-4D97-664B-8FA2-F811E68132B9}" destId="{9E409708-FC7B-604D-AE00-C59A3BC6C774}" srcOrd="0" destOrd="0" parTransId="{AF54B174-D1EC-FF4E-9C8F-E68F41ABE717}" sibTransId="{EE7B1B78-2CB7-C647-875E-937A240D7736}"/>
+    <dgm:cxn modelId="{9AD13F03-FA98-2546-A1F6-086D6D749FC5}" srcId="{82BD223D-4D97-664B-8FA2-F811E68132B9}" destId="{9F5FBEB5-0D91-6442-BAE6-3C8FE451890E}" srcOrd="1" destOrd="0" parTransId="{44185C10-A566-584D-8792-6F8CDA31CFEF}" sibTransId="{D96BFFC3-C37B-F740-8CDD-799CDA9C29AF}"/>
     <dgm:cxn modelId="{E033EC1A-0A6B-414C-BA47-A69CB3DDC2D8}" type="presOf" srcId="{EE7B1B78-2CB7-C647-875E-937A240D7736}" destId="{26BA574D-A9C9-D847-8AAF-A8F48018C2C1}" srcOrd="1" destOrd="0" presId="urn:microsoft.com/office/officeart/2005/8/layout/process1"/>
-    <dgm:cxn modelId="{9AD13F03-FA98-2546-A1F6-086D6D749FC5}" srcId="{82BD223D-4D97-664B-8FA2-F811E68132B9}" destId="{9F5FBEB5-0D91-6442-BAE6-3C8FE451890E}" srcOrd="1" destOrd="0" parTransId="{44185C10-A566-584D-8792-6F8CDA31CFEF}" sibTransId="{D96BFFC3-C37B-F740-8CDD-799CDA9C29AF}"/>
     <dgm:cxn modelId="{E6A75DB5-821C-E345-A783-C1FE436C1B5F}" type="presOf" srcId="{EE7B1B78-2CB7-C647-875E-937A240D7736}" destId="{30EAC814-8F64-D74A-9EBA-0CBC6BE058AA}" srcOrd="0" destOrd="0" presId="urn:microsoft.com/office/officeart/2005/8/layout/process1"/>
     <dgm:cxn modelId="{1B0CBD2C-F6A5-BE47-AA25-80FF0DBC223D}" type="presOf" srcId="{82BD223D-4D97-664B-8FA2-F811E68132B9}" destId="{5C4E5A0B-1B12-EC4C-BCB7-F3E190AFE040}" srcOrd="0" destOrd="0" presId="urn:microsoft.com/office/officeart/2005/8/layout/process1"/>
     <dgm:cxn modelId="{32CD821A-B520-014C-9995-1247839A1615}" type="presOf" srcId="{9F5FBEB5-0D91-6442-BAE6-3C8FE451890E}" destId="{942B2FD4-F953-1241-B452-E01505D35646}" srcOrd="0" destOrd="0" presId="urn:microsoft.com/office/officeart/2005/8/layout/process1"/>
@@ -19633,7 +19633,7 @@
           <a:noFill/>
           <a:extLst>
             <a:ext uri="{909E8E84-426E-40dd-AFC4-6F175D3DCCD1}">
-              <a14:hiddenFill xmlns="" xmlns:a14="http://schemas.microsoft.com/office/drawing/2010/main">
+              <a14:hiddenFill xmlns:a14="http://schemas.microsoft.com/office/drawing/2010/main" xmlns="">
                 <a:solidFill>
                   <a:srgbClr val="FFFFFF"/>
                 </a:solidFill>
@@ -19833,7 +19833,7 @@
           <p:cNvPr id="2" name="Datumsplatzhalter 1">
             <a:extLst>
               <a:ext uri="{FF2B5EF4-FFF2-40B4-BE49-F238E27FC236}">
-                <a16:creationId xmlns="" xmlns:a16="http://schemas.microsoft.com/office/drawing/2014/main" id="{0EE9CECA-FE53-4E0D-AD22-D4AB49ECF809}"/>
+                <a16:creationId xmlns:a16="http://schemas.microsoft.com/office/drawing/2014/main" xmlns="" id="{0EE9CECA-FE53-4E0D-AD22-D4AB49ECF809}"/>
               </a:ext>
             </a:extLst>
           </p:cNvPr>
@@ -19863,7 +19863,7 @@
           <p:cNvPr id="7" name="Fußzeilenplatzhalter 6">
             <a:extLst>
               <a:ext uri="{FF2B5EF4-FFF2-40B4-BE49-F238E27FC236}">
-                <a16:creationId xmlns="" xmlns:a16="http://schemas.microsoft.com/office/drawing/2014/main" id="{C07A299E-41A7-4A08-81FA-6FBA6806F0A5}"/>
+                <a16:creationId xmlns:a16="http://schemas.microsoft.com/office/drawing/2014/main" xmlns="" id="{C07A299E-41A7-4A08-81FA-6FBA6806F0A5}"/>
               </a:ext>
             </a:extLst>
           </p:cNvPr>
@@ -19888,7 +19888,7 @@
           <p:cNvPr id="8" name="Foliennummernplatzhalter 7">
             <a:extLst>
               <a:ext uri="{FF2B5EF4-FFF2-40B4-BE49-F238E27FC236}">
-                <a16:creationId xmlns="" xmlns:a16="http://schemas.microsoft.com/office/drawing/2014/main" id="{9151A28C-FF21-4CC9-B28E-CF780807FE34}"/>
+                <a16:creationId xmlns:a16="http://schemas.microsoft.com/office/drawing/2014/main" xmlns="" id="{9151A28C-FF21-4CC9-B28E-CF780807FE34}"/>
               </a:ext>
             </a:extLst>
           </p:cNvPr>
@@ -20143,7 +20143,7 @@
           <p:cNvPr id="3" name="Datumsplatzhalter 2">
             <a:extLst>
               <a:ext uri="{FF2B5EF4-FFF2-40B4-BE49-F238E27FC236}">
-                <a16:creationId xmlns="" xmlns:a16="http://schemas.microsoft.com/office/drawing/2014/main" id="{3D332A91-9158-4543-9295-8484F133E109}"/>
+                <a16:creationId xmlns:a16="http://schemas.microsoft.com/office/drawing/2014/main" xmlns="" id="{3D332A91-9158-4543-9295-8484F133E109}"/>
               </a:ext>
             </a:extLst>
           </p:cNvPr>
@@ -20173,7 +20173,7 @@
           <p:cNvPr id="7" name="Fußzeilenplatzhalter 6">
             <a:extLst>
               <a:ext uri="{FF2B5EF4-FFF2-40B4-BE49-F238E27FC236}">
-                <a16:creationId xmlns="" xmlns:a16="http://schemas.microsoft.com/office/drawing/2014/main" id="{C426E4CE-7F9D-4A7E-A795-EDD7185E3A7A}"/>
+                <a16:creationId xmlns:a16="http://schemas.microsoft.com/office/drawing/2014/main" xmlns="" id="{C426E4CE-7F9D-4A7E-A795-EDD7185E3A7A}"/>
               </a:ext>
             </a:extLst>
           </p:cNvPr>
@@ -20198,7 +20198,7 @@
           <p:cNvPr id="8" name="Foliennummernplatzhalter 7">
             <a:extLst>
               <a:ext uri="{FF2B5EF4-FFF2-40B4-BE49-F238E27FC236}">
-                <a16:creationId xmlns="" xmlns:a16="http://schemas.microsoft.com/office/drawing/2014/main" id="{73459CEF-058C-4C7D-9907-D7A5E4B23A28}"/>
+                <a16:creationId xmlns:a16="http://schemas.microsoft.com/office/drawing/2014/main" xmlns="" id="{73459CEF-058C-4C7D-9907-D7A5E4B23A28}"/>
               </a:ext>
             </a:extLst>
           </p:cNvPr>
@@ -20446,7 +20446,7 @@
           <p:cNvPr id="2" name="Datumsplatzhalter 1">
             <a:extLst>
               <a:ext uri="{FF2B5EF4-FFF2-40B4-BE49-F238E27FC236}">
-                <a16:creationId xmlns="" xmlns:a16="http://schemas.microsoft.com/office/drawing/2014/main" id="{64A9B900-82AE-4D1E-B11E-155C1B825004}"/>
+                <a16:creationId xmlns:a16="http://schemas.microsoft.com/office/drawing/2014/main" xmlns="" id="{64A9B900-82AE-4D1E-B11E-155C1B825004}"/>
               </a:ext>
             </a:extLst>
           </p:cNvPr>
@@ -20476,7 +20476,7 @@
           <p:cNvPr id="7" name="Fußzeilenplatzhalter 6">
             <a:extLst>
               <a:ext uri="{FF2B5EF4-FFF2-40B4-BE49-F238E27FC236}">
-                <a16:creationId xmlns="" xmlns:a16="http://schemas.microsoft.com/office/drawing/2014/main" id="{41953AE8-A571-4BCE-AF9C-CC7A649DD8C5}"/>
+                <a16:creationId xmlns:a16="http://schemas.microsoft.com/office/drawing/2014/main" xmlns="" id="{41953AE8-A571-4BCE-AF9C-CC7A649DD8C5}"/>
               </a:ext>
             </a:extLst>
           </p:cNvPr>
@@ -20501,7 +20501,7 @@
           <p:cNvPr id="8" name="Foliennummernplatzhalter 7">
             <a:extLst>
               <a:ext uri="{FF2B5EF4-FFF2-40B4-BE49-F238E27FC236}">
-                <a16:creationId xmlns="" xmlns:a16="http://schemas.microsoft.com/office/drawing/2014/main" id="{6DCAD949-98D9-4F76-BE67-6629B37422CB}"/>
+                <a16:creationId xmlns:a16="http://schemas.microsoft.com/office/drawing/2014/main" xmlns="" id="{6DCAD949-98D9-4F76-BE67-6629B37422CB}"/>
               </a:ext>
             </a:extLst>
           </p:cNvPr>
@@ -20602,7 +20602,7 @@
           <p:cNvPr id="2" name="Datumsplatzhalter 1">
             <a:extLst>
               <a:ext uri="{FF2B5EF4-FFF2-40B4-BE49-F238E27FC236}">
-                <a16:creationId xmlns="" xmlns:a16="http://schemas.microsoft.com/office/drawing/2014/main" id="{0F48F7B5-AF2D-4886-B660-ACFD0F3CA06C}"/>
+                <a16:creationId xmlns:a16="http://schemas.microsoft.com/office/drawing/2014/main" xmlns="" id="{0F48F7B5-AF2D-4886-B660-ACFD0F3CA06C}"/>
               </a:ext>
             </a:extLst>
           </p:cNvPr>
@@ -20632,7 +20632,7 @@
           <p:cNvPr id="7" name="Fußzeilenplatzhalter 6">
             <a:extLst>
               <a:ext uri="{FF2B5EF4-FFF2-40B4-BE49-F238E27FC236}">
-                <a16:creationId xmlns="" xmlns:a16="http://schemas.microsoft.com/office/drawing/2014/main" id="{C01D3F89-6DF4-4DC1-ABFC-4B69E0299624}"/>
+                <a16:creationId xmlns:a16="http://schemas.microsoft.com/office/drawing/2014/main" xmlns="" id="{C01D3F89-6DF4-4DC1-ABFC-4B69E0299624}"/>
               </a:ext>
             </a:extLst>
           </p:cNvPr>
@@ -20657,7 +20657,7 @@
           <p:cNvPr id="8" name="Foliennummernplatzhalter 7">
             <a:extLst>
               <a:ext uri="{FF2B5EF4-FFF2-40B4-BE49-F238E27FC236}">
-                <a16:creationId xmlns="" xmlns:a16="http://schemas.microsoft.com/office/drawing/2014/main" id="{BFD42FBE-0754-4285-A3CE-566D22A33C59}"/>
+                <a16:creationId xmlns:a16="http://schemas.microsoft.com/office/drawing/2014/main" xmlns="" id="{BFD42FBE-0754-4285-A3CE-566D22A33C59}"/>
               </a:ext>
             </a:extLst>
           </p:cNvPr>
@@ -20898,7 +20898,7 @@
           <p:cNvPr id="3" name="Datumsplatzhalter 2">
             <a:extLst>
               <a:ext uri="{FF2B5EF4-FFF2-40B4-BE49-F238E27FC236}">
-                <a16:creationId xmlns="" xmlns:a16="http://schemas.microsoft.com/office/drawing/2014/main" id="{434AC82E-1F55-4D6D-B12A-7355E3927B04}"/>
+                <a16:creationId xmlns:a16="http://schemas.microsoft.com/office/drawing/2014/main" xmlns="" id="{434AC82E-1F55-4D6D-B12A-7355E3927B04}"/>
               </a:ext>
             </a:extLst>
           </p:cNvPr>
@@ -20928,7 +20928,7 @@
           <p:cNvPr id="7" name="Fußzeilenplatzhalter 6">
             <a:extLst>
               <a:ext uri="{FF2B5EF4-FFF2-40B4-BE49-F238E27FC236}">
-                <a16:creationId xmlns="" xmlns:a16="http://schemas.microsoft.com/office/drawing/2014/main" id="{95F90759-2A54-4A06-B304-DFA3C45AF309}"/>
+                <a16:creationId xmlns:a16="http://schemas.microsoft.com/office/drawing/2014/main" xmlns="" id="{95F90759-2A54-4A06-B304-DFA3C45AF309}"/>
               </a:ext>
             </a:extLst>
           </p:cNvPr>
@@ -20953,7 +20953,7 @@
           <p:cNvPr id="8" name="Foliennummernplatzhalter 7">
             <a:extLst>
               <a:ext uri="{FF2B5EF4-FFF2-40B4-BE49-F238E27FC236}">
-                <a16:creationId xmlns="" xmlns:a16="http://schemas.microsoft.com/office/drawing/2014/main" id="{AAA489C6-E63E-4078-89A4-7CC1709D7206}"/>
+                <a16:creationId xmlns:a16="http://schemas.microsoft.com/office/drawing/2014/main" xmlns="" id="{AAA489C6-E63E-4078-89A4-7CC1709D7206}"/>
               </a:ext>
             </a:extLst>
           </p:cNvPr>
@@ -21235,7 +21235,7 @@
           <p:cNvPr id="3" name="Datumsplatzhalter 2">
             <a:extLst>
               <a:ext uri="{FF2B5EF4-FFF2-40B4-BE49-F238E27FC236}">
-                <a16:creationId xmlns="" xmlns:a16="http://schemas.microsoft.com/office/drawing/2014/main" id="{24A5A6B0-652D-48FC-AF73-17BD8D217D8E}"/>
+                <a16:creationId xmlns:a16="http://schemas.microsoft.com/office/drawing/2014/main" xmlns="" id="{24A5A6B0-652D-48FC-AF73-17BD8D217D8E}"/>
               </a:ext>
             </a:extLst>
           </p:cNvPr>
@@ -21265,7 +21265,7 @@
           <p:cNvPr id="7" name="Fußzeilenplatzhalter 6">
             <a:extLst>
               <a:ext uri="{FF2B5EF4-FFF2-40B4-BE49-F238E27FC236}">
-                <a16:creationId xmlns="" xmlns:a16="http://schemas.microsoft.com/office/drawing/2014/main" id="{239BA7E1-F103-432E-BC27-0127D2228DA4}"/>
+                <a16:creationId xmlns:a16="http://schemas.microsoft.com/office/drawing/2014/main" xmlns="" id="{239BA7E1-F103-432E-BC27-0127D2228DA4}"/>
               </a:ext>
             </a:extLst>
           </p:cNvPr>
@@ -21290,7 +21290,7 @@
           <p:cNvPr id="9" name="Foliennummernplatzhalter 8">
             <a:extLst>
               <a:ext uri="{FF2B5EF4-FFF2-40B4-BE49-F238E27FC236}">
-                <a16:creationId xmlns="" xmlns:a16="http://schemas.microsoft.com/office/drawing/2014/main" id="{E398A7F9-A765-46A7-B1D7-8FF6247ED6E8}"/>
+                <a16:creationId xmlns:a16="http://schemas.microsoft.com/office/drawing/2014/main" xmlns="" id="{E398A7F9-A765-46A7-B1D7-8FF6247ED6E8}"/>
               </a:ext>
             </a:extLst>
           </p:cNvPr>
@@ -21711,7 +21711,7 @@
           <p:cNvPr id="3" name="Datumsplatzhalter 2">
             <a:extLst>
               <a:ext uri="{FF2B5EF4-FFF2-40B4-BE49-F238E27FC236}">
-                <a16:creationId xmlns="" xmlns:a16="http://schemas.microsoft.com/office/drawing/2014/main" id="{E251BDE8-F6CD-4379-B02C-D58055E91CB7}"/>
+                <a16:creationId xmlns:a16="http://schemas.microsoft.com/office/drawing/2014/main" xmlns="" id="{E251BDE8-F6CD-4379-B02C-D58055E91CB7}"/>
               </a:ext>
             </a:extLst>
           </p:cNvPr>
@@ -21741,7 +21741,7 @@
           <p:cNvPr id="7" name="Fußzeilenplatzhalter 6">
             <a:extLst>
               <a:ext uri="{FF2B5EF4-FFF2-40B4-BE49-F238E27FC236}">
-                <a16:creationId xmlns="" xmlns:a16="http://schemas.microsoft.com/office/drawing/2014/main" id="{F684EDD4-7234-4CF4-A5B8-FCC6419FE199}"/>
+                <a16:creationId xmlns:a16="http://schemas.microsoft.com/office/drawing/2014/main" xmlns="" id="{F684EDD4-7234-4CF4-A5B8-FCC6419FE199}"/>
               </a:ext>
             </a:extLst>
           </p:cNvPr>
@@ -21766,7 +21766,7 @@
           <p:cNvPr id="8" name="Foliennummernplatzhalter 7">
             <a:extLst>
               <a:ext uri="{FF2B5EF4-FFF2-40B4-BE49-F238E27FC236}">
-                <a16:creationId xmlns="" xmlns:a16="http://schemas.microsoft.com/office/drawing/2014/main" id="{81EB7AF2-AEA0-439E-B5DA-DF760778341F}"/>
+                <a16:creationId xmlns:a16="http://schemas.microsoft.com/office/drawing/2014/main" xmlns="" id="{81EB7AF2-AEA0-439E-B5DA-DF760778341F}"/>
               </a:ext>
             </a:extLst>
           </p:cNvPr>
@@ -22094,7 +22094,7 @@
           <p:cNvPr id="3" name="Datumsplatzhalter 2">
             <a:extLst>
               <a:ext uri="{FF2B5EF4-FFF2-40B4-BE49-F238E27FC236}">
-                <a16:creationId xmlns="" xmlns:a16="http://schemas.microsoft.com/office/drawing/2014/main" id="{C2E5ECD2-BEB5-47D1-A89E-69496048A8D5}"/>
+                <a16:creationId xmlns:a16="http://schemas.microsoft.com/office/drawing/2014/main" xmlns="" id="{C2E5ECD2-BEB5-47D1-A89E-69496048A8D5}"/>
               </a:ext>
             </a:extLst>
           </p:cNvPr>
@@ -22124,7 +22124,7 @@
           <p:cNvPr id="7" name="Fußzeilenplatzhalter 6">
             <a:extLst>
               <a:ext uri="{FF2B5EF4-FFF2-40B4-BE49-F238E27FC236}">
-                <a16:creationId xmlns="" xmlns:a16="http://schemas.microsoft.com/office/drawing/2014/main" id="{8DADA64D-3A7A-4438-9197-BD2830657223}"/>
+                <a16:creationId xmlns:a16="http://schemas.microsoft.com/office/drawing/2014/main" xmlns="" id="{8DADA64D-3A7A-4438-9197-BD2830657223}"/>
               </a:ext>
             </a:extLst>
           </p:cNvPr>
@@ -22149,7 +22149,7 @@
           <p:cNvPr id="9" name="Foliennummernplatzhalter 8">
             <a:extLst>
               <a:ext uri="{FF2B5EF4-FFF2-40B4-BE49-F238E27FC236}">
-                <a16:creationId xmlns="" xmlns:a16="http://schemas.microsoft.com/office/drawing/2014/main" id="{3D8A091A-178E-435F-9EA9-84BA66D378CC}"/>
+                <a16:creationId xmlns:a16="http://schemas.microsoft.com/office/drawing/2014/main" xmlns="" id="{3D8A091A-178E-435F-9EA9-84BA66D378CC}"/>
               </a:ext>
             </a:extLst>
           </p:cNvPr>
@@ -22780,7 +22780,7 @@
           <p:cNvPr id="6" name="Datumsplatzhalter 5">
             <a:extLst>
               <a:ext uri="{FF2B5EF4-FFF2-40B4-BE49-F238E27FC236}">
-                <a16:creationId xmlns="" xmlns:a16="http://schemas.microsoft.com/office/drawing/2014/main" id="{E75B6010-F5BB-4F22-8221-D75D21F6EB55}"/>
+                <a16:creationId xmlns:a16="http://schemas.microsoft.com/office/drawing/2014/main" xmlns="" id="{E75B6010-F5BB-4F22-8221-D75D21F6EB55}"/>
               </a:ext>
             </a:extLst>
           </p:cNvPr>
@@ -22810,7 +22810,7 @@
           <p:cNvPr id="7" name="Fußzeilenplatzhalter 6">
             <a:extLst>
               <a:ext uri="{FF2B5EF4-FFF2-40B4-BE49-F238E27FC236}">
-                <a16:creationId xmlns="" xmlns:a16="http://schemas.microsoft.com/office/drawing/2014/main" id="{26547C97-5C9B-4C14-8D49-A5E83DFFB45A}"/>
+                <a16:creationId xmlns:a16="http://schemas.microsoft.com/office/drawing/2014/main" xmlns="" id="{26547C97-5C9B-4C14-8D49-A5E83DFFB45A}"/>
               </a:ext>
             </a:extLst>
           </p:cNvPr>
@@ -22835,7 +22835,7 @@
           <p:cNvPr id="11" name="Foliennummernplatzhalter 10">
             <a:extLst>
               <a:ext uri="{FF2B5EF4-FFF2-40B4-BE49-F238E27FC236}">
-                <a16:creationId xmlns="" xmlns:a16="http://schemas.microsoft.com/office/drawing/2014/main" id="{98B57AAA-67F4-4EFE-A062-411C04E4F8A2}"/>
+                <a16:creationId xmlns:a16="http://schemas.microsoft.com/office/drawing/2014/main" xmlns="" id="{98B57AAA-67F4-4EFE-A062-411C04E4F8A2}"/>
               </a:ext>
             </a:extLst>
           </p:cNvPr>
@@ -23374,7 +23374,7 @@
           <p:cNvPr id="5" name="Datumsplatzhalter 4">
             <a:extLst>
               <a:ext uri="{FF2B5EF4-FFF2-40B4-BE49-F238E27FC236}">
-                <a16:creationId xmlns="" xmlns:a16="http://schemas.microsoft.com/office/drawing/2014/main" id="{0C7C8404-609B-40A1-85F0-0C1D3C5C6357}"/>
+                <a16:creationId xmlns:a16="http://schemas.microsoft.com/office/drawing/2014/main" xmlns="" id="{0C7C8404-609B-40A1-85F0-0C1D3C5C6357}"/>
               </a:ext>
             </a:extLst>
           </p:cNvPr>
@@ -23404,7 +23404,7 @@
           <p:cNvPr id="8" name="Fußzeilenplatzhalter 7">
             <a:extLst>
               <a:ext uri="{FF2B5EF4-FFF2-40B4-BE49-F238E27FC236}">
-                <a16:creationId xmlns="" xmlns:a16="http://schemas.microsoft.com/office/drawing/2014/main" id="{3C29D00E-B305-494B-A605-238A832848F3}"/>
+                <a16:creationId xmlns:a16="http://schemas.microsoft.com/office/drawing/2014/main" xmlns="" id="{3C29D00E-B305-494B-A605-238A832848F3}"/>
               </a:ext>
             </a:extLst>
           </p:cNvPr>
@@ -23429,7 +23429,7 @@
           <p:cNvPr id="9" name="Foliennummernplatzhalter 8">
             <a:extLst>
               <a:ext uri="{FF2B5EF4-FFF2-40B4-BE49-F238E27FC236}">
-                <a16:creationId xmlns="" xmlns:a16="http://schemas.microsoft.com/office/drawing/2014/main" id="{7FC7C27A-51A6-4577-BAAE-22B90EFD1D16}"/>
+                <a16:creationId xmlns:a16="http://schemas.microsoft.com/office/drawing/2014/main" xmlns="" id="{7FC7C27A-51A6-4577-BAAE-22B90EFD1D16}"/>
               </a:ext>
             </a:extLst>
           </p:cNvPr>
@@ -24198,7 +24198,7 @@
           <p:cNvPr id="5" name="Datumsplatzhalter 4">
             <a:extLst>
               <a:ext uri="{FF2B5EF4-FFF2-40B4-BE49-F238E27FC236}">
-                <a16:creationId xmlns="" xmlns:a16="http://schemas.microsoft.com/office/drawing/2014/main" id="{33D616DE-E3B4-4D35-BB61-A1FFAD7A5AAF}"/>
+                <a16:creationId xmlns:a16="http://schemas.microsoft.com/office/drawing/2014/main" xmlns="" id="{33D616DE-E3B4-4D35-BB61-A1FFAD7A5AAF}"/>
               </a:ext>
             </a:extLst>
           </p:cNvPr>
@@ -24228,7 +24228,7 @@
           <p:cNvPr id="7" name="Fußzeilenplatzhalter 6">
             <a:extLst>
               <a:ext uri="{FF2B5EF4-FFF2-40B4-BE49-F238E27FC236}">
-                <a16:creationId xmlns="" xmlns:a16="http://schemas.microsoft.com/office/drawing/2014/main" id="{009571DE-76C3-4B92-A98C-31AD1C84E96F}"/>
+                <a16:creationId xmlns:a16="http://schemas.microsoft.com/office/drawing/2014/main" xmlns="" id="{009571DE-76C3-4B92-A98C-31AD1C84E96F}"/>
               </a:ext>
             </a:extLst>
           </p:cNvPr>
@@ -24253,7 +24253,7 @@
           <p:cNvPr id="10" name="Foliennummernplatzhalter 9">
             <a:extLst>
               <a:ext uri="{FF2B5EF4-FFF2-40B4-BE49-F238E27FC236}">
-                <a16:creationId xmlns="" xmlns:a16="http://schemas.microsoft.com/office/drawing/2014/main" id="{A873DEEA-A3E3-4201-A6F9-C92D0EB9E730}"/>
+                <a16:creationId xmlns:a16="http://schemas.microsoft.com/office/drawing/2014/main" xmlns="" id="{A873DEEA-A3E3-4201-A6F9-C92D0EB9E730}"/>
               </a:ext>
             </a:extLst>
           </p:cNvPr>
@@ -24678,7 +24678,7 @@
           <p:cNvPr id="6" name="Datumsplatzhalter 5">
             <a:extLst>
               <a:ext uri="{FF2B5EF4-FFF2-40B4-BE49-F238E27FC236}">
-                <a16:creationId xmlns="" xmlns:a16="http://schemas.microsoft.com/office/drawing/2014/main" id="{BE1F9E44-CCA9-4032-B773-94D7E2DF8ED5}"/>
+                <a16:creationId xmlns:a16="http://schemas.microsoft.com/office/drawing/2014/main" xmlns="" id="{BE1F9E44-CCA9-4032-B773-94D7E2DF8ED5}"/>
               </a:ext>
             </a:extLst>
           </p:cNvPr>
@@ -24708,7 +24708,7 @@
           <p:cNvPr id="7" name="Fußzeilenplatzhalter 6">
             <a:extLst>
               <a:ext uri="{FF2B5EF4-FFF2-40B4-BE49-F238E27FC236}">
-                <a16:creationId xmlns="" xmlns:a16="http://schemas.microsoft.com/office/drawing/2014/main" id="{4D3B4066-4E5D-4AAB-A33C-01B8A1CAA20D}"/>
+                <a16:creationId xmlns:a16="http://schemas.microsoft.com/office/drawing/2014/main" xmlns="" id="{4D3B4066-4E5D-4AAB-A33C-01B8A1CAA20D}"/>
               </a:ext>
             </a:extLst>
           </p:cNvPr>
@@ -24733,7 +24733,7 @@
           <p:cNvPr id="8" name="Foliennummernplatzhalter 7">
             <a:extLst>
               <a:ext uri="{FF2B5EF4-FFF2-40B4-BE49-F238E27FC236}">
-                <a16:creationId xmlns="" xmlns:a16="http://schemas.microsoft.com/office/drawing/2014/main" id="{52AE4811-CB7B-4E63-92A7-E2967B6AEBEE}"/>
+                <a16:creationId xmlns:a16="http://schemas.microsoft.com/office/drawing/2014/main" xmlns="" id="{52AE4811-CB7B-4E63-92A7-E2967B6AEBEE}"/>
               </a:ext>
             </a:extLst>
           </p:cNvPr>
@@ -25520,7 +25520,7 @@
           <p:cNvPr id="5" name="Datumsplatzhalter 4">
             <a:extLst>
               <a:ext uri="{FF2B5EF4-FFF2-40B4-BE49-F238E27FC236}">
-                <a16:creationId xmlns="" xmlns:a16="http://schemas.microsoft.com/office/drawing/2014/main" id="{7AEDF8C5-F6FB-4119-B6A3-908B246DAB0B}"/>
+                <a16:creationId xmlns:a16="http://schemas.microsoft.com/office/drawing/2014/main" xmlns="" id="{7AEDF8C5-F6FB-4119-B6A3-908B246DAB0B}"/>
               </a:ext>
             </a:extLst>
           </p:cNvPr>
@@ -25550,7 +25550,7 @@
           <p:cNvPr id="7" name="Fußzeilenplatzhalter 6">
             <a:extLst>
               <a:ext uri="{FF2B5EF4-FFF2-40B4-BE49-F238E27FC236}">
-                <a16:creationId xmlns="" xmlns:a16="http://schemas.microsoft.com/office/drawing/2014/main" id="{4CCDEB9D-85DD-4CF0-96C7-BA711D11F2BE}"/>
+                <a16:creationId xmlns:a16="http://schemas.microsoft.com/office/drawing/2014/main" xmlns="" id="{4CCDEB9D-85DD-4CF0-96C7-BA711D11F2BE}"/>
               </a:ext>
             </a:extLst>
           </p:cNvPr>
@@ -25575,7 +25575,7 @@
           <p:cNvPr id="9" name="Foliennummernplatzhalter 8">
             <a:extLst>
               <a:ext uri="{FF2B5EF4-FFF2-40B4-BE49-F238E27FC236}">
-                <a16:creationId xmlns="" xmlns:a16="http://schemas.microsoft.com/office/drawing/2014/main" id="{418E80D9-3450-43BD-94A9-22C9BF91B1C0}"/>
+                <a16:creationId xmlns:a16="http://schemas.microsoft.com/office/drawing/2014/main" xmlns="" id="{418E80D9-3450-43BD-94A9-22C9BF91B1C0}"/>
               </a:ext>
             </a:extLst>
           </p:cNvPr>
@@ -26321,7 +26321,7 @@
           <p:cNvPr id="3" name="Datumsplatzhalter 2">
             <a:extLst>
               <a:ext uri="{FF2B5EF4-FFF2-40B4-BE49-F238E27FC236}">
-                <a16:creationId xmlns="" xmlns:a16="http://schemas.microsoft.com/office/drawing/2014/main" id="{25D8C277-6F42-4B11-AB90-EBE3A1238A85}"/>
+                <a16:creationId xmlns:a16="http://schemas.microsoft.com/office/drawing/2014/main" xmlns="" id="{25D8C277-6F42-4B11-AB90-EBE3A1238A85}"/>
               </a:ext>
             </a:extLst>
           </p:cNvPr>
@@ -26351,7 +26351,7 @@
           <p:cNvPr id="4" name="Fußzeilenplatzhalter 3">
             <a:extLst>
               <a:ext uri="{FF2B5EF4-FFF2-40B4-BE49-F238E27FC236}">
-                <a16:creationId xmlns="" xmlns:a16="http://schemas.microsoft.com/office/drawing/2014/main" id="{4815A052-9443-41A9-9F46-0AA437EEDDA5}"/>
+                <a16:creationId xmlns:a16="http://schemas.microsoft.com/office/drawing/2014/main" xmlns="" id="{4815A052-9443-41A9-9F46-0AA437EEDDA5}"/>
               </a:ext>
             </a:extLst>
           </p:cNvPr>
@@ -26376,7 +26376,7 @@
           <p:cNvPr id="5" name="Foliennummernplatzhalter 4">
             <a:extLst>
               <a:ext uri="{FF2B5EF4-FFF2-40B4-BE49-F238E27FC236}">
-                <a16:creationId xmlns="" xmlns:a16="http://schemas.microsoft.com/office/drawing/2014/main" id="{5F7C50D9-9DEA-4EFD-ACE3-677BBD4DEB55}"/>
+                <a16:creationId xmlns:a16="http://schemas.microsoft.com/office/drawing/2014/main" xmlns="" id="{5F7C50D9-9DEA-4EFD-ACE3-677BBD4DEB55}"/>
               </a:ext>
             </a:extLst>
           </p:cNvPr>
@@ -26842,7 +26842,7 @@
           <p:cNvPr id="5" name="Datumsplatzhalter 4">
             <a:extLst>
               <a:ext uri="{FF2B5EF4-FFF2-40B4-BE49-F238E27FC236}">
-                <a16:creationId xmlns="" xmlns:a16="http://schemas.microsoft.com/office/drawing/2014/main" id="{6B4135B1-E114-41F0-9C64-3A26186B834F}"/>
+                <a16:creationId xmlns:a16="http://schemas.microsoft.com/office/drawing/2014/main" xmlns="" id="{6B4135B1-E114-41F0-9C64-3A26186B834F}"/>
               </a:ext>
             </a:extLst>
           </p:cNvPr>
@@ -26872,7 +26872,7 @@
           <p:cNvPr id="7" name="Fußzeilenplatzhalter 6">
             <a:extLst>
               <a:ext uri="{FF2B5EF4-FFF2-40B4-BE49-F238E27FC236}">
-                <a16:creationId xmlns="" xmlns:a16="http://schemas.microsoft.com/office/drawing/2014/main" id="{84D81854-B37F-4ADF-A34F-BF0CCA2926F2}"/>
+                <a16:creationId xmlns:a16="http://schemas.microsoft.com/office/drawing/2014/main" xmlns="" id="{84D81854-B37F-4ADF-A34F-BF0CCA2926F2}"/>
               </a:ext>
             </a:extLst>
           </p:cNvPr>
@@ -26897,7 +26897,7 @@
           <p:cNvPr id="9" name="Foliennummernplatzhalter 8">
             <a:extLst>
               <a:ext uri="{FF2B5EF4-FFF2-40B4-BE49-F238E27FC236}">
-                <a16:creationId xmlns="" xmlns:a16="http://schemas.microsoft.com/office/drawing/2014/main" id="{2EE17D9C-06FE-45C8-B312-4C5617C49000}"/>
+                <a16:creationId xmlns:a16="http://schemas.microsoft.com/office/drawing/2014/main" xmlns="" id="{2EE17D9C-06FE-45C8-B312-4C5617C49000}"/>
               </a:ext>
             </a:extLst>
           </p:cNvPr>
@@ -27322,7 +27322,7 @@
           <p:cNvPr id="10" name="Datumsplatzhalter 9">
             <a:extLst>
               <a:ext uri="{FF2B5EF4-FFF2-40B4-BE49-F238E27FC236}">
-                <a16:creationId xmlns="" xmlns:a16="http://schemas.microsoft.com/office/drawing/2014/main" id="{F92E0490-C295-4C99-B9D1-6310B9164EDD}"/>
+                <a16:creationId xmlns:a16="http://schemas.microsoft.com/office/drawing/2014/main" xmlns="" id="{F92E0490-C295-4C99-B9D1-6310B9164EDD}"/>
               </a:ext>
             </a:extLst>
           </p:cNvPr>
@@ -27352,7 +27352,7 @@
           <p:cNvPr id="11" name="Fußzeilenplatzhalter 10">
             <a:extLst>
               <a:ext uri="{FF2B5EF4-FFF2-40B4-BE49-F238E27FC236}">
-                <a16:creationId xmlns="" xmlns:a16="http://schemas.microsoft.com/office/drawing/2014/main" id="{DD98C48F-3C69-4703-B4CC-632DDDDB497C}"/>
+                <a16:creationId xmlns:a16="http://schemas.microsoft.com/office/drawing/2014/main" xmlns="" id="{DD98C48F-3C69-4703-B4CC-632DDDDB497C}"/>
               </a:ext>
             </a:extLst>
           </p:cNvPr>
@@ -27377,7 +27377,7 @@
           <p:cNvPr id="15" name="Foliennummernplatzhalter 14">
             <a:extLst>
               <a:ext uri="{FF2B5EF4-FFF2-40B4-BE49-F238E27FC236}">
-                <a16:creationId xmlns="" xmlns:a16="http://schemas.microsoft.com/office/drawing/2014/main" id="{1968527D-44A1-407F-99A6-2ACAB46FBD28}"/>
+                <a16:creationId xmlns:a16="http://schemas.microsoft.com/office/drawing/2014/main" xmlns="" id="{1968527D-44A1-407F-99A6-2ACAB46FBD28}"/>
               </a:ext>
             </a:extLst>
           </p:cNvPr>
@@ -28164,7 +28164,7 @@
           <p:cNvPr id="5" name="Datumsplatzhalter 4">
             <a:extLst>
               <a:ext uri="{FF2B5EF4-FFF2-40B4-BE49-F238E27FC236}">
-                <a16:creationId xmlns="" xmlns:a16="http://schemas.microsoft.com/office/drawing/2014/main" id="{8AFAB162-0FDB-4A37-A4FD-CBFC89474486}"/>
+                <a16:creationId xmlns:a16="http://schemas.microsoft.com/office/drawing/2014/main" xmlns="" id="{8AFAB162-0FDB-4A37-A4FD-CBFC89474486}"/>
               </a:ext>
             </a:extLst>
           </p:cNvPr>
@@ -28194,7 +28194,7 @@
           <p:cNvPr id="7" name="Fußzeilenplatzhalter 6">
             <a:extLst>
               <a:ext uri="{FF2B5EF4-FFF2-40B4-BE49-F238E27FC236}">
-                <a16:creationId xmlns="" xmlns:a16="http://schemas.microsoft.com/office/drawing/2014/main" id="{46B12C25-0691-43C5-8596-6B8AD0039874}"/>
+                <a16:creationId xmlns:a16="http://schemas.microsoft.com/office/drawing/2014/main" xmlns="" id="{46B12C25-0691-43C5-8596-6B8AD0039874}"/>
               </a:ext>
             </a:extLst>
           </p:cNvPr>
@@ -28219,7 +28219,7 @@
           <p:cNvPr id="9" name="Foliennummernplatzhalter 8">
             <a:extLst>
               <a:ext uri="{FF2B5EF4-FFF2-40B4-BE49-F238E27FC236}">
-                <a16:creationId xmlns="" xmlns:a16="http://schemas.microsoft.com/office/drawing/2014/main" id="{7C5C2594-4A54-4AE0-88EE-FB17FDD4570C}"/>
+                <a16:creationId xmlns:a16="http://schemas.microsoft.com/office/drawing/2014/main" xmlns="" id="{7C5C2594-4A54-4AE0-88EE-FB17FDD4570C}"/>
               </a:ext>
             </a:extLst>
           </p:cNvPr>
@@ -28965,7 +28965,7 @@
           <p:cNvPr id="5" name="Datumsplatzhalter 4">
             <a:extLst>
               <a:ext uri="{FF2B5EF4-FFF2-40B4-BE49-F238E27FC236}">
-                <a16:creationId xmlns="" xmlns:a16="http://schemas.microsoft.com/office/drawing/2014/main" id="{D1D6952B-45CB-46FF-9F9B-1F98CC255417}"/>
+                <a16:creationId xmlns:a16="http://schemas.microsoft.com/office/drawing/2014/main" xmlns="" id="{D1D6952B-45CB-46FF-9F9B-1F98CC255417}"/>
               </a:ext>
             </a:extLst>
           </p:cNvPr>
@@ -28995,7 +28995,7 @@
           <p:cNvPr id="7" name="Fußzeilenplatzhalter 6">
             <a:extLst>
               <a:ext uri="{FF2B5EF4-FFF2-40B4-BE49-F238E27FC236}">
-                <a16:creationId xmlns="" xmlns:a16="http://schemas.microsoft.com/office/drawing/2014/main" id="{3C08D0C6-0E40-46E2-9D6C-74181D953DFE}"/>
+                <a16:creationId xmlns:a16="http://schemas.microsoft.com/office/drawing/2014/main" xmlns="" id="{3C08D0C6-0E40-46E2-9D6C-74181D953DFE}"/>
               </a:ext>
             </a:extLst>
           </p:cNvPr>
@@ -29020,7 +29020,7 @@
           <p:cNvPr id="8" name="Foliennummernplatzhalter 7">
             <a:extLst>
               <a:ext uri="{FF2B5EF4-FFF2-40B4-BE49-F238E27FC236}">
-                <a16:creationId xmlns="" xmlns:a16="http://schemas.microsoft.com/office/drawing/2014/main" id="{EA500A2A-E0AD-4AD6-AB58-61BF900F0E2C}"/>
+                <a16:creationId xmlns:a16="http://schemas.microsoft.com/office/drawing/2014/main" xmlns="" id="{EA500A2A-E0AD-4AD6-AB58-61BF900F0E2C}"/>
               </a:ext>
             </a:extLst>
           </p:cNvPr>
@@ -29124,7 +29124,7 @@
           <p:cNvPr id="5" name="Datumsplatzhalter 4">
             <a:extLst>
               <a:ext uri="{FF2B5EF4-FFF2-40B4-BE49-F238E27FC236}">
-                <a16:creationId xmlns="" xmlns:a16="http://schemas.microsoft.com/office/drawing/2014/main" id="{A181F7F8-D379-4070-8216-3B81228BAEC6}"/>
+                <a16:creationId xmlns:a16="http://schemas.microsoft.com/office/drawing/2014/main" xmlns="" id="{A181F7F8-D379-4070-8216-3B81228BAEC6}"/>
               </a:ext>
             </a:extLst>
           </p:cNvPr>
@@ -29154,7 +29154,7 @@
           <p:cNvPr id="7" name="Fußzeilenplatzhalter 6">
             <a:extLst>
               <a:ext uri="{FF2B5EF4-FFF2-40B4-BE49-F238E27FC236}">
-                <a16:creationId xmlns="" xmlns:a16="http://schemas.microsoft.com/office/drawing/2014/main" id="{D8E0E4FD-5CC1-4D23-A3E8-7DAB1134A4FA}"/>
+                <a16:creationId xmlns:a16="http://schemas.microsoft.com/office/drawing/2014/main" xmlns="" id="{D8E0E4FD-5CC1-4D23-A3E8-7DAB1134A4FA}"/>
               </a:ext>
             </a:extLst>
           </p:cNvPr>
@@ -29179,7 +29179,7 @@
           <p:cNvPr id="8" name="Foliennummernplatzhalter 7">
             <a:extLst>
               <a:ext uri="{FF2B5EF4-FFF2-40B4-BE49-F238E27FC236}">
-                <a16:creationId xmlns="" xmlns:a16="http://schemas.microsoft.com/office/drawing/2014/main" id="{6D72C792-B02A-4A44-BF65-9B261DE5D43D}"/>
+                <a16:creationId xmlns:a16="http://schemas.microsoft.com/office/drawing/2014/main" xmlns="" id="{6D72C792-B02A-4A44-BF65-9B261DE5D43D}"/>
               </a:ext>
             </a:extLst>
           </p:cNvPr>
@@ -29576,7 +29576,7 @@
           <p:cNvPr id="2" name="Datumsplatzhalter 1">
             <a:extLst>
               <a:ext uri="{FF2B5EF4-FFF2-40B4-BE49-F238E27FC236}">
-                <a16:creationId xmlns="" xmlns:a16="http://schemas.microsoft.com/office/drawing/2014/main" id="{B1E6CA30-BA19-47F1-BFEE-B5E43CCEC731}"/>
+                <a16:creationId xmlns:a16="http://schemas.microsoft.com/office/drawing/2014/main" xmlns="" id="{B1E6CA30-BA19-47F1-BFEE-B5E43CCEC731}"/>
               </a:ext>
             </a:extLst>
           </p:cNvPr>
@@ -29606,7 +29606,7 @@
           <p:cNvPr id="14" name="Fußzeilenplatzhalter 13">
             <a:extLst>
               <a:ext uri="{FF2B5EF4-FFF2-40B4-BE49-F238E27FC236}">
-                <a16:creationId xmlns="" xmlns:a16="http://schemas.microsoft.com/office/drawing/2014/main" id="{06236A5B-AF48-4E5C-BD02-27BC73328D88}"/>
+                <a16:creationId xmlns:a16="http://schemas.microsoft.com/office/drawing/2014/main" xmlns="" id="{06236A5B-AF48-4E5C-BD02-27BC73328D88}"/>
               </a:ext>
             </a:extLst>
           </p:cNvPr>
@@ -29631,7 +29631,7 @@
           <p:cNvPr id="15" name="Foliennummernplatzhalter 14">
             <a:extLst>
               <a:ext uri="{FF2B5EF4-FFF2-40B4-BE49-F238E27FC236}">
-                <a16:creationId xmlns="" xmlns:a16="http://schemas.microsoft.com/office/drawing/2014/main" id="{6C539E6F-C163-4DFD-A93D-F463843C6D4E}"/>
+                <a16:creationId xmlns:a16="http://schemas.microsoft.com/office/drawing/2014/main" xmlns="" id="{6C539E6F-C163-4DFD-A93D-F463843C6D4E}"/>
               </a:ext>
             </a:extLst>
           </p:cNvPr>
@@ -29947,7 +29947,7 @@
           <p:cNvPr id="7" name="Datumsplatzhalter 6">
             <a:extLst>
               <a:ext uri="{FF2B5EF4-FFF2-40B4-BE49-F238E27FC236}">
-                <a16:creationId xmlns="" xmlns:a16="http://schemas.microsoft.com/office/drawing/2014/main" id="{E9F2D5EB-EB07-4AC4-94D4-FA6BD7E87398}"/>
+                <a16:creationId xmlns:a16="http://schemas.microsoft.com/office/drawing/2014/main" xmlns="" id="{E9F2D5EB-EB07-4AC4-94D4-FA6BD7E87398}"/>
               </a:ext>
             </a:extLst>
           </p:cNvPr>
@@ -29977,7 +29977,7 @@
           <p:cNvPr id="8" name="Fußzeilenplatzhalter 7">
             <a:extLst>
               <a:ext uri="{FF2B5EF4-FFF2-40B4-BE49-F238E27FC236}">
-                <a16:creationId xmlns="" xmlns:a16="http://schemas.microsoft.com/office/drawing/2014/main" id="{947F1BF2-5B5A-4E3F-9A69-A7FC06CEE6DA}"/>
+                <a16:creationId xmlns:a16="http://schemas.microsoft.com/office/drawing/2014/main" xmlns="" id="{947F1BF2-5B5A-4E3F-9A69-A7FC06CEE6DA}"/>
               </a:ext>
             </a:extLst>
           </p:cNvPr>
@@ -30002,7 +30002,7 @@
           <p:cNvPr id="9" name="Foliennummernplatzhalter 8">
             <a:extLst>
               <a:ext uri="{FF2B5EF4-FFF2-40B4-BE49-F238E27FC236}">
-                <a16:creationId xmlns="" xmlns:a16="http://schemas.microsoft.com/office/drawing/2014/main" id="{B0D6E36A-E68C-4CFF-A1B3-ADE80884E18E}"/>
+                <a16:creationId xmlns:a16="http://schemas.microsoft.com/office/drawing/2014/main" xmlns="" id="{B0D6E36A-E68C-4CFF-A1B3-ADE80884E18E}"/>
               </a:ext>
             </a:extLst>
           </p:cNvPr>
@@ -30093,7 +30093,7 @@
           <a:noFill/>
           <a:extLst>
             <a:ext uri="{909E8E84-426E-40dd-AFC4-6F175D3DCCD1}">
-              <a14:hiddenFill xmlns="" xmlns:a14="http://schemas.microsoft.com/office/drawing/2010/main">
+              <a14:hiddenFill xmlns:a14="http://schemas.microsoft.com/office/drawing/2010/main" xmlns="">
                 <a:solidFill>
                   <a:srgbClr val="FFFFFF"/>
                 </a:solidFill>
@@ -30173,7 +30173,7 @@
           <a:noFill/>
           <a:extLst>
             <a:ext uri="{909E8E84-426E-40dd-AFC4-6F175D3DCCD1}">
-              <a14:hiddenFill xmlns="" xmlns:a14="http://schemas.microsoft.com/office/drawing/2010/main">
+              <a14:hiddenFill xmlns:a14="http://schemas.microsoft.com/office/drawing/2010/main" xmlns="">
                 <a:solidFill>
                   <a:srgbClr val="FFFFFF"/>
                 </a:solidFill>
@@ -30476,7 +30476,7 @@
           <p:cNvPr id="5" name="Datumsplatzhalter 4">
             <a:extLst>
               <a:ext uri="{FF2B5EF4-FFF2-40B4-BE49-F238E27FC236}">
-                <a16:creationId xmlns="" xmlns:a16="http://schemas.microsoft.com/office/drawing/2014/main" id="{368DD9D8-7FE8-48F0-AE91-AE98EA3DCA20}"/>
+                <a16:creationId xmlns:a16="http://schemas.microsoft.com/office/drawing/2014/main" xmlns="" id="{368DD9D8-7FE8-48F0-AE91-AE98EA3DCA20}"/>
               </a:ext>
             </a:extLst>
           </p:cNvPr>
@@ -30506,7 +30506,7 @@
           <p:cNvPr id="7" name="Fußzeilenplatzhalter 6">
             <a:extLst>
               <a:ext uri="{FF2B5EF4-FFF2-40B4-BE49-F238E27FC236}">
-                <a16:creationId xmlns="" xmlns:a16="http://schemas.microsoft.com/office/drawing/2014/main" id="{DD743ADB-89F1-48B5-A397-7FB83734730F}"/>
+                <a16:creationId xmlns:a16="http://schemas.microsoft.com/office/drawing/2014/main" xmlns="" id="{DD743ADB-89F1-48B5-A397-7FB83734730F}"/>
               </a:ext>
             </a:extLst>
           </p:cNvPr>
@@ -30531,7 +30531,7 @@
           <p:cNvPr id="8" name="Foliennummernplatzhalter 7">
             <a:extLst>
               <a:ext uri="{FF2B5EF4-FFF2-40B4-BE49-F238E27FC236}">
-                <a16:creationId xmlns="" xmlns:a16="http://schemas.microsoft.com/office/drawing/2014/main" id="{E9AACC46-EA1E-4E6F-8F9D-AC4B57F09904}"/>
+                <a16:creationId xmlns:a16="http://schemas.microsoft.com/office/drawing/2014/main" xmlns="" id="{E9AACC46-EA1E-4E6F-8F9D-AC4B57F09904}"/>
               </a:ext>
             </a:extLst>
           </p:cNvPr>
@@ -30838,7 +30838,7 @@
           <p:cNvPr id="6" name="Datumsplatzhalter 5">
             <a:extLst>
               <a:ext uri="{FF2B5EF4-FFF2-40B4-BE49-F238E27FC236}">
-                <a16:creationId xmlns="" xmlns:a16="http://schemas.microsoft.com/office/drawing/2014/main" id="{39EC82D5-F468-46F1-8BE2-F62E4D04C5CD}"/>
+                <a16:creationId xmlns:a16="http://schemas.microsoft.com/office/drawing/2014/main" xmlns="" id="{39EC82D5-F468-46F1-8BE2-F62E4D04C5CD}"/>
               </a:ext>
             </a:extLst>
           </p:cNvPr>
@@ -30868,7 +30868,7 @@
           <p:cNvPr id="7" name="Fußzeilenplatzhalter 6">
             <a:extLst>
               <a:ext uri="{FF2B5EF4-FFF2-40B4-BE49-F238E27FC236}">
-                <a16:creationId xmlns="" xmlns:a16="http://schemas.microsoft.com/office/drawing/2014/main" id="{32A29AE2-1FA8-458C-9BDD-E35CA69A9340}"/>
+                <a16:creationId xmlns:a16="http://schemas.microsoft.com/office/drawing/2014/main" xmlns="" id="{32A29AE2-1FA8-458C-9BDD-E35CA69A9340}"/>
               </a:ext>
             </a:extLst>
           </p:cNvPr>
@@ -30893,7 +30893,7 @@
           <p:cNvPr id="8" name="Foliennummernplatzhalter 7">
             <a:extLst>
               <a:ext uri="{FF2B5EF4-FFF2-40B4-BE49-F238E27FC236}">
-                <a16:creationId xmlns="" xmlns:a16="http://schemas.microsoft.com/office/drawing/2014/main" id="{DC4135BE-88E8-4C4B-B3FF-FC61855E0C9F}"/>
+                <a16:creationId xmlns:a16="http://schemas.microsoft.com/office/drawing/2014/main" xmlns="" id="{DC4135BE-88E8-4C4B-B3FF-FC61855E0C9F}"/>
               </a:ext>
             </a:extLst>
           </p:cNvPr>
@@ -31204,7 +31204,7 @@
           <p:cNvPr id="5" name="Datumsplatzhalter 4">
             <a:extLst>
               <a:ext uri="{FF2B5EF4-FFF2-40B4-BE49-F238E27FC236}">
-                <a16:creationId xmlns="" xmlns:a16="http://schemas.microsoft.com/office/drawing/2014/main" id="{42621BA8-D298-4AAA-B27E-2D5702596736}"/>
+                <a16:creationId xmlns:a16="http://schemas.microsoft.com/office/drawing/2014/main" xmlns="" id="{42621BA8-D298-4AAA-B27E-2D5702596736}"/>
               </a:ext>
             </a:extLst>
           </p:cNvPr>
@@ -31234,7 +31234,7 @@
           <p:cNvPr id="6" name="Fußzeilenplatzhalter 5">
             <a:extLst>
               <a:ext uri="{FF2B5EF4-FFF2-40B4-BE49-F238E27FC236}">
-                <a16:creationId xmlns="" xmlns:a16="http://schemas.microsoft.com/office/drawing/2014/main" id="{59687A69-8E9C-4168-AA2A-7D487587D19D}"/>
+                <a16:creationId xmlns:a16="http://schemas.microsoft.com/office/drawing/2014/main" xmlns="" id="{59687A69-8E9C-4168-AA2A-7D487587D19D}"/>
               </a:ext>
             </a:extLst>
           </p:cNvPr>
@@ -31259,7 +31259,7 @@
           <p:cNvPr id="7" name="Foliennummernplatzhalter 6">
             <a:extLst>
               <a:ext uri="{FF2B5EF4-FFF2-40B4-BE49-F238E27FC236}">
-                <a16:creationId xmlns="" xmlns:a16="http://schemas.microsoft.com/office/drawing/2014/main" id="{536244A4-4C24-4CD2-82E9-C547A6F8C84B}"/>
+                <a16:creationId xmlns:a16="http://schemas.microsoft.com/office/drawing/2014/main" xmlns="" id="{536244A4-4C24-4CD2-82E9-C547A6F8C84B}"/>
               </a:ext>
             </a:extLst>
           </p:cNvPr>
@@ -31563,7 +31563,7 @@
           <p:cNvPr id="6" name="Datumsplatzhalter 5">
             <a:extLst>
               <a:ext uri="{FF2B5EF4-FFF2-40B4-BE49-F238E27FC236}">
-                <a16:creationId xmlns="" xmlns:a16="http://schemas.microsoft.com/office/drawing/2014/main" id="{BF6F2AC7-7673-45B2-B727-C8AE32F0AB56}"/>
+                <a16:creationId xmlns:a16="http://schemas.microsoft.com/office/drawing/2014/main" xmlns="" id="{BF6F2AC7-7673-45B2-B727-C8AE32F0AB56}"/>
               </a:ext>
             </a:extLst>
           </p:cNvPr>
@@ -31593,7 +31593,7 @@
           <p:cNvPr id="7" name="Fußzeilenplatzhalter 6">
             <a:extLst>
               <a:ext uri="{FF2B5EF4-FFF2-40B4-BE49-F238E27FC236}">
-                <a16:creationId xmlns="" xmlns:a16="http://schemas.microsoft.com/office/drawing/2014/main" id="{92A772BA-DCE7-4C4E-83BA-CF4FFCC183EE}"/>
+                <a16:creationId xmlns:a16="http://schemas.microsoft.com/office/drawing/2014/main" xmlns="" id="{92A772BA-DCE7-4C4E-83BA-CF4FFCC183EE}"/>
               </a:ext>
             </a:extLst>
           </p:cNvPr>
@@ -31618,7 +31618,7 @@
           <p:cNvPr id="8" name="Foliennummernplatzhalter 7">
             <a:extLst>
               <a:ext uri="{FF2B5EF4-FFF2-40B4-BE49-F238E27FC236}">
-                <a16:creationId xmlns="" xmlns:a16="http://schemas.microsoft.com/office/drawing/2014/main" id="{E51D4D1D-A3D0-476F-93F4-F41207D05396}"/>
+                <a16:creationId xmlns:a16="http://schemas.microsoft.com/office/drawing/2014/main" xmlns="" id="{E51D4D1D-A3D0-476F-93F4-F41207D05396}"/>
               </a:ext>
             </a:extLst>
           </p:cNvPr>
@@ -31918,7 +31918,7 @@
           <p:cNvPr id="4" name="Datumsplatzhalter 3">
             <a:extLst>
               <a:ext uri="{FF2B5EF4-FFF2-40B4-BE49-F238E27FC236}">
-                <a16:creationId xmlns="" xmlns:a16="http://schemas.microsoft.com/office/drawing/2014/main" id="{37D39D12-6498-4172-8CA5-163DBEBBD0CB}"/>
+                <a16:creationId xmlns:a16="http://schemas.microsoft.com/office/drawing/2014/main" xmlns="" id="{37D39D12-6498-4172-8CA5-163DBEBBD0CB}"/>
               </a:ext>
             </a:extLst>
           </p:cNvPr>
@@ -31948,7 +31948,7 @@
           <p:cNvPr id="7" name="Fußzeilenplatzhalter 6">
             <a:extLst>
               <a:ext uri="{FF2B5EF4-FFF2-40B4-BE49-F238E27FC236}">
-                <a16:creationId xmlns="" xmlns:a16="http://schemas.microsoft.com/office/drawing/2014/main" id="{F310451D-2AF2-4222-AA5C-04DDCF6CA55F}"/>
+                <a16:creationId xmlns:a16="http://schemas.microsoft.com/office/drawing/2014/main" xmlns="" id="{F310451D-2AF2-4222-AA5C-04DDCF6CA55F}"/>
               </a:ext>
             </a:extLst>
           </p:cNvPr>
@@ -31973,7 +31973,7 @@
           <p:cNvPr id="8" name="Foliennummernplatzhalter 7">
             <a:extLst>
               <a:ext uri="{FF2B5EF4-FFF2-40B4-BE49-F238E27FC236}">
-                <a16:creationId xmlns="" xmlns:a16="http://schemas.microsoft.com/office/drawing/2014/main" id="{8546ADD4-A434-4A15-B639-BB0897136588}"/>
+                <a16:creationId xmlns:a16="http://schemas.microsoft.com/office/drawing/2014/main" xmlns="" id="{8546ADD4-A434-4A15-B639-BB0897136588}"/>
               </a:ext>
             </a:extLst>
           </p:cNvPr>
@@ -32212,7 +32212,7 @@
           <p:cNvPr id="2" name="Datumsplatzhalter 1">
             <a:extLst>
               <a:ext uri="{FF2B5EF4-FFF2-40B4-BE49-F238E27FC236}">
-                <a16:creationId xmlns="" xmlns:a16="http://schemas.microsoft.com/office/drawing/2014/main" id="{A19FBC2B-4138-47A7-96C3-6075667C774D}"/>
+                <a16:creationId xmlns:a16="http://schemas.microsoft.com/office/drawing/2014/main" xmlns="" id="{A19FBC2B-4138-47A7-96C3-6075667C774D}"/>
               </a:ext>
             </a:extLst>
           </p:cNvPr>
@@ -32242,7 +32242,7 @@
           <p:cNvPr id="8" name="Fußzeilenplatzhalter 7">
             <a:extLst>
               <a:ext uri="{FF2B5EF4-FFF2-40B4-BE49-F238E27FC236}">
-                <a16:creationId xmlns="" xmlns:a16="http://schemas.microsoft.com/office/drawing/2014/main" id="{193B0760-28CB-4559-9AEF-4866F2FCE0E4}"/>
+                <a16:creationId xmlns:a16="http://schemas.microsoft.com/office/drawing/2014/main" xmlns="" id="{193B0760-28CB-4559-9AEF-4866F2FCE0E4}"/>
               </a:ext>
             </a:extLst>
           </p:cNvPr>
@@ -32267,7 +32267,7 @@
           <p:cNvPr id="11" name="Foliennummernplatzhalter 10">
             <a:extLst>
               <a:ext uri="{FF2B5EF4-FFF2-40B4-BE49-F238E27FC236}">
-                <a16:creationId xmlns="" xmlns:a16="http://schemas.microsoft.com/office/drawing/2014/main" id="{A263DBAA-5BAE-421E-BCAE-39992A39B610}"/>
+                <a16:creationId xmlns:a16="http://schemas.microsoft.com/office/drawing/2014/main" xmlns="" id="{A263DBAA-5BAE-421E-BCAE-39992A39B610}"/>
               </a:ext>
             </a:extLst>
           </p:cNvPr>
@@ -33173,7 +33173,7 @@
           <p:cNvPr id="11" name="Titel 1">
             <a:extLst>
               <a:ext uri="{FF2B5EF4-FFF2-40B4-BE49-F238E27FC236}">
-                <a16:creationId xmlns="" xmlns:a16="http://schemas.microsoft.com/office/drawing/2014/main" id="{251058B0-31BE-410A-BE50-41D5389B0AAB}"/>
+                <a16:creationId xmlns:a16="http://schemas.microsoft.com/office/drawing/2014/main" xmlns="" id="{251058B0-31BE-410A-BE50-41D5389B0AAB}"/>
               </a:ext>
             </a:extLst>
           </p:cNvPr>
@@ -34638,7 +34638,7 @@
           <p:cNvPr id="2" name="Textplatzhalter 1">
             <a:extLst>
               <a:ext uri="{FF2B5EF4-FFF2-40B4-BE49-F238E27FC236}">
-                <a16:creationId xmlns="" xmlns:a16="http://schemas.microsoft.com/office/drawing/2014/main" id="{45003885-0277-4A8A-9B32-2C0872306E13}"/>
+                <a16:creationId xmlns:a16="http://schemas.microsoft.com/office/drawing/2014/main" xmlns="" id="{45003885-0277-4A8A-9B32-2C0872306E13}"/>
               </a:ext>
             </a:extLst>
           </p:cNvPr>
@@ -34678,7 +34678,7 @@
           <p:cNvPr id="3" name="Titel 2">
             <a:extLst>
               <a:ext uri="{FF2B5EF4-FFF2-40B4-BE49-F238E27FC236}">
-                <a16:creationId xmlns="" xmlns:a16="http://schemas.microsoft.com/office/drawing/2014/main" id="{EA92ABC8-8A1F-45BA-8C5F-D5DEF58C8920}"/>
+                <a16:creationId xmlns:a16="http://schemas.microsoft.com/office/drawing/2014/main" xmlns="" id="{EA92ABC8-8A1F-45BA-8C5F-D5DEF58C8920}"/>
               </a:ext>
             </a:extLst>
           </p:cNvPr>
@@ -36479,8 +36479,8 @@
         </p:blipFill>
         <p:spPr bwMode="auto">
           <a:xfrm>
-            <a:off x="5026622" y="1226969"/>
-            <a:ext cx="7622577" cy="5392906"/>
+            <a:off x="5530467" y="1583434"/>
+            <a:ext cx="7118732" cy="5036440"/>
           </a:xfrm>
           <a:prstGeom prst="rect">
             <a:avLst/>
@@ -36550,20 +36550,21 @@
           <a:p>
             <a:r>
               <a:rPr lang="de-DE" dirty="0" smtClean="0"/>
-              <a:t>Twitter: </a:t>
-            </a:r>
-            <a:r>
-              <a:rPr lang="mr-IN" dirty="0" smtClean="0"/>
-              <a:t>…</a:t>
+              <a:t>Twitter</a:t>
             </a:r>
             <a:endParaRPr lang="de-DE" dirty="0" smtClean="0"/>
           </a:p>
           <a:p>
-            <a:r>
-              <a:rPr lang="mr-IN" dirty="0" smtClean="0"/>
-              <a:t>…</a:t>
-            </a:r>
-            <a:endParaRPr lang="de-DE" smtClean="0"/>
+            <a:pPr lvl="1"/>
+            <a:r>
+              <a:rPr lang="de-DE" dirty="0" smtClean="0"/>
+              <a:t>@</a:t>
+            </a:r>
+            <a:r>
+              <a:rPr lang="de-DE" dirty="0" err="1" smtClean="0"/>
+              <a:t>SCC_at_DATEV</a:t>
+            </a:r>
+            <a:endParaRPr lang="de-DE" dirty="0" smtClean="0"/>
           </a:p>
           <a:p>
             <a:endParaRPr lang="de-DE" dirty="0" smtClean="0"/>
@@ -36583,55 +36584,20 @@
             </a:r>
           </a:p>
           <a:p>
-            <a:r>
-              <a:rPr lang="de-DE" dirty="0"/>
-              <a:t> </a:t>
+            <a:pPr lvl="1"/>
+            <a:r>
+              <a:rPr lang="de-DE" dirty="0" smtClean="0">
+                <a:hlinkClick r:id="rId3"/>
+              </a:rPr>
+              <a:t>https</a:t>
             </a:r>
             <a:r>
               <a:rPr lang="de-DE" dirty="0">
                 <a:hlinkClick r:id="rId3"/>
               </a:rPr>
-              <a:t>https://ti.to/gdcr-nuernberg/2017</a:t>
+              <a:t>://ti.to/gdcr-nuernberg/2017</a:t>
             </a:r>
             <a:endParaRPr lang="de-DE" dirty="0"/>
-          </a:p>
-        </p:txBody>
-      </p:sp>
-      <p:sp>
-        <p:nvSpPr>
-          <p:cNvPr id="10" name="Textplatzhalter 9"/>
-          <p:cNvSpPr>
-            <a:spLocks noGrp="1"/>
-          </p:cNvSpPr>
-          <p:nvPr>
-            <p:ph type="body" sz="quarter" idx="34"/>
-          </p:nvPr>
-        </p:nvSpPr>
-        <p:spPr/>
-        <p:txBody>
-          <a:bodyPr/>
-          <a:lstStyle/>
-          <a:p>
-            <a:endParaRPr lang="de-DE"/>
-          </a:p>
-        </p:txBody>
-      </p:sp>
-      <p:sp>
-        <p:nvSpPr>
-          <p:cNvPr id="11" name="Textplatzhalter 10"/>
-          <p:cNvSpPr>
-            <a:spLocks noGrp="1"/>
-          </p:cNvSpPr>
-          <p:nvPr>
-            <p:ph type="body" sz="quarter" idx="35"/>
-          </p:nvPr>
-        </p:nvSpPr>
-        <p:spPr/>
-        <p:txBody>
-          <a:bodyPr/>
-          <a:lstStyle/>
-          <a:p>
-            <a:endParaRPr lang="de-DE"/>
           </a:p>
         </p:txBody>
       </p:sp>
@@ -39668,45 +39634,6 @@
               </a:rPr>
               <a:t>Link</a:t>
             </a:r>
-            <a:endParaRPr lang="de-DE" dirty="0" smtClean="0"/>
-          </a:p>
-          <a:p>
-            <a:pPr>
-              <a:lnSpc>
-                <a:spcPct val="150000"/>
-              </a:lnSpc>
-            </a:pPr>
-            <a:r>
-              <a:rPr lang="de-DE" dirty="0" smtClean="0"/>
-              <a:t>Software </a:t>
-            </a:r>
-            <a:r>
-              <a:rPr lang="de-DE" dirty="0" err="1" smtClean="0"/>
-              <a:t>Craftsmanship</a:t>
-            </a:r>
-            <a:r>
-              <a:rPr lang="de-DE" dirty="0"/>
-              <a:t> Community (</a:t>
-            </a:r>
-            <a:r>
-              <a:rPr lang="de-DE" dirty="0">
-                <a:hlinkClick r:id="rId4"/>
-              </a:rPr>
-              <a:t>https://</a:t>
-            </a:r>
-            <a:r>
-              <a:rPr lang="de-DE" dirty="0" smtClean="0">
-                <a:hlinkClick r:id="rId4"/>
-              </a:rPr>
-              <a:t>ti.to/gdcr-nuernberg/2017)</a:t>
-            </a:r>
-            <a:r>
-              <a:rPr lang="de-DE" dirty="0" smtClean="0"/>
-              <a:t> </a:t>
-            </a:r>
-            <a:endParaRPr lang="de-DE" dirty="0"/>
-          </a:p>
-          <a:p>
             <a:endParaRPr lang="de-DE" dirty="0"/>
           </a:p>
         </p:txBody>
@@ -39716,7 +39643,7 @@
           <p:cNvPr id="5" name="Datumsplatzhalter 4">
             <a:extLst>
               <a:ext uri="{FF2B5EF4-FFF2-40B4-BE49-F238E27FC236}">
-                <a16:creationId xmlns="" xmlns:a16="http://schemas.microsoft.com/office/drawing/2014/main" id="{D471591C-E430-45E7-A587-2CEC0AF88DA0}"/>
+                <a16:creationId xmlns:a16="http://schemas.microsoft.com/office/drawing/2014/main" xmlns="" id="{D471591C-E430-45E7-A587-2CEC0AF88DA0}"/>
               </a:ext>
             </a:extLst>
           </p:cNvPr>
@@ -39745,7 +39672,7 @@
           <p:cNvPr id="6" name="Fußzeilenplatzhalter 5">
             <a:extLst>
               <a:ext uri="{FF2B5EF4-FFF2-40B4-BE49-F238E27FC236}">
-                <a16:creationId xmlns="" xmlns:a16="http://schemas.microsoft.com/office/drawing/2014/main" id="{B488671B-A101-43AC-84F6-1F2F8515424C}"/>
+                <a16:creationId xmlns:a16="http://schemas.microsoft.com/office/drawing/2014/main" xmlns="" id="{B488671B-A101-43AC-84F6-1F2F8515424C}"/>
               </a:ext>
             </a:extLst>
           </p:cNvPr>
@@ -39770,7 +39697,7 @@
           <p:cNvPr id="7" name="Foliennummernplatzhalter 6">
             <a:extLst>
               <a:ext uri="{FF2B5EF4-FFF2-40B4-BE49-F238E27FC236}">
-                <a16:creationId xmlns="" xmlns:a16="http://schemas.microsoft.com/office/drawing/2014/main" id="{8E977D85-C22B-4016-AC2C-F3FDCE1BCBEB}"/>
+                <a16:creationId xmlns:a16="http://schemas.microsoft.com/office/drawing/2014/main" xmlns="" id="{8E977D85-C22B-4016-AC2C-F3FDCE1BCBEB}"/>
               </a:ext>
             </a:extLst>
           </p:cNvPr>

</xml_diff>

<commit_message>
update ppt fixes #2
</commit_message>
<xml_diff>
--- a/docs/Angular-Workshop-20.10.pptx
+++ b/docs/Angular-Workshop-20.10.pptx
@@ -19316,7 +19316,7 @@
           <a:noFill/>
           <a:extLst>
             <a:ext uri="{909E8E84-426E-40dd-AFC4-6F175D3DCCD1}">
-              <a14:hiddenFill xmlns:a14="http://schemas.microsoft.com/office/drawing/2010/main" xmlns="">
+              <a14:hiddenFill xmlns="" xmlns:a14="http://schemas.microsoft.com/office/drawing/2010/main">
                 <a:solidFill>
                   <a:srgbClr val="FFFFFF"/>
                 </a:solidFill>
@@ -29764,7 +29764,7 @@
           <a:noFill/>
           <a:extLst>
             <a:ext uri="{909E8E84-426E-40dd-AFC4-6F175D3DCCD1}">
-              <a14:hiddenFill xmlns:a14="http://schemas.microsoft.com/office/drawing/2010/main" xmlns="">
+              <a14:hiddenFill xmlns="" xmlns:a14="http://schemas.microsoft.com/office/drawing/2010/main">
                 <a:solidFill>
                   <a:srgbClr val="FFFFFF"/>
                 </a:solidFill>
@@ -29844,7 +29844,7 @@
           <a:noFill/>
           <a:extLst>
             <a:ext uri="{909E8E84-426E-40dd-AFC4-6F175D3DCCD1}">
-              <a14:hiddenFill xmlns:a14="http://schemas.microsoft.com/office/drawing/2010/main" xmlns="">
+              <a14:hiddenFill xmlns="" xmlns:a14="http://schemas.microsoft.com/office/drawing/2010/main">
                 <a:solidFill>
                   <a:srgbClr val="FFFFFF"/>
                 </a:solidFill>
@@ -34703,9 +34703,6 @@
               <a:rPr lang="de-DE" dirty="0"/>
               <a:t>Angular @DATEV - Aktuelle Entwicklungssituation</a:t>
             </a:r>
-          </a:p>
-          <a:p>
-            <a:endParaRPr lang="de-DE" dirty="0"/>
           </a:p>
         </p:txBody>
       </p:sp>

</xml_diff>

<commit_message>
Typos behoben (#1, #2)
</commit_message>
<xml_diff>
--- a/docs/Angular-Workshop-20.10.pptx
+++ b/docs/Angular-Workshop-20.10.pptx
@@ -4814,14 +4814,35 @@
         </dgm:presLayoutVars>
       </dgm:prSet>
       <dgm:spPr/>
+      <dgm:t>
+        <a:bodyPr/>
+        <a:lstStyle/>
+        <a:p>
+          <a:endParaRPr lang="de-DE"/>
+        </a:p>
+      </dgm:t>
     </dgm:pt>
     <dgm:pt modelId="{30EAC814-8F64-D74A-9EBA-0CBC6BE058AA}" type="pres">
       <dgm:prSet presAssocID="{EE7B1B78-2CB7-C647-875E-937A240D7736}" presName="sibTrans" presStyleLbl="sibTrans2D1" presStyleIdx="0" presStyleCnt="2"/>
       <dgm:spPr/>
+      <dgm:t>
+        <a:bodyPr/>
+        <a:lstStyle/>
+        <a:p>
+          <a:endParaRPr lang="de-DE"/>
+        </a:p>
+      </dgm:t>
     </dgm:pt>
     <dgm:pt modelId="{26BA574D-A9C9-D847-8AAF-A8F48018C2C1}" type="pres">
       <dgm:prSet presAssocID="{EE7B1B78-2CB7-C647-875E-937A240D7736}" presName="connectorText" presStyleLbl="sibTrans2D1" presStyleIdx="0" presStyleCnt="2"/>
       <dgm:spPr/>
+      <dgm:t>
+        <a:bodyPr/>
+        <a:lstStyle/>
+        <a:p>
+          <a:endParaRPr lang="de-DE"/>
+        </a:p>
+      </dgm:t>
     </dgm:pt>
     <dgm:pt modelId="{942B2FD4-F953-1241-B452-E01505D35646}" type="pres">
       <dgm:prSet presAssocID="{9F5FBEB5-0D91-6442-BAE6-3C8FE451890E}" presName="node" presStyleLbl="node1" presStyleIdx="1" presStyleCnt="3">
@@ -4830,14 +4851,35 @@
         </dgm:presLayoutVars>
       </dgm:prSet>
       <dgm:spPr/>
+      <dgm:t>
+        <a:bodyPr/>
+        <a:lstStyle/>
+        <a:p>
+          <a:endParaRPr lang="de-DE"/>
+        </a:p>
+      </dgm:t>
     </dgm:pt>
     <dgm:pt modelId="{61D01FBA-AE9A-8140-B034-5E107AF8B06D}" type="pres">
       <dgm:prSet presAssocID="{D96BFFC3-C37B-F740-8CDD-799CDA9C29AF}" presName="sibTrans" presStyleLbl="sibTrans2D1" presStyleIdx="1" presStyleCnt="2"/>
       <dgm:spPr/>
+      <dgm:t>
+        <a:bodyPr/>
+        <a:lstStyle/>
+        <a:p>
+          <a:endParaRPr lang="de-DE"/>
+        </a:p>
+      </dgm:t>
     </dgm:pt>
     <dgm:pt modelId="{36003D2E-E2F1-4C4D-80A6-3A3280BC15B9}" type="pres">
       <dgm:prSet presAssocID="{D96BFFC3-C37B-F740-8CDD-799CDA9C29AF}" presName="connectorText" presStyleLbl="sibTrans2D1" presStyleIdx="1" presStyleCnt="2"/>
       <dgm:spPr/>
+      <dgm:t>
+        <a:bodyPr/>
+        <a:lstStyle/>
+        <a:p>
+          <a:endParaRPr lang="de-DE"/>
+        </a:p>
+      </dgm:t>
     </dgm:pt>
     <dgm:pt modelId="{48E1AD6C-04E3-5047-8B6E-169C4DE6C0BD}" type="pres">
       <dgm:prSet presAssocID="{54AAB197-8266-0B4E-83D2-C0A636856F54}" presName="node" presStyleLbl="node1" presStyleIdx="2" presStyleCnt="3">
@@ -4846,20 +4888,27 @@
         </dgm:presLayoutVars>
       </dgm:prSet>
       <dgm:spPr/>
+      <dgm:t>
+        <a:bodyPr/>
+        <a:lstStyle/>
+        <a:p>
+          <a:endParaRPr lang="de-DE"/>
+        </a:p>
+      </dgm:t>
     </dgm:pt>
   </dgm:ptLst>
   <dgm:cxnLst>
-    <dgm:cxn modelId="{9AD13F03-FA98-2546-A1F6-086D6D749FC5}" srcId="{82BD223D-4D97-664B-8FA2-F811E68132B9}" destId="{9F5FBEB5-0D91-6442-BAE6-3C8FE451890E}" srcOrd="1" destOrd="0" parTransId="{44185C10-A566-584D-8792-6F8CDA31CFEF}" sibTransId="{D96BFFC3-C37B-F740-8CDD-799CDA9C29AF}"/>
-    <dgm:cxn modelId="{204D2F3A-2AAF-5543-9E98-BBE69FD4AAAD}" type="presOf" srcId="{EE7B1B78-2CB7-C647-875E-937A240D7736}" destId="{26BA574D-A9C9-D847-8AAF-A8F48018C2C1}" srcOrd="1" destOrd="0" presId="urn:microsoft.com/office/officeart/2005/8/layout/process1"/>
+    <dgm:cxn modelId="{2BCEAEFF-A9FB-5C48-85FF-B123F8BCA8D1}" srcId="{82BD223D-4D97-664B-8FA2-F811E68132B9}" destId="{54AAB197-8266-0B4E-83D2-C0A636856F54}" srcOrd="2" destOrd="0" parTransId="{5B1EBB87-FA02-2E4E-9C97-ED4DD0AE3921}" sibTransId="{EE6869A3-EE4E-D54B-B05E-1DD13DD15896}"/>
+    <dgm:cxn modelId="{E9D68197-C1CA-8B49-8D4D-676507B04581}" type="presOf" srcId="{D96BFFC3-C37B-F740-8CDD-799CDA9C29AF}" destId="{61D01FBA-AE9A-8140-B034-5E107AF8B06D}" srcOrd="0" destOrd="0" presId="urn:microsoft.com/office/officeart/2005/8/layout/process1"/>
+    <dgm:cxn modelId="{E198D6D4-91AD-F643-8652-6843F8F235B1}" srcId="{82BD223D-4D97-664B-8FA2-F811E68132B9}" destId="{9E409708-FC7B-604D-AE00-C59A3BC6C774}" srcOrd="0" destOrd="0" parTransId="{AF54B174-D1EC-FF4E-9C8F-E68F41ABE717}" sibTransId="{EE7B1B78-2CB7-C647-875E-937A240D7736}"/>
     <dgm:cxn modelId="{EEE44545-27AE-DB46-8FAC-C89225478C81}" type="presOf" srcId="{82BD223D-4D97-664B-8FA2-F811E68132B9}" destId="{5C4E5A0B-1B12-EC4C-BCB7-F3E190AFE040}" srcOrd="0" destOrd="0" presId="urn:microsoft.com/office/officeart/2005/8/layout/process1"/>
     <dgm:cxn modelId="{26D22B50-1593-D448-A022-672B7A73BE42}" type="presOf" srcId="{D96BFFC3-C37B-F740-8CDD-799CDA9C29AF}" destId="{36003D2E-E2F1-4C4D-80A6-3A3280BC15B9}" srcOrd="1" destOrd="0" presId="urn:microsoft.com/office/officeart/2005/8/layout/process1"/>
+    <dgm:cxn modelId="{204D2F3A-2AAF-5543-9E98-BBE69FD4AAAD}" type="presOf" srcId="{EE7B1B78-2CB7-C647-875E-937A240D7736}" destId="{26BA574D-A9C9-D847-8AAF-A8F48018C2C1}" srcOrd="1" destOrd="0" presId="urn:microsoft.com/office/officeart/2005/8/layout/process1"/>
+    <dgm:cxn modelId="{0B5C2FB2-34A3-FD4E-944C-B6AD6041D706}" type="presOf" srcId="{EE7B1B78-2CB7-C647-875E-937A240D7736}" destId="{30EAC814-8F64-D74A-9EBA-0CBC6BE058AA}" srcOrd="0" destOrd="0" presId="urn:microsoft.com/office/officeart/2005/8/layout/process1"/>
+    <dgm:cxn modelId="{F0DD8BDB-048F-5445-A773-92BA998E4A49}" type="presOf" srcId="{54AAB197-8266-0B4E-83D2-C0A636856F54}" destId="{48E1AD6C-04E3-5047-8B6E-169C4DE6C0BD}" srcOrd="0" destOrd="0" presId="urn:microsoft.com/office/officeart/2005/8/layout/process1"/>
+    <dgm:cxn modelId="{4CBE26AE-37BC-EB4A-A9FB-CCA57C75737F}" type="presOf" srcId="{9F5FBEB5-0D91-6442-BAE6-3C8FE451890E}" destId="{942B2FD4-F953-1241-B452-E01505D35646}" srcOrd="0" destOrd="0" presId="urn:microsoft.com/office/officeart/2005/8/layout/process1"/>
     <dgm:cxn modelId="{83288D85-DC7F-8240-8739-38606E06B1EB}" type="presOf" srcId="{9E409708-FC7B-604D-AE00-C59A3BC6C774}" destId="{AC19049A-FF2E-864B-A995-C88CCE14464E}" srcOrd="0" destOrd="0" presId="urn:microsoft.com/office/officeart/2005/8/layout/process1"/>
-    <dgm:cxn modelId="{E9D68197-C1CA-8B49-8D4D-676507B04581}" type="presOf" srcId="{D96BFFC3-C37B-F740-8CDD-799CDA9C29AF}" destId="{61D01FBA-AE9A-8140-B034-5E107AF8B06D}" srcOrd="0" destOrd="0" presId="urn:microsoft.com/office/officeart/2005/8/layout/process1"/>
-    <dgm:cxn modelId="{4CBE26AE-37BC-EB4A-A9FB-CCA57C75737F}" type="presOf" srcId="{9F5FBEB5-0D91-6442-BAE6-3C8FE451890E}" destId="{942B2FD4-F953-1241-B452-E01505D35646}" srcOrd="0" destOrd="0" presId="urn:microsoft.com/office/officeart/2005/8/layout/process1"/>
-    <dgm:cxn modelId="{0B5C2FB2-34A3-FD4E-944C-B6AD6041D706}" type="presOf" srcId="{EE7B1B78-2CB7-C647-875E-937A240D7736}" destId="{30EAC814-8F64-D74A-9EBA-0CBC6BE058AA}" srcOrd="0" destOrd="0" presId="urn:microsoft.com/office/officeart/2005/8/layout/process1"/>
-    <dgm:cxn modelId="{E198D6D4-91AD-F643-8652-6843F8F235B1}" srcId="{82BD223D-4D97-664B-8FA2-F811E68132B9}" destId="{9E409708-FC7B-604D-AE00-C59A3BC6C774}" srcOrd="0" destOrd="0" parTransId="{AF54B174-D1EC-FF4E-9C8F-E68F41ABE717}" sibTransId="{EE7B1B78-2CB7-C647-875E-937A240D7736}"/>
-    <dgm:cxn modelId="{F0DD8BDB-048F-5445-A773-92BA998E4A49}" type="presOf" srcId="{54AAB197-8266-0B4E-83D2-C0A636856F54}" destId="{48E1AD6C-04E3-5047-8B6E-169C4DE6C0BD}" srcOrd="0" destOrd="0" presId="urn:microsoft.com/office/officeart/2005/8/layout/process1"/>
-    <dgm:cxn modelId="{2BCEAEFF-A9FB-5C48-85FF-B123F8BCA8D1}" srcId="{82BD223D-4D97-664B-8FA2-F811E68132B9}" destId="{54AAB197-8266-0B4E-83D2-C0A636856F54}" srcOrd="2" destOrd="0" parTransId="{5B1EBB87-FA02-2E4E-9C97-ED4DD0AE3921}" sibTransId="{EE6869A3-EE4E-D54B-B05E-1DD13DD15896}"/>
+    <dgm:cxn modelId="{9AD13F03-FA98-2546-A1F6-086D6D749FC5}" srcId="{82BD223D-4D97-664B-8FA2-F811E68132B9}" destId="{9F5FBEB5-0D91-6442-BAE6-3C8FE451890E}" srcOrd="1" destOrd="0" parTransId="{44185C10-A566-584D-8792-6F8CDA31CFEF}" sibTransId="{D96BFFC3-C37B-F740-8CDD-799CDA9C29AF}"/>
     <dgm:cxn modelId="{78543FD6-8257-884F-93D8-C543EE4956F6}" type="presParOf" srcId="{5C4E5A0B-1B12-EC4C-BCB7-F3E190AFE040}" destId="{AC19049A-FF2E-864B-A995-C88CCE14464E}" srcOrd="0" destOrd="0" presId="urn:microsoft.com/office/officeart/2005/8/layout/process1"/>
     <dgm:cxn modelId="{04F4235A-244F-8A46-9CD6-E8510748FBEA}" type="presParOf" srcId="{5C4E5A0B-1B12-EC4C-BCB7-F3E190AFE040}" destId="{30EAC814-8F64-D74A-9EBA-0CBC6BE058AA}" srcOrd="1" destOrd="0" presId="urn:microsoft.com/office/officeart/2005/8/layout/process1"/>
     <dgm:cxn modelId="{B1F1B014-CF98-3544-9AAB-1881CB2B9BAD}" type="presParOf" srcId="{30EAC814-8F64-D74A-9EBA-0CBC6BE058AA}" destId="{26BA574D-A9C9-D847-8AAF-A8F48018C2C1}" srcOrd="0" destOrd="0" presId="urn:microsoft.com/office/officeart/2005/8/layout/process1"/>
@@ -5022,14 +5071,35 @@
         </dgm:presLayoutVars>
       </dgm:prSet>
       <dgm:spPr/>
+      <dgm:t>
+        <a:bodyPr/>
+        <a:lstStyle/>
+        <a:p>
+          <a:endParaRPr lang="de-DE"/>
+        </a:p>
+      </dgm:t>
     </dgm:pt>
     <dgm:pt modelId="{30EAC814-8F64-D74A-9EBA-0CBC6BE058AA}" type="pres">
       <dgm:prSet presAssocID="{EE7B1B78-2CB7-C647-875E-937A240D7736}" presName="sibTrans" presStyleLbl="sibTrans2D1" presStyleIdx="0" presStyleCnt="2"/>
       <dgm:spPr/>
+      <dgm:t>
+        <a:bodyPr/>
+        <a:lstStyle/>
+        <a:p>
+          <a:endParaRPr lang="de-DE"/>
+        </a:p>
+      </dgm:t>
     </dgm:pt>
     <dgm:pt modelId="{26BA574D-A9C9-D847-8AAF-A8F48018C2C1}" type="pres">
       <dgm:prSet presAssocID="{EE7B1B78-2CB7-C647-875E-937A240D7736}" presName="connectorText" presStyleLbl="sibTrans2D1" presStyleIdx="0" presStyleCnt="2"/>
       <dgm:spPr/>
+      <dgm:t>
+        <a:bodyPr/>
+        <a:lstStyle/>
+        <a:p>
+          <a:endParaRPr lang="de-DE"/>
+        </a:p>
+      </dgm:t>
     </dgm:pt>
     <dgm:pt modelId="{942B2FD4-F953-1241-B452-E01505D35646}" type="pres">
       <dgm:prSet presAssocID="{9F5FBEB5-0D91-6442-BAE6-3C8FE451890E}" presName="node" presStyleLbl="node1" presStyleIdx="1" presStyleCnt="3">
@@ -5038,14 +5108,35 @@
         </dgm:presLayoutVars>
       </dgm:prSet>
       <dgm:spPr/>
+      <dgm:t>
+        <a:bodyPr/>
+        <a:lstStyle/>
+        <a:p>
+          <a:endParaRPr lang="de-DE"/>
+        </a:p>
+      </dgm:t>
     </dgm:pt>
     <dgm:pt modelId="{61D01FBA-AE9A-8140-B034-5E107AF8B06D}" type="pres">
       <dgm:prSet presAssocID="{D96BFFC3-C37B-F740-8CDD-799CDA9C29AF}" presName="sibTrans" presStyleLbl="sibTrans2D1" presStyleIdx="1" presStyleCnt="2"/>
       <dgm:spPr/>
+      <dgm:t>
+        <a:bodyPr/>
+        <a:lstStyle/>
+        <a:p>
+          <a:endParaRPr lang="de-DE"/>
+        </a:p>
+      </dgm:t>
     </dgm:pt>
     <dgm:pt modelId="{36003D2E-E2F1-4C4D-80A6-3A3280BC15B9}" type="pres">
       <dgm:prSet presAssocID="{D96BFFC3-C37B-F740-8CDD-799CDA9C29AF}" presName="connectorText" presStyleLbl="sibTrans2D1" presStyleIdx="1" presStyleCnt="2"/>
       <dgm:spPr/>
+      <dgm:t>
+        <a:bodyPr/>
+        <a:lstStyle/>
+        <a:p>
+          <a:endParaRPr lang="de-DE"/>
+        </a:p>
+      </dgm:t>
     </dgm:pt>
     <dgm:pt modelId="{48E1AD6C-04E3-5047-8B6E-169C4DE6C0BD}" type="pres">
       <dgm:prSet presAssocID="{54AAB197-8266-0B4E-83D2-C0A636856F54}" presName="node" presStyleLbl="node1" presStyleIdx="2" presStyleCnt="3">
@@ -5054,20 +5145,27 @@
         </dgm:presLayoutVars>
       </dgm:prSet>
       <dgm:spPr/>
+      <dgm:t>
+        <a:bodyPr/>
+        <a:lstStyle/>
+        <a:p>
+          <a:endParaRPr lang="de-DE"/>
+        </a:p>
+      </dgm:t>
     </dgm:pt>
   </dgm:ptLst>
   <dgm:cxnLst>
+    <dgm:cxn modelId="{2BCEAEFF-A9FB-5C48-85FF-B123F8BCA8D1}" srcId="{82BD223D-4D97-664B-8FA2-F811E68132B9}" destId="{54AAB197-8266-0B4E-83D2-C0A636856F54}" srcOrd="2" destOrd="0" parTransId="{5B1EBB87-FA02-2E4E-9C97-ED4DD0AE3921}" sibTransId="{EE6869A3-EE4E-D54B-B05E-1DD13DD15896}"/>
+    <dgm:cxn modelId="{69805F36-919C-904F-B7BA-6F556E7CE6A4}" type="presOf" srcId="{9F5FBEB5-0D91-6442-BAE6-3C8FE451890E}" destId="{942B2FD4-F953-1241-B452-E01505D35646}" srcOrd="0" destOrd="0" presId="urn:microsoft.com/office/officeart/2005/8/layout/process1"/>
+    <dgm:cxn modelId="{E198D6D4-91AD-F643-8652-6843F8F235B1}" srcId="{82BD223D-4D97-664B-8FA2-F811E68132B9}" destId="{9E409708-FC7B-604D-AE00-C59A3BC6C774}" srcOrd="0" destOrd="0" parTransId="{AF54B174-D1EC-FF4E-9C8F-E68F41ABE717}" sibTransId="{EE7B1B78-2CB7-C647-875E-937A240D7736}"/>
+    <dgm:cxn modelId="{2BEB67B7-48B3-FD4E-863C-14ADF2D587B2}" type="presOf" srcId="{9E409708-FC7B-604D-AE00-C59A3BC6C774}" destId="{AC19049A-FF2E-864B-A995-C88CCE14464E}" srcOrd="0" destOrd="0" presId="urn:microsoft.com/office/officeart/2005/8/layout/process1"/>
+    <dgm:cxn modelId="{415BE8A2-96CF-9F43-8B38-1AB3649795FE}" type="presOf" srcId="{EE7B1B78-2CB7-C647-875E-937A240D7736}" destId="{30EAC814-8F64-D74A-9EBA-0CBC6BE058AA}" srcOrd="0" destOrd="0" presId="urn:microsoft.com/office/officeart/2005/8/layout/process1"/>
+    <dgm:cxn modelId="{832028F2-2484-2347-9176-3AAC5BBBD59F}" type="presOf" srcId="{EE7B1B78-2CB7-C647-875E-937A240D7736}" destId="{26BA574D-A9C9-D847-8AAF-A8F48018C2C1}" srcOrd="1" destOrd="0" presId="urn:microsoft.com/office/officeart/2005/8/layout/process1"/>
+    <dgm:cxn modelId="{43C40EE3-4A95-6743-9906-8E96AD14C7FC}" type="presOf" srcId="{54AAB197-8266-0B4E-83D2-C0A636856F54}" destId="{48E1AD6C-04E3-5047-8B6E-169C4DE6C0BD}" srcOrd="0" destOrd="0" presId="urn:microsoft.com/office/officeart/2005/8/layout/process1"/>
+    <dgm:cxn modelId="{DC2960B5-B00C-4243-BDA1-BCD292550A07}" type="presOf" srcId="{D96BFFC3-C37B-F740-8CDD-799CDA9C29AF}" destId="{36003D2E-E2F1-4C4D-80A6-3A3280BC15B9}" srcOrd="1" destOrd="0" presId="urn:microsoft.com/office/officeart/2005/8/layout/process1"/>
+    <dgm:cxn modelId="{76F02889-CC7F-0F4E-93D0-368883CD7297}" type="presOf" srcId="{D96BFFC3-C37B-F740-8CDD-799CDA9C29AF}" destId="{61D01FBA-AE9A-8140-B034-5E107AF8B06D}" srcOrd="0" destOrd="0" presId="urn:microsoft.com/office/officeart/2005/8/layout/process1"/>
+    <dgm:cxn modelId="{3F0BBB61-DEB1-0D4B-8CE4-04D6A26FB54F}" type="presOf" srcId="{82BD223D-4D97-664B-8FA2-F811E68132B9}" destId="{5C4E5A0B-1B12-EC4C-BCB7-F3E190AFE040}" srcOrd="0" destOrd="0" presId="urn:microsoft.com/office/officeart/2005/8/layout/process1"/>
     <dgm:cxn modelId="{9AD13F03-FA98-2546-A1F6-086D6D749FC5}" srcId="{82BD223D-4D97-664B-8FA2-F811E68132B9}" destId="{9F5FBEB5-0D91-6442-BAE6-3C8FE451890E}" srcOrd="1" destOrd="0" parTransId="{44185C10-A566-584D-8792-6F8CDA31CFEF}" sibTransId="{D96BFFC3-C37B-F740-8CDD-799CDA9C29AF}"/>
-    <dgm:cxn modelId="{69805F36-919C-904F-B7BA-6F556E7CE6A4}" type="presOf" srcId="{9F5FBEB5-0D91-6442-BAE6-3C8FE451890E}" destId="{942B2FD4-F953-1241-B452-E01505D35646}" srcOrd="0" destOrd="0" presId="urn:microsoft.com/office/officeart/2005/8/layout/process1"/>
-    <dgm:cxn modelId="{3F0BBB61-DEB1-0D4B-8CE4-04D6A26FB54F}" type="presOf" srcId="{82BD223D-4D97-664B-8FA2-F811E68132B9}" destId="{5C4E5A0B-1B12-EC4C-BCB7-F3E190AFE040}" srcOrd="0" destOrd="0" presId="urn:microsoft.com/office/officeart/2005/8/layout/process1"/>
-    <dgm:cxn modelId="{76F02889-CC7F-0F4E-93D0-368883CD7297}" type="presOf" srcId="{D96BFFC3-C37B-F740-8CDD-799CDA9C29AF}" destId="{61D01FBA-AE9A-8140-B034-5E107AF8B06D}" srcOrd="0" destOrd="0" presId="urn:microsoft.com/office/officeart/2005/8/layout/process1"/>
-    <dgm:cxn modelId="{415BE8A2-96CF-9F43-8B38-1AB3649795FE}" type="presOf" srcId="{EE7B1B78-2CB7-C647-875E-937A240D7736}" destId="{30EAC814-8F64-D74A-9EBA-0CBC6BE058AA}" srcOrd="0" destOrd="0" presId="urn:microsoft.com/office/officeart/2005/8/layout/process1"/>
-    <dgm:cxn modelId="{DC2960B5-B00C-4243-BDA1-BCD292550A07}" type="presOf" srcId="{D96BFFC3-C37B-F740-8CDD-799CDA9C29AF}" destId="{36003D2E-E2F1-4C4D-80A6-3A3280BC15B9}" srcOrd="1" destOrd="0" presId="urn:microsoft.com/office/officeart/2005/8/layout/process1"/>
-    <dgm:cxn modelId="{2BEB67B7-48B3-FD4E-863C-14ADF2D587B2}" type="presOf" srcId="{9E409708-FC7B-604D-AE00-C59A3BC6C774}" destId="{AC19049A-FF2E-864B-A995-C88CCE14464E}" srcOrd="0" destOrd="0" presId="urn:microsoft.com/office/officeart/2005/8/layout/process1"/>
-    <dgm:cxn modelId="{E198D6D4-91AD-F643-8652-6843F8F235B1}" srcId="{82BD223D-4D97-664B-8FA2-F811E68132B9}" destId="{9E409708-FC7B-604D-AE00-C59A3BC6C774}" srcOrd="0" destOrd="0" parTransId="{AF54B174-D1EC-FF4E-9C8F-E68F41ABE717}" sibTransId="{EE7B1B78-2CB7-C647-875E-937A240D7736}"/>
-    <dgm:cxn modelId="{43C40EE3-4A95-6743-9906-8E96AD14C7FC}" type="presOf" srcId="{54AAB197-8266-0B4E-83D2-C0A636856F54}" destId="{48E1AD6C-04E3-5047-8B6E-169C4DE6C0BD}" srcOrd="0" destOrd="0" presId="urn:microsoft.com/office/officeart/2005/8/layout/process1"/>
-    <dgm:cxn modelId="{832028F2-2484-2347-9176-3AAC5BBBD59F}" type="presOf" srcId="{EE7B1B78-2CB7-C647-875E-937A240D7736}" destId="{26BA574D-A9C9-D847-8AAF-A8F48018C2C1}" srcOrd="1" destOrd="0" presId="urn:microsoft.com/office/officeart/2005/8/layout/process1"/>
-    <dgm:cxn modelId="{2BCEAEFF-A9FB-5C48-85FF-B123F8BCA8D1}" srcId="{82BD223D-4D97-664B-8FA2-F811E68132B9}" destId="{54AAB197-8266-0B4E-83D2-C0A636856F54}" srcOrd="2" destOrd="0" parTransId="{5B1EBB87-FA02-2E4E-9C97-ED4DD0AE3921}" sibTransId="{EE6869A3-EE4E-D54B-B05E-1DD13DD15896}"/>
     <dgm:cxn modelId="{3559C9F1-5C8F-354A-9E01-1DE9FF22BE2A}" type="presParOf" srcId="{5C4E5A0B-1B12-EC4C-BCB7-F3E190AFE040}" destId="{AC19049A-FF2E-864B-A995-C88CCE14464E}" srcOrd="0" destOrd="0" presId="urn:microsoft.com/office/officeart/2005/8/layout/process1"/>
     <dgm:cxn modelId="{9D5BD0CC-4547-7E44-835B-D74A13C1989F}" type="presParOf" srcId="{5C4E5A0B-1B12-EC4C-BCB7-F3E190AFE040}" destId="{30EAC814-8F64-D74A-9EBA-0CBC6BE058AA}" srcOrd="1" destOrd="0" presId="urn:microsoft.com/office/officeart/2005/8/layout/process1"/>
     <dgm:cxn modelId="{7FC1D771-BB8A-7742-9ADA-6471C3344A30}" type="presParOf" srcId="{30EAC814-8F64-D74A-9EBA-0CBC6BE058AA}" destId="{26BA574D-A9C9-D847-8AAF-A8F48018C2C1}" srcOrd="0" destOrd="0" presId="urn:microsoft.com/office/officeart/2005/8/layout/process1"/>
@@ -5318,14 +5416,35 @@
         </dgm:presLayoutVars>
       </dgm:prSet>
       <dgm:spPr/>
+      <dgm:t>
+        <a:bodyPr/>
+        <a:lstStyle/>
+        <a:p>
+          <a:endParaRPr lang="de-DE"/>
+        </a:p>
+      </dgm:t>
     </dgm:pt>
     <dgm:pt modelId="{30EAC814-8F64-D74A-9EBA-0CBC6BE058AA}" type="pres">
       <dgm:prSet presAssocID="{EE7B1B78-2CB7-C647-875E-937A240D7736}" presName="sibTrans" presStyleLbl="sibTrans2D1" presStyleIdx="0" presStyleCnt="4"/>
       <dgm:spPr/>
+      <dgm:t>
+        <a:bodyPr/>
+        <a:lstStyle/>
+        <a:p>
+          <a:endParaRPr lang="de-DE"/>
+        </a:p>
+      </dgm:t>
     </dgm:pt>
     <dgm:pt modelId="{26BA574D-A9C9-D847-8AAF-A8F48018C2C1}" type="pres">
       <dgm:prSet presAssocID="{EE7B1B78-2CB7-C647-875E-937A240D7736}" presName="connectorText" presStyleLbl="sibTrans2D1" presStyleIdx="0" presStyleCnt="4"/>
       <dgm:spPr/>
+      <dgm:t>
+        <a:bodyPr/>
+        <a:lstStyle/>
+        <a:p>
+          <a:endParaRPr lang="de-DE"/>
+        </a:p>
+      </dgm:t>
     </dgm:pt>
     <dgm:pt modelId="{942B2FD4-F953-1241-B452-E01505D35646}" type="pres">
       <dgm:prSet presAssocID="{9F5FBEB5-0D91-6442-BAE6-3C8FE451890E}" presName="node" presStyleLbl="node1" presStyleIdx="1" presStyleCnt="5">
@@ -5334,14 +5453,35 @@
         </dgm:presLayoutVars>
       </dgm:prSet>
       <dgm:spPr/>
+      <dgm:t>
+        <a:bodyPr/>
+        <a:lstStyle/>
+        <a:p>
+          <a:endParaRPr lang="de-DE"/>
+        </a:p>
+      </dgm:t>
     </dgm:pt>
     <dgm:pt modelId="{61D01FBA-AE9A-8140-B034-5E107AF8B06D}" type="pres">
       <dgm:prSet presAssocID="{D96BFFC3-C37B-F740-8CDD-799CDA9C29AF}" presName="sibTrans" presStyleLbl="sibTrans2D1" presStyleIdx="1" presStyleCnt="4"/>
       <dgm:spPr/>
+      <dgm:t>
+        <a:bodyPr/>
+        <a:lstStyle/>
+        <a:p>
+          <a:endParaRPr lang="de-DE"/>
+        </a:p>
+      </dgm:t>
     </dgm:pt>
     <dgm:pt modelId="{36003D2E-E2F1-4C4D-80A6-3A3280BC15B9}" type="pres">
       <dgm:prSet presAssocID="{D96BFFC3-C37B-F740-8CDD-799CDA9C29AF}" presName="connectorText" presStyleLbl="sibTrans2D1" presStyleIdx="1" presStyleCnt="4"/>
       <dgm:spPr/>
+      <dgm:t>
+        <a:bodyPr/>
+        <a:lstStyle/>
+        <a:p>
+          <a:endParaRPr lang="de-DE"/>
+        </a:p>
+      </dgm:t>
     </dgm:pt>
     <dgm:pt modelId="{48E1AD6C-04E3-5047-8B6E-169C4DE6C0BD}" type="pres">
       <dgm:prSet presAssocID="{54AAB197-8266-0B4E-83D2-C0A636856F54}" presName="node" presStyleLbl="node1" presStyleIdx="2" presStyleCnt="5">
@@ -5350,14 +5490,35 @@
         </dgm:presLayoutVars>
       </dgm:prSet>
       <dgm:spPr/>
+      <dgm:t>
+        <a:bodyPr/>
+        <a:lstStyle/>
+        <a:p>
+          <a:endParaRPr lang="de-DE"/>
+        </a:p>
+      </dgm:t>
     </dgm:pt>
     <dgm:pt modelId="{0AD4DF4A-E0D6-074E-8C5C-EC60A69D5CD5}" type="pres">
       <dgm:prSet presAssocID="{EE6869A3-EE4E-D54B-B05E-1DD13DD15896}" presName="sibTrans" presStyleLbl="sibTrans2D1" presStyleIdx="2" presStyleCnt="4"/>
       <dgm:spPr/>
+      <dgm:t>
+        <a:bodyPr/>
+        <a:lstStyle/>
+        <a:p>
+          <a:endParaRPr lang="de-DE"/>
+        </a:p>
+      </dgm:t>
     </dgm:pt>
     <dgm:pt modelId="{B2447F15-FA32-1347-AF28-173890CF07D0}" type="pres">
       <dgm:prSet presAssocID="{EE6869A3-EE4E-D54B-B05E-1DD13DD15896}" presName="connectorText" presStyleLbl="sibTrans2D1" presStyleIdx="2" presStyleCnt="4"/>
       <dgm:spPr/>
+      <dgm:t>
+        <a:bodyPr/>
+        <a:lstStyle/>
+        <a:p>
+          <a:endParaRPr lang="de-DE"/>
+        </a:p>
+      </dgm:t>
     </dgm:pt>
     <dgm:pt modelId="{C72C48AC-E55D-9140-B4CF-F284B256CE46}" type="pres">
       <dgm:prSet presAssocID="{31CB1F73-FDD4-4249-9ACC-6BAC469E2FBB}" presName="node" presStyleLbl="node1" presStyleIdx="3" presStyleCnt="5">
@@ -5366,14 +5527,35 @@
         </dgm:presLayoutVars>
       </dgm:prSet>
       <dgm:spPr/>
+      <dgm:t>
+        <a:bodyPr/>
+        <a:lstStyle/>
+        <a:p>
+          <a:endParaRPr lang="de-DE"/>
+        </a:p>
+      </dgm:t>
     </dgm:pt>
     <dgm:pt modelId="{C0778852-E178-8D45-B49B-75D931FC40CB}" type="pres">
       <dgm:prSet presAssocID="{730EE106-A639-0B49-A10D-12585A85B535}" presName="sibTrans" presStyleLbl="sibTrans2D1" presStyleIdx="3" presStyleCnt="4"/>
       <dgm:spPr/>
+      <dgm:t>
+        <a:bodyPr/>
+        <a:lstStyle/>
+        <a:p>
+          <a:endParaRPr lang="de-DE"/>
+        </a:p>
+      </dgm:t>
     </dgm:pt>
     <dgm:pt modelId="{5FE60D9B-3EEA-7F45-B860-500441313F74}" type="pres">
       <dgm:prSet presAssocID="{730EE106-A639-0B49-A10D-12585A85B535}" presName="connectorText" presStyleLbl="sibTrans2D1" presStyleIdx="3" presStyleCnt="4"/>
       <dgm:spPr/>
+      <dgm:t>
+        <a:bodyPr/>
+        <a:lstStyle/>
+        <a:p>
+          <a:endParaRPr lang="de-DE"/>
+        </a:p>
+      </dgm:t>
     </dgm:pt>
     <dgm:pt modelId="{CE1BF210-B0C1-0C45-B643-E2A51ACDB5A4}" type="pres">
       <dgm:prSet presAssocID="{4A355F56-BC59-D340-9D26-878E3214B76A}" presName="node" presStyleLbl="node1" presStyleIdx="4" presStyleCnt="5">
@@ -5382,28 +5564,35 @@
         </dgm:presLayoutVars>
       </dgm:prSet>
       <dgm:spPr/>
+      <dgm:t>
+        <a:bodyPr/>
+        <a:lstStyle/>
+        <a:p>
+          <a:endParaRPr lang="de-DE"/>
+        </a:p>
+      </dgm:t>
     </dgm:pt>
   </dgm:ptLst>
   <dgm:cxnLst>
-    <dgm:cxn modelId="{9AD13F03-FA98-2546-A1F6-086D6D749FC5}" srcId="{82BD223D-4D97-664B-8FA2-F811E68132B9}" destId="{9F5FBEB5-0D91-6442-BAE6-3C8FE451890E}" srcOrd="1" destOrd="0" parTransId="{44185C10-A566-584D-8792-6F8CDA31CFEF}" sibTransId="{D96BFFC3-C37B-F740-8CDD-799CDA9C29AF}"/>
-    <dgm:cxn modelId="{2802DF12-F683-B141-BE60-CB3DEEA1EEEC}" type="presOf" srcId="{D96BFFC3-C37B-F740-8CDD-799CDA9C29AF}" destId="{61D01FBA-AE9A-8140-B034-5E107AF8B06D}" srcOrd="0" destOrd="0" presId="urn:microsoft.com/office/officeart/2005/8/layout/process1"/>
+    <dgm:cxn modelId="{2BCEAEFF-A9FB-5C48-85FF-B123F8BCA8D1}" srcId="{82BD223D-4D97-664B-8FA2-F811E68132B9}" destId="{54AAB197-8266-0B4E-83D2-C0A636856F54}" srcOrd="2" destOrd="0" parTransId="{5B1EBB87-FA02-2E4E-9C97-ED4DD0AE3921}" sibTransId="{EE6869A3-EE4E-D54B-B05E-1DD13DD15896}"/>
+    <dgm:cxn modelId="{F07B818B-B6C5-E64E-A8AB-C17509C2C8BA}" srcId="{82BD223D-4D97-664B-8FA2-F811E68132B9}" destId="{4A355F56-BC59-D340-9D26-878E3214B76A}" srcOrd="4" destOrd="0" parTransId="{3ACC4126-0A33-B243-886D-FE1B29822403}" sibTransId="{5286A1E3-3A87-2849-91D5-6D2FFAC8FAA4}"/>
+    <dgm:cxn modelId="{E606397D-2620-B84D-BAE9-1F11829AFD46}" type="presOf" srcId="{EE6869A3-EE4E-D54B-B05E-1DD13DD15896}" destId="{0AD4DF4A-E0D6-074E-8C5C-EC60A69D5CD5}" srcOrd="0" destOrd="0" presId="urn:microsoft.com/office/officeart/2005/8/layout/process1"/>
+    <dgm:cxn modelId="{AB48EADB-57A3-7443-A755-307E8AD763F9}" type="presOf" srcId="{4A355F56-BC59-D340-9D26-878E3214B76A}" destId="{CE1BF210-B0C1-0C45-B643-E2A51ACDB5A4}" srcOrd="0" destOrd="0" presId="urn:microsoft.com/office/officeart/2005/8/layout/process1"/>
+    <dgm:cxn modelId="{E198D6D4-91AD-F643-8652-6843F8F235B1}" srcId="{82BD223D-4D97-664B-8FA2-F811E68132B9}" destId="{9E409708-FC7B-604D-AE00-C59A3BC6C774}" srcOrd="0" destOrd="0" parTransId="{AF54B174-D1EC-FF4E-9C8F-E68F41ABE717}" sibTransId="{EE7B1B78-2CB7-C647-875E-937A240D7736}"/>
+    <dgm:cxn modelId="{4E77594F-B6F3-3146-B27F-9CE80AE1F09A}" type="presOf" srcId="{730EE106-A639-0B49-A10D-12585A85B535}" destId="{C0778852-E178-8D45-B49B-75D931FC40CB}" srcOrd="0" destOrd="0" presId="urn:microsoft.com/office/officeart/2005/8/layout/process1"/>
+    <dgm:cxn modelId="{37CDF3F7-3279-8E46-A1EC-4783E3ACA65C}" type="presOf" srcId="{31CB1F73-FDD4-4249-9ACC-6BAC469E2FBB}" destId="{C72C48AC-E55D-9140-B4CF-F284B256CE46}" srcOrd="0" destOrd="0" presId="urn:microsoft.com/office/officeart/2005/8/layout/process1"/>
+    <dgm:cxn modelId="{A5F2F987-D69F-844E-83D1-BCC022A941D1}" type="presOf" srcId="{D96BFFC3-C37B-F740-8CDD-799CDA9C29AF}" destId="{36003D2E-E2F1-4C4D-80A6-3A3280BC15B9}" srcOrd="1" destOrd="0" presId="urn:microsoft.com/office/officeart/2005/8/layout/process1"/>
+    <dgm:cxn modelId="{1F493379-F789-6B4C-BA30-60D769F546F1}" type="presOf" srcId="{54AAB197-8266-0B4E-83D2-C0A636856F54}" destId="{48E1AD6C-04E3-5047-8B6E-169C4DE6C0BD}" srcOrd="0" destOrd="0" presId="urn:microsoft.com/office/officeart/2005/8/layout/process1"/>
     <dgm:cxn modelId="{1EB75F14-D39E-EB46-A1C2-3A1E91137228}" type="presOf" srcId="{82BD223D-4D97-664B-8FA2-F811E68132B9}" destId="{5C4E5A0B-1B12-EC4C-BCB7-F3E190AFE040}" srcOrd="0" destOrd="0" presId="urn:microsoft.com/office/officeart/2005/8/layout/process1"/>
-    <dgm:cxn modelId="{7DAFAF27-675B-BF4E-9067-F3219584E4C2}" type="presOf" srcId="{9F5FBEB5-0D91-6442-BAE6-3C8FE451890E}" destId="{942B2FD4-F953-1241-B452-E01505D35646}" srcOrd="0" destOrd="0" presId="urn:microsoft.com/office/officeart/2005/8/layout/process1"/>
-    <dgm:cxn modelId="{4E77594F-B6F3-3146-B27F-9CE80AE1F09A}" type="presOf" srcId="{730EE106-A639-0B49-A10D-12585A85B535}" destId="{C0778852-E178-8D45-B49B-75D931FC40CB}" srcOrd="0" destOrd="0" presId="urn:microsoft.com/office/officeart/2005/8/layout/process1"/>
-    <dgm:cxn modelId="{1F493379-F789-6B4C-BA30-60D769F546F1}" type="presOf" srcId="{54AAB197-8266-0B4E-83D2-C0A636856F54}" destId="{48E1AD6C-04E3-5047-8B6E-169C4DE6C0BD}" srcOrd="0" destOrd="0" presId="urn:microsoft.com/office/officeart/2005/8/layout/process1"/>
-    <dgm:cxn modelId="{2E32F27B-67BC-BF47-9CDB-8C9FF1808A3A}" type="presOf" srcId="{EE7B1B78-2CB7-C647-875E-937A240D7736}" destId="{30EAC814-8F64-D74A-9EBA-0CBC6BE058AA}" srcOrd="0" destOrd="0" presId="urn:microsoft.com/office/officeart/2005/8/layout/process1"/>
-    <dgm:cxn modelId="{E606397D-2620-B84D-BAE9-1F11829AFD46}" type="presOf" srcId="{EE6869A3-EE4E-D54B-B05E-1DD13DD15896}" destId="{0AD4DF4A-E0D6-074E-8C5C-EC60A69D5CD5}" srcOrd="0" destOrd="0" presId="urn:microsoft.com/office/officeart/2005/8/layout/process1"/>
-    <dgm:cxn modelId="{A5F2F987-D69F-844E-83D1-BCC022A941D1}" type="presOf" srcId="{D96BFFC3-C37B-F740-8CDD-799CDA9C29AF}" destId="{36003D2E-E2F1-4C4D-80A6-3A3280BC15B9}" srcOrd="1" destOrd="0" presId="urn:microsoft.com/office/officeart/2005/8/layout/process1"/>
-    <dgm:cxn modelId="{F07B818B-B6C5-E64E-A8AB-C17509C2C8BA}" srcId="{82BD223D-4D97-664B-8FA2-F811E68132B9}" destId="{4A355F56-BC59-D340-9D26-878E3214B76A}" srcOrd="4" destOrd="0" parTransId="{3ACC4126-0A33-B243-886D-FE1B29822403}" sibTransId="{5286A1E3-3A87-2849-91D5-6D2FFAC8FAA4}"/>
     <dgm:cxn modelId="{62536BAF-6EA3-584E-A5F7-24EF17C15217}" srcId="{82BD223D-4D97-664B-8FA2-F811E68132B9}" destId="{31CB1F73-FDD4-4249-9ACC-6BAC469E2FBB}" srcOrd="3" destOrd="0" parTransId="{70D48A33-06DE-D04C-B220-2420D7BB86CF}" sibTransId="{730EE106-A639-0B49-A10D-12585A85B535}"/>
     <dgm:cxn modelId="{FD07EFB2-B072-F843-9F0D-D3FEBBCC6891}" type="presOf" srcId="{9E409708-FC7B-604D-AE00-C59A3BC6C774}" destId="{AC19049A-FF2E-864B-A995-C88CCE14464E}" srcOrd="0" destOrd="0" presId="urn:microsoft.com/office/officeart/2005/8/layout/process1"/>
     <dgm:cxn modelId="{E760BEC1-6B4E-AF41-85DE-E4F285D35B6B}" type="presOf" srcId="{EE6869A3-EE4E-D54B-B05E-1DD13DD15896}" destId="{B2447F15-FA32-1347-AF28-173890CF07D0}" srcOrd="1" destOrd="0" presId="urn:microsoft.com/office/officeart/2005/8/layout/process1"/>
+    <dgm:cxn modelId="{2E32F27B-67BC-BF47-9CDB-8C9FF1808A3A}" type="presOf" srcId="{EE7B1B78-2CB7-C647-875E-937A240D7736}" destId="{30EAC814-8F64-D74A-9EBA-0CBC6BE058AA}" srcOrd="0" destOrd="0" presId="urn:microsoft.com/office/officeart/2005/8/layout/process1"/>
+    <dgm:cxn modelId="{7341F2E6-127A-4E44-A259-6B1AACD4487E}" type="presOf" srcId="{EE7B1B78-2CB7-C647-875E-937A240D7736}" destId="{26BA574D-A9C9-D847-8AAF-A8F48018C2C1}" srcOrd="1" destOrd="0" presId="urn:microsoft.com/office/officeart/2005/8/layout/process1"/>
+    <dgm:cxn modelId="{7DAFAF27-675B-BF4E-9067-F3219584E4C2}" type="presOf" srcId="{9F5FBEB5-0D91-6442-BAE6-3C8FE451890E}" destId="{942B2FD4-F953-1241-B452-E01505D35646}" srcOrd="0" destOrd="0" presId="urn:microsoft.com/office/officeart/2005/8/layout/process1"/>
+    <dgm:cxn modelId="{2802DF12-F683-B141-BE60-CB3DEEA1EEEC}" type="presOf" srcId="{D96BFFC3-C37B-F740-8CDD-799CDA9C29AF}" destId="{61D01FBA-AE9A-8140-B034-5E107AF8B06D}" srcOrd="0" destOrd="0" presId="urn:microsoft.com/office/officeart/2005/8/layout/process1"/>
     <dgm:cxn modelId="{08210ACA-5EE5-7840-AEB6-FA93404CA335}" type="presOf" srcId="{730EE106-A639-0B49-A10D-12585A85B535}" destId="{5FE60D9B-3EEA-7F45-B860-500441313F74}" srcOrd="1" destOrd="0" presId="urn:microsoft.com/office/officeart/2005/8/layout/process1"/>
-    <dgm:cxn modelId="{E198D6D4-91AD-F643-8652-6843F8F235B1}" srcId="{82BD223D-4D97-664B-8FA2-F811E68132B9}" destId="{9E409708-FC7B-604D-AE00-C59A3BC6C774}" srcOrd="0" destOrd="0" parTransId="{AF54B174-D1EC-FF4E-9C8F-E68F41ABE717}" sibTransId="{EE7B1B78-2CB7-C647-875E-937A240D7736}"/>
-    <dgm:cxn modelId="{AB48EADB-57A3-7443-A755-307E8AD763F9}" type="presOf" srcId="{4A355F56-BC59-D340-9D26-878E3214B76A}" destId="{CE1BF210-B0C1-0C45-B643-E2A51ACDB5A4}" srcOrd="0" destOrd="0" presId="urn:microsoft.com/office/officeart/2005/8/layout/process1"/>
-    <dgm:cxn modelId="{7341F2E6-127A-4E44-A259-6B1AACD4487E}" type="presOf" srcId="{EE7B1B78-2CB7-C647-875E-937A240D7736}" destId="{26BA574D-A9C9-D847-8AAF-A8F48018C2C1}" srcOrd="1" destOrd="0" presId="urn:microsoft.com/office/officeart/2005/8/layout/process1"/>
-    <dgm:cxn modelId="{37CDF3F7-3279-8E46-A1EC-4783E3ACA65C}" type="presOf" srcId="{31CB1F73-FDD4-4249-9ACC-6BAC469E2FBB}" destId="{C72C48AC-E55D-9140-B4CF-F284B256CE46}" srcOrd="0" destOrd="0" presId="urn:microsoft.com/office/officeart/2005/8/layout/process1"/>
-    <dgm:cxn modelId="{2BCEAEFF-A9FB-5C48-85FF-B123F8BCA8D1}" srcId="{82BD223D-4D97-664B-8FA2-F811E68132B9}" destId="{54AAB197-8266-0B4E-83D2-C0A636856F54}" srcOrd="2" destOrd="0" parTransId="{5B1EBB87-FA02-2E4E-9C97-ED4DD0AE3921}" sibTransId="{EE6869A3-EE4E-D54B-B05E-1DD13DD15896}"/>
+    <dgm:cxn modelId="{9AD13F03-FA98-2546-A1F6-086D6D749FC5}" srcId="{82BD223D-4D97-664B-8FA2-F811E68132B9}" destId="{9F5FBEB5-0D91-6442-BAE6-3C8FE451890E}" srcOrd="1" destOrd="0" parTransId="{44185C10-A566-584D-8792-6F8CDA31CFEF}" sibTransId="{D96BFFC3-C37B-F740-8CDD-799CDA9C29AF}"/>
     <dgm:cxn modelId="{EC929195-EDB4-0841-8BFE-8E2AC6860829}" type="presParOf" srcId="{5C4E5A0B-1B12-EC4C-BCB7-F3E190AFE040}" destId="{AC19049A-FF2E-864B-A995-C88CCE14464E}" srcOrd="0" destOrd="0" presId="urn:microsoft.com/office/officeart/2005/8/layout/process1"/>
     <dgm:cxn modelId="{221F53CB-23B7-EC4F-825F-359AD86AB9A7}" type="presParOf" srcId="{5C4E5A0B-1B12-EC4C-BCB7-F3E190AFE040}" destId="{30EAC814-8F64-D74A-9EBA-0CBC6BE058AA}" srcOrd="1" destOrd="0" presId="urn:microsoft.com/office/officeart/2005/8/layout/process1"/>
     <dgm:cxn modelId="{636D27AA-FF62-BE45-9CDC-1D55EB2DC1D7}" type="presParOf" srcId="{30EAC814-8F64-D74A-9EBA-0CBC6BE058AA}" destId="{26BA574D-A9C9-D847-8AAF-A8F48018C2C1}" srcOrd="0" destOrd="0" presId="urn:microsoft.com/office/officeart/2005/8/layout/process1"/>
@@ -5596,14 +5785,35 @@
         </dgm:presLayoutVars>
       </dgm:prSet>
       <dgm:spPr/>
+      <dgm:t>
+        <a:bodyPr/>
+        <a:lstStyle/>
+        <a:p>
+          <a:endParaRPr lang="de-DE"/>
+        </a:p>
+      </dgm:t>
     </dgm:pt>
     <dgm:pt modelId="{30EAC814-8F64-D74A-9EBA-0CBC6BE058AA}" type="pres">
       <dgm:prSet presAssocID="{EE7B1B78-2CB7-C647-875E-937A240D7736}" presName="sibTrans" presStyleLbl="sibTrans2D1" presStyleIdx="0" presStyleCnt="3"/>
       <dgm:spPr/>
+      <dgm:t>
+        <a:bodyPr/>
+        <a:lstStyle/>
+        <a:p>
+          <a:endParaRPr lang="de-DE"/>
+        </a:p>
+      </dgm:t>
     </dgm:pt>
     <dgm:pt modelId="{26BA574D-A9C9-D847-8AAF-A8F48018C2C1}" type="pres">
       <dgm:prSet presAssocID="{EE7B1B78-2CB7-C647-875E-937A240D7736}" presName="connectorText" presStyleLbl="sibTrans2D1" presStyleIdx="0" presStyleCnt="3"/>
       <dgm:spPr/>
+      <dgm:t>
+        <a:bodyPr/>
+        <a:lstStyle/>
+        <a:p>
+          <a:endParaRPr lang="de-DE"/>
+        </a:p>
+      </dgm:t>
     </dgm:pt>
     <dgm:pt modelId="{942B2FD4-F953-1241-B452-E01505D35646}" type="pres">
       <dgm:prSet presAssocID="{9F5FBEB5-0D91-6442-BAE6-3C8FE451890E}" presName="node" presStyleLbl="node1" presStyleIdx="1" presStyleCnt="4">
@@ -5612,14 +5822,35 @@
         </dgm:presLayoutVars>
       </dgm:prSet>
       <dgm:spPr/>
+      <dgm:t>
+        <a:bodyPr/>
+        <a:lstStyle/>
+        <a:p>
+          <a:endParaRPr lang="de-DE"/>
+        </a:p>
+      </dgm:t>
     </dgm:pt>
     <dgm:pt modelId="{61D01FBA-AE9A-8140-B034-5E107AF8B06D}" type="pres">
       <dgm:prSet presAssocID="{D96BFFC3-C37B-F740-8CDD-799CDA9C29AF}" presName="sibTrans" presStyleLbl="sibTrans2D1" presStyleIdx="1" presStyleCnt="3"/>
       <dgm:spPr/>
+      <dgm:t>
+        <a:bodyPr/>
+        <a:lstStyle/>
+        <a:p>
+          <a:endParaRPr lang="de-DE"/>
+        </a:p>
+      </dgm:t>
     </dgm:pt>
     <dgm:pt modelId="{36003D2E-E2F1-4C4D-80A6-3A3280BC15B9}" type="pres">
       <dgm:prSet presAssocID="{D96BFFC3-C37B-F740-8CDD-799CDA9C29AF}" presName="connectorText" presStyleLbl="sibTrans2D1" presStyleIdx="1" presStyleCnt="3"/>
       <dgm:spPr/>
+      <dgm:t>
+        <a:bodyPr/>
+        <a:lstStyle/>
+        <a:p>
+          <a:endParaRPr lang="de-DE"/>
+        </a:p>
+      </dgm:t>
     </dgm:pt>
     <dgm:pt modelId="{2D682FDA-6E7F-4A43-8A70-4A764CE24742}" type="pres">
       <dgm:prSet presAssocID="{D485B35D-896C-DA49-AEA4-E274D4DDB368}" presName="node" presStyleLbl="node1" presStyleIdx="2" presStyleCnt="4">
@@ -5628,14 +5859,35 @@
         </dgm:presLayoutVars>
       </dgm:prSet>
       <dgm:spPr/>
+      <dgm:t>
+        <a:bodyPr/>
+        <a:lstStyle/>
+        <a:p>
+          <a:endParaRPr lang="de-DE"/>
+        </a:p>
+      </dgm:t>
     </dgm:pt>
     <dgm:pt modelId="{78019554-895E-1248-B21B-5CD6309654E4}" type="pres">
       <dgm:prSet presAssocID="{98D865C2-7249-0546-A289-4BA2617820E6}" presName="sibTrans" presStyleLbl="sibTrans2D1" presStyleIdx="2" presStyleCnt="3"/>
       <dgm:spPr/>
+      <dgm:t>
+        <a:bodyPr/>
+        <a:lstStyle/>
+        <a:p>
+          <a:endParaRPr lang="de-DE"/>
+        </a:p>
+      </dgm:t>
     </dgm:pt>
     <dgm:pt modelId="{17A53E92-4269-D049-A101-E669C1A6D0BA}" type="pres">
       <dgm:prSet presAssocID="{98D865C2-7249-0546-A289-4BA2617820E6}" presName="connectorText" presStyleLbl="sibTrans2D1" presStyleIdx="2" presStyleCnt="3"/>
       <dgm:spPr/>
+      <dgm:t>
+        <a:bodyPr/>
+        <a:lstStyle/>
+        <a:p>
+          <a:endParaRPr lang="de-DE"/>
+        </a:p>
+      </dgm:t>
     </dgm:pt>
     <dgm:pt modelId="{48E1AD6C-04E3-5047-8B6E-169C4DE6C0BD}" type="pres">
       <dgm:prSet presAssocID="{54AAB197-8266-0B4E-83D2-C0A636856F54}" presName="node" presStyleLbl="node1" presStyleIdx="3" presStyleCnt="4">
@@ -5644,24 +5896,31 @@
         </dgm:presLayoutVars>
       </dgm:prSet>
       <dgm:spPr/>
+      <dgm:t>
+        <a:bodyPr/>
+        <a:lstStyle/>
+        <a:p>
+          <a:endParaRPr lang="de-DE"/>
+        </a:p>
+      </dgm:t>
     </dgm:pt>
   </dgm:ptLst>
   <dgm:cxnLst>
+    <dgm:cxn modelId="{2BCEAEFF-A9FB-5C48-85FF-B123F8BCA8D1}" srcId="{82BD223D-4D97-664B-8FA2-F811E68132B9}" destId="{54AAB197-8266-0B4E-83D2-C0A636856F54}" srcOrd="3" destOrd="0" parTransId="{5B1EBB87-FA02-2E4E-9C97-ED4DD0AE3921}" sibTransId="{EE6869A3-EE4E-D54B-B05E-1DD13DD15896}"/>
+    <dgm:cxn modelId="{81C7B384-6DE4-594F-B553-60CE583DD7A1}" srcId="{82BD223D-4D97-664B-8FA2-F811E68132B9}" destId="{D485B35D-896C-DA49-AEA4-E274D4DDB368}" srcOrd="2" destOrd="0" parTransId="{F00B634A-EC19-AB43-9C55-25F6154F2E01}" sibTransId="{98D865C2-7249-0546-A289-4BA2617820E6}"/>
+    <dgm:cxn modelId="{E198D6D4-91AD-F643-8652-6843F8F235B1}" srcId="{82BD223D-4D97-664B-8FA2-F811E68132B9}" destId="{9E409708-FC7B-604D-AE00-C59A3BC6C774}" srcOrd="0" destOrd="0" parTransId="{AF54B174-D1EC-FF4E-9C8F-E68F41ABE717}" sibTransId="{EE7B1B78-2CB7-C647-875E-937A240D7736}"/>
+    <dgm:cxn modelId="{626BC39B-8003-7848-BACF-4013CF507C46}" type="presOf" srcId="{EE7B1B78-2CB7-C647-875E-937A240D7736}" destId="{30EAC814-8F64-D74A-9EBA-0CBC6BE058AA}" srcOrd="0" destOrd="0" presId="urn:microsoft.com/office/officeart/2005/8/layout/process1"/>
+    <dgm:cxn modelId="{4D13A3EA-2847-3646-8608-9827840068A1}" type="presOf" srcId="{98D865C2-7249-0546-A289-4BA2617820E6}" destId="{17A53E92-4269-D049-A101-E669C1A6D0BA}" srcOrd="1" destOrd="0" presId="urn:microsoft.com/office/officeart/2005/8/layout/process1"/>
     <dgm:cxn modelId="{F4B23D00-6711-944D-8D20-31EE18CD607F}" type="presOf" srcId="{98D865C2-7249-0546-A289-4BA2617820E6}" destId="{78019554-895E-1248-B21B-5CD6309654E4}" srcOrd="0" destOrd="0" presId="urn:microsoft.com/office/officeart/2005/8/layout/process1"/>
+    <dgm:cxn modelId="{E2308D9B-C318-7A47-BD25-D5AD8211465F}" type="presOf" srcId="{D96BFFC3-C37B-F740-8CDD-799CDA9C29AF}" destId="{61D01FBA-AE9A-8140-B034-5E107AF8B06D}" srcOrd="0" destOrd="0" presId="urn:microsoft.com/office/officeart/2005/8/layout/process1"/>
+    <dgm:cxn modelId="{EC73EC4B-5CB1-C747-BBCA-53FD4000BA85}" type="presOf" srcId="{54AAB197-8266-0B4E-83D2-C0A636856F54}" destId="{48E1AD6C-04E3-5047-8B6E-169C4DE6C0BD}" srcOrd="0" destOrd="0" presId="urn:microsoft.com/office/officeart/2005/8/layout/process1"/>
+    <dgm:cxn modelId="{09218870-4562-3746-B611-E3A55E4B78FA}" type="presOf" srcId="{9F5FBEB5-0D91-6442-BAE6-3C8FE451890E}" destId="{942B2FD4-F953-1241-B452-E01505D35646}" srcOrd="0" destOrd="0" presId="urn:microsoft.com/office/officeart/2005/8/layout/process1"/>
+    <dgm:cxn modelId="{6B2B184E-1680-4244-8570-78F51F565DE1}" type="presOf" srcId="{9E409708-FC7B-604D-AE00-C59A3BC6C774}" destId="{AC19049A-FF2E-864B-A995-C88CCE14464E}" srcOrd="0" destOrd="0" presId="urn:microsoft.com/office/officeart/2005/8/layout/process1"/>
+    <dgm:cxn modelId="{2563B04A-08A4-A648-8EF7-123C712C2CD0}" type="presOf" srcId="{D96BFFC3-C37B-F740-8CDD-799CDA9C29AF}" destId="{36003D2E-E2F1-4C4D-80A6-3A3280BC15B9}" srcOrd="1" destOrd="0" presId="urn:microsoft.com/office/officeart/2005/8/layout/process1"/>
+    <dgm:cxn modelId="{5365C2D6-3123-7B47-B212-501916D3CA42}" type="presOf" srcId="{82BD223D-4D97-664B-8FA2-F811E68132B9}" destId="{5C4E5A0B-1B12-EC4C-BCB7-F3E190AFE040}" srcOrd="0" destOrd="0" presId="urn:microsoft.com/office/officeart/2005/8/layout/process1"/>
     <dgm:cxn modelId="{9AD13F03-FA98-2546-A1F6-086D6D749FC5}" srcId="{82BD223D-4D97-664B-8FA2-F811E68132B9}" destId="{9F5FBEB5-0D91-6442-BAE6-3C8FE451890E}" srcOrd="1" destOrd="0" parTransId="{44185C10-A566-584D-8792-6F8CDA31CFEF}" sibTransId="{D96BFFC3-C37B-F740-8CDD-799CDA9C29AF}"/>
-    <dgm:cxn modelId="{2563B04A-08A4-A648-8EF7-123C712C2CD0}" type="presOf" srcId="{D96BFFC3-C37B-F740-8CDD-799CDA9C29AF}" destId="{36003D2E-E2F1-4C4D-80A6-3A3280BC15B9}" srcOrd="1" destOrd="0" presId="urn:microsoft.com/office/officeart/2005/8/layout/process1"/>
-    <dgm:cxn modelId="{EC73EC4B-5CB1-C747-BBCA-53FD4000BA85}" type="presOf" srcId="{54AAB197-8266-0B4E-83D2-C0A636856F54}" destId="{48E1AD6C-04E3-5047-8B6E-169C4DE6C0BD}" srcOrd="0" destOrd="0" presId="urn:microsoft.com/office/officeart/2005/8/layout/process1"/>
-    <dgm:cxn modelId="{6B2B184E-1680-4244-8570-78F51F565DE1}" type="presOf" srcId="{9E409708-FC7B-604D-AE00-C59A3BC6C774}" destId="{AC19049A-FF2E-864B-A995-C88CCE14464E}" srcOrd="0" destOrd="0" presId="urn:microsoft.com/office/officeart/2005/8/layout/process1"/>
-    <dgm:cxn modelId="{09218870-4562-3746-B611-E3A55E4B78FA}" type="presOf" srcId="{9F5FBEB5-0D91-6442-BAE6-3C8FE451890E}" destId="{942B2FD4-F953-1241-B452-E01505D35646}" srcOrd="0" destOrd="0" presId="urn:microsoft.com/office/officeart/2005/8/layout/process1"/>
-    <dgm:cxn modelId="{81C7B384-6DE4-594F-B553-60CE583DD7A1}" srcId="{82BD223D-4D97-664B-8FA2-F811E68132B9}" destId="{D485B35D-896C-DA49-AEA4-E274D4DDB368}" srcOrd="2" destOrd="0" parTransId="{F00B634A-EC19-AB43-9C55-25F6154F2E01}" sibTransId="{98D865C2-7249-0546-A289-4BA2617820E6}"/>
+    <dgm:cxn modelId="{ECF68DED-B918-1A4D-B28F-3EC8D3653DF8}" type="presOf" srcId="{D485B35D-896C-DA49-AEA4-E274D4DDB368}" destId="{2D682FDA-6E7F-4A43-8A70-4A764CE24742}" srcOrd="0" destOrd="0" presId="urn:microsoft.com/office/officeart/2005/8/layout/process1"/>
     <dgm:cxn modelId="{7DB42488-BE7C-3344-BA7C-7137057D492C}" type="presOf" srcId="{EE7B1B78-2CB7-C647-875E-937A240D7736}" destId="{26BA574D-A9C9-D847-8AAF-A8F48018C2C1}" srcOrd="1" destOrd="0" presId="urn:microsoft.com/office/officeart/2005/8/layout/process1"/>
-    <dgm:cxn modelId="{E2308D9B-C318-7A47-BD25-D5AD8211465F}" type="presOf" srcId="{D96BFFC3-C37B-F740-8CDD-799CDA9C29AF}" destId="{61D01FBA-AE9A-8140-B034-5E107AF8B06D}" srcOrd="0" destOrd="0" presId="urn:microsoft.com/office/officeart/2005/8/layout/process1"/>
-    <dgm:cxn modelId="{626BC39B-8003-7848-BACF-4013CF507C46}" type="presOf" srcId="{EE7B1B78-2CB7-C647-875E-937A240D7736}" destId="{30EAC814-8F64-D74A-9EBA-0CBC6BE058AA}" srcOrd="0" destOrd="0" presId="urn:microsoft.com/office/officeart/2005/8/layout/process1"/>
-    <dgm:cxn modelId="{E198D6D4-91AD-F643-8652-6843F8F235B1}" srcId="{82BD223D-4D97-664B-8FA2-F811E68132B9}" destId="{9E409708-FC7B-604D-AE00-C59A3BC6C774}" srcOrd="0" destOrd="0" parTransId="{AF54B174-D1EC-FF4E-9C8F-E68F41ABE717}" sibTransId="{EE7B1B78-2CB7-C647-875E-937A240D7736}"/>
-    <dgm:cxn modelId="{5365C2D6-3123-7B47-B212-501916D3CA42}" type="presOf" srcId="{82BD223D-4D97-664B-8FA2-F811E68132B9}" destId="{5C4E5A0B-1B12-EC4C-BCB7-F3E190AFE040}" srcOrd="0" destOrd="0" presId="urn:microsoft.com/office/officeart/2005/8/layout/process1"/>
-    <dgm:cxn modelId="{4D13A3EA-2847-3646-8608-9827840068A1}" type="presOf" srcId="{98D865C2-7249-0546-A289-4BA2617820E6}" destId="{17A53E92-4269-D049-A101-E669C1A6D0BA}" srcOrd="1" destOrd="0" presId="urn:microsoft.com/office/officeart/2005/8/layout/process1"/>
-    <dgm:cxn modelId="{ECF68DED-B918-1A4D-B28F-3EC8D3653DF8}" type="presOf" srcId="{D485B35D-896C-DA49-AEA4-E274D4DDB368}" destId="{2D682FDA-6E7F-4A43-8A70-4A764CE24742}" srcOrd="0" destOrd="0" presId="urn:microsoft.com/office/officeart/2005/8/layout/process1"/>
-    <dgm:cxn modelId="{2BCEAEFF-A9FB-5C48-85FF-B123F8BCA8D1}" srcId="{82BD223D-4D97-664B-8FA2-F811E68132B9}" destId="{54AAB197-8266-0B4E-83D2-C0A636856F54}" srcOrd="3" destOrd="0" parTransId="{5B1EBB87-FA02-2E4E-9C97-ED4DD0AE3921}" sibTransId="{EE6869A3-EE4E-D54B-B05E-1DD13DD15896}"/>
     <dgm:cxn modelId="{653116DA-45E0-F740-85EC-9A8B6796BB0F}" type="presParOf" srcId="{5C4E5A0B-1B12-EC4C-BCB7-F3E190AFE040}" destId="{AC19049A-FF2E-864B-A995-C88CCE14464E}" srcOrd="0" destOrd="0" presId="urn:microsoft.com/office/officeart/2005/8/layout/process1"/>
     <dgm:cxn modelId="{4B1C97D8-10DC-0D40-BBE1-E24628D2442F}" type="presParOf" srcId="{5C4E5A0B-1B12-EC4C-BCB7-F3E190AFE040}" destId="{30EAC814-8F64-D74A-9EBA-0CBC6BE058AA}" srcOrd="1" destOrd="0" presId="urn:microsoft.com/office/officeart/2005/8/layout/process1"/>
     <dgm:cxn modelId="{F41F64AF-4C2E-3E47-A2ED-EE018ED6D450}" type="presParOf" srcId="{30EAC814-8F64-D74A-9EBA-0CBC6BE058AA}" destId="{26BA574D-A9C9-D847-8AAF-A8F48018C2C1}" srcOrd="0" destOrd="0" presId="urn:microsoft.com/office/officeart/2005/8/layout/process1"/>
@@ -5778,14 +6037,35 @@
         </dgm:presLayoutVars>
       </dgm:prSet>
       <dgm:spPr/>
+      <dgm:t>
+        <a:bodyPr/>
+        <a:lstStyle/>
+        <a:p>
+          <a:endParaRPr lang="de-DE"/>
+        </a:p>
+      </dgm:t>
     </dgm:pt>
     <dgm:pt modelId="{30EAC814-8F64-D74A-9EBA-0CBC6BE058AA}" type="pres">
       <dgm:prSet presAssocID="{EE7B1B78-2CB7-C647-875E-937A240D7736}" presName="sibTrans" presStyleLbl="sibTrans2D1" presStyleIdx="0" presStyleCnt="1"/>
       <dgm:spPr/>
+      <dgm:t>
+        <a:bodyPr/>
+        <a:lstStyle/>
+        <a:p>
+          <a:endParaRPr lang="de-DE"/>
+        </a:p>
+      </dgm:t>
     </dgm:pt>
     <dgm:pt modelId="{26BA574D-A9C9-D847-8AAF-A8F48018C2C1}" type="pres">
       <dgm:prSet presAssocID="{EE7B1B78-2CB7-C647-875E-937A240D7736}" presName="connectorText" presStyleLbl="sibTrans2D1" presStyleIdx="0" presStyleCnt="1"/>
       <dgm:spPr/>
+      <dgm:t>
+        <a:bodyPr/>
+        <a:lstStyle/>
+        <a:p>
+          <a:endParaRPr lang="de-DE"/>
+        </a:p>
+      </dgm:t>
     </dgm:pt>
     <dgm:pt modelId="{F3798565-47D6-9C41-8AE7-D9D9868DAAE8}" type="pres">
       <dgm:prSet presAssocID="{71D68F48-EF39-0D4B-9727-81BBE7C36DFA}" presName="node" presStyleLbl="node1" presStyleIdx="1" presStyleCnt="2">
@@ -5794,16 +6074,23 @@
         </dgm:presLayoutVars>
       </dgm:prSet>
       <dgm:spPr/>
+      <dgm:t>
+        <a:bodyPr/>
+        <a:lstStyle/>
+        <a:p>
+          <a:endParaRPr lang="de-DE"/>
+        </a:p>
+      </dgm:t>
     </dgm:pt>
   </dgm:ptLst>
   <dgm:cxnLst>
-    <dgm:cxn modelId="{C1FB551E-AA5C-5F42-992A-765D9395B3F3}" type="presOf" srcId="{71D68F48-EF39-0D4B-9727-81BBE7C36DFA}" destId="{F3798565-47D6-9C41-8AE7-D9D9868DAAE8}" srcOrd="0" destOrd="0" presId="urn:microsoft.com/office/officeart/2005/8/layout/process1"/>
+    <dgm:cxn modelId="{3BD5FD7F-ACAD-2444-B596-B7307DC983E4}" type="presOf" srcId="{EE7B1B78-2CB7-C647-875E-937A240D7736}" destId="{30EAC814-8F64-D74A-9EBA-0CBC6BE058AA}" srcOrd="0" destOrd="0" presId="urn:microsoft.com/office/officeart/2005/8/layout/process1"/>
+    <dgm:cxn modelId="{382F1465-D27C-FD49-9140-08DA3B39E4DF}" srcId="{82BD223D-4D97-664B-8FA2-F811E68132B9}" destId="{71D68F48-EF39-0D4B-9727-81BBE7C36DFA}" srcOrd="1" destOrd="0" parTransId="{98EAC6FD-7FB1-F24A-8C95-19E6E4834FF9}" sibTransId="{223C2E35-3AE7-F640-AE72-FAF240D76888}"/>
     <dgm:cxn modelId="{C864D32C-D202-D649-84A6-DF938C126F4D}" type="presOf" srcId="{EE7B1B78-2CB7-C647-875E-937A240D7736}" destId="{26BA574D-A9C9-D847-8AAF-A8F48018C2C1}" srcOrd="1" destOrd="0" presId="urn:microsoft.com/office/officeart/2005/8/layout/process1"/>
-    <dgm:cxn modelId="{382F1465-D27C-FD49-9140-08DA3B39E4DF}" srcId="{82BD223D-4D97-664B-8FA2-F811E68132B9}" destId="{71D68F48-EF39-0D4B-9727-81BBE7C36DFA}" srcOrd="1" destOrd="0" parTransId="{98EAC6FD-7FB1-F24A-8C95-19E6E4834FF9}" sibTransId="{223C2E35-3AE7-F640-AE72-FAF240D76888}"/>
     <dgm:cxn modelId="{2274EC66-D9A7-7D44-A799-6CA5B5A963AC}" type="presOf" srcId="{9E409708-FC7B-604D-AE00-C59A3BC6C774}" destId="{AC19049A-FF2E-864B-A995-C88CCE14464E}" srcOrd="0" destOrd="0" presId="urn:microsoft.com/office/officeart/2005/8/layout/process1"/>
     <dgm:cxn modelId="{A9BCD256-481B-3844-887A-D74D5A833AAF}" type="presOf" srcId="{82BD223D-4D97-664B-8FA2-F811E68132B9}" destId="{5C4E5A0B-1B12-EC4C-BCB7-F3E190AFE040}" srcOrd="0" destOrd="0" presId="urn:microsoft.com/office/officeart/2005/8/layout/process1"/>
-    <dgm:cxn modelId="{3BD5FD7F-ACAD-2444-B596-B7307DC983E4}" type="presOf" srcId="{EE7B1B78-2CB7-C647-875E-937A240D7736}" destId="{30EAC814-8F64-D74A-9EBA-0CBC6BE058AA}" srcOrd="0" destOrd="0" presId="urn:microsoft.com/office/officeart/2005/8/layout/process1"/>
     <dgm:cxn modelId="{E198D6D4-91AD-F643-8652-6843F8F235B1}" srcId="{82BD223D-4D97-664B-8FA2-F811E68132B9}" destId="{9E409708-FC7B-604D-AE00-C59A3BC6C774}" srcOrd="0" destOrd="0" parTransId="{AF54B174-D1EC-FF4E-9C8F-E68F41ABE717}" sibTransId="{EE7B1B78-2CB7-C647-875E-937A240D7736}"/>
+    <dgm:cxn modelId="{C1FB551E-AA5C-5F42-992A-765D9395B3F3}" type="presOf" srcId="{71D68F48-EF39-0D4B-9727-81BBE7C36DFA}" destId="{F3798565-47D6-9C41-8AE7-D9D9868DAAE8}" srcOrd="0" destOrd="0" presId="urn:microsoft.com/office/officeart/2005/8/layout/process1"/>
     <dgm:cxn modelId="{455F0944-5EEE-C143-81E6-A819CE682C15}" type="presParOf" srcId="{5C4E5A0B-1B12-EC4C-BCB7-F3E190AFE040}" destId="{AC19049A-FF2E-864B-A995-C88CCE14464E}" srcOrd="0" destOrd="0" presId="urn:microsoft.com/office/officeart/2005/8/layout/process1"/>
     <dgm:cxn modelId="{165A46C4-BCD6-2C44-8F17-15A217E5C55B}" type="presParOf" srcId="{5C4E5A0B-1B12-EC4C-BCB7-F3E190AFE040}" destId="{30EAC814-8F64-D74A-9EBA-0CBC6BE058AA}" srcOrd="1" destOrd="0" presId="urn:microsoft.com/office/officeart/2005/8/layout/process1"/>
     <dgm:cxn modelId="{74002F84-C358-884D-8F39-FEEBB52F7F4E}" type="presParOf" srcId="{30EAC814-8F64-D74A-9EBA-0CBC6BE058AA}" destId="{26BA574D-A9C9-D847-8AAF-A8F48018C2C1}" srcOrd="0" destOrd="0" presId="urn:microsoft.com/office/officeart/2005/8/layout/process1"/>
@@ -5914,14 +6201,35 @@
         </dgm:presLayoutVars>
       </dgm:prSet>
       <dgm:spPr/>
+      <dgm:t>
+        <a:bodyPr/>
+        <a:lstStyle/>
+        <a:p>
+          <a:endParaRPr lang="de-DE"/>
+        </a:p>
+      </dgm:t>
     </dgm:pt>
     <dgm:pt modelId="{30EAC814-8F64-D74A-9EBA-0CBC6BE058AA}" type="pres">
       <dgm:prSet presAssocID="{EE7B1B78-2CB7-C647-875E-937A240D7736}" presName="sibTrans" presStyleLbl="sibTrans2D1" presStyleIdx="0" presStyleCnt="1"/>
       <dgm:spPr/>
+      <dgm:t>
+        <a:bodyPr/>
+        <a:lstStyle/>
+        <a:p>
+          <a:endParaRPr lang="de-DE"/>
+        </a:p>
+      </dgm:t>
     </dgm:pt>
     <dgm:pt modelId="{26BA574D-A9C9-D847-8AAF-A8F48018C2C1}" type="pres">
       <dgm:prSet presAssocID="{EE7B1B78-2CB7-C647-875E-937A240D7736}" presName="connectorText" presStyleLbl="sibTrans2D1" presStyleIdx="0" presStyleCnt="1"/>
       <dgm:spPr/>
+      <dgm:t>
+        <a:bodyPr/>
+        <a:lstStyle/>
+        <a:p>
+          <a:endParaRPr lang="de-DE"/>
+        </a:p>
+      </dgm:t>
     </dgm:pt>
     <dgm:pt modelId="{942B2FD4-F953-1241-B452-E01505D35646}" type="pres">
       <dgm:prSet presAssocID="{9F5FBEB5-0D91-6442-BAE6-3C8FE451890E}" presName="node" presStyleLbl="node1" presStyleIdx="1" presStyleCnt="2">
@@ -5930,16 +6238,23 @@
         </dgm:presLayoutVars>
       </dgm:prSet>
       <dgm:spPr/>
+      <dgm:t>
+        <a:bodyPr/>
+        <a:lstStyle/>
+        <a:p>
+          <a:endParaRPr lang="de-DE"/>
+        </a:p>
+      </dgm:t>
     </dgm:pt>
   </dgm:ptLst>
   <dgm:cxnLst>
+    <dgm:cxn modelId="{B0721CA3-19A8-D04D-857E-407EB9BC671A}" type="presOf" srcId="{9E409708-FC7B-604D-AE00-C59A3BC6C774}" destId="{AC19049A-FF2E-864B-A995-C88CCE14464E}" srcOrd="0" destOrd="0" presId="urn:microsoft.com/office/officeart/2005/8/layout/process1"/>
     <dgm:cxn modelId="{9AD13F03-FA98-2546-A1F6-086D6D749FC5}" srcId="{82BD223D-4D97-664B-8FA2-F811E68132B9}" destId="{9F5FBEB5-0D91-6442-BAE6-3C8FE451890E}" srcOrd="1" destOrd="0" parTransId="{44185C10-A566-584D-8792-6F8CDA31CFEF}" sibTransId="{D96BFFC3-C37B-F740-8CDD-799CDA9C29AF}"/>
-    <dgm:cxn modelId="{32CD821A-B520-014C-9995-1247839A1615}" type="presOf" srcId="{9F5FBEB5-0D91-6442-BAE6-3C8FE451890E}" destId="{942B2FD4-F953-1241-B452-E01505D35646}" srcOrd="0" destOrd="0" presId="urn:microsoft.com/office/officeart/2005/8/layout/process1"/>
+    <dgm:cxn modelId="{E198D6D4-91AD-F643-8652-6843F8F235B1}" srcId="{82BD223D-4D97-664B-8FA2-F811E68132B9}" destId="{9E409708-FC7B-604D-AE00-C59A3BC6C774}" srcOrd="0" destOrd="0" parTransId="{AF54B174-D1EC-FF4E-9C8F-E68F41ABE717}" sibTransId="{EE7B1B78-2CB7-C647-875E-937A240D7736}"/>
     <dgm:cxn modelId="{E033EC1A-0A6B-414C-BA47-A69CB3DDC2D8}" type="presOf" srcId="{EE7B1B78-2CB7-C647-875E-937A240D7736}" destId="{26BA574D-A9C9-D847-8AAF-A8F48018C2C1}" srcOrd="1" destOrd="0" presId="urn:microsoft.com/office/officeart/2005/8/layout/process1"/>
     <dgm:cxn modelId="{1B0CBD2C-F6A5-BE47-AA25-80FF0DBC223D}" type="presOf" srcId="{82BD223D-4D97-664B-8FA2-F811E68132B9}" destId="{5C4E5A0B-1B12-EC4C-BCB7-F3E190AFE040}" srcOrd="0" destOrd="0" presId="urn:microsoft.com/office/officeart/2005/8/layout/process1"/>
-    <dgm:cxn modelId="{B0721CA3-19A8-D04D-857E-407EB9BC671A}" type="presOf" srcId="{9E409708-FC7B-604D-AE00-C59A3BC6C774}" destId="{AC19049A-FF2E-864B-A995-C88CCE14464E}" srcOrd="0" destOrd="0" presId="urn:microsoft.com/office/officeart/2005/8/layout/process1"/>
     <dgm:cxn modelId="{E6A75DB5-821C-E345-A783-C1FE436C1B5F}" type="presOf" srcId="{EE7B1B78-2CB7-C647-875E-937A240D7736}" destId="{30EAC814-8F64-D74A-9EBA-0CBC6BE058AA}" srcOrd="0" destOrd="0" presId="urn:microsoft.com/office/officeart/2005/8/layout/process1"/>
-    <dgm:cxn modelId="{E198D6D4-91AD-F643-8652-6843F8F235B1}" srcId="{82BD223D-4D97-664B-8FA2-F811E68132B9}" destId="{9E409708-FC7B-604D-AE00-C59A3BC6C774}" srcOrd="0" destOrd="0" parTransId="{AF54B174-D1EC-FF4E-9C8F-E68F41ABE717}" sibTransId="{EE7B1B78-2CB7-C647-875E-937A240D7736}"/>
+    <dgm:cxn modelId="{32CD821A-B520-014C-9995-1247839A1615}" type="presOf" srcId="{9F5FBEB5-0D91-6442-BAE6-3C8FE451890E}" destId="{942B2FD4-F953-1241-B452-E01505D35646}" srcOrd="0" destOrd="0" presId="urn:microsoft.com/office/officeart/2005/8/layout/process1"/>
     <dgm:cxn modelId="{A4352B15-D4C4-FC49-93A5-8ECF0236F8FE}" type="presParOf" srcId="{5C4E5A0B-1B12-EC4C-BCB7-F3E190AFE040}" destId="{AC19049A-FF2E-864B-A995-C88CCE14464E}" srcOrd="0" destOrd="0" presId="urn:microsoft.com/office/officeart/2005/8/layout/process1"/>
     <dgm:cxn modelId="{76B2E135-3E91-D646-96A5-12475035BBCD}" type="presParOf" srcId="{5C4E5A0B-1B12-EC4C-BCB7-F3E190AFE040}" destId="{30EAC814-8F64-D74A-9EBA-0CBC6BE058AA}" srcOrd="1" destOrd="0" presId="urn:microsoft.com/office/officeart/2005/8/layout/process1"/>
     <dgm:cxn modelId="{F19A6B13-7B8B-F549-9914-C9DC6C60AA94}" type="presParOf" srcId="{30EAC814-8F64-D74A-9EBA-0CBC6BE058AA}" destId="{26BA574D-A9C9-D847-8AAF-A8F48018C2C1}" srcOrd="0" destOrd="0" presId="urn:microsoft.com/office/officeart/2005/8/layout/process1"/>
@@ -6044,7 +6359,7 @@
         </a:bodyPr>
         <a:lstStyle/>
         <a:p>
-          <a:pPr marL="0" lvl="0" indent="0" algn="ctr" defTabSz="1689100">
+          <a:pPr lvl="0" algn="ctr" defTabSz="1689100">
             <a:lnSpc>
               <a:spcPct val="90000"/>
             </a:lnSpc>
@@ -6054,7 +6369,6 @@
             <a:spcAft>
               <a:spcPct val="35000"/>
             </a:spcAft>
-            <a:buNone/>
           </a:pPr>
           <a:r>
             <a:rPr lang="de-DE" sz="3800" kern="1200" dirty="0"/>
@@ -6152,7 +6466,7 @@
         </a:bodyPr>
         <a:lstStyle/>
         <a:p>
-          <a:pPr marL="0" lvl="0" indent="0" algn="ctr" defTabSz="1377950">
+          <a:pPr lvl="0" algn="ctr" defTabSz="1377950">
             <a:lnSpc>
               <a:spcPct val="90000"/>
             </a:lnSpc>
@@ -6162,7 +6476,6 @@
             <a:spcAft>
               <a:spcPct val="35000"/>
             </a:spcAft>
-            <a:buNone/>
           </a:pPr>
           <a:endParaRPr lang="de-DE" sz="3100" kern="1200"/>
         </a:p>
@@ -6253,7 +6566,7 @@
         </a:bodyPr>
         <a:lstStyle/>
         <a:p>
-          <a:pPr marL="0" lvl="0" indent="0" algn="ctr" defTabSz="1689100">
+          <a:pPr lvl="0" algn="ctr" defTabSz="1689100">
             <a:lnSpc>
               <a:spcPct val="90000"/>
             </a:lnSpc>
@@ -6263,7 +6576,6 @@
             <a:spcAft>
               <a:spcPct val="35000"/>
             </a:spcAft>
-            <a:buNone/>
           </a:pPr>
           <a:r>
             <a:rPr lang="de-DE" sz="3800" kern="1200" dirty="0"/>
@@ -6361,7 +6673,7 @@
         </a:bodyPr>
         <a:lstStyle/>
         <a:p>
-          <a:pPr marL="0" lvl="0" indent="0" algn="ctr" defTabSz="1377950">
+          <a:pPr lvl="0" algn="ctr" defTabSz="1377950">
             <a:lnSpc>
               <a:spcPct val="90000"/>
             </a:lnSpc>
@@ -6371,7 +6683,6 @@
             <a:spcAft>
               <a:spcPct val="35000"/>
             </a:spcAft>
-            <a:buNone/>
           </a:pPr>
           <a:endParaRPr lang="de-DE" sz="3100" kern="1200"/>
         </a:p>
@@ -6462,7 +6773,7 @@
         </a:bodyPr>
         <a:lstStyle/>
         <a:p>
-          <a:pPr marL="0" lvl="0" indent="0" algn="ctr" defTabSz="1689100">
+          <a:pPr lvl="0" algn="ctr" defTabSz="1689100">
             <a:lnSpc>
               <a:spcPct val="90000"/>
             </a:lnSpc>
@@ -6472,7 +6783,6 @@
             <a:spcAft>
               <a:spcPct val="35000"/>
             </a:spcAft>
-            <a:buNone/>
           </a:pPr>
           <a:r>
             <a:rPr lang="de-DE" sz="3800" kern="1200" dirty="0"/>
@@ -6578,7 +6888,7 @@
         </a:bodyPr>
         <a:lstStyle/>
         <a:p>
-          <a:pPr marL="0" lvl="0" indent="0" algn="ctr" defTabSz="1600200">
+          <a:pPr lvl="0" algn="ctr" defTabSz="1600200">
             <a:lnSpc>
               <a:spcPct val="90000"/>
             </a:lnSpc>
@@ -6588,7 +6898,6 @@
             <a:spcAft>
               <a:spcPct val="35000"/>
             </a:spcAft>
-            <a:buNone/>
           </a:pPr>
           <a:r>
             <a:rPr lang="de-DE" sz="3600" kern="1200" dirty="0"/>
@@ -6694,7 +7003,7 @@
         </a:bodyPr>
         <a:lstStyle/>
         <a:p>
-          <a:pPr marL="0" lvl="0" indent="0" algn="ctr" defTabSz="1289050">
+          <a:pPr lvl="0" algn="ctr" defTabSz="1289050">
             <a:lnSpc>
               <a:spcPct val="90000"/>
             </a:lnSpc>
@@ -6704,7 +7013,6 @@
             <a:spcAft>
               <a:spcPct val="35000"/>
             </a:spcAft>
-            <a:buNone/>
           </a:pPr>
           <a:endParaRPr lang="de-DE" sz="2900" kern="1200"/>
         </a:p>
@@ -6795,7 +7103,7 @@
         </a:bodyPr>
         <a:lstStyle/>
         <a:p>
-          <a:pPr marL="0" lvl="0" indent="0" algn="ctr" defTabSz="1600200">
+          <a:pPr lvl="0" algn="ctr" defTabSz="1600200">
             <a:lnSpc>
               <a:spcPct val="90000"/>
             </a:lnSpc>
@@ -6805,7 +7113,6 @@
             <a:spcAft>
               <a:spcPct val="35000"/>
             </a:spcAft>
-            <a:buNone/>
           </a:pPr>
           <a:r>
             <a:rPr lang="de-DE" sz="3600" kern="1200" dirty="0"/>
@@ -6908,7 +7215,7 @@
         </a:bodyPr>
         <a:lstStyle/>
         <a:p>
-          <a:pPr marL="0" lvl="0" indent="0" algn="ctr" defTabSz="1289050">
+          <a:pPr lvl="0" algn="ctr" defTabSz="1289050">
             <a:lnSpc>
               <a:spcPct val="90000"/>
             </a:lnSpc>
@@ -6918,7 +7225,6 @@
             <a:spcAft>
               <a:spcPct val="35000"/>
             </a:spcAft>
-            <a:buNone/>
           </a:pPr>
           <a:endParaRPr lang="de-DE" sz="2900" kern="1200"/>
         </a:p>
@@ -7009,7 +7315,7 @@
         </a:bodyPr>
         <a:lstStyle/>
         <a:p>
-          <a:pPr marL="0" lvl="0" indent="0" algn="ctr" defTabSz="1600200">
+          <a:pPr lvl="0" algn="ctr" defTabSz="1600200">
             <a:lnSpc>
               <a:spcPct val="90000"/>
             </a:lnSpc>
@@ -7019,7 +7325,6 @@
             <a:spcAft>
               <a:spcPct val="35000"/>
             </a:spcAft>
-            <a:buNone/>
           </a:pPr>
           <a:r>
             <a:rPr lang="de-DE" sz="3600" kern="1200" dirty="0"/>
@@ -7125,7 +7430,7 @@
         </a:bodyPr>
         <a:lstStyle/>
         <a:p>
-          <a:pPr marL="0" lvl="0" indent="0" algn="ctr" defTabSz="844550">
+          <a:pPr lvl="0" algn="ctr" defTabSz="844550">
             <a:lnSpc>
               <a:spcPct val="90000"/>
             </a:lnSpc>
@@ -7135,7 +7440,6 @@
             <a:spcAft>
               <a:spcPct val="35000"/>
             </a:spcAft>
-            <a:buNone/>
           </a:pPr>
           <a:r>
             <a:rPr lang="de-DE" sz="1900" kern="1200" dirty="0"/>
@@ -7241,7 +7545,7 @@
         </a:bodyPr>
         <a:lstStyle/>
         <a:p>
-          <a:pPr marL="0" lvl="0" indent="0" algn="ctr" defTabSz="711200">
+          <a:pPr lvl="0" algn="ctr" defTabSz="711200">
             <a:lnSpc>
               <a:spcPct val="90000"/>
             </a:lnSpc>
@@ -7251,7 +7555,6 @@
             <a:spcAft>
               <a:spcPct val="35000"/>
             </a:spcAft>
-            <a:buNone/>
           </a:pPr>
           <a:endParaRPr lang="de-DE" sz="1600" kern="1200"/>
         </a:p>
@@ -7342,7 +7645,7 @@
         </a:bodyPr>
         <a:lstStyle/>
         <a:p>
-          <a:pPr marL="0" lvl="0" indent="0" algn="ctr" defTabSz="844550">
+          <a:pPr lvl="0" algn="ctr" defTabSz="844550">
             <a:lnSpc>
               <a:spcPct val="90000"/>
             </a:lnSpc>
@@ -7352,7 +7655,6 @@
             <a:spcAft>
               <a:spcPct val="35000"/>
             </a:spcAft>
-            <a:buNone/>
           </a:pPr>
           <a:r>
             <a:rPr lang="de-DE" sz="1900" kern="1200" dirty="0"/>
@@ -7450,7 +7752,7 @@
         </a:bodyPr>
         <a:lstStyle/>
         <a:p>
-          <a:pPr marL="0" lvl="0" indent="0" algn="ctr" defTabSz="711200">
+          <a:pPr lvl="0" algn="ctr" defTabSz="711200">
             <a:lnSpc>
               <a:spcPct val="90000"/>
             </a:lnSpc>
@@ -7460,7 +7762,6 @@
             <a:spcAft>
               <a:spcPct val="35000"/>
             </a:spcAft>
-            <a:buNone/>
           </a:pPr>
           <a:endParaRPr lang="de-DE" sz="1600" kern="1200"/>
         </a:p>
@@ -7551,7 +7852,7 @@
         </a:bodyPr>
         <a:lstStyle/>
         <a:p>
-          <a:pPr marL="0" lvl="0" indent="0" algn="ctr" defTabSz="844550">
+          <a:pPr lvl="0" algn="ctr" defTabSz="844550">
             <a:lnSpc>
               <a:spcPct val="90000"/>
             </a:lnSpc>
@@ -7561,7 +7862,6 @@
             <a:spcAft>
               <a:spcPct val="35000"/>
             </a:spcAft>
-            <a:buNone/>
           </a:pPr>
           <a:r>
             <a:rPr lang="de-DE" sz="1900" kern="1200" dirty="0"/>
@@ -7667,7 +7967,7 @@
         </a:bodyPr>
         <a:lstStyle/>
         <a:p>
-          <a:pPr marL="0" lvl="0" indent="0" algn="ctr" defTabSz="711200">
+          <a:pPr lvl="0" algn="ctr" defTabSz="711200">
             <a:lnSpc>
               <a:spcPct val="90000"/>
             </a:lnSpc>
@@ -7677,7 +7977,6 @@
             <a:spcAft>
               <a:spcPct val="35000"/>
             </a:spcAft>
-            <a:buNone/>
           </a:pPr>
           <a:endParaRPr lang="de-DE" sz="1600" kern="1200"/>
         </a:p>
@@ -7768,7 +8067,7 @@
         </a:bodyPr>
         <a:lstStyle/>
         <a:p>
-          <a:pPr marL="0" lvl="0" indent="0" algn="ctr" defTabSz="844550">
+          <a:pPr lvl="0" algn="ctr" defTabSz="844550">
             <a:lnSpc>
               <a:spcPct val="90000"/>
             </a:lnSpc>
@@ -7778,7 +8077,6 @@
             <a:spcAft>
               <a:spcPct val="35000"/>
             </a:spcAft>
-            <a:buNone/>
           </a:pPr>
           <a:r>
             <a:rPr lang="de-DE" sz="1900" kern="1200" dirty="0"/>
@@ -7884,7 +8182,7 @@
         </a:bodyPr>
         <a:lstStyle/>
         <a:p>
-          <a:pPr marL="0" lvl="0" indent="0" algn="ctr" defTabSz="711200">
+          <a:pPr lvl="0" algn="ctr" defTabSz="711200">
             <a:lnSpc>
               <a:spcPct val="90000"/>
             </a:lnSpc>
@@ -7894,7 +8192,6 @@
             <a:spcAft>
               <a:spcPct val="35000"/>
             </a:spcAft>
-            <a:buNone/>
           </a:pPr>
           <a:endParaRPr lang="de-DE" sz="1600" kern="1200"/>
         </a:p>
@@ -7985,7 +8282,7 @@
         </a:bodyPr>
         <a:lstStyle/>
         <a:p>
-          <a:pPr marL="0" lvl="0" indent="0" algn="ctr" defTabSz="844550">
+          <a:pPr lvl="0" algn="ctr" defTabSz="844550">
             <a:lnSpc>
               <a:spcPct val="90000"/>
             </a:lnSpc>
@@ -7995,7 +8292,6 @@
             <a:spcAft>
               <a:spcPct val="35000"/>
             </a:spcAft>
-            <a:buNone/>
           </a:pPr>
           <a:r>
             <a:rPr lang="de-DE" sz="1900" kern="1200" dirty="0"/>
@@ -8106,7 +8402,7 @@
         </a:bodyPr>
         <a:lstStyle/>
         <a:p>
-          <a:pPr marL="0" lvl="0" indent="0" algn="ctr" defTabSz="1155700">
+          <a:pPr lvl="0" algn="ctr" defTabSz="1155700">
             <a:lnSpc>
               <a:spcPct val="90000"/>
             </a:lnSpc>
@@ -8116,7 +8412,6 @@
             <a:spcAft>
               <a:spcPct val="35000"/>
             </a:spcAft>
-            <a:buNone/>
           </a:pPr>
           <a:r>
             <a:rPr lang="de-DE" sz="2600" kern="1200" dirty="0"/>
@@ -8222,7 +8517,7 @@
         </a:bodyPr>
         <a:lstStyle/>
         <a:p>
-          <a:pPr marL="0" lvl="0" indent="0" algn="ctr" defTabSz="933450">
+          <a:pPr lvl="0" algn="ctr" defTabSz="933450">
             <a:lnSpc>
               <a:spcPct val="90000"/>
             </a:lnSpc>
@@ -8232,7 +8527,6 @@
             <a:spcAft>
               <a:spcPct val="35000"/>
             </a:spcAft>
-            <a:buNone/>
           </a:pPr>
           <a:endParaRPr lang="de-DE" sz="2100" kern="1200"/>
         </a:p>
@@ -8323,7 +8617,7 @@
         </a:bodyPr>
         <a:lstStyle/>
         <a:p>
-          <a:pPr marL="0" lvl="0" indent="0" algn="ctr" defTabSz="1155700">
+          <a:pPr lvl="0" algn="ctr" defTabSz="1155700">
             <a:lnSpc>
               <a:spcPct val="90000"/>
             </a:lnSpc>
@@ -8333,7 +8627,6 @@
             <a:spcAft>
               <a:spcPct val="35000"/>
             </a:spcAft>
-            <a:buNone/>
           </a:pPr>
           <a:r>
             <a:rPr lang="de-DE" sz="2600" kern="1200" dirty="0"/>
@@ -8431,7 +8724,7 @@
         </a:bodyPr>
         <a:lstStyle/>
         <a:p>
-          <a:pPr marL="0" lvl="0" indent="0" algn="ctr" defTabSz="933450">
+          <a:pPr lvl="0" algn="ctr" defTabSz="933450">
             <a:lnSpc>
               <a:spcPct val="90000"/>
             </a:lnSpc>
@@ -8441,7 +8734,6 @@
             <a:spcAft>
               <a:spcPct val="35000"/>
             </a:spcAft>
-            <a:buNone/>
           </a:pPr>
           <a:endParaRPr lang="de-DE" sz="2100" kern="1200"/>
         </a:p>
@@ -8532,7 +8824,7 @@
         </a:bodyPr>
         <a:lstStyle/>
         <a:p>
-          <a:pPr marL="0" lvl="0" indent="0" algn="ctr" defTabSz="1155700">
+          <a:pPr lvl="0" algn="ctr" defTabSz="1155700">
             <a:lnSpc>
               <a:spcPct val="90000"/>
             </a:lnSpc>
@@ -8542,7 +8834,6 @@
             <a:spcAft>
               <a:spcPct val="35000"/>
             </a:spcAft>
-            <a:buNone/>
           </a:pPr>
           <a:r>
             <a:rPr lang="de-DE" sz="2600" kern="1200" dirty="0"/>
@@ -8640,7 +8931,7 @@
         </a:bodyPr>
         <a:lstStyle/>
         <a:p>
-          <a:pPr marL="0" lvl="0" indent="0" algn="ctr" defTabSz="933450">
+          <a:pPr lvl="0" algn="ctr" defTabSz="933450">
             <a:lnSpc>
               <a:spcPct val="90000"/>
             </a:lnSpc>
@@ -8650,7 +8941,6 @@
             <a:spcAft>
               <a:spcPct val="35000"/>
             </a:spcAft>
-            <a:buNone/>
           </a:pPr>
           <a:endParaRPr lang="de-DE" sz="2100" kern="1200"/>
         </a:p>
@@ -8741,7 +9031,7 @@
         </a:bodyPr>
         <a:lstStyle/>
         <a:p>
-          <a:pPr marL="0" lvl="0" indent="0" algn="ctr" defTabSz="1155700">
+          <a:pPr lvl="0" algn="ctr" defTabSz="1155700">
             <a:lnSpc>
               <a:spcPct val="90000"/>
             </a:lnSpc>
@@ -8751,7 +9041,6 @@
             <a:spcAft>
               <a:spcPct val="35000"/>
             </a:spcAft>
-            <a:buNone/>
           </a:pPr>
           <a:r>
             <a:rPr lang="de-DE" sz="2600" kern="1200" dirty="0"/>
@@ -8857,7 +9146,7 @@
         </a:bodyPr>
         <a:lstStyle/>
         <a:p>
-          <a:pPr marL="0" lvl="0" indent="0" algn="ctr" defTabSz="2755900">
+          <a:pPr lvl="0" algn="ctr" defTabSz="2755900">
             <a:lnSpc>
               <a:spcPct val="90000"/>
             </a:lnSpc>
@@ -8867,7 +9156,6 @@
             <a:spcAft>
               <a:spcPct val="35000"/>
             </a:spcAft>
-            <a:buNone/>
           </a:pPr>
           <a:r>
             <a:rPr lang="de-DE" sz="6200" kern="1200" dirty="0"/>
@@ -8965,7 +9253,7 @@
         </a:bodyPr>
         <a:lstStyle/>
         <a:p>
-          <a:pPr marL="0" lvl="0" indent="0" algn="ctr" defTabSz="2222500">
+          <a:pPr lvl="0" algn="ctr" defTabSz="2222500">
             <a:lnSpc>
               <a:spcPct val="90000"/>
             </a:lnSpc>
@@ -8975,7 +9263,6 @@
             <a:spcAft>
               <a:spcPct val="35000"/>
             </a:spcAft>
-            <a:buNone/>
           </a:pPr>
           <a:endParaRPr lang="de-DE" sz="5000" kern="1200"/>
         </a:p>
@@ -9066,7 +9353,7 @@
         </a:bodyPr>
         <a:lstStyle/>
         <a:p>
-          <a:pPr marL="0" lvl="0" indent="0" algn="ctr" defTabSz="2755900">
+          <a:pPr lvl="0" algn="ctr" defTabSz="2755900">
             <a:lnSpc>
               <a:spcPct val="90000"/>
             </a:lnSpc>
@@ -9076,7 +9363,6 @@
             <a:spcAft>
               <a:spcPct val="35000"/>
             </a:spcAft>
-            <a:buNone/>
           </a:pPr>
           <a:r>
             <a:rPr lang="de-DE" sz="6200" kern="1200" dirty="0"/>
@@ -9182,7 +9468,7 @@
         </a:bodyPr>
         <a:lstStyle/>
         <a:p>
-          <a:pPr marL="0" lvl="0" indent="0" algn="ctr" defTabSz="2889250">
+          <a:pPr lvl="0" algn="ctr" defTabSz="2889250">
             <a:lnSpc>
               <a:spcPct val="90000"/>
             </a:lnSpc>
@@ -9192,7 +9478,6 @@
             <a:spcAft>
               <a:spcPct val="35000"/>
             </a:spcAft>
-            <a:buNone/>
           </a:pPr>
           <a:r>
             <a:rPr lang="de-DE" sz="6500" kern="1200" dirty="0"/>
@@ -9290,7 +9575,7 @@
         </a:bodyPr>
         <a:lstStyle/>
         <a:p>
-          <a:pPr marL="0" lvl="0" indent="0" algn="ctr" defTabSz="2400300">
+          <a:pPr lvl="0" algn="ctr" defTabSz="2400300">
             <a:lnSpc>
               <a:spcPct val="90000"/>
             </a:lnSpc>
@@ -9300,7 +9585,6 @@
             <a:spcAft>
               <a:spcPct val="35000"/>
             </a:spcAft>
-            <a:buNone/>
           </a:pPr>
           <a:endParaRPr lang="de-DE" sz="5400" kern="1200"/>
         </a:p>
@@ -9391,7 +9675,7 @@
         </a:bodyPr>
         <a:lstStyle/>
         <a:p>
-          <a:pPr marL="0" lvl="0" indent="0" algn="ctr" defTabSz="2889250">
+          <a:pPr lvl="0" algn="ctr" defTabSz="2889250">
             <a:lnSpc>
               <a:spcPct val="90000"/>
             </a:lnSpc>
@@ -9401,7 +9685,6 @@
             <a:spcAft>
               <a:spcPct val="35000"/>
             </a:spcAft>
-            <a:buNone/>
           </a:pPr>
           <a:r>
             <a:rPr lang="de-DE" sz="6500" kern="1200" dirty="0"/>
@@ -16585,7 +16868,7 @@
                 <a:latin typeface="Segoe UI" pitchFamily="34" charset="0"/>
               </a:rPr>
               <a:pPr/>
-              <a:t>19.10.2017</a:t>
+              <a:t>19.10.17</a:t>
             </a:fld>
             <a:endParaRPr lang="de-DE" dirty="0">
               <a:latin typeface="Segoe UI" pitchFamily="34" charset="0"/>
@@ -16764,7 +17047,7 @@
             <a:fld id="{D2E1CCC5-01B8-284F-B77B-84D835A7601B}" type="datetimeFigureOut">
               <a:rPr lang="de-DE" smtClean="0"/>
               <a:pPr/>
-              <a:t>19.10.2017</a:t>
+              <a:t>19.10.17</a:t>
             </a:fld>
             <a:endParaRPr lang="de-DE" dirty="0"/>
           </a:p>
@@ -19316,7 +19599,7 @@
           <a:noFill/>
           <a:extLst>
             <a:ext uri="{909E8E84-426E-40dd-AFC4-6F175D3DCCD1}">
-              <a14:hiddenFill xmlns="" xmlns:a14="http://schemas.microsoft.com/office/drawing/2010/main">
+              <a14:hiddenFill xmlns:a14="http://schemas.microsoft.com/office/drawing/2010/main" xmlns="">
                 <a:solidFill>
                   <a:srgbClr val="FFFFFF"/>
                 </a:solidFill>
@@ -19516,7 +19799,7 @@
           <p:cNvPr id="2" name="Datumsplatzhalter 1">
             <a:extLst>
               <a:ext uri="{FF2B5EF4-FFF2-40B4-BE49-F238E27FC236}">
-                <a16:creationId xmlns:a16="http://schemas.microsoft.com/office/drawing/2014/main" id="{0EE9CECA-FE53-4E0D-AD22-D4AB49ECF809}"/>
+                <a16:creationId xmlns:a16="http://schemas.microsoft.com/office/drawing/2014/main" xmlns="" id="{0EE9CECA-FE53-4E0D-AD22-D4AB49ECF809}"/>
               </a:ext>
             </a:extLst>
           </p:cNvPr>
@@ -19535,7 +19818,7 @@
             <a:fld id="{17C2562E-359A-3C42-BBEF-E02CE97BECB1}" type="datetimeFigureOut">
               <a:rPr lang="de-DE" smtClean="0"/>
               <a:pPr/>
-              <a:t>19.10.2017</a:t>
+              <a:t>19.10.17</a:t>
             </a:fld>
             <a:endParaRPr lang="de-DE" dirty="0"/>
           </a:p>
@@ -19546,7 +19829,7 @@
           <p:cNvPr id="7" name="Fußzeilenplatzhalter 6">
             <a:extLst>
               <a:ext uri="{FF2B5EF4-FFF2-40B4-BE49-F238E27FC236}">
-                <a16:creationId xmlns:a16="http://schemas.microsoft.com/office/drawing/2014/main" id="{C07A299E-41A7-4A08-81FA-6FBA6806F0A5}"/>
+                <a16:creationId xmlns:a16="http://schemas.microsoft.com/office/drawing/2014/main" xmlns="" id="{C07A299E-41A7-4A08-81FA-6FBA6806F0A5}"/>
               </a:ext>
             </a:extLst>
           </p:cNvPr>
@@ -19571,7 +19854,7 @@
           <p:cNvPr id="8" name="Foliennummernplatzhalter 7">
             <a:extLst>
               <a:ext uri="{FF2B5EF4-FFF2-40B4-BE49-F238E27FC236}">
-                <a16:creationId xmlns:a16="http://schemas.microsoft.com/office/drawing/2014/main" id="{9151A28C-FF21-4CC9-B28E-CF780807FE34}"/>
+                <a16:creationId xmlns:a16="http://schemas.microsoft.com/office/drawing/2014/main" xmlns="" id="{9151A28C-FF21-4CC9-B28E-CF780807FE34}"/>
               </a:ext>
             </a:extLst>
           </p:cNvPr>
@@ -19826,7 +20109,7 @@
           <p:cNvPr id="3" name="Datumsplatzhalter 2">
             <a:extLst>
               <a:ext uri="{FF2B5EF4-FFF2-40B4-BE49-F238E27FC236}">
-                <a16:creationId xmlns:a16="http://schemas.microsoft.com/office/drawing/2014/main" id="{3D332A91-9158-4543-9295-8484F133E109}"/>
+                <a16:creationId xmlns:a16="http://schemas.microsoft.com/office/drawing/2014/main" xmlns="" id="{3D332A91-9158-4543-9295-8484F133E109}"/>
               </a:ext>
             </a:extLst>
           </p:cNvPr>
@@ -19845,7 +20128,7 @@
             <a:fld id="{17C2562E-359A-3C42-BBEF-E02CE97BECB1}" type="datetimeFigureOut">
               <a:rPr lang="de-DE" smtClean="0"/>
               <a:pPr/>
-              <a:t>19.10.2017</a:t>
+              <a:t>19.10.17</a:t>
             </a:fld>
             <a:endParaRPr lang="de-DE" dirty="0"/>
           </a:p>
@@ -19856,7 +20139,7 @@
           <p:cNvPr id="7" name="Fußzeilenplatzhalter 6">
             <a:extLst>
               <a:ext uri="{FF2B5EF4-FFF2-40B4-BE49-F238E27FC236}">
-                <a16:creationId xmlns:a16="http://schemas.microsoft.com/office/drawing/2014/main" id="{C426E4CE-7F9D-4A7E-A795-EDD7185E3A7A}"/>
+                <a16:creationId xmlns:a16="http://schemas.microsoft.com/office/drawing/2014/main" xmlns="" id="{C426E4CE-7F9D-4A7E-A795-EDD7185E3A7A}"/>
               </a:ext>
             </a:extLst>
           </p:cNvPr>
@@ -19881,7 +20164,7 @@
           <p:cNvPr id="8" name="Foliennummernplatzhalter 7">
             <a:extLst>
               <a:ext uri="{FF2B5EF4-FFF2-40B4-BE49-F238E27FC236}">
-                <a16:creationId xmlns:a16="http://schemas.microsoft.com/office/drawing/2014/main" id="{73459CEF-058C-4C7D-9907-D7A5E4B23A28}"/>
+                <a16:creationId xmlns:a16="http://schemas.microsoft.com/office/drawing/2014/main" xmlns="" id="{73459CEF-058C-4C7D-9907-D7A5E4B23A28}"/>
               </a:ext>
             </a:extLst>
           </p:cNvPr>
@@ -20129,7 +20412,7 @@
           <p:cNvPr id="2" name="Datumsplatzhalter 1">
             <a:extLst>
               <a:ext uri="{FF2B5EF4-FFF2-40B4-BE49-F238E27FC236}">
-                <a16:creationId xmlns:a16="http://schemas.microsoft.com/office/drawing/2014/main" id="{64A9B900-82AE-4D1E-B11E-155C1B825004}"/>
+                <a16:creationId xmlns:a16="http://schemas.microsoft.com/office/drawing/2014/main" xmlns="" id="{64A9B900-82AE-4D1E-B11E-155C1B825004}"/>
               </a:ext>
             </a:extLst>
           </p:cNvPr>
@@ -20148,7 +20431,7 @@
             <a:fld id="{17C2562E-359A-3C42-BBEF-E02CE97BECB1}" type="datetimeFigureOut">
               <a:rPr lang="de-DE" smtClean="0"/>
               <a:pPr/>
-              <a:t>19.10.2017</a:t>
+              <a:t>19.10.17</a:t>
             </a:fld>
             <a:endParaRPr lang="de-DE" dirty="0"/>
           </a:p>
@@ -20159,7 +20442,7 @@
           <p:cNvPr id="7" name="Fußzeilenplatzhalter 6">
             <a:extLst>
               <a:ext uri="{FF2B5EF4-FFF2-40B4-BE49-F238E27FC236}">
-                <a16:creationId xmlns:a16="http://schemas.microsoft.com/office/drawing/2014/main" id="{41953AE8-A571-4BCE-AF9C-CC7A649DD8C5}"/>
+                <a16:creationId xmlns:a16="http://schemas.microsoft.com/office/drawing/2014/main" xmlns="" id="{41953AE8-A571-4BCE-AF9C-CC7A649DD8C5}"/>
               </a:ext>
             </a:extLst>
           </p:cNvPr>
@@ -20184,7 +20467,7 @@
           <p:cNvPr id="8" name="Foliennummernplatzhalter 7">
             <a:extLst>
               <a:ext uri="{FF2B5EF4-FFF2-40B4-BE49-F238E27FC236}">
-                <a16:creationId xmlns:a16="http://schemas.microsoft.com/office/drawing/2014/main" id="{6DCAD949-98D9-4F76-BE67-6629B37422CB}"/>
+                <a16:creationId xmlns:a16="http://schemas.microsoft.com/office/drawing/2014/main" xmlns="" id="{6DCAD949-98D9-4F76-BE67-6629B37422CB}"/>
               </a:ext>
             </a:extLst>
           </p:cNvPr>
@@ -20285,7 +20568,7 @@
           <p:cNvPr id="2" name="Datumsplatzhalter 1">
             <a:extLst>
               <a:ext uri="{FF2B5EF4-FFF2-40B4-BE49-F238E27FC236}">
-                <a16:creationId xmlns:a16="http://schemas.microsoft.com/office/drawing/2014/main" id="{0F48F7B5-AF2D-4886-B660-ACFD0F3CA06C}"/>
+                <a16:creationId xmlns:a16="http://schemas.microsoft.com/office/drawing/2014/main" xmlns="" id="{0F48F7B5-AF2D-4886-B660-ACFD0F3CA06C}"/>
               </a:ext>
             </a:extLst>
           </p:cNvPr>
@@ -20304,7 +20587,7 @@
             <a:fld id="{17C2562E-359A-3C42-BBEF-E02CE97BECB1}" type="datetimeFigureOut">
               <a:rPr lang="de-DE" smtClean="0"/>
               <a:pPr/>
-              <a:t>19.10.2017</a:t>
+              <a:t>19.10.17</a:t>
             </a:fld>
             <a:endParaRPr lang="de-DE" dirty="0"/>
           </a:p>
@@ -20315,7 +20598,7 @@
           <p:cNvPr id="7" name="Fußzeilenplatzhalter 6">
             <a:extLst>
               <a:ext uri="{FF2B5EF4-FFF2-40B4-BE49-F238E27FC236}">
-                <a16:creationId xmlns:a16="http://schemas.microsoft.com/office/drawing/2014/main" id="{C01D3F89-6DF4-4DC1-ABFC-4B69E0299624}"/>
+                <a16:creationId xmlns:a16="http://schemas.microsoft.com/office/drawing/2014/main" xmlns="" id="{C01D3F89-6DF4-4DC1-ABFC-4B69E0299624}"/>
               </a:ext>
             </a:extLst>
           </p:cNvPr>
@@ -20340,7 +20623,7 @@
           <p:cNvPr id="8" name="Foliennummernplatzhalter 7">
             <a:extLst>
               <a:ext uri="{FF2B5EF4-FFF2-40B4-BE49-F238E27FC236}">
-                <a16:creationId xmlns:a16="http://schemas.microsoft.com/office/drawing/2014/main" id="{BFD42FBE-0754-4285-A3CE-566D22A33C59}"/>
+                <a16:creationId xmlns:a16="http://schemas.microsoft.com/office/drawing/2014/main" xmlns="" id="{BFD42FBE-0754-4285-A3CE-566D22A33C59}"/>
               </a:ext>
             </a:extLst>
           </p:cNvPr>
@@ -20581,7 +20864,7 @@
           <p:cNvPr id="3" name="Datumsplatzhalter 2">
             <a:extLst>
               <a:ext uri="{FF2B5EF4-FFF2-40B4-BE49-F238E27FC236}">
-                <a16:creationId xmlns:a16="http://schemas.microsoft.com/office/drawing/2014/main" id="{434AC82E-1F55-4D6D-B12A-7355E3927B04}"/>
+                <a16:creationId xmlns:a16="http://schemas.microsoft.com/office/drawing/2014/main" xmlns="" id="{434AC82E-1F55-4D6D-B12A-7355E3927B04}"/>
               </a:ext>
             </a:extLst>
           </p:cNvPr>
@@ -20600,7 +20883,7 @@
             <a:fld id="{17C2562E-359A-3C42-BBEF-E02CE97BECB1}" type="datetimeFigureOut">
               <a:rPr lang="de-DE" smtClean="0"/>
               <a:pPr/>
-              <a:t>19.10.2017</a:t>
+              <a:t>19.10.17</a:t>
             </a:fld>
             <a:endParaRPr lang="de-DE" dirty="0"/>
           </a:p>
@@ -20611,7 +20894,7 @@
           <p:cNvPr id="7" name="Fußzeilenplatzhalter 6">
             <a:extLst>
               <a:ext uri="{FF2B5EF4-FFF2-40B4-BE49-F238E27FC236}">
-                <a16:creationId xmlns:a16="http://schemas.microsoft.com/office/drawing/2014/main" id="{95F90759-2A54-4A06-B304-DFA3C45AF309}"/>
+                <a16:creationId xmlns:a16="http://schemas.microsoft.com/office/drawing/2014/main" xmlns="" id="{95F90759-2A54-4A06-B304-DFA3C45AF309}"/>
               </a:ext>
             </a:extLst>
           </p:cNvPr>
@@ -20636,7 +20919,7 @@
           <p:cNvPr id="8" name="Foliennummernplatzhalter 7">
             <a:extLst>
               <a:ext uri="{FF2B5EF4-FFF2-40B4-BE49-F238E27FC236}">
-                <a16:creationId xmlns:a16="http://schemas.microsoft.com/office/drawing/2014/main" id="{AAA489C6-E63E-4078-89A4-7CC1709D7206}"/>
+                <a16:creationId xmlns:a16="http://schemas.microsoft.com/office/drawing/2014/main" xmlns="" id="{AAA489C6-E63E-4078-89A4-7CC1709D7206}"/>
               </a:ext>
             </a:extLst>
           </p:cNvPr>
@@ -20918,7 +21201,7 @@
           <p:cNvPr id="3" name="Datumsplatzhalter 2">
             <a:extLst>
               <a:ext uri="{FF2B5EF4-FFF2-40B4-BE49-F238E27FC236}">
-                <a16:creationId xmlns:a16="http://schemas.microsoft.com/office/drawing/2014/main" id="{24A5A6B0-652D-48FC-AF73-17BD8D217D8E}"/>
+                <a16:creationId xmlns:a16="http://schemas.microsoft.com/office/drawing/2014/main" xmlns="" id="{24A5A6B0-652D-48FC-AF73-17BD8D217D8E}"/>
               </a:ext>
             </a:extLst>
           </p:cNvPr>
@@ -20937,7 +21220,7 @@
             <a:fld id="{17C2562E-359A-3C42-BBEF-E02CE97BECB1}" type="datetimeFigureOut">
               <a:rPr lang="de-DE" smtClean="0"/>
               <a:pPr/>
-              <a:t>19.10.2017</a:t>
+              <a:t>19.10.17</a:t>
             </a:fld>
             <a:endParaRPr lang="de-DE" dirty="0"/>
           </a:p>
@@ -20948,7 +21231,7 @@
           <p:cNvPr id="7" name="Fußzeilenplatzhalter 6">
             <a:extLst>
               <a:ext uri="{FF2B5EF4-FFF2-40B4-BE49-F238E27FC236}">
-                <a16:creationId xmlns:a16="http://schemas.microsoft.com/office/drawing/2014/main" id="{239BA7E1-F103-432E-BC27-0127D2228DA4}"/>
+                <a16:creationId xmlns:a16="http://schemas.microsoft.com/office/drawing/2014/main" xmlns="" id="{239BA7E1-F103-432E-BC27-0127D2228DA4}"/>
               </a:ext>
             </a:extLst>
           </p:cNvPr>
@@ -20973,7 +21256,7 @@
           <p:cNvPr id="9" name="Foliennummernplatzhalter 8">
             <a:extLst>
               <a:ext uri="{FF2B5EF4-FFF2-40B4-BE49-F238E27FC236}">
-                <a16:creationId xmlns:a16="http://schemas.microsoft.com/office/drawing/2014/main" id="{E398A7F9-A765-46A7-B1D7-8FF6247ED6E8}"/>
+                <a16:creationId xmlns:a16="http://schemas.microsoft.com/office/drawing/2014/main" xmlns="" id="{E398A7F9-A765-46A7-B1D7-8FF6247ED6E8}"/>
               </a:ext>
             </a:extLst>
           </p:cNvPr>
@@ -21394,7 +21677,7 @@
           <p:cNvPr id="3" name="Datumsplatzhalter 2">
             <a:extLst>
               <a:ext uri="{FF2B5EF4-FFF2-40B4-BE49-F238E27FC236}">
-                <a16:creationId xmlns:a16="http://schemas.microsoft.com/office/drawing/2014/main" id="{E251BDE8-F6CD-4379-B02C-D58055E91CB7}"/>
+                <a16:creationId xmlns:a16="http://schemas.microsoft.com/office/drawing/2014/main" xmlns="" id="{E251BDE8-F6CD-4379-B02C-D58055E91CB7}"/>
               </a:ext>
             </a:extLst>
           </p:cNvPr>
@@ -21413,7 +21696,7 @@
             <a:fld id="{17C2562E-359A-3C42-BBEF-E02CE97BECB1}" type="datetimeFigureOut">
               <a:rPr lang="de-DE" smtClean="0"/>
               <a:pPr/>
-              <a:t>19.10.2017</a:t>
+              <a:t>19.10.17</a:t>
             </a:fld>
             <a:endParaRPr lang="de-DE" dirty="0"/>
           </a:p>
@@ -21424,7 +21707,7 @@
           <p:cNvPr id="7" name="Fußzeilenplatzhalter 6">
             <a:extLst>
               <a:ext uri="{FF2B5EF4-FFF2-40B4-BE49-F238E27FC236}">
-                <a16:creationId xmlns:a16="http://schemas.microsoft.com/office/drawing/2014/main" id="{F684EDD4-7234-4CF4-A5B8-FCC6419FE199}"/>
+                <a16:creationId xmlns:a16="http://schemas.microsoft.com/office/drawing/2014/main" xmlns="" id="{F684EDD4-7234-4CF4-A5B8-FCC6419FE199}"/>
               </a:ext>
             </a:extLst>
           </p:cNvPr>
@@ -21449,7 +21732,7 @@
           <p:cNvPr id="8" name="Foliennummernplatzhalter 7">
             <a:extLst>
               <a:ext uri="{FF2B5EF4-FFF2-40B4-BE49-F238E27FC236}">
-                <a16:creationId xmlns:a16="http://schemas.microsoft.com/office/drawing/2014/main" id="{81EB7AF2-AEA0-439E-B5DA-DF760778341F}"/>
+                <a16:creationId xmlns:a16="http://schemas.microsoft.com/office/drawing/2014/main" xmlns="" id="{81EB7AF2-AEA0-439E-B5DA-DF760778341F}"/>
               </a:ext>
             </a:extLst>
           </p:cNvPr>
@@ -21777,7 +22060,7 @@
           <p:cNvPr id="3" name="Datumsplatzhalter 2">
             <a:extLst>
               <a:ext uri="{FF2B5EF4-FFF2-40B4-BE49-F238E27FC236}">
-                <a16:creationId xmlns:a16="http://schemas.microsoft.com/office/drawing/2014/main" id="{C2E5ECD2-BEB5-47D1-A89E-69496048A8D5}"/>
+                <a16:creationId xmlns:a16="http://schemas.microsoft.com/office/drawing/2014/main" xmlns="" id="{C2E5ECD2-BEB5-47D1-A89E-69496048A8D5}"/>
               </a:ext>
             </a:extLst>
           </p:cNvPr>
@@ -21796,7 +22079,7 @@
             <a:fld id="{17C2562E-359A-3C42-BBEF-E02CE97BECB1}" type="datetimeFigureOut">
               <a:rPr lang="de-DE" smtClean="0"/>
               <a:pPr/>
-              <a:t>19.10.2017</a:t>
+              <a:t>19.10.17</a:t>
             </a:fld>
             <a:endParaRPr lang="de-DE" dirty="0"/>
           </a:p>
@@ -21807,7 +22090,7 @@
           <p:cNvPr id="7" name="Fußzeilenplatzhalter 6">
             <a:extLst>
               <a:ext uri="{FF2B5EF4-FFF2-40B4-BE49-F238E27FC236}">
-                <a16:creationId xmlns:a16="http://schemas.microsoft.com/office/drawing/2014/main" id="{8DADA64D-3A7A-4438-9197-BD2830657223}"/>
+                <a16:creationId xmlns:a16="http://schemas.microsoft.com/office/drawing/2014/main" xmlns="" id="{8DADA64D-3A7A-4438-9197-BD2830657223}"/>
               </a:ext>
             </a:extLst>
           </p:cNvPr>
@@ -21832,7 +22115,7 @@
           <p:cNvPr id="9" name="Foliennummernplatzhalter 8">
             <a:extLst>
               <a:ext uri="{FF2B5EF4-FFF2-40B4-BE49-F238E27FC236}">
-                <a16:creationId xmlns:a16="http://schemas.microsoft.com/office/drawing/2014/main" id="{3D8A091A-178E-435F-9EA9-84BA66D378CC}"/>
+                <a16:creationId xmlns:a16="http://schemas.microsoft.com/office/drawing/2014/main" xmlns="" id="{3D8A091A-178E-435F-9EA9-84BA66D378CC}"/>
               </a:ext>
             </a:extLst>
           </p:cNvPr>
@@ -22463,7 +22746,7 @@
           <p:cNvPr id="6" name="Datumsplatzhalter 5">
             <a:extLst>
               <a:ext uri="{FF2B5EF4-FFF2-40B4-BE49-F238E27FC236}">
-                <a16:creationId xmlns:a16="http://schemas.microsoft.com/office/drawing/2014/main" id="{E75B6010-F5BB-4F22-8221-D75D21F6EB55}"/>
+                <a16:creationId xmlns:a16="http://schemas.microsoft.com/office/drawing/2014/main" xmlns="" id="{E75B6010-F5BB-4F22-8221-D75D21F6EB55}"/>
               </a:ext>
             </a:extLst>
           </p:cNvPr>
@@ -22482,7 +22765,7 @@
             <a:fld id="{17C2562E-359A-3C42-BBEF-E02CE97BECB1}" type="datetimeFigureOut">
               <a:rPr lang="de-DE" smtClean="0"/>
               <a:pPr/>
-              <a:t>19.10.2017</a:t>
+              <a:t>19.10.17</a:t>
             </a:fld>
             <a:endParaRPr lang="de-DE" dirty="0"/>
           </a:p>
@@ -22493,7 +22776,7 @@
           <p:cNvPr id="7" name="Fußzeilenplatzhalter 6">
             <a:extLst>
               <a:ext uri="{FF2B5EF4-FFF2-40B4-BE49-F238E27FC236}">
-                <a16:creationId xmlns:a16="http://schemas.microsoft.com/office/drawing/2014/main" id="{26547C97-5C9B-4C14-8D49-A5E83DFFB45A}"/>
+                <a16:creationId xmlns:a16="http://schemas.microsoft.com/office/drawing/2014/main" xmlns="" id="{26547C97-5C9B-4C14-8D49-A5E83DFFB45A}"/>
               </a:ext>
             </a:extLst>
           </p:cNvPr>
@@ -22518,7 +22801,7 @@
           <p:cNvPr id="11" name="Foliennummernplatzhalter 10">
             <a:extLst>
               <a:ext uri="{FF2B5EF4-FFF2-40B4-BE49-F238E27FC236}">
-                <a16:creationId xmlns:a16="http://schemas.microsoft.com/office/drawing/2014/main" id="{98B57AAA-67F4-4EFE-A062-411C04E4F8A2}"/>
+                <a16:creationId xmlns:a16="http://schemas.microsoft.com/office/drawing/2014/main" xmlns="" id="{98B57AAA-67F4-4EFE-A062-411C04E4F8A2}"/>
               </a:ext>
             </a:extLst>
           </p:cNvPr>
@@ -23057,7 +23340,7 @@
           <p:cNvPr id="5" name="Datumsplatzhalter 4">
             <a:extLst>
               <a:ext uri="{FF2B5EF4-FFF2-40B4-BE49-F238E27FC236}">
-                <a16:creationId xmlns:a16="http://schemas.microsoft.com/office/drawing/2014/main" id="{0C7C8404-609B-40A1-85F0-0C1D3C5C6357}"/>
+                <a16:creationId xmlns:a16="http://schemas.microsoft.com/office/drawing/2014/main" xmlns="" id="{0C7C8404-609B-40A1-85F0-0C1D3C5C6357}"/>
               </a:ext>
             </a:extLst>
           </p:cNvPr>
@@ -23076,7 +23359,7 @@
             <a:fld id="{17C2562E-359A-3C42-BBEF-E02CE97BECB1}" type="datetimeFigureOut">
               <a:rPr lang="de-DE" smtClean="0"/>
               <a:pPr/>
-              <a:t>19.10.2017</a:t>
+              <a:t>19.10.17</a:t>
             </a:fld>
             <a:endParaRPr lang="de-DE" dirty="0"/>
           </a:p>
@@ -23087,7 +23370,7 @@
           <p:cNvPr id="8" name="Fußzeilenplatzhalter 7">
             <a:extLst>
               <a:ext uri="{FF2B5EF4-FFF2-40B4-BE49-F238E27FC236}">
-                <a16:creationId xmlns:a16="http://schemas.microsoft.com/office/drawing/2014/main" id="{3C29D00E-B305-494B-A605-238A832848F3}"/>
+                <a16:creationId xmlns:a16="http://schemas.microsoft.com/office/drawing/2014/main" xmlns="" id="{3C29D00E-B305-494B-A605-238A832848F3}"/>
               </a:ext>
             </a:extLst>
           </p:cNvPr>
@@ -23112,7 +23395,7 @@
           <p:cNvPr id="9" name="Foliennummernplatzhalter 8">
             <a:extLst>
               <a:ext uri="{FF2B5EF4-FFF2-40B4-BE49-F238E27FC236}">
-                <a16:creationId xmlns:a16="http://schemas.microsoft.com/office/drawing/2014/main" id="{7FC7C27A-51A6-4577-BAAE-22B90EFD1D16}"/>
+                <a16:creationId xmlns:a16="http://schemas.microsoft.com/office/drawing/2014/main" xmlns="" id="{7FC7C27A-51A6-4577-BAAE-22B90EFD1D16}"/>
               </a:ext>
             </a:extLst>
           </p:cNvPr>
@@ -23881,7 +24164,7 @@
           <p:cNvPr id="5" name="Datumsplatzhalter 4">
             <a:extLst>
               <a:ext uri="{FF2B5EF4-FFF2-40B4-BE49-F238E27FC236}">
-                <a16:creationId xmlns:a16="http://schemas.microsoft.com/office/drawing/2014/main" id="{33D616DE-E3B4-4D35-BB61-A1FFAD7A5AAF}"/>
+                <a16:creationId xmlns:a16="http://schemas.microsoft.com/office/drawing/2014/main" xmlns="" id="{33D616DE-E3B4-4D35-BB61-A1FFAD7A5AAF}"/>
               </a:ext>
             </a:extLst>
           </p:cNvPr>
@@ -23900,7 +24183,7 @@
             <a:fld id="{17C2562E-359A-3C42-BBEF-E02CE97BECB1}" type="datetimeFigureOut">
               <a:rPr lang="de-DE" smtClean="0"/>
               <a:pPr/>
-              <a:t>19.10.2017</a:t>
+              <a:t>19.10.17</a:t>
             </a:fld>
             <a:endParaRPr lang="de-DE" dirty="0"/>
           </a:p>
@@ -23911,7 +24194,7 @@
           <p:cNvPr id="7" name="Fußzeilenplatzhalter 6">
             <a:extLst>
               <a:ext uri="{FF2B5EF4-FFF2-40B4-BE49-F238E27FC236}">
-                <a16:creationId xmlns:a16="http://schemas.microsoft.com/office/drawing/2014/main" id="{009571DE-76C3-4B92-A98C-31AD1C84E96F}"/>
+                <a16:creationId xmlns:a16="http://schemas.microsoft.com/office/drawing/2014/main" xmlns="" id="{009571DE-76C3-4B92-A98C-31AD1C84E96F}"/>
               </a:ext>
             </a:extLst>
           </p:cNvPr>
@@ -23936,7 +24219,7 @@
           <p:cNvPr id="10" name="Foliennummernplatzhalter 9">
             <a:extLst>
               <a:ext uri="{FF2B5EF4-FFF2-40B4-BE49-F238E27FC236}">
-                <a16:creationId xmlns:a16="http://schemas.microsoft.com/office/drawing/2014/main" id="{A873DEEA-A3E3-4201-A6F9-C92D0EB9E730}"/>
+                <a16:creationId xmlns:a16="http://schemas.microsoft.com/office/drawing/2014/main" xmlns="" id="{A873DEEA-A3E3-4201-A6F9-C92D0EB9E730}"/>
               </a:ext>
             </a:extLst>
           </p:cNvPr>
@@ -24361,7 +24644,7 @@
           <p:cNvPr id="6" name="Datumsplatzhalter 5">
             <a:extLst>
               <a:ext uri="{FF2B5EF4-FFF2-40B4-BE49-F238E27FC236}">
-                <a16:creationId xmlns:a16="http://schemas.microsoft.com/office/drawing/2014/main" id="{BE1F9E44-CCA9-4032-B773-94D7E2DF8ED5}"/>
+                <a16:creationId xmlns:a16="http://schemas.microsoft.com/office/drawing/2014/main" xmlns="" id="{BE1F9E44-CCA9-4032-B773-94D7E2DF8ED5}"/>
               </a:ext>
             </a:extLst>
           </p:cNvPr>
@@ -24380,7 +24663,7 @@
             <a:fld id="{17C2562E-359A-3C42-BBEF-E02CE97BECB1}" type="datetimeFigureOut">
               <a:rPr lang="de-DE" smtClean="0"/>
               <a:pPr/>
-              <a:t>19.10.2017</a:t>
+              <a:t>19.10.17</a:t>
             </a:fld>
             <a:endParaRPr lang="de-DE" dirty="0"/>
           </a:p>
@@ -24391,7 +24674,7 @@
           <p:cNvPr id="7" name="Fußzeilenplatzhalter 6">
             <a:extLst>
               <a:ext uri="{FF2B5EF4-FFF2-40B4-BE49-F238E27FC236}">
-                <a16:creationId xmlns:a16="http://schemas.microsoft.com/office/drawing/2014/main" id="{4D3B4066-4E5D-4AAB-A33C-01B8A1CAA20D}"/>
+                <a16:creationId xmlns:a16="http://schemas.microsoft.com/office/drawing/2014/main" xmlns="" id="{4D3B4066-4E5D-4AAB-A33C-01B8A1CAA20D}"/>
               </a:ext>
             </a:extLst>
           </p:cNvPr>
@@ -24416,7 +24699,7 @@
           <p:cNvPr id="8" name="Foliennummernplatzhalter 7">
             <a:extLst>
               <a:ext uri="{FF2B5EF4-FFF2-40B4-BE49-F238E27FC236}">
-                <a16:creationId xmlns:a16="http://schemas.microsoft.com/office/drawing/2014/main" id="{52AE4811-CB7B-4E63-92A7-E2967B6AEBEE}"/>
+                <a16:creationId xmlns:a16="http://schemas.microsoft.com/office/drawing/2014/main" xmlns="" id="{52AE4811-CB7B-4E63-92A7-E2967B6AEBEE}"/>
               </a:ext>
             </a:extLst>
           </p:cNvPr>
@@ -25203,7 +25486,7 @@
           <p:cNvPr id="5" name="Datumsplatzhalter 4">
             <a:extLst>
               <a:ext uri="{FF2B5EF4-FFF2-40B4-BE49-F238E27FC236}">
-                <a16:creationId xmlns:a16="http://schemas.microsoft.com/office/drawing/2014/main" id="{7AEDF8C5-F6FB-4119-B6A3-908B246DAB0B}"/>
+                <a16:creationId xmlns:a16="http://schemas.microsoft.com/office/drawing/2014/main" xmlns="" id="{7AEDF8C5-F6FB-4119-B6A3-908B246DAB0B}"/>
               </a:ext>
             </a:extLst>
           </p:cNvPr>
@@ -25222,7 +25505,7 @@
             <a:fld id="{17C2562E-359A-3C42-BBEF-E02CE97BECB1}" type="datetimeFigureOut">
               <a:rPr lang="de-DE" smtClean="0"/>
               <a:pPr/>
-              <a:t>19.10.2017</a:t>
+              <a:t>19.10.17</a:t>
             </a:fld>
             <a:endParaRPr lang="de-DE" dirty="0"/>
           </a:p>
@@ -25233,7 +25516,7 @@
           <p:cNvPr id="7" name="Fußzeilenplatzhalter 6">
             <a:extLst>
               <a:ext uri="{FF2B5EF4-FFF2-40B4-BE49-F238E27FC236}">
-                <a16:creationId xmlns:a16="http://schemas.microsoft.com/office/drawing/2014/main" id="{4CCDEB9D-85DD-4CF0-96C7-BA711D11F2BE}"/>
+                <a16:creationId xmlns:a16="http://schemas.microsoft.com/office/drawing/2014/main" xmlns="" id="{4CCDEB9D-85DD-4CF0-96C7-BA711D11F2BE}"/>
               </a:ext>
             </a:extLst>
           </p:cNvPr>
@@ -25258,7 +25541,7 @@
           <p:cNvPr id="9" name="Foliennummernplatzhalter 8">
             <a:extLst>
               <a:ext uri="{FF2B5EF4-FFF2-40B4-BE49-F238E27FC236}">
-                <a16:creationId xmlns:a16="http://schemas.microsoft.com/office/drawing/2014/main" id="{418E80D9-3450-43BD-94A9-22C9BF91B1C0}"/>
+                <a16:creationId xmlns:a16="http://schemas.microsoft.com/office/drawing/2014/main" xmlns="" id="{418E80D9-3450-43BD-94A9-22C9BF91B1C0}"/>
               </a:ext>
             </a:extLst>
           </p:cNvPr>
@@ -26004,7 +26287,7 @@
           <p:cNvPr id="3" name="Datumsplatzhalter 2">
             <a:extLst>
               <a:ext uri="{FF2B5EF4-FFF2-40B4-BE49-F238E27FC236}">
-                <a16:creationId xmlns:a16="http://schemas.microsoft.com/office/drawing/2014/main" id="{25D8C277-6F42-4B11-AB90-EBE3A1238A85}"/>
+                <a16:creationId xmlns:a16="http://schemas.microsoft.com/office/drawing/2014/main" xmlns="" id="{25D8C277-6F42-4B11-AB90-EBE3A1238A85}"/>
               </a:ext>
             </a:extLst>
           </p:cNvPr>
@@ -26023,7 +26306,7 @@
             <a:fld id="{17C2562E-359A-3C42-BBEF-E02CE97BECB1}" type="datetimeFigureOut">
               <a:rPr lang="de-DE" smtClean="0"/>
               <a:pPr/>
-              <a:t>19.10.2017</a:t>
+              <a:t>19.10.17</a:t>
             </a:fld>
             <a:endParaRPr lang="de-DE" dirty="0"/>
           </a:p>
@@ -26034,7 +26317,7 @@
           <p:cNvPr id="4" name="Fußzeilenplatzhalter 3">
             <a:extLst>
               <a:ext uri="{FF2B5EF4-FFF2-40B4-BE49-F238E27FC236}">
-                <a16:creationId xmlns:a16="http://schemas.microsoft.com/office/drawing/2014/main" id="{4815A052-9443-41A9-9F46-0AA437EEDDA5}"/>
+                <a16:creationId xmlns:a16="http://schemas.microsoft.com/office/drawing/2014/main" xmlns="" id="{4815A052-9443-41A9-9F46-0AA437EEDDA5}"/>
               </a:ext>
             </a:extLst>
           </p:cNvPr>
@@ -26059,7 +26342,7 @@
           <p:cNvPr id="5" name="Foliennummernplatzhalter 4">
             <a:extLst>
               <a:ext uri="{FF2B5EF4-FFF2-40B4-BE49-F238E27FC236}">
-                <a16:creationId xmlns:a16="http://schemas.microsoft.com/office/drawing/2014/main" id="{5F7C50D9-9DEA-4EFD-ACE3-677BBD4DEB55}"/>
+                <a16:creationId xmlns:a16="http://schemas.microsoft.com/office/drawing/2014/main" xmlns="" id="{5F7C50D9-9DEA-4EFD-ACE3-677BBD4DEB55}"/>
               </a:ext>
             </a:extLst>
           </p:cNvPr>
@@ -26525,7 +26808,7 @@
           <p:cNvPr id="5" name="Datumsplatzhalter 4">
             <a:extLst>
               <a:ext uri="{FF2B5EF4-FFF2-40B4-BE49-F238E27FC236}">
-                <a16:creationId xmlns:a16="http://schemas.microsoft.com/office/drawing/2014/main" id="{6B4135B1-E114-41F0-9C64-3A26186B834F}"/>
+                <a16:creationId xmlns:a16="http://schemas.microsoft.com/office/drawing/2014/main" xmlns="" id="{6B4135B1-E114-41F0-9C64-3A26186B834F}"/>
               </a:ext>
             </a:extLst>
           </p:cNvPr>
@@ -26544,7 +26827,7 @@
             <a:fld id="{17C2562E-359A-3C42-BBEF-E02CE97BECB1}" type="datetimeFigureOut">
               <a:rPr lang="de-DE" smtClean="0"/>
               <a:pPr/>
-              <a:t>19.10.2017</a:t>
+              <a:t>19.10.17</a:t>
             </a:fld>
             <a:endParaRPr lang="de-DE" dirty="0"/>
           </a:p>
@@ -26555,7 +26838,7 @@
           <p:cNvPr id="7" name="Fußzeilenplatzhalter 6">
             <a:extLst>
               <a:ext uri="{FF2B5EF4-FFF2-40B4-BE49-F238E27FC236}">
-                <a16:creationId xmlns:a16="http://schemas.microsoft.com/office/drawing/2014/main" id="{84D81854-B37F-4ADF-A34F-BF0CCA2926F2}"/>
+                <a16:creationId xmlns:a16="http://schemas.microsoft.com/office/drawing/2014/main" xmlns="" id="{84D81854-B37F-4ADF-A34F-BF0CCA2926F2}"/>
               </a:ext>
             </a:extLst>
           </p:cNvPr>
@@ -26580,7 +26863,7 @@
           <p:cNvPr id="9" name="Foliennummernplatzhalter 8">
             <a:extLst>
               <a:ext uri="{FF2B5EF4-FFF2-40B4-BE49-F238E27FC236}">
-                <a16:creationId xmlns:a16="http://schemas.microsoft.com/office/drawing/2014/main" id="{2EE17D9C-06FE-45C8-B312-4C5617C49000}"/>
+                <a16:creationId xmlns:a16="http://schemas.microsoft.com/office/drawing/2014/main" xmlns="" id="{2EE17D9C-06FE-45C8-B312-4C5617C49000}"/>
               </a:ext>
             </a:extLst>
           </p:cNvPr>
@@ -27005,7 +27288,7 @@
           <p:cNvPr id="10" name="Datumsplatzhalter 9">
             <a:extLst>
               <a:ext uri="{FF2B5EF4-FFF2-40B4-BE49-F238E27FC236}">
-                <a16:creationId xmlns:a16="http://schemas.microsoft.com/office/drawing/2014/main" id="{F92E0490-C295-4C99-B9D1-6310B9164EDD}"/>
+                <a16:creationId xmlns:a16="http://schemas.microsoft.com/office/drawing/2014/main" xmlns="" id="{F92E0490-C295-4C99-B9D1-6310B9164EDD}"/>
               </a:ext>
             </a:extLst>
           </p:cNvPr>
@@ -27024,7 +27307,7 @@
             <a:fld id="{17C2562E-359A-3C42-BBEF-E02CE97BECB1}" type="datetimeFigureOut">
               <a:rPr lang="de-DE" smtClean="0"/>
               <a:pPr/>
-              <a:t>19.10.2017</a:t>
+              <a:t>19.10.17</a:t>
             </a:fld>
             <a:endParaRPr lang="de-DE" dirty="0"/>
           </a:p>
@@ -27035,7 +27318,7 @@
           <p:cNvPr id="11" name="Fußzeilenplatzhalter 10">
             <a:extLst>
               <a:ext uri="{FF2B5EF4-FFF2-40B4-BE49-F238E27FC236}">
-                <a16:creationId xmlns:a16="http://schemas.microsoft.com/office/drawing/2014/main" id="{DD98C48F-3C69-4703-B4CC-632DDDDB497C}"/>
+                <a16:creationId xmlns:a16="http://schemas.microsoft.com/office/drawing/2014/main" xmlns="" id="{DD98C48F-3C69-4703-B4CC-632DDDDB497C}"/>
               </a:ext>
             </a:extLst>
           </p:cNvPr>
@@ -27060,7 +27343,7 @@
           <p:cNvPr id="15" name="Foliennummernplatzhalter 14">
             <a:extLst>
               <a:ext uri="{FF2B5EF4-FFF2-40B4-BE49-F238E27FC236}">
-                <a16:creationId xmlns:a16="http://schemas.microsoft.com/office/drawing/2014/main" id="{1968527D-44A1-407F-99A6-2ACAB46FBD28}"/>
+                <a16:creationId xmlns:a16="http://schemas.microsoft.com/office/drawing/2014/main" xmlns="" id="{1968527D-44A1-407F-99A6-2ACAB46FBD28}"/>
               </a:ext>
             </a:extLst>
           </p:cNvPr>
@@ -27847,7 +28130,7 @@
           <p:cNvPr id="5" name="Datumsplatzhalter 4">
             <a:extLst>
               <a:ext uri="{FF2B5EF4-FFF2-40B4-BE49-F238E27FC236}">
-                <a16:creationId xmlns:a16="http://schemas.microsoft.com/office/drawing/2014/main" id="{8AFAB162-0FDB-4A37-A4FD-CBFC89474486}"/>
+                <a16:creationId xmlns:a16="http://schemas.microsoft.com/office/drawing/2014/main" xmlns="" id="{8AFAB162-0FDB-4A37-A4FD-CBFC89474486}"/>
               </a:ext>
             </a:extLst>
           </p:cNvPr>
@@ -27866,7 +28149,7 @@
             <a:fld id="{17C2562E-359A-3C42-BBEF-E02CE97BECB1}" type="datetimeFigureOut">
               <a:rPr lang="de-DE" smtClean="0"/>
               <a:pPr/>
-              <a:t>19.10.2017</a:t>
+              <a:t>19.10.17</a:t>
             </a:fld>
             <a:endParaRPr lang="de-DE" dirty="0"/>
           </a:p>
@@ -27877,7 +28160,7 @@
           <p:cNvPr id="7" name="Fußzeilenplatzhalter 6">
             <a:extLst>
               <a:ext uri="{FF2B5EF4-FFF2-40B4-BE49-F238E27FC236}">
-                <a16:creationId xmlns:a16="http://schemas.microsoft.com/office/drawing/2014/main" id="{46B12C25-0691-43C5-8596-6B8AD0039874}"/>
+                <a16:creationId xmlns:a16="http://schemas.microsoft.com/office/drawing/2014/main" xmlns="" id="{46B12C25-0691-43C5-8596-6B8AD0039874}"/>
               </a:ext>
             </a:extLst>
           </p:cNvPr>
@@ -27902,7 +28185,7 @@
           <p:cNvPr id="9" name="Foliennummernplatzhalter 8">
             <a:extLst>
               <a:ext uri="{FF2B5EF4-FFF2-40B4-BE49-F238E27FC236}">
-                <a16:creationId xmlns:a16="http://schemas.microsoft.com/office/drawing/2014/main" id="{7C5C2594-4A54-4AE0-88EE-FB17FDD4570C}"/>
+                <a16:creationId xmlns:a16="http://schemas.microsoft.com/office/drawing/2014/main" xmlns="" id="{7C5C2594-4A54-4AE0-88EE-FB17FDD4570C}"/>
               </a:ext>
             </a:extLst>
           </p:cNvPr>
@@ -28648,7 +28931,7 @@
           <p:cNvPr id="5" name="Datumsplatzhalter 4">
             <a:extLst>
               <a:ext uri="{FF2B5EF4-FFF2-40B4-BE49-F238E27FC236}">
-                <a16:creationId xmlns:a16="http://schemas.microsoft.com/office/drawing/2014/main" id="{D1D6952B-45CB-46FF-9F9B-1F98CC255417}"/>
+                <a16:creationId xmlns:a16="http://schemas.microsoft.com/office/drawing/2014/main" xmlns="" id="{D1D6952B-45CB-46FF-9F9B-1F98CC255417}"/>
               </a:ext>
             </a:extLst>
           </p:cNvPr>
@@ -28667,7 +28950,7 @@
             <a:fld id="{17C2562E-359A-3C42-BBEF-E02CE97BECB1}" type="datetimeFigureOut">
               <a:rPr lang="de-DE" smtClean="0"/>
               <a:pPr/>
-              <a:t>19.10.2017</a:t>
+              <a:t>19.10.17</a:t>
             </a:fld>
             <a:endParaRPr lang="de-DE" dirty="0"/>
           </a:p>
@@ -28678,7 +28961,7 @@
           <p:cNvPr id="7" name="Fußzeilenplatzhalter 6">
             <a:extLst>
               <a:ext uri="{FF2B5EF4-FFF2-40B4-BE49-F238E27FC236}">
-                <a16:creationId xmlns:a16="http://schemas.microsoft.com/office/drawing/2014/main" id="{3C08D0C6-0E40-46E2-9D6C-74181D953DFE}"/>
+                <a16:creationId xmlns:a16="http://schemas.microsoft.com/office/drawing/2014/main" xmlns="" id="{3C08D0C6-0E40-46E2-9D6C-74181D953DFE}"/>
               </a:ext>
             </a:extLst>
           </p:cNvPr>
@@ -28703,7 +28986,7 @@
           <p:cNvPr id="8" name="Foliennummernplatzhalter 7">
             <a:extLst>
               <a:ext uri="{FF2B5EF4-FFF2-40B4-BE49-F238E27FC236}">
-                <a16:creationId xmlns:a16="http://schemas.microsoft.com/office/drawing/2014/main" id="{EA500A2A-E0AD-4AD6-AB58-61BF900F0E2C}"/>
+                <a16:creationId xmlns:a16="http://schemas.microsoft.com/office/drawing/2014/main" xmlns="" id="{EA500A2A-E0AD-4AD6-AB58-61BF900F0E2C}"/>
               </a:ext>
             </a:extLst>
           </p:cNvPr>
@@ -28807,7 +29090,7 @@
           <p:cNvPr id="5" name="Datumsplatzhalter 4">
             <a:extLst>
               <a:ext uri="{FF2B5EF4-FFF2-40B4-BE49-F238E27FC236}">
-                <a16:creationId xmlns:a16="http://schemas.microsoft.com/office/drawing/2014/main" id="{A181F7F8-D379-4070-8216-3B81228BAEC6}"/>
+                <a16:creationId xmlns:a16="http://schemas.microsoft.com/office/drawing/2014/main" xmlns="" id="{A181F7F8-D379-4070-8216-3B81228BAEC6}"/>
               </a:ext>
             </a:extLst>
           </p:cNvPr>
@@ -28826,7 +29109,7 @@
             <a:fld id="{17C2562E-359A-3C42-BBEF-E02CE97BECB1}" type="datetimeFigureOut">
               <a:rPr lang="de-DE" smtClean="0"/>
               <a:pPr/>
-              <a:t>19.10.2017</a:t>
+              <a:t>19.10.17</a:t>
             </a:fld>
             <a:endParaRPr lang="de-DE" dirty="0"/>
           </a:p>
@@ -28837,7 +29120,7 @@
           <p:cNvPr id="7" name="Fußzeilenplatzhalter 6">
             <a:extLst>
               <a:ext uri="{FF2B5EF4-FFF2-40B4-BE49-F238E27FC236}">
-                <a16:creationId xmlns:a16="http://schemas.microsoft.com/office/drawing/2014/main" id="{D8E0E4FD-5CC1-4D23-A3E8-7DAB1134A4FA}"/>
+                <a16:creationId xmlns:a16="http://schemas.microsoft.com/office/drawing/2014/main" xmlns="" id="{D8E0E4FD-5CC1-4D23-A3E8-7DAB1134A4FA}"/>
               </a:ext>
             </a:extLst>
           </p:cNvPr>
@@ -28862,7 +29145,7 @@
           <p:cNvPr id="8" name="Foliennummernplatzhalter 7">
             <a:extLst>
               <a:ext uri="{FF2B5EF4-FFF2-40B4-BE49-F238E27FC236}">
-                <a16:creationId xmlns:a16="http://schemas.microsoft.com/office/drawing/2014/main" id="{6D72C792-B02A-4A44-BF65-9B261DE5D43D}"/>
+                <a16:creationId xmlns:a16="http://schemas.microsoft.com/office/drawing/2014/main" xmlns="" id="{6D72C792-B02A-4A44-BF65-9B261DE5D43D}"/>
               </a:ext>
             </a:extLst>
           </p:cNvPr>
@@ -28983,6 +29266,10 @@
                 <a:spcPts val="600"/>
               </a:spcBef>
             </a:pPr>
+            <a:r>
+              <a:rPr lang="de-DE" sz="2000" dirty="0"/>
+              <a:t/>
+            </a:r>
             <a:br>
               <a:rPr lang="de-DE" sz="2000" dirty="0"/>
             </a:br>
@@ -29199,9 +29486,17 @@
               <a:rPr lang="de-DE" sz="2000" noProof="0" dirty="0"/>
               <a:t>dateveg</a:t>
             </a:r>
+            <a:r>
+              <a:rPr lang="de-DE" sz="2000" dirty="0"/>
+              <a:t/>
+            </a:r>
             <a:br>
               <a:rPr lang="de-DE" sz="2000" dirty="0"/>
             </a:br>
+            <a:r>
+              <a:rPr lang="de-DE" sz="2000" dirty="0"/>
+              <a:t/>
+            </a:r>
             <a:br>
               <a:rPr lang="de-DE" sz="2000" dirty="0"/>
             </a:br>
@@ -29247,7 +29542,7 @@
           <p:cNvPr id="2" name="Datumsplatzhalter 1">
             <a:extLst>
               <a:ext uri="{FF2B5EF4-FFF2-40B4-BE49-F238E27FC236}">
-                <a16:creationId xmlns:a16="http://schemas.microsoft.com/office/drawing/2014/main" id="{B1E6CA30-BA19-47F1-BFEE-B5E43CCEC731}"/>
+                <a16:creationId xmlns:a16="http://schemas.microsoft.com/office/drawing/2014/main" xmlns="" id="{B1E6CA30-BA19-47F1-BFEE-B5E43CCEC731}"/>
               </a:ext>
             </a:extLst>
           </p:cNvPr>
@@ -29266,7 +29561,7 @@
             <a:fld id="{17C2562E-359A-3C42-BBEF-E02CE97BECB1}" type="datetimeFigureOut">
               <a:rPr lang="de-DE" smtClean="0"/>
               <a:pPr/>
-              <a:t>19.10.2017</a:t>
+              <a:t>19.10.17</a:t>
             </a:fld>
             <a:endParaRPr lang="de-DE" dirty="0"/>
           </a:p>
@@ -29277,7 +29572,7 @@
           <p:cNvPr id="14" name="Fußzeilenplatzhalter 13">
             <a:extLst>
               <a:ext uri="{FF2B5EF4-FFF2-40B4-BE49-F238E27FC236}">
-                <a16:creationId xmlns:a16="http://schemas.microsoft.com/office/drawing/2014/main" id="{06236A5B-AF48-4E5C-BD02-27BC73328D88}"/>
+                <a16:creationId xmlns:a16="http://schemas.microsoft.com/office/drawing/2014/main" xmlns="" id="{06236A5B-AF48-4E5C-BD02-27BC73328D88}"/>
               </a:ext>
             </a:extLst>
           </p:cNvPr>
@@ -29302,7 +29597,7 @@
           <p:cNvPr id="15" name="Foliennummernplatzhalter 14">
             <a:extLst>
               <a:ext uri="{FF2B5EF4-FFF2-40B4-BE49-F238E27FC236}">
-                <a16:creationId xmlns:a16="http://schemas.microsoft.com/office/drawing/2014/main" id="{6C539E6F-C163-4DFD-A93D-F463843C6D4E}"/>
+                <a16:creationId xmlns:a16="http://schemas.microsoft.com/office/drawing/2014/main" xmlns="" id="{6C539E6F-C163-4DFD-A93D-F463843C6D4E}"/>
               </a:ext>
             </a:extLst>
           </p:cNvPr>
@@ -29618,7 +29913,7 @@
           <p:cNvPr id="7" name="Datumsplatzhalter 6">
             <a:extLst>
               <a:ext uri="{FF2B5EF4-FFF2-40B4-BE49-F238E27FC236}">
-                <a16:creationId xmlns:a16="http://schemas.microsoft.com/office/drawing/2014/main" id="{E9F2D5EB-EB07-4AC4-94D4-FA6BD7E87398}"/>
+                <a16:creationId xmlns:a16="http://schemas.microsoft.com/office/drawing/2014/main" xmlns="" id="{E9F2D5EB-EB07-4AC4-94D4-FA6BD7E87398}"/>
               </a:ext>
             </a:extLst>
           </p:cNvPr>
@@ -29637,7 +29932,7 @@
             <a:fld id="{17C2562E-359A-3C42-BBEF-E02CE97BECB1}" type="datetimeFigureOut">
               <a:rPr lang="de-DE" smtClean="0"/>
               <a:pPr/>
-              <a:t>19.10.2017</a:t>
+              <a:t>19.10.17</a:t>
             </a:fld>
             <a:endParaRPr lang="de-DE" dirty="0"/>
           </a:p>
@@ -29648,7 +29943,7 @@
           <p:cNvPr id="8" name="Fußzeilenplatzhalter 7">
             <a:extLst>
               <a:ext uri="{FF2B5EF4-FFF2-40B4-BE49-F238E27FC236}">
-                <a16:creationId xmlns:a16="http://schemas.microsoft.com/office/drawing/2014/main" id="{947F1BF2-5B5A-4E3F-9A69-A7FC06CEE6DA}"/>
+                <a16:creationId xmlns:a16="http://schemas.microsoft.com/office/drawing/2014/main" xmlns="" id="{947F1BF2-5B5A-4E3F-9A69-A7FC06CEE6DA}"/>
               </a:ext>
             </a:extLst>
           </p:cNvPr>
@@ -29673,7 +29968,7 @@
           <p:cNvPr id="9" name="Foliennummernplatzhalter 8">
             <a:extLst>
               <a:ext uri="{FF2B5EF4-FFF2-40B4-BE49-F238E27FC236}">
-                <a16:creationId xmlns:a16="http://schemas.microsoft.com/office/drawing/2014/main" id="{B0D6E36A-E68C-4CFF-A1B3-ADE80884E18E}"/>
+                <a16:creationId xmlns:a16="http://schemas.microsoft.com/office/drawing/2014/main" xmlns="" id="{B0D6E36A-E68C-4CFF-A1B3-ADE80884E18E}"/>
               </a:ext>
             </a:extLst>
           </p:cNvPr>
@@ -29764,7 +30059,7 @@
           <a:noFill/>
           <a:extLst>
             <a:ext uri="{909E8E84-426E-40dd-AFC4-6F175D3DCCD1}">
-              <a14:hiddenFill xmlns="" xmlns:a14="http://schemas.microsoft.com/office/drawing/2010/main">
+              <a14:hiddenFill xmlns:a14="http://schemas.microsoft.com/office/drawing/2010/main" xmlns="">
                 <a:solidFill>
                   <a:srgbClr val="FFFFFF"/>
                 </a:solidFill>
@@ -29844,7 +30139,7 @@
           <a:noFill/>
           <a:extLst>
             <a:ext uri="{909E8E84-426E-40dd-AFC4-6F175D3DCCD1}">
-              <a14:hiddenFill xmlns="" xmlns:a14="http://schemas.microsoft.com/office/drawing/2010/main">
+              <a14:hiddenFill xmlns:a14="http://schemas.microsoft.com/office/drawing/2010/main" xmlns="">
                 <a:solidFill>
                   <a:srgbClr val="FFFFFF"/>
                 </a:solidFill>
@@ -30147,7 +30442,7 @@
           <p:cNvPr id="5" name="Datumsplatzhalter 4">
             <a:extLst>
               <a:ext uri="{FF2B5EF4-FFF2-40B4-BE49-F238E27FC236}">
-                <a16:creationId xmlns:a16="http://schemas.microsoft.com/office/drawing/2014/main" id="{368DD9D8-7FE8-48F0-AE91-AE98EA3DCA20}"/>
+                <a16:creationId xmlns:a16="http://schemas.microsoft.com/office/drawing/2014/main" xmlns="" id="{368DD9D8-7FE8-48F0-AE91-AE98EA3DCA20}"/>
               </a:ext>
             </a:extLst>
           </p:cNvPr>
@@ -30166,7 +30461,7 @@
             <a:fld id="{17C2562E-359A-3C42-BBEF-E02CE97BECB1}" type="datetimeFigureOut">
               <a:rPr lang="de-DE" smtClean="0"/>
               <a:pPr/>
-              <a:t>19.10.2017</a:t>
+              <a:t>19.10.17</a:t>
             </a:fld>
             <a:endParaRPr lang="de-DE" dirty="0"/>
           </a:p>
@@ -30177,7 +30472,7 @@
           <p:cNvPr id="7" name="Fußzeilenplatzhalter 6">
             <a:extLst>
               <a:ext uri="{FF2B5EF4-FFF2-40B4-BE49-F238E27FC236}">
-                <a16:creationId xmlns:a16="http://schemas.microsoft.com/office/drawing/2014/main" id="{DD743ADB-89F1-48B5-A397-7FB83734730F}"/>
+                <a16:creationId xmlns:a16="http://schemas.microsoft.com/office/drawing/2014/main" xmlns="" id="{DD743ADB-89F1-48B5-A397-7FB83734730F}"/>
               </a:ext>
             </a:extLst>
           </p:cNvPr>
@@ -30202,7 +30497,7 @@
           <p:cNvPr id="8" name="Foliennummernplatzhalter 7">
             <a:extLst>
               <a:ext uri="{FF2B5EF4-FFF2-40B4-BE49-F238E27FC236}">
-                <a16:creationId xmlns:a16="http://schemas.microsoft.com/office/drawing/2014/main" id="{E9AACC46-EA1E-4E6F-8F9D-AC4B57F09904}"/>
+                <a16:creationId xmlns:a16="http://schemas.microsoft.com/office/drawing/2014/main" xmlns="" id="{E9AACC46-EA1E-4E6F-8F9D-AC4B57F09904}"/>
               </a:ext>
             </a:extLst>
           </p:cNvPr>
@@ -30509,7 +30804,7 @@
           <p:cNvPr id="6" name="Datumsplatzhalter 5">
             <a:extLst>
               <a:ext uri="{FF2B5EF4-FFF2-40B4-BE49-F238E27FC236}">
-                <a16:creationId xmlns:a16="http://schemas.microsoft.com/office/drawing/2014/main" id="{39EC82D5-F468-46F1-8BE2-F62E4D04C5CD}"/>
+                <a16:creationId xmlns:a16="http://schemas.microsoft.com/office/drawing/2014/main" xmlns="" id="{39EC82D5-F468-46F1-8BE2-F62E4D04C5CD}"/>
               </a:ext>
             </a:extLst>
           </p:cNvPr>
@@ -30528,7 +30823,7 @@
             <a:fld id="{17C2562E-359A-3C42-BBEF-E02CE97BECB1}" type="datetimeFigureOut">
               <a:rPr lang="de-DE" smtClean="0"/>
               <a:pPr/>
-              <a:t>19.10.2017</a:t>
+              <a:t>19.10.17</a:t>
             </a:fld>
             <a:endParaRPr lang="de-DE" dirty="0"/>
           </a:p>
@@ -30539,7 +30834,7 @@
           <p:cNvPr id="7" name="Fußzeilenplatzhalter 6">
             <a:extLst>
               <a:ext uri="{FF2B5EF4-FFF2-40B4-BE49-F238E27FC236}">
-                <a16:creationId xmlns:a16="http://schemas.microsoft.com/office/drawing/2014/main" id="{32A29AE2-1FA8-458C-9BDD-E35CA69A9340}"/>
+                <a16:creationId xmlns:a16="http://schemas.microsoft.com/office/drawing/2014/main" xmlns="" id="{32A29AE2-1FA8-458C-9BDD-E35CA69A9340}"/>
               </a:ext>
             </a:extLst>
           </p:cNvPr>
@@ -30564,7 +30859,7 @@
           <p:cNvPr id="8" name="Foliennummernplatzhalter 7">
             <a:extLst>
               <a:ext uri="{FF2B5EF4-FFF2-40B4-BE49-F238E27FC236}">
-                <a16:creationId xmlns:a16="http://schemas.microsoft.com/office/drawing/2014/main" id="{DC4135BE-88E8-4C4B-B3FF-FC61855E0C9F}"/>
+                <a16:creationId xmlns:a16="http://schemas.microsoft.com/office/drawing/2014/main" xmlns="" id="{DC4135BE-88E8-4C4B-B3FF-FC61855E0C9F}"/>
               </a:ext>
             </a:extLst>
           </p:cNvPr>
@@ -30875,7 +31170,7 @@
           <p:cNvPr id="5" name="Datumsplatzhalter 4">
             <a:extLst>
               <a:ext uri="{FF2B5EF4-FFF2-40B4-BE49-F238E27FC236}">
-                <a16:creationId xmlns:a16="http://schemas.microsoft.com/office/drawing/2014/main" id="{42621BA8-D298-4AAA-B27E-2D5702596736}"/>
+                <a16:creationId xmlns:a16="http://schemas.microsoft.com/office/drawing/2014/main" xmlns="" id="{42621BA8-D298-4AAA-B27E-2D5702596736}"/>
               </a:ext>
             </a:extLst>
           </p:cNvPr>
@@ -30894,7 +31189,7 @@
             <a:fld id="{17C2562E-359A-3C42-BBEF-E02CE97BECB1}" type="datetimeFigureOut">
               <a:rPr lang="de-DE" smtClean="0"/>
               <a:pPr/>
-              <a:t>19.10.2017</a:t>
+              <a:t>19.10.17</a:t>
             </a:fld>
             <a:endParaRPr lang="de-DE" dirty="0"/>
           </a:p>
@@ -30905,7 +31200,7 @@
           <p:cNvPr id="6" name="Fußzeilenplatzhalter 5">
             <a:extLst>
               <a:ext uri="{FF2B5EF4-FFF2-40B4-BE49-F238E27FC236}">
-                <a16:creationId xmlns:a16="http://schemas.microsoft.com/office/drawing/2014/main" id="{59687A69-8E9C-4168-AA2A-7D487587D19D}"/>
+                <a16:creationId xmlns:a16="http://schemas.microsoft.com/office/drawing/2014/main" xmlns="" id="{59687A69-8E9C-4168-AA2A-7D487587D19D}"/>
               </a:ext>
             </a:extLst>
           </p:cNvPr>
@@ -30930,7 +31225,7 @@
           <p:cNvPr id="7" name="Foliennummernplatzhalter 6">
             <a:extLst>
               <a:ext uri="{FF2B5EF4-FFF2-40B4-BE49-F238E27FC236}">
-                <a16:creationId xmlns:a16="http://schemas.microsoft.com/office/drawing/2014/main" id="{536244A4-4C24-4CD2-82E9-C547A6F8C84B}"/>
+                <a16:creationId xmlns:a16="http://schemas.microsoft.com/office/drawing/2014/main" xmlns="" id="{536244A4-4C24-4CD2-82E9-C547A6F8C84B}"/>
               </a:ext>
             </a:extLst>
           </p:cNvPr>
@@ -31234,7 +31529,7 @@
           <p:cNvPr id="6" name="Datumsplatzhalter 5">
             <a:extLst>
               <a:ext uri="{FF2B5EF4-FFF2-40B4-BE49-F238E27FC236}">
-                <a16:creationId xmlns:a16="http://schemas.microsoft.com/office/drawing/2014/main" id="{BF6F2AC7-7673-45B2-B727-C8AE32F0AB56}"/>
+                <a16:creationId xmlns:a16="http://schemas.microsoft.com/office/drawing/2014/main" xmlns="" id="{BF6F2AC7-7673-45B2-B727-C8AE32F0AB56}"/>
               </a:ext>
             </a:extLst>
           </p:cNvPr>
@@ -31253,7 +31548,7 @@
             <a:fld id="{17C2562E-359A-3C42-BBEF-E02CE97BECB1}" type="datetimeFigureOut">
               <a:rPr lang="de-DE" smtClean="0"/>
               <a:pPr/>
-              <a:t>19.10.2017</a:t>
+              <a:t>19.10.17</a:t>
             </a:fld>
             <a:endParaRPr lang="de-DE" dirty="0"/>
           </a:p>
@@ -31264,7 +31559,7 @@
           <p:cNvPr id="7" name="Fußzeilenplatzhalter 6">
             <a:extLst>
               <a:ext uri="{FF2B5EF4-FFF2-40B4-BE49-F238E27FC236}">
-                <a16:creationId xmlns:a16="http://schemas.microsoft.com/office/drawing/2014/main" id="{92A772BA-DCE7-4C4E-83BA-CF4FFCC183EE}"/>
+                <a16:creationId xmlns:a16="http://schemas.microsoft.com/office/drawing/2014/main" xmlns="" id="{92A772BA-DCE7-4C4E-83BA-CF4FFCC183EE}"/>
               </a:ext>
             </a:extLst>
           </p:cNvPr>
@@ -31289,7 +31584,7 @@
           <p:cNvPr id="8" name="Foliennummernplatzhalter 7">
             <a:extLst>
               <a:ext uri="{FF2B5EF4-FFF2-40B4-BE49-F238E27FC236}">
-                <a16:creationId xmlns:a16="http://schemas.microsoft.com/office/drawing/2014/main" id="{E51D4D1D-A3D0-476F-93F4-F41207D05396}"/>
+                <a16:creationId xmlns:a16="http://schemas.microsoft.com/office/drawing/2014/main" xmlns="" id="{E51D4D1D-A3D0-476F-93F4-F41207D05396}"/>
               </a:ext>
             </a:extLst>
           </p:cNvPr>
@@ -31589,7 +31884,7 @@
           <p:cNvPr id="4" name="Datumsplatzhalter 3">
             <a:extLst>
               <a:ext uri="{FF2B5EF4-FFF2-40B4-BE49-F238E27FC236}">
-                <a16:creationId xmlns:a16="http://schemas.microsoft.com/office/drawing/2014/main" id="{37D39D12-6498-4172-8CA5-163DBEBBD0CB}"/>
+                <a16:creationId xmlns:a16="http://schemas.microsoft.com/office/drawing/2014/main" xmlns="" id="{37D39D12-6498-4172-8CA5-163DBEBBD0CB}"/>
               </a:ext>
             </a:extLst>
           </p:cNvPr>
@@ -31608,7 +31903,7 @@
             <a:fld id="{17C2562E-359A-3C42-BBEF-E02CE97BECB1}" type="datetimeFigureOut">
               <a:rPr lang="de-DE" smtClean="0"/>
               <a:pPr/>
-              <a:t>19.10.2017</a:t>
+              <a:t>19.10.17</a:t>
             </a:fld>
             <a:endParaRPr lang="de-DE" dirty="0"/>
           </a:p>
@@ -31619,7 +31914,7 @@
           <p:cNvPr id="7" name="Fußzeilenplatzhalter 6">
             <a:extLst>
               <a:ext uri="{FF2B5EF4-FFF2-40B4-BE49-F238E27FC236}">
-                <a16:creationId xmlns:a16="http://schemas.microsoft.com/office/drawing/2014/main" id="{F310451D-2AF2-4222-AA5C-04DDCF6CA55F}"/>
+                <a16:creationId xmlns:a16="http://schemas.microsoft.com/office/drawing/2014/main" xmlns="" id="{F310451D-2AF2-4222-AA5C-04DDCF6CA55F}"/>
               </a:ext>
             </a:extLst>
           </p:cNvPr>
@@ -31644,7 +31939,7 @@
           <p:cNvPr id="8" name="Foliennummernplatzhalter 7">
             <a:extLst>
               <a:ext uri="{FF2B5EF4-FFF2-40B4-BE49-F238E27FC236}">
-                <a16:creationId xmlns:a16="http://schemas.microsoft.com/office/drawing/2014/main" id="{8546ADD4-A434-4A15-B639-BB0897136588}"/>
+                <a16:creationId xmlns:a16="http://schemas.microsoft.com/office/drawing/2014/main" xmlns="" id="{8546ADD4-A434-4A15-B639-BB0897136588}"/>
               </a:ext>
             </a:extLst>
           </p:cNvPr>
@@ -31883,7 +32178,7 @@
           <p:cNvPr id="2" name="Datumsplatzhalter 1">
             <a:extLst>
               <a:ext uri="{FF2B5EF4-FFF2-40B4-BE49-F238E27FC236}">
-                <a16:creationId xmlns:a16="http://schemas.microsoft.com/office/drawing/2014/main" id="{A19FBC2B-4138-47A7-96C3-6075667C774D}"/>
+                <a16:creationId xmlns:a16="http://schemas.microsoft.com/office/drawing/2014/main" xmlns="" id="{A19FBC2B-4138-47A7-96C3-6075667C774D}"/>
               </a:ext>
             </a:extLst>
           </p:cNvPr>
@@ -31902,7 +32197,7 @@
             <a:fld id="{17C2562E-359A-3C42-BBEF-E02CE97BECB1}" type="datetimeFigureOut">
               <a:rPr lang="de-DE" smtClean="0"/>
               <a:pPr/>
-              <a:t>19.10.2017</a:t>
+              <a:t>19.10.17</a:t>
             </a:fld>
             <a:endParaRPr lang="de-DE" dirty="0"/>
           </a:p>
@@ -31913,7 +32208,7 @@
           <p:cNvPr id="8" name="Fußzeilenplatzhalter 7">
             <a:extLst>
               <a:ext uri="{FF2B5EF4-FFF2-40B4-BE49-F238E27FC236}">
-                <a16:creationId xmlns:a16="http://schemas.microsoft.com/office/drawing/2014/main" id="{193B0760-28CB-4559-9AEF-4866F2FCE0E4}"/>
+                <a16:creationId xmlns:a16="http://schemas.microsoft.com/office/drawing/2014/main" xmlns="" id="{193B0760-28CB-4559-9AEF-4866F2FCE0E4}"/>
               </a:ext>
             </a:extLst>
           </p:cNvPr>
@@ -31938,7 +32233,7 @@
           <p:cNvPr id="11" name="Foliennummernplatzhalter 10">
             <a:extLst>
               <a:ext uri="{FF2B5EF4-FFF2-40B4-BE49-F238E27FC236}">
-                <a16:creationId xmlns:a16="http://schemas.microsoft.com/office/drawing/2014/main" id="{A263DBAA-5BAE-421E-BCAE-39992A39B610}"/>
+                <a16:creationId xmlns:a16="http://schemas.microsoft.com/office/drawing/2014/main" xmlns="" id="{A263DBAA-5BAE-421E-BCAE-39992A39B610}"/>
               </a:ext>
             </a:extLst>
           </p:cNvPr>
@@ -32145,7 +32440,7 @@
             <a:fld id="{17C2562E-359A-3C42-BBEF-E02CE97BECB1}" type="datetimeFigureOut">
               <a:rPr lang="de-DE" smtClean="0"/>
               <a:pPr/>
-              <a:t>19.10.2017</a:t>
+              <a:t>19.10.17</a:t>
             </a:fld>
             <a:endParaRPr lang="de-DE" dirty="0"/>
           </a:p>
@@ -32720,7 +33015,7 @@
             <a:fld id="{17C2562E-359A-3C42-BBEF-E02CE97BECB1}" type="datetimeFigureOut">
               <a:rPr lang="de-DE" smtClean="0"/>
               <a:pPr/>
-              <a:t>19.10.2017</a:t>
+              <a:t>19.10.17</a:t>
             </a:fld>
             <a:endParaRPr lang="de-DE" dirty="0"/>
           </a:p>
@@ -32844,7 +33139,7 @@
           <p:cNvPr id="11" name="Titel 1">
             <a:extLst>
               <a:ext uri="{FF2B5EF4-FFF2-40B4-BE49-F238E27FC236}">
-                <a16:creationId xmlns:a16="http://schemas.microsoft.com/office/drawing/2014/main" id="{251058B0-31BE-410A-BE50-41D5389B0AAB}"/>
+                <a16:creationId xmlns:a16="http://schemas.microsoft.com/office/drawing/2014/main" xmlns="" id="{251058B0-31BE-410A-BE50-41D5389B0AAB}"/>
               </a:ext>
             </a:extLst>
           </p:cNvPr>
@@ -34309,7 +34604,7 @@
           <p:cNvPr id="2" name="Textplatzhalter 1">
             <a:extLst>
               <a:ext uri="{FF2B5EF4-FFF2-40B4-BE49-F238E27FC236}">
-                <a16:creationId xmlns:a16="http://schemas.microsoft.com/office/drawing/2014/main" id="{45003885-0277-4A8A-9B32-2C0872306E13}"/>
+                <a16:creationId xmlns:a16="http://schemas.microsoft.com/office/drawing/2014/main" xmlns="" id="{45003885-0277-4A8A-9B32-2C0872306E13}"/>
               </a:ext>
             </a:extLst>
           </p:cNvPr>
@@ -34349,7 +34644,7 @@
           <p:cNvPr id="3" name="Titel 2">
             <a:extLst>
               <a:ext uri="{FF2B5EF4-FFF2-40B4-BE49-F238E27FC236}">
-                <a16:creationId xmlns:a16="http://schemas.microsoft.com/office/drawing/2014/main" id="{EA92ABC8-8A1F-45BA-8C5F-D5DEF58C8920}"/>
+                <a16:creationId xmlns:a16="http://schemas.microsoft.com/office/drawing/2014/main" xmlns="" id="{EA92ABC8-8A1F-45BA-8C5F-D5DEF58C8920}"/>
               </a:ext>
             </a:extLst>
           </p:cNvPr>
@@ -34449,38 +34744,52 @@
           </a:bodyPr>
           <a:lstStyle/>
           <a:p>
-            <a:pPr marL="360045" indent="-360045">
+            <a:pPr>
               <a:lnSpc>
                 <a:spcPct val="150000"/>
               </a:lnSpc>
             </a:pPr>
             <a:r>
               <a:rPr lang="de-DE" dirty="0"/>
-              <a:t>Ende 2015 musste ein Nachfolger für damals eingesetzte, veraltete Framework gefunden werden</a:t>
-            </a:r>
-          </a:p>
-          <a:p>
-            <a:pPr marL="360045" indent="-360045">
+              <a:t>Ende 2015 musste ein Nachfolger für damals eingesetzte, veraltete Framework gefunden </a:t>
+            </a:r>
+            <a:r>
+              <a:rPr lang="de-DE" dirty="0" smtClean="0"/>
+              <a:t>werden</a:t>
+            </a:r>
+          </a:p>
+          <a:p>
+            <a:pPr>
               <a:lnSpc>
                 <a:spcPct val="150000"/>
               </a:lnSpc>
-              <a:buSzPct val="64999"/>
             </a:pPr>
             <a:r>
-              <a:rPr lang="de-DE" dirty="0"/>
-              <a:t>Erste Version: Angular2 Alpha 36</a:t>
-            </a:r>
-          </a:p>
-          <a:p>
-            <a:pPr marL="360045" indent="-360045">
+              <a:rPr lang="de-DE" dirty="0" smtClean="0"/>
+              <a:t>Erste </a:t>
+            </a:r>
+            <a:r>
+              <a:rPr lang="de-DE" dirty="0"/>
+              <a:t>Version: Angular2 Alpha </a:t>
+            </a:r>
+            <a:r>
+              <a:rPr lang="de-DE" dirty="0" smtClean="0"/>
+              <a:t>36</a:t>
+            </a:r>
+          </a:p>
+          <a:p>
+            <a:pPr>
               <a:lnSpc>
                 <a:spcPct val="150000"/>
               </a:lnSpc>
-              <a:buSzPct val="64999"/>
             </a:pPr>
             <a:r>
-              <a:rPr lang="de-DE" dirty="0"/>
-              <a:t>Hürden bei der Einführung</a:t>
+              <a:rPr lang="de-DE" dirty="0" smtClean="0"/>
+              <a:t>Hürden </a:t>
+            </a:r>
+            <a:r>
+              <a:rPr lang="de-DE" dirty="0"/>
+              <a:t>bei der Einführung</a:t>
             </a:r>
           </a:p>
           <a:p>
@@ -34535,9 +34844,18 @@
               <a:t>Anfängliche hohe Komplexität und viel </a:t>
             </a:r>
             <a:r>
-              <a:rPr lang="de-DE" dirty="0" err="1"/>
-              <a:t>BreakingChanges</a:t>
-            </a:r>
+              <a:rPr lang="de-DE" dirty="0" err="1" smtClean="0"/>
+              <a:t>Breaking</a:t>
+            </a:r>
+            <a:r>
+              <a:rPr lang="de-DE" dirty="0" smtClean="0"/>
+              <a:t> </a:t>
+            </a:r>
+            <a:r>
+              <a:rPr lang="de-DE" dirty="0" err="1" smtClean="0"/>
+              <a:t>Changes</a:t>
+            </a:r>
+            <a:endParaRPr lang="de-DE" dirty="0"/>
           </a:p>
           <a:p>
             <a:pPr marL="719455" lvl="1" indent="-359410">
@@ -34548,7 +34866,15 @@
             </a:pPr>
             <a:r>
               <a:rPr lang="de-DE" dirty="0"/>
-              <a:t>Große Defizite im Vergleich zum bis dato eingesetztem Framework</a:t>
+              <a:t>Große Defizite im Vergleich zum bis dato </a:t>
+            </a:r>
+            <a:r>
+              <a:rPr lang="de-DE" dirty="0" smtClean="0"/>
+              <a:t>eingesetzten </a:t>
+            </a:r>
+            <a:r>
+              <a:rPr lang="de-DE" dirty="0"/>
+              <a:t>Framework</a:t>
             </a:r>
           </a:p>
           <a:p>
@@ -34601,7 +34927,7 @@
             <a:fld id="{17C2562E-359A-3C42-BBEF-E02CE97BECB1}" type="datetimeFigureOut">
               <a:rPr lang="de-DE" smtClean="0"/>
               <a:pPr/>
-              <a:t>19.10.2017</a:t>
+              <a:t>19.10.17</a:t>
             </a:fld>
             <a:endParaRPr lang="de-DE" dirty="0"/>
           </a:p>
@@ -34745,10 +35071,9 @@
               <a:rPr lang="de-DE" dirty="0"/>
               <a:t>-Registry, die mit npmjs.com kommunizieren kann</a:t>
             </a:r>
-            <a:endParaRPr lang="de-DE"/>
-          </a:p>
-          <a:p>
-            <a:pPr marL="719455" lvl="1" indent="-359410">
+          </a:p>
+          <a:p>
+            <a:pPr marL="359818" indent="-359410">
               <a:lnSpc>
                 <a:spcPct val="150000"/>
               </a:lnSpc>
@@ -34759,7 +35084,7 @@
             </a:r>
           </a:p>
           <a:p>
-            <a:pPr marL="719455" lvl="1" indent="-359410">
+            <a:pPr marL="359818" indent="-359410">
               <a:lnSpc>
                 <a:spcPct val="150000"/>
               </a:lnSpc>
@@ -34774,7 +35099,7 @@
             </a:r>
           </a:p>
           <a:p>
-            <a:pPr marL="719455" lvl="1" indent="-359410">
+            <a:pPr marL="359818" indent="-359410">
               <a:lnSpc>
                 <a:spcPct val="150000"/>
               </a:lnSpc>
@@ -34803,7 +35128,7 @@
             </a:r>
           </a:p>
           <a:p>
-            <a:pPr marL="719455" lvl="1" indent="-359410">
+            <a:pPr marL="359818" indent="-359410">
               <a:lnSpc>
                 <a:spcPct val="150000"/>
               </a:lnSpc>
@@ -34837,7 +35162,7 @@
             <a:fld id="{17C2562E-359A-3C42-BBEF-E02CE97BECB1}" type="datetimeFigureOut">
               <a:rPr lang="de-DE" smtClean="0"/>
               <a:pPr/>
-              <a:t>19.10.2017</a:t>
+              <a:t>19.10.17</a:t>
             </a:fld>
             <a:endParaRPr lang="de-DE" dirty="0"/>
           </a:p>
@@ -35147,7 +35472,7 @@
             <a:fld id="{17C2562E-359A-3C42-BBEF-E02CE97BECB1}" type="datetimeFigureOut">
               <a:rPr lang="de-DE" smtClean="0"/>
               <a:pPr/>
-              <a:t>19.10.2017</a:t>
+              <a:t>19.10.17</a:t>
             </a:fld>
             <a:endParaRPr lang="de-DE" dirty="0"/>
           </a:p>
@@ -35313,7 +35638,7 @@
             <a:fld id="{17C2562E-359A-3C42-BBEF-E02CE97BECB1}" type="datetimeFigureOut">
               <a:rPr lang="de-DE" smtClean="0"/>
               <a:pPr/>
-              <a:t>19.10.2017</a:t>
+              <a:t>19.10.17</a:t>
             </a:fld>
             <a:endParaRPr lang="de-DE" dirty="0"/>
           </a:p>
@@ -35554,7 +35879,7 @@
             <a:fld id="{17C2562E-359A-3C42-BBEF-E02CE97BECB1}" type="datetimeFigureOut">
               <a:rPr lang="de-DE" smtClean="0"/>
               <a:pPr/>
-              <a:t>19.10.2017</a:t>
+              <a:t>19.10.17</a:t>
             </a:fld>
             <a:endParaRPr lang="de-DE" dirty="0"/>
           </a:p>
@@ -35815,7 +36140,7 @@
             <a:fld id="{17C2562E-359A-3C42-BBEF-E02CE97BECB1}" type="datetimeFigureOut">
               <a:rPr lang="de-DE" smtClean="0"/>
               <a:pPr/>
-              <a:t>19.10.2017</a:t>
+              <a:t>19.10.17</a:t>
             </a:fld>
             <a:endParaRPr lang="de-DE" dirty="0"/>
           </a:p>
@@ -35981,7 +36306,7 @@
             <a:fld id="{17C2562E-359A-3C42-BBEF-E02CE97BECB1}" type="datetimeFigureOut">
               <a:rPr lang="de-DE" smtClean="0"/>
               <a:pPr/>
-              <a:t>19.10.2017</a:t>
+              <a:t>19.10.17</a:t>
             </a:fld>
             <a:endParaRPr lang="de-DE" dirty="0"/>
           </a:p>
@@ -36219,7 +36544,7 @@
             <a:fld id="{17C2562E-359A-3C42-BBEF-E02CE97BECB1}" type="datetimeFigureOut">
               <a:rPr lang="de-DE" smtClean="0"/>
               <a:pPr/>
-              <a:t>19.10.2017</a:t>
+              <a:t>19.10.17</a:t>
             </a:fld>
             <a:endParaRPr lang="de-DE" dirty="0"/>
           </a:p>
@@ -36497,7 +36822,7 @@
             <a:fld id="{17C2562E-359A-3C42-BBEF-E02CE97BECB1}" type="datetimeFigureOut">
               <a:rPr lang="de-DE" smtClean="0"/>
               <a:pPr/>
-              <a:t>19.10.2017</a:t>
+              <a:t>19.10.17</a:t>
             </a:fld>
             <a:endParaRPr lang="de-DE" dirty="0"/>
           </a:p>
@@ -36801,7 +37126,7 @@
             <a:fld id="{17C2562E-359A-3C42-BBEF-E02CE97BECB1}" type="datetimeFigureOut">
               <a:rPr lang="de-DE" smtClean="0"/>
               <a:pPr/>
-              <a:t>19.10.2017</a:t>
+              <a:t>19.10.17</a:t>
             </a:fld>
             <a:endParaRPr lang="de-DE" dirty="0"/>
           </a:p>
@@ -37146,7 +37471,7 @@
             <a:fld id="{17C2562E-359A-3C42-BBEF-E02CE97BECB1}" type="datetimeFigureOut">
               <a:rPr lang="de-DE" smtClean="0"/>
               <a:pPr/>
-              <a:t>19.10.2017</a:t>
+              <a:t>19.10.17</a:t>
             </a:fld>
             <a:endParaRPr lang="de-DE" dirty="0"/>
           </a:p>
@@ -37364,7 +37689,7 @@
             <a:fld id="{17C2562E-359A-3C42-BBEF-E02CE97BECB1}" type="datetimeFigureOut">
               <a:rPr lang="de-DE" smtClean="0"/>
               <a:pPr/>
-              <a:t>19.10.2017</a:t>
+              <a:t>19.10.17</a:t>
             </a:fld>
             <a:endParaRPr lang="de-DE" dirty="0"/>
           </a:p>
@@ -37655,7 +37980,7 @@
             <a:fld id="{17C2562E-359A-3C42-BBEF-E02CE97BECB1}" type="datetimeFigureOut">
               <a:rPr lang="de-DE" smtClean="0"/>
               <a:pPr/>
-              <a:t>19.10.2017</a:t>
+              <a:t>19.10.17</a:t>
             </a:fld>
             <a:endParaRPr lang="de-DE" dirty="0"/>
           </a:p>
@@ -37879,7 +38204,7 @@
             <a:fld id="{17C2562E-359A-3C42-BBEF-E02CE97BECB1}" type="datetimeFigureOut">
               <a:rPr lang="de-DE" smtClean="0"/>
               <a:pPr/>
-              <a:t>19.10.2017</a:t>
+              <a:t>19.10.17</a:t>
             </a:fld>
             <a:endParaRPr lang="de-DE" dirty="0"/>
           </a:p>
@@ -38116,7 +38441,7 @@
             <a:fld id="{17C2562E-359A-3C42-BBEF-E02CE97BECB1}" type="datetimeFigureOut">
               <a:rPr lang="de-DE" smtClean="0"/>
               <a:pPr/>
-              <a:t>19.10.2017</a:t>
+              <a:t>19.10.17</a:t>
             </a:fld>
             <a:endParaRPr lang="de-DE" dirty="0"/>
           </a:p>
@@ -38282,7 +38607,7 @@
             <a:fld id="{17C2562E-359A-3C42-BBEF-E02CE97BECB1}" type="datetimeFigureOut">
               <a:rPr lang="de-DE" smtClean="0"/>
               <a:pPr/>
-              <a:t>19.10.2017</a:t>
+              <a:t>19.10.17</a:t>
             </a:fld>
             <a:endParaRPr lang="de-DE" dirty="0"/>
           </a:p>
@@ -38572,7 +38897,7 @@
             <a:fld id="{17C2562E-359A-3C42-BBEF-E02CE97BECB1}" type="datetimeFigureOut">
               <a:rPr lang="de-DE" smtClean="0"/>
               <a:pPr/>
-              <a:t>19.10.2017</a:t>
+              <a:t>19.10.17</a:t>
             </a:fld>
             <a:endParaRPr lang="de-DE" dirty="0"/>
           </a:p>
@@ -38738,7 +39063,7 @@
             <a:fld id="{17C2562E-359A-3C42-BBEF-E02CE97BECB1}" type="datetimeFigureOut">
               <a:rPr lang="de-DE" smtClean="0"/>
               <a:pPr/>
-              <a:t>19.10.2017</a:t>
+              <a:t>19.10.17</a:t>
             </a:fld>
             <a:endParaRPr lang="de-DE" dirty="0"/>
           </a:p>
@@ -38888,7 +39213,7 @@
             <a:fld id="{17C2562E-359A-3C42-BBEF-E02CE97BECB1}" type="datetimeFigureOut">
               <a:rPr lang="de-DE" smtClean="0"/>
               <a:pPr/>
-              <a:t>19.10.2017</a:t>
+              <a:t>19.10.17</a:t>
             </a:fld>
             <a:endParaRPr lang="de-DE" dirty="0"/>
           </a:p>
@@ -39113,7 +39438,7 @@
           <p:cNvPr id="5" name="Datumsplatzhalter 4">
             <a:extLst>
               <a:ext uri="{FF2B5EF4-FFF2-40B4-BE49-F238E27FC236}">
-                <a16:creationId xmlns:a16="http://schemas.microsoft.com/office/drawing/2014/main" id="{D471591C-E430-45E7-A587-2CEC0AF88DA0}"/>
+                <a16:creationId xmlns:a16="http://schemas.microsoft.com/office/drawing/2014/main" xmlns="" id="{D471591C-E430-45E7-A587-2CEC0AF88DA0}"/>
               </a:ext>
             </a:extLst>
           </p:cNvPr>
@@ -39131,7 +39456,7 @@
           <a:p>
             <a:fld id="{D3ADFBD6-4690-496C-B9C9-0BEF0B938F74}" type="datetime1">
               <a:rPr lang="de-DE" smtClean="0"/>
-              <a:t>19.10.2017</a:t>
+              <a:t>19.10.17</a:t>
             </a:fld>
             <a:endParaRPr lang="de-DE" dirty="0"/>
           </a:p>
@@ -39142,7 +39467,7 @@
           <p:cNvPr id="6" name="Fußzeilenplatzhalter 5">
             <a:extLst>
               <a:ext uri="{FF2B5EF4-FFF2-40B4-BE49-F238E27FC236}">
-                <a16:creationId xmlns:a16="http://schemas.microsoft.com/office/drawing/2014/main" id="{B488671B-A101-43AC-84F6-1F2F8515424C}"/>
+                <a16:creationId xmlns:a16="http://schemas.microsoft.com/office/drawing/2014/main" xmlns="" id="{B488671B-A101-43AC-84F6-1F2F8515424C}"/>
               </a:ext>
             </a:extLst>
           </p:cNvPr>
@@ -39167,7 +39492,7 @@
           <p:cNvPr id="7" name="Foliennummernplatzhalter 6">
             <a:extLst>
               <a:ext uri="{FF2B5EF4-FFF2-40B4-BE49-F238E27FC236}">
-                <a16:creationId xmlns:a16="http://schemas.microsoft.com/office/drawing/2014/main" id="{8E977D85-C22B-4016-AC2C-F3FDCE1BCBEB}"/>
+                <a16:creationId xmlns:a16="http://schemas.microsoft.com/office/drawing/2014/main" xmlns="" id="{8E977D85-C22B-4016-AC2C-F3FDCE1BCBEB}"/>
               </a:ext>
             </a:extLst>
           </p:cNvPr>
@@ -39395,7 +39720,7 @@
             <a:fld id="{17C2562E-359A-3C42-BBEF-E02CE97BECB1}" type="datetimeFigureOut">
               <a:rPr lang="de-DE" smtClean="0"/>
               <a:pPr/>
-              <a:t>19.10.2017</a:t>
+              <a:t>19.10.17</a:t>
             </a:fld>
             <a:endParaRPr lang="de-DE" dirty="0"/>
           </a:p>
@@ -39518,7 +39843,7 @@
             <a:fld id="{17C2562E-359A-3C42-BBEF-E02CE97BECB1}" type="datetimeFigureOut">
               <a:rPr lang="de-DE" smtClean="0"/>
               <a:pPr/>
-              <a:t>19.10.2017</a:t>
+              <a:t>19.10.17</a:t>
             </a:fld>
             <a:endParaRPr lang="de-DE" dirty="0"/>
           </a:p>
@@ -39808,7 +40133,7 @@
             <a:fld id="{17C2562E-359A-3C42-BBEF-E02CE97BECB1}" type="datetimeFigureOut">
               <a:rPr lang="de-DE" smtClean="0"/>
               <a:pPr/>
-              <a:t>19.10.2017</a:t>
+              <a:t>19.10.17</a:t>
             </a:fld>
             <a:endParaRPr lang="de-DE" dirty="0"/>
           </a:p>
@@ -39866,7 +40191,7 @@
           <p:cNvPr id="8" name="Grafik 8">
             <a:extLst>
               <a:ext uri="{FF2B5EF4-FFF2-40B4-BE49-F238E27FC236}">
-                <a16:creationId xmlns:a16="http://schemas.microsoft.com/office/drawing/2014/main" id="{7CF3AEDB-FAEB-4721-8ACE-7522ACB7DC22}"/>
+                <a16:creationId xmlns:a16="http://schemas.microsoft.com/office/drawing/2014/main" xmlns="" id="{7CF3AEDB-FAEB-4721-8ACE-7522ACB7DC22}"/>
               </a:ext>
             </a:extLst>
           </p:cNvPr>
@@ -39896,7 +40221,7 @@
           <p:cNvPr id="11" name="Textfeld 10">
             <a:extLst>
               <a:ext uri="{FF2B5EF4-FFF2-40B4-BE49-F238E27FC236}">
-                <a16:creationId xmlns:a16="http://schemas.microsoft.com/office/drawing/2014/main" id="{E75A7EFF-4B3E-4C10-9F74-6849362D15CF}"/>
+                <a16:creationId xmlns:a16="http://schemas.microsoft.com/office/drawing/2014/main" xmlns="" id="{E75A7EFF-4B3E-4C10-9F74-6849362D15CF}"/>
               </a:ext>
             </a:extLst>
           </p:cNvPr>
@@ -40151,7 +40476,7 @@
             <a:fld id="{17C2562E-359A-3C42-BBEF-E02CE97BECB1}" type="datetimeFigureOut">
               <a:rPr lang="de-DE" smtClean="0"/>
               <a:pPr/>
-              <a:t>19.10.2017</a:t>
+              <a:t>19.10.17</a:t>
             </a:fld>
             <a:endParaRPr lang="de-DE" dirty="0"/>
           </a:p>
@@ -40336,7 +40661,7 @@
             <a:fld id="{17C2562E-359A-3C42-BBEF-E02CE97BECB1}" type="datetimeFigureOut">
               <a:rPr lang="de-DE" smtClean="0"/>
               <a:pPr/>
-              <a:t>19.10.2017</a:t>
+              <a:t>19.10.17</a:t>
             </a:fld>
             <a:endParaRPr lang="de-DE" dirty="0"/>
           </a:p>
@@ -40604,7 +40929,7 @@
             <a:fld id="{17C2562E-359A-3C42-BBEF-E02CE97BECB1}" type="datetimeFigureOut">
               <a:rPr lang="de-DE" smtClean="0"/>
               <a:pPr/>
-              <a:t>19.10.2017</a:t>
+              <a:t>19.10.17</a:t>
             </a:fld>
             <a:endParaRPr lang="de-DE" dirty="0"/>
           </a:p>

</xml_diff>

<commit_message>
Backupfolie für swapi-Anbindung #4
</commit_message>
<xml_diff>
--- a/docs/Angular-Workshop-20.10.pptx
+++ b/docs/Angular-Workshop-20.10.pptx
@@ -8,10 +8,10 @@
     <p:sldMasterId id="2147483721" r:id="rId4"/>
   </p:sldMasterIdLst>
   <p:notesMasterIdLst>
-    <p:notesMasterId r:id="rId32"/>
+    <p:notesMasterId r:id="rId33"/>
   </p:notesMasterIdLst>
   <p:handoutMasterIdLst>
-    <p:handoutMasterId r:id="rId33"/>
+    <p:handoutMasterId r:id="rId34"/>
   </p:handoutMasterIdLst>
   <p:sldIdLst>
     <p:sldId id="256" r:id="rId5"/>
@@ -40,7 +40,8 @@
     <p:sldId id="291" r:id="rId28"/>
     <p:sldId id="292" r:id="rId29"/>
     <p:sldId id="293" r:id="rId30"/>
-    <p:sldId id="279" r:id="rId31"/>
+    <p:sldId id="296" r:id="rId31"/>
+    <p:sldId id="279" r:id="rId32"/>
   </p:sldIdLst>
   <p:sldSz cx="13004800" cy="7315200"/>
   <p:notesSz cx="6858000" cy="9144000"/>
@@ -6250,8 +6251,8 @@
   <dgm:cxnLst>
     <dgm:cxn modelId="{B0721CA3-19A8-D04D-857E-407EB9BC671A}" type="presOf" srcId="{9E409708-FC7B-604D-AE00-C59A3BC6C774}" destId="{AC19049A-FF2E-864B-A995-C88CCE14464E}" srcOrd="0" destOrd="0" presId="urn:microsoft.com/office/officeart/2005/8/layout/process1"/>
     <dgm:cxn modelId="{9AD13F03-FA98-2546-A1F6-086D6D749FC5}" srcId="{82BD223D-4D97-664B-8FA2-F811E68132B9}" destId="{9F5FBEB5-0D91-6442-BAE6-3C8FE451890E}" srcOrd="1" destOrd="0" parTransId="{44185C10-A566-584D-8792-6F8CDA31CFEF}" sibTransId="{D96BFFC3-C37B-F740-8CDD-799CDA9C29AF}"/>
+    <dgm:cxn modelId="{E033EC1A-0A6B-414C-BA47-A69CB3DDC2D8}" type="presOf" srcId="{EE7B1B78-2CB7-C647-875E-937A240D7736}" destId="{26BA574D-A9C9-D847-8AAF-A8F48018C2C1}" srcOrd="1" destOrd="0" presId="urn:microsoft.com/office/officeart/2005/8/layout/process1"/>
     <dgm:cxn modelId="{E198D6D4-91AD-F643-8652-6843F8F235B1}" srcId="{82BD223D-4D97-664B-8FA2-F811E68132B9}" destId="{9E409708-FC7B-604D-AE00-C59A3BC6C774}" srcOrd="0" destOrd="0" parTransId="{AF54B174-D1EC-FF4E-9C8F-E68F41ABE717}" sibTransId="{EE7B1B78-2CB7-C647-875E-937A240D7736}"/>
-    <dgm:cxn modelId="{E033EC1A-0A6B-414C-BA47-A69CB3DDC2D8}" type="presOf" srcId="{EE7B1B78-2CB7-C647-875E-937A240D7736}" destId="{26BA574D-A9C9-D847-8AAF-A8F48018C2C1}" srcOrd="1" destOrd="0" presId="urn:microsoft.com/office/officeart/2005/8/layout/process1"/>
     <dgm:cxn modelId="{1B0CBD2C-F6A5-BE47-AA25-80FF0DBC223D}" type="presOf" srcId="{82BD223D-4D97-664B-8FA2-F811E68132B9}" destId="{5C4E5A0B-1B12-EC4C-BCB7-F3E190AFE040}" srcOrd="0" destOrd="0" presId="urn:microsoft.com/office/officeart/2005/8/layout/process1"/>
     <dgm:cxn modelId="{E6A75DB5-821C-E345-A783-C1FE436C1B5F}" type="presOf" srcId="{EE7B1B78-2CB7-C647-875E-937A240D7736}" destId="{30EAC814-8F64-D74A-9EBA-0CBC6BE058AA}" srcOrd="0" destOrd="0" presId="urn:microsoft.com/office/officeart/2005/8/layout/process1"/>
     <dgm:cxn modelId="{32CD821A-B520-014C-9995-1247839A1615}" type="presOf" srcId="{9F5FBEB5-0D91-6442-BAE6-3C8FE451890E}" destId="{942B2FD4-F953-1241-B452-E01505D35646}" srcOrd="0" destOrd="0" presId="urn:microsoft.com/office/officeart/2005/8/layout/process1"/>
@@ -6278,523 +6279,6 @@
       <dsp:cNvGrpSpPr/>
     </dsp:nvGrpSpPr>
     <dsp:grpSpPr/>
-    <dsp:sp modelId="{AC19049A-FF2E-864B-A995-C88CCE14464E}">
-      <dsp:nvSpPr>
-        <dsp:cNvPr id="0" name=""/>
-        <dsp:cNvSpPr/>
-      </dsp:nvSpPr>
-      <dsp:spPr>
-        <a:xfrm>
-          <a:off x="10782" y="1558461"/>
-          <a:ext cx="3222641" cy="1933584"/>
-        </a:xfrm>
-        <a:prstGeom prst="roundRect">
-          <a:avLst>
-            <a:gd name="adj" fmla="val 10000"/>
-          </a:avLst>
-        </a:prstGeom>
-        <a:gradFill rotWithShape="0">
-          <a:gsLst>
-            <a:gs pos="0">
-              <a:schemeClr val="dk2">
-                <a:hueOff val="0"/>
-                <a:satOff val="0"/>
-                <a:lumOff val="0"/>
-                <a:alphaOff val="0"/>
-                <a:shade val="51000"/>
-                <a:satMod val="130000"/>
-              </a:schemeClr>
-            </a:gs>
-            <a:gs pos="80000">
-              <a:schemeClr val="dk2">
-                <a:hueOff val="0"/>
-                <a:satOff val="0"/>
-                <a:lumOff val="0"/>
-                <a:alphaOff val="0"/>
-                <a:shade val="93000"/>
-                <a:satMod val="130000"/>
-              </a:schemeClr>
-            </a:gs>
-            <a:gs pos="100000">
-              <a:schemeClr val="dk2">
-                <a:hueOff val="0"/>
-                <a:satOff val="0"/>
-                <a:lumOff val="0"/>
-                <a:alphaOff val="0"/>
-                <a:shade val="94000"/>
-                <a:satMod val="135000"/>
-              </a:schemeClr>
-            </a:gs>
-          </a:gsLst>
-          <a:lin ang="16200000" scaled="0"/>
-        </a:gradFill>
-        <a:ln>
-          <a:noFill/>
-        </a:ln>
-        <a:effectLst>
-          <a:outerShdw blurRad="40000" dist="23000" dir="5400000" rotWithShape="0">
-            <a:srgbClr val="000000">
-              <a:alpha val="35000"/>
-            </a:srgbClr>
-          </a:outerShdw>
-        </a:effectLst>
-      </dsp:spPr>
-      <dsp:style>
-        <a:lnRef idx="0">
-          <a:scrgbClr r="0" g="0" b="0"/>
-        </a:lnRef>
-        <a:fillRef idx="3">
-          <a:scrgbClr r="0" g="0" b="0"/>
-        </a:fillRef>
-        <a:effectRef idx="2">
-          <a:scrgbClr r="0" g="0" b="0"/>
-        </a:effectRef>
-        <a:fontRef idx="minor">
-          <a:schemeClr val="lt1"/>
-        </a:fontRef>
-      </dsp:style>
-      <dsp:txBody>
-        <a:bodyPr spcFirstLastPara="0" vert="horz" wrap="square" lIns="144780" tIns="144780" rIns="144780" bIns="144780" numCol="1" spcCol="1270" anchor="ctr" anchorCtr="0">
-          <a:noAutofit/>
-        </a:bodyPr>
-        <a:lstStyle/>
-        <a:p>
-          <a:pPr lvl="0" algn="ctr" defTabSz="1689100">
-            <a:lnSpc>
-              <a:spcPct val="90000"/>
-            </a:lnSpc>
-            <a:spcBef>
-              <a:spcPct val="0"/>
-            </a:spcBef>
-            <a:spcAft>
-              <a:spcPct val="35000"/>
-            </a:spcAft>
-          </a:pPr>
-          <a:r>
-            <a:rPr lang="de-DE" sz="3800" kern="1200" dirty="0"/>
-            <a:t>Erstellen der Anwendung</a:t>
-          </a:r>
-        </a:p>
-      </dsp:txBody>
-      <dsp:txXfrm>
-        <a:off x="67415" y="1615094"/>
-        <a:ext cx="3109375" cy="1820318"/>
-      </dsp:txXfrm>
-    </dsp:sp>
-    <dsp:sp modelId="{30EAC814-8F64-D74A-9EBA-0CBC6BE058AA}">
-      <dsp:nvSpPr>
-        <dsp:cNvPr id="0" name=""/>
-        <dsp:cNvSpPr/>
-      </dsp:nvSpPr>
-      <dsp:spPr>
-        <a:xfrm>
-          <a:off x="3555687" y="2125646"/>
-          <a:ext cx="683199" cy="799214"/>
-        </a:xfrm>
-        <a:prstGeom prst="rightArrow">
-          <a:avLst>
-            <a:gd name="adj1" fmla="val 60000"/>
-            <a:gd name="adj2" fmla="val 50000"/>
-          </a:avLst>
-        </a:prstGeom>
-        <a:gradFill rotWithShape="0">
-          <a:gsLst>
-            <a:gs pos="0">
-              <a:schemeClr val="dk2">
-                <a:tint val="60000"/>
-                <a:hueOff val="0"/>
-                <a:satOff val="0"/>
-                <a:lumOff val="0"/>
-                <a:alphaOff val="0"/>
-                <a:shade val="51000"/>
-                <a:satMod val="130000"/>
-              </a:schemeClr>
-            </a:gs>
-            <a:gs pos="80000">
-              <a:schemeClr val="dk2">
-                <a:tint val="60000"/>
-                <a:hueOff val="0"/>
-                <a:satOff val="0"/>
-                <a:lumOff val="0"/>
-                <a:alphaOff val="0"/>
-                <a:shade val="93000"/>
-                <a:satMod val="130000"/>
-              </a:schemeClr>
-            </a:gs>
-            <a:gs pos="100000">
-              <a:schemeClr val="dk2">
-                <a:tint val="60000"/>
-                <a:hueOff val="0"/>
-                <a:satOff val="0"/>
-                <a:lumOff val="0"/>
-                <a:alphaOff val="0"/>
-                <a:shade val="94000"/>
-                <a:satMod val="135000"/>
-              </a:schemeClr>
-            </a:gs>
-          </a:gsLst>
-          <a:lin ang="16200000" scaled="0"/>
-        </a:gradFill>
-        <a:ln>
-          <a:noFill/>
-        </a:ln>
-        <a:effectLst>
-          <a:outerShdw blurRad="40000" dist="23000" dir="5400000" rotWithShape="0">
-            <a:srgbClr val="000000">
-              <a:alpha val="35000"/>
-            </a:srgbClr>
-          </a:outerShdw>
-        </a:effectLst>
-      </dsp:spPr>
-      <dsp:style>
-        <a:lnRef idx="0">
-          <a:scrgbClr r="0" g="0" b="0"/>
-        </a:lnRef>
-        <a:fillRef idx="3">
-          <a:scrgbClr r="0" g="0" b="0"/>
-        </a:fillRef>
-        <a:effectRef idx="2">
-          <a:scrgbClr r="0" g="0" b="0"/>
-        </a:effectRef>
-        <a:fontRef idx="minor">
-          <a:schemeClr val="lt1"/>
-        </a:fontRef>
-      </dsp:style>
-      <dsp:txBody>
-        <a:bodyPr spcFirstLastPara="0" vert="horz" wrap="square" lIns="0" tIns="0" rIns="0" bIns="0" numCol="1" spcCol="1270" anchor="ctr" anchorCtr="0">
-          <a:noAutofit/>
-        </a:bodyPr>
-        <a:lstStyle/>
-        <a:p>
-          <a:pPr lvl="0" algn="ctr" defTabSz="1377950">
-            <a:lnSpc>
-              <a:spcPct val="90000"/>
-            </a:lnSpc>
-            <a:spcBef>
-              <a:spcPct val="0"/>
-            </a:spcBef>
-            <a:spcAft>
-              <a:spcPct val="35000"/>
-            </a:spcAft>
-          </a:pPr>
-          <a:endParaRPr lang="de-DE" sz="3100" kern="1200"/>
-        </a:p>
-      </dsp:txBody>
-      <dsp:txXfrm>
-        <a:off x="3555687" y="2285489"/>
-        <a:ext cx="478239" cy="479528"/>
-      </dsp:txXfrm>
-    </dsp:sp>
-    <dsp:sp modelId="{942B2FD4-F953-1241-B452-E01505D35646}">
-      <dsp:nvSpPr>
-        <dsp:cNvPr id="0" name=""/>
-        <dsp:cNvSpPr/>
-      </dsp:nvSpPr>
-      <dsp:spPr>
-        <a:xfrm>
-          <a:off x="4522479" y="1558461"/>
-          <a:ext cx="3222641" cy="1933584"/>
-        </a:xfrm>
-        <a:prstGeom prst="roundRect">
-          <a:avLst>
-            <a:gd name="adj" fmla="val 10000"/>
-          </a:avLst>
-        </a:prstGeom>
-        <a:gradFill rotWithShape="0">
-          <a:gsLst>
-            <a:gs pos="0">
-              <a:schemeClr val="dk2">
-                <a:hueOff val="0"/>
-                <a:satOff val="0"/>
-                <a:lumOff val="0"/>
-                <a:alphaOff val="0"/>
-                <a:shade val="51000"/>
-                <a:satMod val="130000"/>
-              </a:schemeClr>
-            </a:gs>
-            <a:gs pos="80000">
-              <a:schemeClr val="dk2">
-                <a:hueOff val="0"/>
-                <a:satOff val="0"/>
-                <a:lumOff val="0"/>
-                <a:alphaOff val="0"/>
-                <a:shade val="93000"/>
-                <a:satMod val="130000"/>
-              </a:schemeClr>
-            </a:gs>
-            <a:gs pos="100000">
-              <a:schemeClr val="dk2">
-                <a:hueOff val="0"/>
-                <a:satOff val="0"/>
-                <a:lumOff val="0"/>
-                <a:alphaOff val="0"/>
-                <a:shade val="94000"/>
-                <a:satMod val="135000"/>
-              </a:schemeClr>
-            </a:gs>
-          </a:gsLst>
-          <a:lin ang="16200000" scaled="0"/>
-        </a:gradFill>
-        <a:ln>
-          <a:noFill/>
-        </a:ln>
-        <a:effectLst>
-          <a:outerShdw blurRad="40000" dist="23000" dir="5400000" rotWithShape="0">
-            <a:srgbClr val="000000">
-              <a:alpha val="35000"/>
-            </a:srgbClr>
-          </a:outerShdw>
-        </a:effectLst>
-      </dsp:spPr>
-      <dsp:style>
-        <a:lnRef idx="0">
-          <a:scrgbClr r="0" g="0" b="0"/>
-        </a:lnRef>
-        <a:fillRef idx="3">
-          <a:scrgbClr r="0" g="0" b="0"/>
-        </a:fillRef>
-        <a:effectRef idx="2">
-          <a:scrgbClr r="0" g="0" b="0"/>
-        </a:effectRef>
-        <a:fontRef idx="minor">
-          <a:schemeClr val="lt1"/>
-        </a:fontRef>
-      </dsp:style>
-      <dsp:txBody>
-        <a:bodyPr spcFirstLastPara="0" vert="horz" wrap="square" lIns="144780" tIns="144780" rIns="144780" bIns="144780" numCol="1" spcCol="1270" anchor="ctr" anchorCtr="0">
-          <a:noAutofit/>
-        </a:bodyPr>
-        <a:lstStyle/>
-        <a:p>
-          <a:pPr lvl="0" algn="ctr" defTabSz="1689100">
-            <a:lnSpc>
-              <a:spcPct val="90000"/>
-            </a:lnSpc>
-            <a:spcBef>
-              <a:spcPct val="0"/>
-            </a:spcBef>
-            <a:spcAft>
-              <a:spcPct val="35000"/>
-            </a:spcAft>
-          </a:pPr>
-          <a:r>
-            <a:rPr lang="de-DE" sz="3800" kern="1200" dirty="0"/>
-            <a:t>Kennenlernen</a:t>
-          </a:r>
-        </a:p>
-      </dsp:txBody>
-      <dsp:txXfrm>
-        <a:off x="4579112" y="1615094"/>
-        <a:ext cx="3109375" cy="1820318"/>
-      </dsp:txXfrm>
-    </dsp:sp>
-    <dsp:sp modelId="{61D01FBA-AE9A-8140-B034-5E107AF8B06D}">
-      <dsp:nvSpPr>
-        <dsp:cNvPr id="0" name=""/>
-        <dsp:cNvSpPr/>
-      </dsp:nvSpPr>
-      <dsp:spPr>
-        <a:xfrm>
-          <a:off x="8067384" y="2125646"/>
-          <a:ext cx="683199" cy="799214"/>
-        </a:xfrm>
-        <a:prstGeom prst="rightArrow">
-          <a:avLst>
-            <a:gd name="adj1" fmla="val 60000"/>
-            <a:gd name="adj2" fmla="val 50000"/>
-          </a:avLst>
-        </a:prstGeom>
-        <a:gradFill rotWithShape="0">
-          <a:gsLst>
-            <a:gs pos="0">
-              <a:schemeClr val="dk2">
-                <a:tint val="60000"/>
-                <a:hueOff val="0"/>
-                <a:satOff val="0"/>
-                <a:lumOff val="0"/>
-                <a:alphaOff val="0"/>
-                <a:shade val="51000"/>
-                <a:satMod val="130000"/>
-              </a:schemeClr>
-            </a:gs>
-            <a:gs pos="80000">
-              <a:schemeClr val="dk2">
-                <a:tint val="60000"/>
-                <a:hueOff val="0"/>
-                <a:satOff val="0"/>
-                <a:lumOff val="0"/>
-                <a:alphaOff val="0"/>
-                <a:shade val="93000"/>
-                <a:satMod val="130000"/>
-              </a:schemeClr>
-            </a:gs>
-            <a:gs pos="100000">
-              <a:schemeClr val="dk2">
-                <a:tint val="60000"/>
-                <a:hueOff val="0"/>
-                <a:satOff val="0"/>
-                <a:lumOff val="0"/>
-                <a:alphaOff val="0"/>
-                <a:shade val="94000"/>
-                <a:satMod val="135000"/>
-              </a:schemeClr>
-            </a:gs>
-          </a:gsLst>
-          <a:lin ang="16200000" scaled="0"/>
-        </a:gradFill>
-        <a:ln>
-          <a:noFill/>
-        </a:ln>
-        <a:effectLst>
-          <a:outerShdw blurRad="40000" dist="23000" dir="5400000" rotWithShape="0">
-            <a:srgbClr val="000000">
-              <a:alpha val="35000"/>
-            </a:srgbClr>
-          </a:outerShdw>
-        </a:effectLst>
-      </dsp:spPr>
-      <dsp:style>
-        <a:lnRef idx="0">
-          <a:scrgbClr r="0" g="0" b="0"/>
-        </a:lnRef>
-        <a:fillRef idx="3">
-          <a:scrgbClr r="0" g="0" b="0"/>
-        </a:fillRef>
-        <a:effectRef idx="2">
-          <a:scrgbClr r="0" g="0" b="0"/>
-        </a:effectRef>
-        <a:fontRef idx="minor">
-          <a:schemeClr val="lt1"/>
-        </a:fontRef>
-      </dsp:style>
-      <dsp:txBody>
-        <a:bodyPr spcFirstLastPara="0" vert="horz" wrap="square" lIns="0" tIns="0" rIns="0" bIns="0" numCol="1" spcCol="1270" anchor="ctr" anchorCtr="0">
-          <a:noAutofit/>
-        </a:bodyPr>
-        <a:lstStyle/>
-        <a:p>
-          <a:pPr lvl="0" algn="ctr" defTabSz="1377950">
-            <a:lnSpc>
-              <a:spcPct val="90000"/>
-            </a:lnSpc>
-            <a:spcBef>
-              <a:spcPct val="0"/>
-            </a:spcBef>
-            <a:spcAft>
-              <a:spcPct val="35000"/>
-            </a:spcAft>
-          </a:pPr>
-          <a:endParaRPr lang="de-DE" sz="3100" kern="1200"/>
-        </a:p>
-      </dsp:txBody>
-      <dsp:txXfrm>
-        <a:off x="8067384" y="2285489"/>
-        <a:ext cx="478239" cy="479528"/>
-      </dsp:txXfrm>
-    </dsp:sp>
-    <dsp:sp modelId="{48E1AD6C-04E3-5047-8B6E-169C4DE6C0BD}">
-      <dsp:nvSpPr>
-        <dsp:cNvPr id="0" name=""/>
-        <dsp:cNvSpPr/>
-      </dsp:nvSpPr>
-      <dsp:spPr>
-        <a:xfrm>
-          <a:off x="9034176" y="1558461"/>
-          <a:ext cx="3222641" cy="1933584"/>
-        </a:xfrm>
-        <a:prstGeom prst="roundRect">
-          <a:avLst>
-            <a:gd name="adj" fmla="val 10000"/>
-          </a:avLst>
-        </a:prstGeom>
-        <a:gradFill rotWithShape="0">
-          <a:gsLst>
-            <a:gs pos="0">
-              <a:schemeClr val="dk2">
-                <a:hueOff val="0"/>
-                <a:satOff val="0"/>
-                <a:lumOff val="0"/>
-                <a:alphaOff val="0"/>
-                <a:shade val="51000"/>
-                <a:satMod val="130000"/>
-              </a:schemeClr>
-            </a:gs>
-            <a:gs pos="80000">
-              <a:schemeClr val="dk2">
-                <a:hueOff val="0"/>
-                <a:satOff val="0"/>
-                <a:lumOff val="0"/>
-                <a:alphaOff val="0"/>
-                <a:shade val="93000"/>
-                <a:satMod val="130000"/>
-              </a:schemeClr>
-            </a:gs>
-            <a:gs pos="100000">
-              <a:schemeClr val="dk2">
-                <a:hueOff val="0"/>
-                <a:satOff val="0"/>
-                <a:lumOff val="0"/>
-                <a:alphaOff val="0"/>
-                <a:shade val="94000"/>
-                <a:satMod val="135000"/>
-              </a:schemeClr>
-            </a:gs>
-          </a:gsLst>
-          <a:lin ang="16200000" scaled="0"/>
-        </a:gradFill>
-        <a:ln>
-          <a:noFill/>
-        </a:ln>
-        <a:effectLst>
-          <a:outerShdw blurRad="40000" dist="23000" dir="5400000" rotWithShape="0">
-            <a:srgbClr val="000000">
-              <a:alpha val="35000"/>
-            </a:srgbClr>
-          </a:outerShdw>
-        </a:effectLst>
-      </dsp:spPr>
-      <dsp:style>
-        <a:lnRef idx="0">
-          <a:scrgbClr r="0" g="0" b="0"/>
-        </a:lnRef>
-        <a:fillRef idx="3">
-          <a:scrgbClr r="0" g="0" b="0"/>
-        </a:fillRef>
-        <a:effectRef idx="2">
-          <a:scrgbClr r="0" g="0" b="0"/>
-        </a:effectRef>
-        <a:fontRef idx="minor">
-          <a:schemeClr val="lt1"/>
-        </a:fontRef>
-      </dsp:style>
-      <dsp:txBody>
-        <a:bodyPr spcFirstLastPara="0" vert="horz" wrap="square" lIns="144780" tIns="144780" rIns="144780" bIns="144780" numCol="1" spcCol="1270" anchor="ctr" anchorCtr="0">
-          <a:noAutofit/>
-        </a:bodyPr>
-        <a:lstStyle/>
-        <a:p>
-          <a:pPr lvl="0" algn="ctr" defTabSz="1689100">
-            <a:lnSpc>
-              <a:spcPct val="90000"/>
-            </a:lnSpc>
-            <a:spcBef>
-              <a:spcPct val="0"/>
-            </a:spcBef>
-            <a:spcAft>
-              <a:spcPct val="35000"/>
-            </a:spcAft>
-          </a:pPr>
-          <a:r>
-            <a:rPr lang="de-DE" sz="3800" kern="1200" dirty="0"/>
-            <a:t>Erste Anpassungen</a:t>
-          </a:r>
-        </a:p>
-      </dsp:txBody>
-      <dsp:txXfrm>
-        <a:off x="9090809" y="1615094"/>
-        <a:ext cx="3109375" cy="1820318"/>
-      </dsp:txXfrm>
-    </dsp:sp>
   </dsp:spTree>
 </dsp:drawing>
 </file>
@@ -6807,536 +6291,6 @@
       <dsp:cNvGrpSpPr/>
     </dsp:nvGrpSpPr>
     <dsp:grpSpPr/>
-    <dsp:sp modelId="{AC19049A-FF2E-864B-A995-C88CCE14464E}">
-      <dsp:nvSpPr>
-        <dsp:cNvPr id="0" name=""/>
-        <dsp:cNvSpPr/>
-      </dsp:nvSpPr>
-      <dsp:spPr>
-        <a:xfrm>
-          <a:off x="10782" y="1558461"/>
-          <a:ext cx="3222641" cy="1933584"/>
-        </a:xfrm>
-        <a:prstGeom prst="roundRect">
-          <a:avLst>
-            <a:gd name="adj" fmla="val 10000"/>
-          </a:avLst>
-        </a:prstGeom>
-        <a:gradFill rotWithShape="0">
-          <a:gsLst>
-            <a:gs pos="0">
-              <a:schemeClr val="dk2">
-                <a:hueOff val="0"/>
-                <a:satOff val="0"/>
-                <a:lumOff val="0"/>
-                <a:alphaOff val="0"/>
-                <a:shade val="51000"/>
-                <a:satMod val="130000"/>
-              </a:schemeClr>
-            </a:gs>
-            <a:gs pos="80000">
-              <a:schemeClr val="dk2">
-                <a:hueOff val="0"/>
-                <a:satOff val="0"/>
-                <a:lumOff val="0"/>
-                <a:alphaOff val="0"/>
-                <a:shade val="93000"/>
-                <a:satMod val="130000"/>
-              </a:schemeClr>
-            </a:gs>
-            <a:gs pos="100000">
-              <a:schemeClr val="dk2">
-                <a:hueOff val="0"/>
-                <a:satOff val="0"/>
-                <a:lumOff val="0"/>
-                <a:alphaOff val="0"/>
-                <a:shade val="94000"/>
-                <a:satMod val="135000"/>
-              </a:schemeClr>
-            </a:gs>
-          </a:gsLst>
-          <a:lin ang="16200000" scaled="0"/>
-        </a:gradFill>
-        <a:ln>
-          <a:noFill/>
-        </a:ln>
-        <a:effectLst>
-          <a:outerShdw blurRad="40000" dist="23000" dir="5400000" rotWithShape="0">
-            <a:srgbClr val="000000">
-              <a:alpha val="35000"/>
-            </a:srgbClr>
-          </a:outerShdw>
-        </a:effectLst>
-      </dsp:spPr>
-      <dsp:style>
-        <a:lnRef idx="0">
-          <a:scrgbClr r="0" g="0" b="0"/>
-        </a:lnRef>
-        <a:fillRef idx="3">
-          <a:scrgbClr r="0" g="0" b="0"/>
-        </a:fillRef>
-        <a:effectRef idx="2">
-          <a:scrgbClr r="0" g="0" b="0"/>
-        </a:effectRef>
-        <a:fontRef idx="minor">
-          <a:schemeClr val="lt1"/>
-        </a:fontRef>
-      </dsp:style>
-      <dsp:txBody>
-        <a:bodyPr spcFirstLastPara="0" vert="horz" wrap="square" lIns="137160" tIns="137160" rIns="137160" bIns="137160" numCol="1" spcCol="1270" anchor="ctr" anchorCtr="0">
-          <a:noAutofit/>
-        </a:bodyPr>
-        <a:lstStyle/>
-        <a:p>
-          <a:pPr lvl="0" algn="ctr" defTabSz="1600200">
-            <a:lnSpc>
-              <a:spcPct val="90000"/>
-            </a:lnSpc>
-            <a:spcBef>
-              <a:spcPct val="0"/>
-            </a:spcBef>
-            <a:spcAft>
-              <a:spcPct val="35000"/>
-            </a:spcAft>
-          </a:pPr>
-          <a:r>
-            <a:rPr lang="de-DE" sz="3600" kern="1200" dirty="0"/>
-            <a:t>Erstellen der Komponente „</a:t>
-          </a:r>
-          <a:r>
-            <a:rPr lang="de-DE" sz="3600" kern="1200" dirty="0" err="1"/>
-            <a:t>home</a:t>
-          </a:r>
-          <a:r>
-            <a:rPr lang="de-DE" sz="3600" kern="1200" dirty="0"/>
-            <a:t>“</a:t>
-          </a:r>
-        </a:p>
-      </dsp:txBody>
-      <dsp:txXfrm>
-        <a:off x="67415" y="1615094"/>
-        <a:ext cx="3109375" cy="1820318"/>
-      </dsp:txXfrm>
-    </dsp:sp>
-    <dsp:sp modelId="{30EAC814-8F64-D74A-9EBA-0CBC6BE058AA}">
-      <dsp:nvSpPr>
-        <dsp:cNvPr id="0" name=""/>
-        <dsp:cNvSpPr/>
-      </dsp:nvSpPr>
-      <dsp:spPr>
-        <a:xfrm>
-          <a:off x="3555687" y="2125646"/>
-          <a:ext cx="683199" cy="799214"/>
-        </a:xfrm>
-        <a:prstGeom prst="rightArrow">
-          <a:avLst>
-            <a:gd name="adj1" fmla="val 60000"/>
-            <a:gd name="adj2" fmla="val 50000"/>
-          </a:avLst>
-        </a:prstGeom>
-        <a:gradFill rotWithShape="0">
-          <a:gsLst>
-            <a:gs pos="0">
-              <a:schemeClr val="dk2">
-                <a:tint val="60000"/>
-                <a:hueOff val="0"/>
-                <a:satOff val="0"/>
-                <a:lumOff val="0"/>
-                <a:alphaOff val="0"/>
-                <a:shade val="51000"/>
-                <a:satMod val="130000"/>
-              </a:schemeClr>
-            </a:gs>
-            <a:gs pos="80000">
-              <a:schemeClr val="dk2">
-                <a:tint val="60000"/>
-                <a:hueOff val="0"/>
-                <a:satOff val="0"/>
-                <a:lumOff val="0"/>
-                <a:alphaOff val="0"/>
-                <a:shade val="93000"/>
-                <a:satMod val="130000"/>
-              </a:schemeClr>
-            </a:gs>
-            <a:gs pos="100000">
-              <a:schemeClr val="dk2">
-                <a:tint val="60000"/>
-                <a:hueOff val="0"/>
-                <a:satOff val="0"/>
-                <a:lumOff val="0"/>
-                <a:alphaOff val="0"/>
-                <a:shade val="94000"/>
-                <a:satMod val="135000"/>
-              </a:schemeClr>
-            </a:gs>
-          </a:gsLst>
-          <a:lin ang="16200000" scaled="0"/>
-        </a:gradFill>
-        <a:ln>
-          <a:noFill/>
-        </a:ln>
-        <a:effectLst>
-          <a:outerShdw blurRad="40000" dist="23000" dir="5400000" rotWithShape="0">
-            <a:srgbClr val="000000">
-              <a:alpha val="35000"/>
-            </a:srgbClr>
-          </a:outerShdw>
-        </a:effectLst>
-      </dsp:spPr>
-      <dsp:style>
-        <a:lnRef idx="0">
-          <a:scrgbClr r="0" g="0" b="0"/>
-        </a:lnRef>
-        <a:fillRef idx="3">
-          <a:scrgbClr r="0" g="0" b="0"/>
-        </a:fillRef>
-        <a:effectRef idx="2">
-          <a:scrgbClr r="0" g="0" b="0"/>
-        </a:effectRef>
-        <a:fontRef idx="minor">
-          <a:schemeClr val="lt1"/>
-        </a:fontRef>
-      </dsp:style>
-      <dsp:txBody>
-        <a:bodyPr spcFirstLastPara="0" vert="horz" wrap="square" lIns="0" tIns="0" rIns="0" bIns="0" numCol="1" spcCol="1270" anchor="ctr" anchorCtr="0">
-          <a:noAutofit/>
-        </a:bodyPr>
-        <a:lstStyle/>
-        <a:p>
-          <a:pPr lvl="0" algn="ctr" defTabSz="1289050">
-            <a:lnSpc>
-              <a:spcPct val="90000"/>
-            </a:lnSpc>
-            <a:spcBef>
-              <a:spcPct val="0"/>
-            </a:spcBef>
-            <a:spcAft>
-              <a:spcPct val="35000"/>
-            </a:spcAft>
-          </a:pPr>
-          <a:endParaRPr lang="de-DE" sz="2900" kern="1200"/>
-        </a:p>
-      </dsp:txBody>
-      <dsp:txXfrm>
-        <a:off x="3555687" y="2285489"/>
-        <a:ext cx="478239" cy="479528"/>
-      </dsp:txXfrm>
-    </dsp:sp>
-    <dsp:sp modelId="{942B2FD4-F953-1241-B452-E01505D35646}">
-      <dsp:nvSpPr>
-        <dsp:cNvPr id="0" name=""/>
-        <dsp:cNvSpPr/>
-      </dsp:nvSpPr>
-      <dsp:spPr>
-        <a:xfrm>
-          <a:off x="4522479" y="1558461"/>
-          <a:ext cx="3222641" cy="1933584"/>
-        </a:xfrm>
-        <a:prstGeom prst="roundRect">
-          <a:avLst>
-            <a:gd name="adj" fmla="val 10000"/>
-          </a:avLst>
-        </a:prstGeom>
-        <a:gradFill rotWithShape="0">
-          <a:gsLst>
-            <a:gs pos="0">
-              <a:schemeClr val="dk2">
-                <a:hueOff val="0"/>
-                <a:satOff val="0"/>
-                <a:lumOff val="0"/>
-                <a:alphaOff val="0"/>
-                <a:shade val="51000"/>
-                <a:satMod val="130000"/>
-              </a:schemeClr>
-            </a:gs>
-            <a:gs pos="80000">
-              <a:schemeClr val="dk2">
-                <a:hueOff val="0"/>
-                <a:satOff val="0"/>
-                <a:lumOff val="0"/>
-                <a:alphaOff val="0"/>
-                <a:shade val="93000"/>
-                <a:satMod val="130000"/>
-              </a:schemeClr>
-            </a:gs>
-            <a:gs pos="100000">
-              <a:schemeClr val="dk2">
-                <a:hueOff val="0"/>
-                <a:satOff val="0"/>
-                <a:lumOff val="0"/>
-                <a:alphaOff val="0"/>
-                <a:shade val="94000"/>
-                <a:satMod val="135000"/>
-              </a:schemeClr>
-            </a:gs>
-          </a:gsLst>
-          <a:lin ang="16200000" scaled="0"/>
-        </a:gradFill>
-        <a:ln>
-          <a:noFill/>
-        </a:ln>
-        <a:effectLst>
-          <a:outerShdw blurRad="40000" dist="23000" dir="5400000" rotWithShape="0">
-            <a:srgbClr val="000000">
-              <a:alpha val="35000"/>
-            </a:srgbClr>
-          </a:outerShdw>
-        </a:effectLst>
-      </dsp:spPr>
-      <dsp:style>
-        <a:lnRef idx="0">
-          <a:scrgbClr r="0" g="0" b="0"/>
-        </a:lnRef>
-        <a:fillRef idx="3">
-          <a:scrgbClr r="0" g="0" b="0"/>
-        </a:fillRef>
-        <a:effectRef idx="2">
-          <a:scrgbClr r="0" g="0" b="0"/>
-        </a:effectRef>
-        <a:fontRef idx="minor">
-          <a:schemeClr val="lt1"/>
-        </a:fontRef>
-      </dsp:style>
-      <dsp:txBody>
-        <a:bodyPr spcFirstLastPara="0" vert="horz" wrap="square" lIns="137160" tIns="137160" rIns="137160" bIns="137160" numCol="1" spcCol="1270" anchor="ctr" anchorCtr="0">
-          <a:noAutofit/>
-        </a:bodyPr>
-        <a:lstStyle/>
-        <a:p>
-          <a:pPr lvl="0" algn="ctr" defTabSz="1600200">
-            <a:lnSpc>
-              <a:spcPct val="90000"/>
-            </a:lnSpc>
-            <a:spcBef>
-              <a:spcPct val="0"/>
-            </a:spcBef>
-            <a:spcAft>
-              <a:spcPct val="35000"/>
-            </a:spcAft>
-          </a:pPr>
-          <a:r>
-            <a:rPr lang="de-DE" sz="3600" kern="1200" dirty="0"/>
-            <a:t>Auslagern von HTML nach </a:t>
-          </a:r>
-          <a:r>
-            <a:rPr lang="de-DE" sz="3600" kern="1200" dirty="0" err="1"/>
-            <a:t>home</a:t>
-          </a:r>
-          <a:endParaRPr lang="de-DE" sz="3600" kern="1200" dirty="0"/>
-        </a:p>
-      </dsp:txBody>
-      <dsp:txXfrm>
-        <a:off x="4579112" y="1615094"/>
-        <a:ext cx="3109375" cy="1820318"/>
-      </dsp:txXfrm>
-    </dsp:sp>
-    <dsp:sp modelId="{61D01FBA-AE9A-8140-B034-5E107AF8B06D}">
-      <dsp:nvSpPr>
-        <dsp:cNvPr id="0" name=""/>
-        <dsp:cNvSpPr/>
-      </dsp:nvSpPr>
-      <dsp:spPr>
-        <a:xfrm>
-          <a:off x="8067384" y="2125646"/>
-          <a:ext cx="683199" cy="799214"/>
-        </a:xfrm>
-        <a:prstGeom prst="rightArrow">
-          <a:avLst>
-            <a:gd name="adj1" fmla="val 60000"/>
-            <a:gd name="adj2" fmla="val 50000"/>
-          </a:avLst>
-        </a:prstGeom>
-        <a:gradFill rotWithShape="0">
-          <a:gsLst>
-            <a:gs pos="0">
-              <a:schemeClr val="dk2">
-                <a:tint val="60000"/>
-                <a:hueOff val="0"/>
-                <a:satOff val="0"/>
-                <a:lumOff val="0"/>
-                <a:alphaOff val="0"/>
-                <a:shade val="51000"/>
-                <a:satMod val="130000"/>
-              </a:schemeClr>
-            </a:gs>
-            <a:gs pos="80000">
-              <a:schemeClr val="dk2">
-                <a:tint val="60000"/>
-                <a:hueOff val="0"/>
-                <a:satOff val="0"/>
-                <a:lumOff val="0"/>
-                <a:alphaOff val="0"/>
-                <a:shade val="93000"/>
-                <a:satMod val="130000"/>
-              </a:schemeClr>
-            </a:gs>
-            <a:gs pos="100000">
-              <a:schemeClr val="dk2">
-                <a:tint val="60000"/>
-                <a:hueOff val="0"/>
-                <a:satOff val="0"/>
-                <a:lumOff val="0"/>
-                <a:alphaOff val="0"/>
-                <a:shade val="94000"/>
-                <a:satMod val="135000"/>
-              </a:schemeClr>
-            </a:gs>
-          </a:gsLst>
-          <a:lin ang="16200000" scaled="0"/>
-        </a:gradFill>
-        <a:ln>
-          <a:noFill/>
-        </a:ln>
-        <a:effectLst>
-          <a:outerShdw blurRad="40000" dist="23000" dir="5400000" rotWithShape="0">
-            <a:srgbClr val="000000">
-              <a:alpha val="35000"/>
-            </a:srgbClr>
-          </a:outerShdw>
-        </a:effectLst>
-      </dsp:spPr>
-      <dsp:style>
-        <a:lnRef idx="0">
-          <a:scrgbClr r="0" g="0" b="0"/>
-        </a:lnRef>
-        <a:fillRef idx="3">
-          <a:scrgbClr r="0" g="0" b="0"/>
-        </a:fillRef>
-        <a:effectRef idx="2">
-          <a:scrgbClr r="0" g="0" b="0"/>
-        </a:effectRef>
-        <a:fontRef idx="minor">
-          <a:schemeClr val="lt1"/>
-        </a:fontRef>
-      </dsp:style>
-      <dsp:txBody>
-        <a:bodyPr spcFirstLastPara="0" vert="horz" wrap="square" lIns="0" tIns="0" rIns="0" bIns="0" numCol="1" spcCol="1270" anchor="ctr" anchorCtr="0">
-          <a:noAutofit/>
-        </a:bodyPr>
-        <a:lstStyle/>
-        <a:p>
-          <a:pPr lvl="0" algn="ctr" defTabSz="1289050">
-            <a:lnSpc>
-              <a:spcPct val="90000"/>
-            </a:lnSpc>
-            <a:spcBef>
-              <a:spcPct val="0"/>
-            </a:spcBef>
-            <a:spcAft>
-              <a:spcPct val="35000"/>
-            </a:spcAft>
-          </a:pPr>
-          <a:endParaRPr lang="de-DE" sz="2900" kern="1200"/>
-        </a:p>
-      </dsp:txBody>
-      <dsp:txXfrm>
-        <a:off x="8067384" y="2285489"/>
-        <a:ext cx="478239" cy="479528"/>
-      </dsp:txXfrm>
-    </dsp:sp>
-    <dsp:sp modelId="{48E1AD6C-04E3-5047-8B6E-169C4DE6C0BD}">
-      <dsp:nvSpPr>
-        <dsp:cNvPr id="0" name=""/>
-        <dsp:cNvSpPr/>
-      </dsp:nvSpPr>
-      <dsp:spPr>
-        <a:xfrm>
-          <a:off x="9034176" y="1558461"/>
-          <a:ext cx="3222641" cy="1933584"/>
-        </a:xfrm>
-        <a:prstGeom prst="roundRect">
-          <a:avLst>
-            <a:gd name="adj" fmla="val 10000"/>
-          </a:avLst>
-        </a:prstGeom>
-        <a:gradFill rotWithShape="0">
-          <a:gsLst>
-            <a:gs pos="0">
-              <a:schemeClr val="dk2">
-                <a:hueOff val="0"/>
-                <a:satOff val="0"/>
-                <a:lumOff val="0"/>
-                <a:alphaOff val="0"/>
-                <a:shade val="51000"/>
-                <a:satMod val="130000"/>
-              </a:schemeClr>
-            </a:gs>
-            <a:gs pos="80000">
-              <a:schemeClr val="dk2">
-                <a:hueOff val="0"/>
-                <a:satOff val="0"/>
-                <a:lumOff val="0"/>
-                <a:alphaOff val="0"/>
-                <a:shade val="93000"/>
-                <a:satMod val="130000"/>
-              </a:schemeClr>
-            </a:gs>
-            <a:gs pos="100000">
-              <a:schemeClr val="dk2">
-                <a:hueOff val="0"/>
-                <a:satOff val="0"/>
-                <a:lumOff val="0"/>
-                <a:alphaOff val="0"/>
-                <a:shade val="94000"/>
-                <a:satMod val="135000"/>
-              </a:schemeClr>
-            </a:gs>
-          </a:gsLst>
-          <a:lin ang="16200000" scaled="0"/>
-        </a:gradFill>
-        <a:ln>
-          <a:noFill/>
-        </a:ln>
-        <a:effectLst>
-          <a:outerShdw blurRad="40000" dist="23000" dir="5400000" rotWithShape="0">
-            <a:srgbClr val="000000">
-              <a:alpha val="35000"/>
-            </a:srgbClr>
-          </a:outerShdw>
-        </a:effectLst>
-      </dsp:spPr>
-      <dsp:style>
-        <a:lnRef idx="0">
-          <a:scrgbClr r="0" g="0" b="0"/>
-        </a:lnRef>
-        <a:fillRef idx="3">
-          <a:scrgbClr r="0" g="0" b="0"/>
-        </a:fillRef>
-        <a:effectRef idx="2">
-          <a:scrgbClr r="0" g="0" b="0"/>
-        </a:effectRef>
-        <a:fontRef idx="minor">
-          <a:schemeClr val="lt1"/>
-        </a:fontRef>
-      </dsp:style>
-      <dsp:txBody>
-        <a:bodyPr spcFirstLastPara="0" vert="horz" wrap="square" lIns="137160" tIns="137160" rIns="137160" bIns="137160" numCol="1" spcCol="1270" anchor="ctr" anchorCtr="0">
-          <a:noAutofit/>
-        </a:bodyPr>
-        <a:lstStyle/>
-        <a:p>
-          <a:pPr lvl="0" algn="ctr" defTabSz="1600200">
-            <a:lnSpc>
-              <a:spcPct val="90000"/>
-            </a:lnSpc>
-            <a:spcBef>
-              <a:spcPct val="0"/>
-            </a:spcBef>
-            <a:spcAft>
-              <a:spcPct val="35000"/>
-            </a:spcAft>
-          </a:pPr>
-          <a:r>
-            <a:rPr lang="de-DE" sz="3600" kern="1200" dirty="0"/>
-            <a:t>Einbinden in die Anwendung</a:t>
-          </a:r>
-        </a:p>
-      </dsp:txBody>
-      <dsp:txXfrm>
-        <a:off x="9090809" y="1615094"/>
-        <a:ext cx="3109375" cy="1820318"/>
-      </dsp:txXfrm>
-    </dsp:sp>
   </dsp:spTree>
 </dsp:drawing>
 </file>
@@ -7349,966 +6303,6 @@
       <dsp:cNvGrpSpPr/>
     </dsp:nvGrpSpPr>
     <dsp:grpSpPr/>
-    <dsp:sp modelId="{AC19049A-FF2E-864B-A995-C88CCE14464E}">
-      <dsp:nvSpPr>
-        <dsp:cNvPr id="0" name=""/>
-        <dsp:cNvSpPr/>
-      </dsp:nvSpPr>
-      <dsp:spPr>
-        <a:xfrm>
-          <a:off x="5990" y="1968179"/>
-          <a:ext cx="1856912" cy="1114147"/>
-        </a:xfrm>
-        <a:prstGeom prst="roundRect">
-          <a:avLst>
-            <a:gd name="adj" fmla="val 10000"/>
-          </a:avLst>
-        </a:prstGeom>
-        <a:gradFill rotWithShape="0">
-          <a:gsLst>
-            <a:gs pos="0">
-              <a:schemeClr val="dk2">
-                <a:hueOff val="0"/>
-                <a:satOff val="0"/>
-                <a:lumOff val="0"/>
-                <a:alphaOff val="0"/>
-                <a:shade val="51000"/>
-                <a:satMod val="130000"/>
-              </a:schemeClr>
-            </a:gs>
-            <a:gs pos="80000">
-              <a:schemeClr val="dk2">
-                <a:hueOff val="0"/>
-                <a:satOff val="0"/>
-                <a:lumOff val="0"/>
-                <a:alphaOff val="0"/>
-                <a:shade val="93000"/>
-                <a:satMod val="130000"/>
-              </a:schemeClr>
-            </a:gs>
-            <a:gs pos="100000">
-              <a:schemeClr val="dk2">
-                <a:hueOff val="0"/>
-                <a:satOff val="0"/>
-                <a:lumOff val="0"/>
-                <a:alphaOff val="0"/>
-                <a:shade val="94000"/>
-                <a:satMod val="135000"/>
-              </a:schemeClr>
-            </a:gs>
-          </a:gsLst>
-          <a:lin ang="16200000" scaled="0"/>
-        </a:gradFill>
-        <a:ln>
-          <a:noFill/>
-        </a:ln>
-        <a:effectLst>
-          <a:outerShdw blurRad="40000" dist="23000" dir="5400000" rotWithShape="0">
-            <a:srgbClr val="000000">
-              <a:alpha val="35000"/>
-            </a:srgbClr>
-          </a:outerShdw>
-        </a:effectLst>
-      </dsp:spPr>
-      <dsp:style>
-        <a:lnRef idx="0">
-          <a:scrgbClr r="0" g="0" b="0"/>
-        </a:lnRef>
-        <a:fillRef idx="3">
-          <a:scrgbClr r="0" g="0" b="0"/>
-        </a:fillRef>
-        <a:effectRef idx="2">
-          <a:scrgbClr r="0" g="0" b="0"/>
-        </a:effectRef>
-        <a:fontRef idx="minor">
-          <a:schemeClr val="lt1"/>
-        </a:fontRef>
-      </dsp:style>
-      <dsp:txBody>
-        <a:bodyPr spcFirstLastPara="0" vert="horz" wrap="square" lIns="72390" tIns="72390" rIns="72390" bIns="72390" numCol="1" spcCol="1270" anchor="ctr" anchorCtr="0">
-          <a:noAutofit/>
-        </a:bodyPr>
-        <a:lstStyle/>
-        <a:p>
-          <a:pPr lvl="0" algn="ctr" defTabSz="844550">
-            <a:lnSpc>
-              <a:spcPct val="90000"/>
-            </a:lnSpc>
-            <a:spcBef>
-              <a:spcPct val="0"/>
-            </a:spcBef>
-            <a:spcAft>
-              <a:spcPct val="35000"/>
-            </a:spcAft>
-          </a:pPr>
-          <a:r>
-            <a:rPr lang="de-DE" sz="1900" kern="1200" dirty="0"/>
-            <a:t>Erstellen der Komponente „</a:t>
-          </a:r>
-          <a:r>
-            <a:rPr lang="de-DE" sz="1900" kern="1200" dirty="0" err="1"/>
-            <a:t>guest-book</a:t>
-          </a:r>
-          <a:r>
-            <a:rPr lang="de-DE" sz="1900" kern="1200" dirty="0"/>
-            <a:t>“</a:t>
-          </a:r>
-        </a:p>
-      </dsp:txBody>
-      <dsp:txXfrm>
-        <a:off x="38622" y="2000811"/>
-        <a:ext cx="1791648" cy="1048883"/>
-      </dsp:txXfrm>
-    </dsp:sp>
-    <dsp:sp modelId="{30EAC814-8F64-D74A-9EBA-0CBC6BE058AA}">
-      <dsp:nvSpPr>
-        <dsp:cNvPr id="0" name=""/>
-        <dsp:cNvSpPr/>
-      </dsp:nvSpPr>
-      <dsp:spPr>
-        <a:xfrm>
-          <a:off x="2048593" y="2294996"/>
-          <a:ext cx="393665" cy="460514"/>
-        </a:xfrm>
-        <a:prstGeom prst="rightArrow">
-          <a:avLst>
-            <a:gd name="adj1" fmla="val 60000"/>
-            <a:gd name="adj2" fmla="val 50000"/>
-          </a:avLst>
-        </a:prstGeom>
-        <a:gradFill rotWithShape="0">
-          <a:gsLst>
-            <a:gs pos="0">
-              <a:schemeClr val="dk2">
-                <a:tint val="60000"/>
-                <a:hueOff val="0"/>
-                <a:satOff val="0"/>
-                <a:lumOff val="0"/>
-                <a:alphaOff val="0"/>
-                <a:shade val="51000"/>
-                <a:satMod val="130000"/>
-              </a:schemeClr>
-            </a:gs>
-            <a:gs pos="80000">
-              <a:schemeClr val="dk2">
-                <a:tint val="60000"/>
-                <a:hueOff val="0"/>
-                <a:satOff val="0"/>
-                <a:lumOff val="0"/>
-                <a:alphaOff val="0"/>
-                <a:shade val="93000"/>
-                <a:satMod val="130000"/>
-              </a:schemeClr>
-            </a:gs>
-            <a:gs pos="100000">
-              <a:schemeClr val="dk2">
-                <a:tint val="60000"/>
-                <a:hueOff val="0"/>
-                <a:satOff val="0"/>
-                <a:lumOff val="0"/>
-                <a:alphaOff val="0"/>
-                <a:shade val="94000"/>
-                <a:satMod val="135000"/>
-              </a:schemeClr>
-            </a:gs>
-          </a:gsLst>
-          <a:lin ang="16200000" scaled="0"/>
-        </a:gradFill>
-        <a:ln>
-          <a:noFill/>
-        </a:ln>
-        <a:effectLst>
-          <a:outerShdw blurRad="40000" dist="23000" dir="5400000" rotWithShape="0">
-            <a:srgbClr val="000000">
-              <a:alpha val="35000"/>
-            </a:srgbClr>
-          </a:outerShdw>
-        </a:effectLst>
-      </dsp:spPr>
-      <dsp:style>
-        <a:lnRef idx="0">
-          <a:scrgbClr r="0" g="0" b="0"/>
-        </a:lnRef>
-        <a:fillRef idx="3">
-          <a:scrgbClr r="0" g="0" b="0"/>
-        </a:fillRef>
-        <a:effectRef idx="2">
-          <a:scrgbClr r="0" g="0" b="0"/>
-        </a:effectRef>
-        <a:fontRef idx="minor">
-          <a:schemeClr val="lt1"/>
-        </a:fontRef>
-      </dsp:style>
-      <dsp:txBody>
-        <a:bodyPr spcFirstLastPara="0" vert="horz" wrap="square" lIns="0" tIns="0" rIns="0" bIns="0" numCol="1" spcCol="1270" anchor="ctr" anchorCtr="0">
-          <a:noAutofit/>
-        </a:bodyPr>
-        <a:lstStyle/>
-        <a:p>
-          <a:pPr lvl="0" algn="ctr" defTabSz="711200">
-            <a:lnSpc>
-              <a:spcPct val="90000"/>
-            </a:lnSpc>
-            <a:spcBef>
-              <a:spcPct val="0"/>
-            </a:spcBef>
-            <a:spcAft>
-              <a:spcPct val="35000"/>
-            </a:spcAft>
-          </a:pPr>
-          <a:endParaRPr lang="de-DE" sz="1600" kern="1200"/>
-        </a:p>
-      </dsp:txBody>
-      <dsp:txXfrm>
-        <a:off x="2048593" y="2387099"/>
-        <a:ext cx="275566" cy="276308"/>
-      </dsp:txXfrm>
-    </dsp:sp>
-    <dsp:sp modelId="{942B2FD4-F953-1241-B452-E01505D35646}">
-      <dsp:nvSpPr>
-        <dsp:cNvPr id="0" name=""/>
-        <dsp:cNvSpPr/>
-      </dsp:nvSpPr>
-      <dsp:spPr>
-        <a:xfrm>
-          <a:off x="2605666" y="1968179"/>
-          <a:ext cx="1856912" cy="1114147"/>
-        </a:xfrm>
-        <a:prstGeom prst="roundRect">
-          <a:avLst>
-            <a:gd name="adj" fmla="val 10000"/>
-          </a:avLst>
-        </a:prstGeom>
-        <a:gradFill rotWithShape="0">
-          <a:gsLst>
-            <a:gs pos="0">
-              <a:schemeClr val="dk2">
-                <a:hueOff val="0"/>
-                <a:satOff val="0"/>
-                <a:lumOff val="0"/>
-                <a:alphaOff val="0"/>
-                <a:shade val="51000"/>
-                <a:satMod val="130000"/>
-              </a:schemeClr>
-            </a:gs>
-            <a:gs pos="80000">
-              <a:schemeClr val="dk2">
-                <a:hueOff val="0"/>
-                <a:satOff val="0"/>
-                <a:lumOff val="0"/>
-                <a:alphaOff val="0"/>
-                <a:shade val="93000"/>
-                <a:satMod val="130000"/>
-              </a:schemeClr>
-            </a:gs>
-            <a:gs pos="100000">
-              <a:schemeClr val="dk2">
-                <a:hueOff val="0"/>
-                <a:satOff val="0"/>
-                <a:lumOff val="0"/>
-                <a:alphaOff val="0"/>
-                <a:shade val="94000"/>
-                <a:satMod val="135000"/>
-              </a:schemeClr>
-            </a:gs>
-          </a:gsLst>
-          <a:lin ang="16200000" scaled="0"/>
-        </a:gradFill>
-        <a:ln>
-          <a:noFill/>
-        </a:ln>
-        <a:effectLst>
-          <a:outerShdw blurRad="40000" dist="23000" dir="5400000" rotWithShape="0">
-            <a:srgbClr val="000000">
-              <a:alpha val="35000"/>
-            </a:srgbClr>
-          </a:outerShdw>
-        </a:effectLst>
-      </dsp:spPr>
-      <dsp:style>
-        <a:lnRef idx="0">
-          <a:scrgbClr r="0" g="0" b="0"/>
-        </a:lnRef>
-        <a:fillRef idx="3">
-          <a:scrgbClr r="0" g="0" b="0"/>
-        </a:fillRef>
-        <a:effectRef idx="2">
-          <a:scrgbClr r="0" g="0" b="0"/>
-        </a:effectRef>
-        <a:fontRef idx="minor">
-          <a:schemeClr val="lt1"/>
-        </a:fontRef>
-      </dsp:style>
-      <dsp:txBody>
-        <a:bodyPr spcFirstLastPara="0" vert="horz" wrap="square" lIns="72390" tIns="72390" rIns="72390" bIns="72390" numCol="1" spcCol="1270" anchor="ctr" anchorCtr="0">
-          <a:noAutofit/>
-        </a:bodyPr>
-        <a:lstStyle/>
-        <a:p>
-          <a:pPr lvl="0" algn="ctr" defTabSz="844550">
-            <a:lnSpc>
-              <a:spcPct val="90000"/>
-            </a:lnSpc>
-            <a:spcBef>
-              <a:spcPct val="0"/>
-            </a:spcBef>
-            <a:spcAft>
-              <a:spcPct val="35000"/>
-            </a:spcAft>
-          </a:pPr>
-          <a:r>
-            <a:rPr lang="de-DE" sz="1900" kern="1200" dirty="0"/>
-            <a:t>Einbinden in die Anwendung</a:t>
-          </a:r>
-        </a:p>
-      </dsp:txBody>
-      <dsp:txXfrm>
-        <a:off x="2638298" y="2000811"/>
-        <a:ext cx="1791648" cy="1048883"/>
-      </dsp:txXfrm>
-    </dsp:sp>
-    <dsp:sp modelId="{61D01FBA-AE9A-8140-B034-5E107AF8B06D}">
-      <dsp:nvSpPr>
-        <dsp:cNvPr id="0" name=""/>
-        <dsp:cNvSpPr/>
-      </dsp:nvSpPr>
-      <dsp:spPr>
-        <a:xfrm>
-          <a:off x="4648270" y="2294996"/>
-          <a:ext cx="393665" cy="460514"/>
-        </a:xfrm>
-        <a:prstGeom prst="rightArrow">
-          <a:avLst>
-            <a:gd name="adj1" fmla="val 60000"/>
-            <a:gd name="adj2" fmla="val 50000"/>
-          </a:avLst>
-        </a:prstGeom>
-        <a:gradFill rotWithShape="0">
-          <a:gsLst>
-            <a:gs pos="0">
-              <a:schemeClr val="dk2">
-                <a:tint val="60000"/>
-                <a:hueOff val="0"/>
-                <a:satOff val="0"/>
-                <a:lumOff val="0"/>
-                <a:alphaOff val="0"/>
-                <a:shade val="51000"/>
-                <a:satMod val="130000"/>
-              </a:schemeClr>
-            </a:gs>
-            <a:gs pos="80000">
-              <a:schemeClr val="dk2">
-                <a:tint val="60000"/>
-                <a:hueOff val="0"/>
-                <a:satOff val="0"/>
-                <a:lumOff val="0"/>
-                <a:alphaOff val="0"/>
-                <a:shade val="93000"/>
-                <a:satMod val="130000"/>
-              </a:schemeClr>
-            </a:gs>
-            <a:gs pos="100000">
-              <a:schemeClr val="dk2">
-                <a:tint val="60000"/>
-                <a:hueOff val="0"/>
-                <a:satOff val="0"/>
-                <a:lumOff val="0"/>
-                <a:alphaOff val="0"/>
-                <a:shade val="94000"/>
-                <a:satMod val="135000"/>
-              </a:schemeClr>
-            </a:gs>
-          </a:gsLst>
-          <a:lin ang="16200000" scaled="0"/>
-        </a:gradFill>
-        <a:ln>
-          <a:noFill/>
-        </a:ln>
-        <a:effectLst>
-          <a:outerShdw blurRad="40000" dist="23000" dir="5400000" rotWithShape="0">
-            <a:srgbClr val="000000">
-              <a:alpha val="35000"/>
-            </a:srgbClr>
-          </a:outerShdw>
-        </a:effectLst>
-      </dsp:spPr>
-      <dsp:style>
-        <a:lnRef idx="0">
-          <a:scrgbClr r="0" g="0" b="0"/>
-        </a:lnRef>
-        <a:fillRef idx="3">
-          <a:scrgbClr r="0" g="0" b="0"/>
-        </a:fillRef>
-        <a:effectRef idx="2">
-          <a:scrgbClr r="0" g="0" b="0"/>
-        </a:effectRef>
-        <a:fontRef idx="minor">
-          <a:schemeClr val="lt1"/>
-        </a:fontRef>
-      </dsp:style>
-      <dsp:txBody>
-        <a:bodyPr spcFirstLastPara="0" vert="horz" wrap="square" lIns="0" tIns="0" rIns="0" bIns="0" numCol="1" spcCol="1270" anchor="ctr" anchorCtr="0">
-          <a:noAutofit/>
-        </a:bodyPr>
-        <a:lstStyle/>
-        <a:p>
-          <a:pPr lvl="0" algn="ctr" defTabSz="711200">
-            <a:lnSpc>
-              <a:spcPct val="90000"/>
-            </a:lnSpc>
-            <a:spcBef>
-              <a:spcPct val="0"/>
-            </a:spcBef>
-            <a:spcAft>
-              <a:spcPct val="35000"/>
-            </a:spcAft>
-          </a:pPr>
-          <a:endParaRPr lang="de-DE" sz="1600" kern="1200"/>
-        </a:p>
-      </dsp:txBody>
-      <dsp:txXfrm>
-        <a:off x="4648270" y="2387099"/>
-        <a:ext cx="275566" cy="276308"/>
-      </dsp:txXfrm>
-    </dsp:sp>
-    <dsp:sp modelId="{48E1AD6C-04E3-5047-8B6E-169C4DE6C0BD}">
-      <dsp:nvSpPr>
-        <dsp:cNvPr id="0" name=""/>
-        <dsp:cNvSpPr/>
-      </dsp:nvSpPr>
-      <dsp:spPr>
-        <a:xfrm>
-          <a:off x="5205343" y="1968179"/>
-          <a:ext cx="1856912" cy="1114147"/>
-        </a:xfrm>
-        <a:prstGeom prst="roundRect">
-          <a:avLst>
-            <a:gd name="adj" fmla="val 10000"/>
-          </a:avLst>
-        </a:prstGeom>
-        <a:gradFill rotWithShape="0">
-          <a:gsLst>
-            <a:gs pos="0">
-              <a:schemeClr val="dk2">
-                <a:hueOff val="0"/>
-                <a:satOff val="0"/>
-                <a:lumOff val="0"/>
-                <a:alphaOff val="0"/>
-                <a:shade val="51000"/>
-                <a:satMod val="130000"/>
-              </a:schemeClr>
-            </a:gs>
-            <a:gs pos="80000">
-              <a:schemeClr val="dk2">
-                <a:hueOff val="0"/>
-                <a:satOff val="0"/>
-                <a:lumOff val="0"/>
-                <a:alphaOff val="0"/>
-                <a:shade val="93000"/>
-                <a:satMod val="130000"/>
-              </a:schemeClr>
-            </a:gs>
-            <a:gs pos="100000">
-              <a:schemeClr val="dk2">
-                <a:hueOff val="0"/>
-                <a:satOff val="0"/>
-                <a:lumOff val="0"/>
-                <a:alphaOff val="0"/>
-                <a:shade val="94000"/>
-                <a:satMod val="135000"/>
-              </a:schemeClr>
-            </a:gs>
-          </a:gsLst>
-          <a:lin ang="16200000" scaled="0"/>
-        </a:gradFill>
-        <a:ln>
-          <a:noFill/>
-        </a:ln>
-        <a:effectLst>
-          <a:outerShdw blurRad="40000" dist="23000" dir="5400000" rotWithShape="0">
-            <a:srgbClr val="000000">
-              <a:alpha val="35000"/>
-            </a:srgbClr>
-          </a:outerShdw>
-        </a:effectLst>
-      </dsp:spPr>
-      <dsp:style>
-        <a:lnRef idx="0">
-          <a:scrgbClr r="0" g="0" b="0"/>
-        </a:lnRef>
-        <a:fillRef idx="3">
-          <a:scrgbClr r="0" g="0" b="0"/>
-        </a:fillRef>
-        <a:effectRef idx="2">
-          <a:scrgbClr r="0" g="0" b="0"/>
-        </a:effectRef>
-        <a:fontRef idx="minor">
-          <a:schemeClr val="lt1"/>
-        </a:fontRef>
-      </dsp:style>
-      <dsp:txBody>
-        <a:bodyPr spcFirstLastPara="0" vert="horz" wrap="square" lIns="72390" tIns="72390" rIns="72390" bIns="72390" numCol="1" spcCol="1270" anchor="ctr" anchorCtr="0">
-          <a:noAutofit/>
-        </a:bodyPr>
-        <a:lstStyle/>
-        <a:p>
-          <a:pPr lvl="0" algn="ctr" defTabSz="844550">
-            <a:lnSpc>
-              <a:spcPct val="90000"/>
-            </a:lnSpc>
-            <a:spcBef>
-              <a:spcPct val="0"/>
-            </a:spcBef>
-            <a:spcAft>
-              <a:spcPct val="35000"/>
-            </a:spcAft>
-          </a:pPr>
-          <a:r>
-            <a:rPr lang="de-DE" sz="1900" kern="1200" dirty="0"/>
-            <a:t>Erstellen der Komponente „</a:t>
-          </a:r>
-          <a:r>
-            <a:rPr lang="de-DE" sz="1900" kern="1200" dirty="0" err="1"/>
-            <a:t>guest</a:t>
-          </a:r>
-          <a:r>
-            <a:rPr lang="de-DE" sz="1900" kern="1200" dirty="0"/>
-            <a:t>-list“</a:t>
-          </a:r>
-        </a:p>
-      </dsp:txBody>
-      <dsp:txXfrm>
-        <a:off x="5237975" y="2000811"/>
-        <a:ext cx="1791648" cy="1048883"/>
-      </dsp:txXfrm>
-    </dsp:sp>
-    <dsp:sp modelId="{0AD4DF4A-E0D6-074E-8C5C-EC60A69D5CD5}">
-      <dsp:nvSpPr>
-        <dsp:cNvPr id="0" name=""/>
-        <dsp:cNvSpPr/>
-      </dsp:nvSpPr>
-      <dsp:spPr>
-        <a:xfrm>
-          <a:off x="7247947" y="2294996"/>
-          <a:ext cx="393665" cy="460514"/>
-        </a:xfrm>
-        <a:prstGeom prst="rightArrow">
-          <a:avLst>
-            <a:gd name="adj1" fmla="val 60000"/>
-            <a:gd name="adj2" fmla="val 50000"/>
-          </a:avLst>
-        </a:prstGeom>
-        <a:gradFill rotWithShape="0">
-          <a:gsLst>
-            <a:gs pos="0">
-              <a:schemeClr val="dk2">
-                <a:tint val="60000"/>
-                <a:hueOff val="0"/>
-                <a:satOff val="0"/>
-                <a:lumOff val="0"/>
-                <a:alphaOff val="0"/>
-                <a:shade val="51000"/>
-                <a:satMod val="130000"/>
-              </a:schemeClr>
-            </a:gs>
-            <a:gs pos="80000">
-              <a:schemeClr val="dk2">
-                <a:tint val="60000"/>
-                <a:hueOff val="0"/>
-                <a:satOff val="0"/>
-                <a:lumOff val="0"/>
-                <a:alphaOff val="0"/>
-                <a:shade val="93000"/>
-                <a:satMod val="130000"/>
-              </a:schemeClr>
-            </a:gs>
-            <a:gs pos="100000">
-              <a:schemeClr val="dk2">
-                <a:tint val="60000"/>
-                <a:hueOff val="0"/>
-                <a:satOff val="0"/>
-                <a:lumOff val="0"/>
-                <a:alphaOff val="0"/>
-                <a:shade val="94000"/>
-                <a:satMod val="135000"/>
-              </a:schemeClr>
-            </a:gs>
-          </a:gsLst>
-          <a:lin ang="16200000" scaled="0"/>
-        </a:gradFill>
-        <a:ln>
-          <a:noFill/>
-        </a:ln>
-        <a:effectLst>
-          <a:outerShdw blurRad="40000" dist="23000" dir="5400000" rotWithShape="0">
-            <a:srgbClr val="000000">
-              <a:alpha val="35000"/>
-            </a:srgbClr>
-          </a:outerShdw>
-        </a:effectLst>
-      </dsp:spPr>
-      <dsp:style>
-        <a:lnRef idx="0">
-          <a:scrgbClr r="0" g="0" b="0"/>
-        </a:lnRef>
-        <a:fillRef idx="3">
-          <a:scrgbClr r="0" g="0" b="0"/>
-        </a:fillRef>
-        <a:effectRef idx="2">
-          <a:scrgbClr r="0" g="0" b="0"/>
-        </a:effectRef>
-        <a:fontRef idx="minor">
-          <a:schemeClr val="lt1"/>
-        </a:fontRef>
-      </dsp:style>
-      <dsp:txBody>
-        <a:bodyPr spcFirstLastPara="0" vert="horz" wrap="square" lIns="0" tIns="0" rIns="0" bIns="0" numCol="1" spcCol="1270" anchor="ctr" anchorCtr="0">
-          <a:noAutofit/>
-        </a:bodyPr>
-        <a:lstStyle/>
-        <a:p>
-          <a:pPr lvl="0" algn="ctr" defTabSz="711200">
-            <a:lnSpc>
-              <a:spcPct val="90000"/>
-            </a:lnSpc>
-            <a:spcBef>
-              <a:spcPct val="0"/>
-            </a:spcBef>
-            <a:spcAft>
-              <a:spcPct val="35000"/>
-            </a:spcAft>
-          </a:pPr>
-          <a:endParaRPr lang="de-DE" sz="1600" kern="1200"/>
-        </a:p>
-      </dsp:txBody>
-      <dsp:txXfrm>
-        <a:off x="7247947" y="2387099"/>
-        <a:ext cx="275566" cy="276308"/>
-      </dsp:txXfrm>
-    </dsp:sp>
-    <dsp:sp modelId="{C72C48AC-E55D-9140-B4CF-F284B256CE46}">
-      <dsp:nvSpPr>
-        <dsp:cNvPr id="0" name=""/>
-        <dsp:cNvSpPr/>
-      </dsp:nvSpPr>
-      <dsp:spPr>
-        <a:xfrm>
-          <a:off x="7805020" y="1968179"/>
-          <a:ext cx="1856912" cy="1114147"/>
-        </a:xfrm>
-        <a:prstGeom prst="roundRect">
-          <a:avLst>
-            <a:gd name="adj" fmla="val 10000"/>
-          </a:avLst>
-        </a:prstGeom>
-        <a:gradFill rotWithShape="0">
-          <a:gsLst>
-            <a:gs pos="0">
-              <a:schemeClr val="dk2">
-                <a:hueOff val="0"/>
-                <a:satOff val="0"/>
-                <a:lumOff val="0"/>
-                <a:alphaOff val="0"/>
-                <a:shade val="51000"/>
-                <a:satMod val="130000"/>
-              </a:schemeClr>
-            </a:gs>
-            <a:gs pos="80000">
-              <a:schemeClr val="dk2">
-                <a:hueOff val="0"/>
-                <a:satOff val="0"/>
-                <a:lumOff val="0"/>
-                <a:alphaOff val="0"/>
-                <a:shade val="93000"/>
-                <a:satMod val="130000"/>
-              </a:schemeClr>
-            </a:gs>
-            <a:gs pos="100000">
-              <a:schemeClr val="dk2">
-                <a:hueOff val="0"/>
-                <a:satOff val="0"/>
-                <a:lumOff val="0"/>
-                <a:alphaOff val="0"/>
-                <a:shade val="94000"/>
-                <a:satMod val="135000"/>
-              </a:schemeClr>
-            </a:gs>
-          </a:gsLst>
-          <a:lin ang="16200000" scaled="0"/>
-        </a:gradFill>
-        <a:ln>
-          <a:noFill/>
-        </a:ln>
-        <a:effectLst>
-          <a:outerShdw blurRad="40000" dist="23000" dir="5400000" rotWithShape="0">
-            <a:srgbClr val="000000">
-              <a:alpha val="35000"/>
-            </a:srgbClr>
-          </a:outerShdw>
-        </a:effectLst>
-      </dsp:spPr>
-      <dsp:style>
-        <a:lnRef idx="0">
-          <a:scrgbClr r="0" g="0" b="0"/>
-        </a:lnRef>
-        <a:fillRef idx="3">
-          <a:scrgbClr r="0" g="0" b="0"/>
-        </a:fillRef>
-        <a:effectRef idx="2">
-          <a:scrgbClr r="0" g="0" b="0"/>
-        </a:effectRef>
-        <a:fontRef idx="minor">
-          <a:schemeClr val="lt1"/>
-        </a:fontRef>
-      </dsp:style>
-      <dsp:txBody>
-        <a:bodyPr spcFirstLastPara="0" vert="horz" wrap="square" lIns="72390" tIns="72390" rIns="72390" bIns="72390" numCol="1" spcCol="1270" anchor="ctr" anchorCtr="0">
-          <a:noAutofit/>
-        </a:bodyPr>
-        <a:lstStyle/>
-        <a:p>
-          <a:pPr lvl="0" algn="ctr" defTabSz="844550">
-            <a:lnSpc>
-              <a:spcPct val="90000"/>
-            </a:lnSpc>
-            <a:spcBef>
-              <a:spcPct val="0"/>
-            </a:spcBef>
-            <a:spcAft>
-              <a:spcPct val="35000"/>
-            </a:spcAft>
-          </a:pPr>
-          <a:r>
-            <a:rPr lang="de-DE" sz="1900" kern="1200" dirty="0"/>
-            <a:t>Auslagern des HTML nach </a:t>
-          </a:r>
-          <a:r>
-            <a:rPr lang="de-DE" sz="1900" kern="1200" dirty="0" err="1"/>
-            <a:t>guest</a:t>
-          </a:r>
-          <a:r>
-            <a:rPr lang="de-DE" sz="1900" kern="1200" dirty="0"/>
-            <a:t>-list</a:t>
-          </a:r>
-        </a:p>
-      </dsp:txBody>
-      <dsp:txXfrm>
-        <a:off x="7837652" y="2000811"/>
-        <a:ext cx="1791648" cy="1048883"/>
-      </dsp:txXfrm>
-    </dsp:sp>
-    <dsp:sp modelId="{C0778852-E178-8D45-B49B-75D931FC40CB}">
-      <dsp:nvSpPr>
-        <dsp:cNvPr id="0" name=""/>
-        <dsp:cNvSpPr/>
-      </dsp:nvSpPr>
-      <dsp:spPr>
-        <a:xfrm>
-          <a:off x="9847624" y="2294996"/>
-          <a:ext cx="393665" cy="460514"/>
-        </a:xfrm>
-        <a:prstGeom prst="rightArrow">
-          <a:avLst>
-            <a:gd name="adj1" fmla="val 60000"/>
-            <a:gd name="adj2" fmla="val 50000"/>
-          </a:avLst>
-        </a:prstGeom>
-        <a:gradFill rotWithShape="0">
-          <a:gsLst>
-            <a:gs pos="0">
-              <a:schemeClr val="dk2">
-                <a:tint val="60000"/>
-                <a:hueOff val="0"/>
-                <a:satOff val="0"/>
-                <a:lumOff val="0"/>
-                <a:alphaOff val="0"/>
-                <a:shade val="51000"/>
-                <a:satMod val="130000"/>
-              </a:schemeClr>
-            </a:gs>
-            <a:gs pos="80000">
-              <a:schemeClr val="dk2">
-                <a:tint val="60000"/>
-                <a:hueOff val="0"/>
-                <a:satOff val="0"/>
-                <a:lumOff val="0"/>
-                <a:alphaOff val="0"/>
-                <a:shade val="93000"/>
-                <a:satMod val="130000"/>
-              </a:schemeClr>
-            </a:gs>
-            <a:gs pos="100000">
-              <a:schemeClr val="dk2">
-                <a:tint val="60000"/>
-                <a:hueOff val="0"/>
-                <a:satOff val="0"/>
-                <a:lumOff val="0"/>
-                <a:alphaOff val="0"/>
-                <a:shade val="94000"/>
-                <a:satMod val="135000"/>
-              </a:schemeClr>
-            </a:gs>
-          </a:gsLst>
-          <a:lin ang="16200000" scaled="0"/>
-        </a:gradFill>
-        <a:ln>
-          <a:noFill/>
-        </a:ln>
-        <a:effectLst>
-          <a:outerShdw blurRad="40000" dist="23000" dir="5400000" rotWithShape="0">
-            <a:srgbClr val="000000">
-              <a:alpha val="35000"/>
-            </a:srgbClr>
-          </a:outerShdw>
-        </a:effectLst>
-      </dsp:spPr>
-      <dsp:style>
-        <a:lnRef idx="0">
-          <a:scrgbClr r="0" g="0" b="0"/>
-        </a:lnRef>
-        <a:fillRef idx="3">
-          <a:scrgbClr r="0" g="0" b="0"/>
-        </a:fillRef>
-        <a:effectRef idx="2">
-          <a:scrgbClr r="0" g="0" b="0"/>
-        </a:effectRef>
-        <a:fontRef idx="minor">
-          <a:schemeClr val="lt1"/>
-        </a:fontRef>
-      </dsp:style>
-      <dsp:txBody>
-        <a:bodyPr spcFirstLastPara="0" vert="horz" wrap="square" lIns="0" tIns="0" rIns="0" bIns="0" numCol="1" spcCol="1270" anchor="ctr" anchorCtr="0">
-          <a:noAutofit/>
-        </a:bodyPr>
-        <a:lstStyle/>
-        <a:p>
-          <a:pPr lvl="0" algn="ctr" defTabSz="711200">
-            <a:lnSpc>
-              <a:spcPct val="90000"/>
-            </a:lnSpc>
-            <a:spcBef>
-              <a:spcPct val="0"/>
-            </a:spcBef>
-            <a:spcAft>
-              <a:spcPct val="35000"/>
-            </a:spcAft>
-          </a:pPr>
-          <a:endParaRPr lang="de-DE" sz="1600" kern="1200"/>
-        </a:p>
-      </dsp:txBody>
-      <dsp:txXfrm>
-        <a:off x="9847624" y="2387099"/>
-        <a:ext cx="275566" cy="276308"/>
-      </dsp:txXfrm>
-    </dsp:sp>
-    <dsp:sp modelId="{CE1BF210-B0C1-0C45-B643-E2A51ACDB5A4}">
-      <dsp:nvSpPr>
-        <dsp:cNvPr id="0" name=""/>
-        <dsp:cNvSpPr/>
-      </dsp:nvSpPr>
-      <dsp:spPr>
-        <a:xfrm>
-          <a:off x="10404697" y="1968179"/>
-          <a:ext cx="1856912" cy="1114147"/>
-        </a:xfrm>
-        <a:prstGeom prst="roundRect">
-          <a:avLst>
-            <a:gd name="adj" fmla="val 10000"/>
-          </a:avLst>
-        </a:prstGeom>
-        <a:gradFill rotWithShape="0">
-          <a:gsLst>
-            <a:gs pos="0">
-              <a:schemeClr val="dk2">
-                <a:hueOff val="0"/>
-                <a:satOff val="0"/>
-                <a:lumOff val="0"/>
-                <a:alphaOff val="0"/>
-                <a:shade val="51000"/>
-                <a:satMod val="130000"/>
-              </a:schemeClr>
-            </a:gs>
-            <a:gs pos="80000">
-              <a:schemeClr val="dk2">
-                <a:hueOff val="0"/>
-                <a:satOff val="0"/>
-                <a:lumOff val="0"/>
-                <a:alphaOff val="0"/>
-                <a:shade val="93000"/>
-                <a:satMod val="130000"/>
-              </a:schemeClr>
-            </a:gs>
-            <a:gs pos="100000">
-              <a:schemeClr val="dk2">
-                <a:hueOff val="0"/>
-                <a:satOff val="0"/>
-                <a:lumOff val="0"/>
-                <a:alphaOff val="0"/>
-                <a:shade val="94000"/>
-                <a:satMod val="135000"/>
-              </a:schemeClr>
-            </a:gs>
-          </a:gsLst>
-          <a:lin ang="16200000" scaled="0"/>
-        </a:gradFill>
-        <a:ln>
-          <a:noFill/>
-        </a:ln>
-        <a:effectLst>
-          <a:outerShdw blurRad="40000" dist="23000" dir="5400000" rotWithShape="0">
-            <a:srgbClr val="000000">
-              <a:alpha val="35000"/>
-            </a:srgbClr>
-          </a:outerShdw>
-        </a:effectLst>
-      </dsp:spPr>
-      <dsp:style>
-        <a:lnRef idx="0">
-          <a:scrgbClr r="0" g="0" b="0"/>
-        </a:lnRef>
-        <a:fillRef idx="3">
-          <a:scrgbClr r="0" g="0" b="0"/>
-        </a:fillRef>
-        <a:effectRef idx="2">
-          <a:scrgbClr r="0" g="0" b="0"/>
-        </a:effectRef>
-        <a:fontRef idx="minor">
-          <a:schemeClr val="lt1"/>
-        </a:fontRef>
-      </dsp:style>
-      <dsp:txBody>
-        <a:bodyPr spcFirstLastPara="0" vert="horz" wrap="square" lIns="72390" tIns="72390" rIns="72390" bIns="72390" numCol="1" spcCol="1270" anchor="ctr" anchorCtr="0">
-          <a:noAutofit/>
-        </a:bodyPr>
-        <a:lstStyle/>
-        <a:p>
-          <a:pPr lvl="0" algn="ctr" defTabSz="844550">
-            <a:lnSpc>
-              <a:spcPct val="90000"/>
-            </a:lnSpc>
-            <a:spcBef>
-              <a:spcPct val="0"/>
-            </a:spcBef>
-            <a:spcAft>
-              <a:spcPct val="35000"/>
-            </a:spcAft>
-          </a:pPr>
-          <a:r>
-            <a:rPr lang="de-DE" sz="1900" kern="1200" dirty="0"/>
-            <a:t>Einbinden in die Komponente </a:t>
-          </a:r>
-          <a:r>
-            <a:rPr lang="de-DE" sz="1900" kern="1200" dirty="0" err="1"/>
-            <a:t>guest-book</a:t>
-          </a:r>
-          <a:endParaRPr lang="de-DE" sz="1900" kern="1200" dirty="0"/>
-        </a:p>
-      </dsp:txBody>
-      <dsp:txXfrm>
-        <a:off x="10437329" y="2000811"/>
-        <a:ext cx="1791648" cy="1048883"/>
-      </dsp:txXfrm>
-    </dsp:sp>
   </dsp:spTree>
 </dsp:drawing>
 </file>
@@ -8321,743 +6315,23 @@
       <dsp:cNvGrpSpPr/>
     </dsp:nvGrpSpPr>
     <dsp:grpSpPr/>
-    <dsp:sp modelId="{AC19049A-FF2E-864B-A995-C88CCE14464E}">
-      <dsp:nvSpPr>
-        <dsp:cNvPr id="0" name=""/>
-        <dsp:cNvSpPr/>
-      </dsp:nvSpPr>
-      <dsp:spPr>
-        <a:xfrm>
-          <a:off x="5391" y="1818129"/>
-          <a:ext cx="2357080" cy="1414248"/>
-        </a:xfrm>
-        <a:prstGeom prst="roundRect">
-          <a:avLst>
-            <a:gd name="adj" fmla="val 10000"/>
-          </a:avLst>
-        </a:prstGeom>
-        <a:gradFill rotWithShape="0">
-          <a:gsLst>
-            <a:gs pos="0">
-              <a:schemeClr val="dk2">
-                <a:hueOff val="0"/>
-                <a:satOff val="0"/>
-                <a:lumOff val="0"/>
-                <a:alphaOff val="0"/>
-                <a:shade val="51000"/>
-                <a:satMod val="130000"/>
-              </a:schemeClr>
-            </a:gs>
-            <a:gs pos="80000">
-              <a:schemeClr val="dk2">
-                <a:hueOff val="0"/>
-                <a:satOff val="0"/>
-                <a:lumOff val="0"/>
-                <a:alphaOff val="0"/>
-                <a:shade val="93000"/>
-                <a:satMod val="130000"/>
-              </a:schemeClr>
-            </a:gs>
-            <a:gs pos="100000">
-              <a:schemeClr val="dk2">
-                <a:hueOff val="0"/>
-                <a:satOff val="0"/>
-                <a:lumOff val="0"/>
-                <a:alphaOff val="0"/>
-                <a:shade val="94000"/>
-                <a:satMod val="135000"/>
-              </a:schemeClr>
-            </a:gs>
-          </a:gsLst>
-          <a:lin ang="16200000" scaled="0"/>
-        </a:gradFill>
-        <a:ln>
-          <a:noFill/>
-        </a:ln>
-        <a:effectLst>
-          <a:outerShdw blurRad="40000" dist="23000" dir="5400000" rotWithShape="0">
-            <a:srgbClr val="000000">
-              <a:alpha val="35000"/>
-            </a:srgbClr>
-          </a:outerShdw>
-        </a:effectLst>
-      </dsp:spPr>
-      <dsp:style>
-        <a:lnRef idx="0">
-          <a:scrgbClr r="0" g="0" b="0"/>
-        </a:lnRef>
-        <a:fillRef idx="3">
-          <a:scrgbClr r="0" g="0" b="0"/>
-        </a:fillRef>
-        <a:effectRef idx="2">
-          <a:scrgbClr r="0" g="0" b="0"/>
-        </a:effectRef>
-        <a:fontRef idx="minor">
-          <a:schemeClr val="lt1"/>
-        </a:fontRef>
-      </dsp:style>
-      <dsp:txBody>
-        <a:bodyPr spcFirstLastPara="0" vert="horz" wrap="square" lIns="99060" tIns="99060" rIns="99060" bIns="99060" numCol="1" spcCol="1270" anchor="ctr" anchorCtr="0">
-          <a:noAutofit/>
-        </a:bodyPr>
-        <a:lstStyle/>
-        <a:p>
-          <a:pPr lvl="0" algn="ctr" defTabSz="1155700">
-            <a:lnSpc>
-              <a:spcPct val="90000"/>
-            </a:lnSpc>
-            <a:spcBef>
-              <a:spcPct val="0"/>
-            </a:spcBef>
-            <a:spcAft>
-              <a:spcPct val="35000"/>
-            </a:spcAft>
-          </a:pPr>
-          <a:r>
-            <a:rPr lang="de-DE" sz="2600" kern="1200" dirty="0"/>
-            <a:t>Erstellen des Service „</a:t>
-          </a:r>
-          <a:r>
-            <a:rPr lang="de-DE" sz="2600" kern="1200" dirty="0" err="1"/>
-            <a:t>guest-book.service</a:t>
-          </a:r>
-          <a:r>
-            <a:rPr lang="de-DE" sz="2600" kern="1200" dirty="0"/>
-            <a:t>“</a:t>
-          </a:r>
-        </a:p>
-      </dsp:txBody>
-      <dsp:txXfrm>
-        <a:off x="46813" y="1859551"/>
-        <a:ext cx="2274236" cy="1331404"/>
-      </dsp:txXfrm>
-    </dsp:sp>
-    <dsp:sp modelId="{30EAC814-8F64-D74A-9EBA-0CBC6BE058AA}">
-      <dsp:nvSpPr>
-        <dsp:cNvPr id="0" name=""/>
-        <dsp:cNvSpPr/>
-      </dsp:nvSpPr>
-      <dsp:spPr>
-        <a:xfrm>
-          <a:off x="2598179" y="2232975"/>
-          <a:ext cx="499701" cy="584555"/>
-        </a:xfrm>
-        <a:prstGeom prst="rightArrow">
-          <a:avLst>
-            <a:gd name="adj1" fmla="val 60000"/>
-            <a:gd name="adj2" fmla="val 50000"/>
-          </a:avLst>
-        </a:prstGeom>
-        <a:gradFill rotWithShape="0">
-          <a:gsLst>
-            <a:gs pos="0">
-              <a:schemeClr val="dk2">
-                <a:tint val="60000"/>
-                <a:hueOff val="0"/>
-                <a:satOff val="0"/>
-                <a:lumOff val="0"/>
-                <a:alphaOff val="0"/>
-                <a:shade val="51000"/>
-                <a:satMod val="130000"/>
-              </a:schemeClr>
-            </a:gs>
-            <a:gs pos="80000">
-              <a:schemeClr val="dk2">
-                <a:tint val="60000"/>
-                <a:hueOff val="0"/>
-                <a:satOff val="0"/>
-                <a:lumOff val="0"/>
-                <a:alphaOff val="0"/>
-                <a:shade val="93000"/>
-                <a:satMod val="130000"/>
-              </a:schemeClr>
-            </a:gs>
-            <a:gs pos="100000">
-              <a:schemeClr val="dk2">
-                <a:tint val="60000"/>
-                <a:hueOff val="0"/>
-                <a:satOff val="0"/>
-                <a:lumOff val="0"/>
-                <a:alphaOff val="0"/>
-                <a:shade val="94000"/>
-                <a:satMod val="135000"/>
-              </a:schemeClr>
-            </a:gs>
-          </a:gsLst>
-          <a:lin ang="16200000" scaled="0"/>
-        </a:gradFill>
-        <a:ln>
-          <a:noFill/>
-        </a:ln>
-        <a:effectLst>
-          <a:outerShdw blurRad="40000" dist="23000" dir="5400000" rotWithShape="0">
-            <a:srgbClr val="000000">
-              <a:alpha val="35000"/>
-            </a:srgbClr>
-          </a:outerShdw>
-        </a:effectLst>
-      </dsp:spPr>
-      <dsp:style>
-        <a:lnRef idx="0">
-          <a:scrgbClr r="0" g="0" b="0"/>
-        </a:lnRef>
-        <a:fillRef idx="3">
-          <a:scrgbClr r="0" g="0" b="0"/>
-        </a:fillRef>
-        <a:effectRef idx="2">
-          <a:scrgbClr r="0" g="0" b="0"/>
-        </a:effectRef>
-        <a:fontRef idx="minor">
-          <a:schemeClr val="lt1"/>
-        </a:fontRef>
-      </dsp:style>
-      <dsp:txBody>
-        <a:bodyPr spcFirstLastPara="0" vert="horz" wrap="square" lIns="0" tIns="0" rIns="0" bIns="0" numCol="1" spcCol="1270" anchor="ctr" anchorCtr="0">
-          <a:noAutofit/>
-        </a:bodyPr>
-        <a:lstStyle/>
-        <a:p>
-          <a:pPr lvl="0" algn="ctr" defTabSz="933450">
-            <a:lnSpc>
-              <a:spcPct val="90000"/>
-            </a:lnSpc>
-            <a:spcBef>
-              <a:spcPct val="0"/>
-            </a:spcBef>
-            <a:spcAft>
-              <a:spcPct val="35000"/>
-            </a:spcAft>
-          </a:pPr>
-          <a:endParaRPr lang="de-DE" sz="2100" kern="1200"/>
-        </a:p>
-      </dsp:txBody>
-      <dsp:txXfrm>
-        <a:off x="2598179" y="2349886"/>
-        <a:ext cx="349791" cy="350733"/>
-      </dsp:txXfrm>
-    </dsp:sp>
-    <dsp:sp modelId="{942B2FD4-F953-1241-B452-E01505D35646}">
-      <dsp:nvSpPr>
-        <dsp:cNvPr id="0" name=""/>
-        <dsp:cNvSpPr/>
-      </dsp:nvSpPr>
-      <dsp:spPr>
-        <a:xfrm>
-          <a:off x="3305303" y="1818129"/>
-          <a:ext cx="2357080" cy="1414248"/>
-        </a:xfrm>
-        <a:prstGeom prst="roundRect">
-          <a:avLst>
-            <a:gd name="adj" fmla="val 10000"/>
-          </a:avLst>
-        </a:prstGeom>
-        <a:gradFill rotWithShape="0">
-          <a:gsLst>
-            <a:gs pos="0">
-              <a:schemeClr val="dk2">
-                <a:hueOff val="0"/>
-                <a:satOff val="0"/>
-                <a:lumOff val="0"/>
-                <a:alphaOff val="0"/>
-                <a:shade val="51000"/>
-                <a:satMod val="130000"/>
-              </a:schemeClr>
-            </a:gs>
-            <a:gs pos="80000">
-              <a:schemeClr val="dk2">
-                <a:hueOff val="0"/>
-                <a:satOff val="0"/>
-                <a:lumOff val="0"/>
-                <a:alphaOff val="0"/>
-                <a:shade val="93000"/>
-                <a:satMod val="130000"/>
-              </a:schemeClr>
-            </a:gs>
-            <a:gs pos="100000">
-              <a:schemeClr val="dk2">
-                <a:hueOff val="0"/>
-                <a:satOff val="0"/>
-                <a:lumOff val="0"/>
-                <a:alphaOff val="0"/>
-                <a:shade val="94000"/>
-                <a:satMod val="135000"/>
-              </a:schemeClr>
-            </a:gs>
-          </a:gsLst>
-          <a:lin ang="16200000" scaled="0"/>
-        </a:gradFill>
-        <a:ln>
-          <a:noFill/>
-        </a:ln>
-        <a:effectLst>
-          <a:outerShdw blurRad="40000" dist="23000" dir="5400000" rotWithShape="0">
-            <a:srgbClr val="000000">
-              <a:alpha val="35000"/>
-            </a:srgbClr>
-          </a:outerShdw>
-        </a:effectLst>
-      </dsp:spPr>
-      <dsp:style>
-        <a:lnRef idx="0">
-          <a:scrgbClr r="0" g="0" b="0"/>
-        </a:lnRef>
-        <a:fillRef idx="3">
-          <a:scrgbClr r="0" g="0" b="0"/>
-        </a:fillRef>
-        <a:effectRef idx="2">
-          <a:scrgbClr r="0" g="0" b="0"/>
-        </a:effectRef>
-        <a:fontRef idx="minor">
-          <a:schemeClr val="lt1"/>
-        </a:fontRef>
-      </dsp:style>
-      <dsp:txBody>
-        <a:bodyPr spcFirstLastPara="0" vert="horz" wrap="square" lIns="99060" tIns="99060" rIns="99060" bIns="99060" numCol="1" spcCol="1270" anchor="ctr" anchorCtr="0">
-          <a:noAutofit/>
-        </a:bodyPr>
-        <a:lstStyle/>
-        <a:p>
-          <a:pPr lvl="0" algn="ctr" defTabSz="1155700">
-            <a:lnSpc>
-              <a:spcPct val="90000"/>
-            </a:lnSpc>
-            <a:spcBef>
-              <a:spcPct val="0"/>
-            </a:spcBef>
-            <a:spcAft>
-              <a:spcPct val="35000"/>
-            </a:spcAft>
-          </a:pPr>
-          <a:r>
-            <a:rPr lang="de-DE" sz="2600" kern="1200" dirty="0"/>
-            <a:t>Einbinden in die Anwendung</a:t>
-          </a:r>
-        </a:p>
-      </dsp:txBody>
-      <dsp:txXfrm>
-        <a:off x="3346725" y="1859551"/>
-        <a:ext cx="2274236" cy="1331404"/>
-      </dsp:txXfrm>
-    </dsp:sp>
-    <dsp:sp modelId="{61D01FBA-AE9A-8140-B034-5E107AF8B06D}">
-      <dsp:nvSpPr>
-        <dsp:cNvPr id="0" name=""/>
-        <dsp:cNvSpPr/>
-      </dsp:nvSpPr>
-      <dsp:spPr>
-        <a:xfrm>
-          <a:off x="5898091" y="2232975"/>
-          <a:ext cx="499701" cy="584555"/>
-        </a:xfrm>
-        <a:prstGeom prst="rightArrow">
-          <a:avLst>
-            <a:gd name="adj1" fmla="val 60000"/>
-            <a:gd name="adj2" fmla="val 50000"/>
-          </a:avLst>
-        </a:prstGeom>
-        <a:gradFill rotWithShape="0">
-          <a:gsLst>
-            <a:gs pos="0">
-              <a:schemeClr val="dk2">
-                <a:tint val="60000"/>
-                <a:hueOff val="0"/>
-                <a:satOff val="0"/>
-                <a:lumOff val="0"/>
-                <a:alphaOff val="0"/>
-                <a:shade val="51000"/>
-                <a:satMod val="130000"/>
-              </a:schemeClr>
-            </a:gs>
-            <a:gs pos="80000">
-              <a:schemeClr val="dk2">
-                <a:tint val="60000"/>
-                <a:hueOff val="0"/>
-                <a:satOff val="0"/>
-                <a:lumOff val="0"/>
-                <a:alphaOff val="0"/>
-                <a:shade val="93000"/>
-                <a:satMod val="130000"/>
-              </a:schemeClr>
-            </a:gs>
-            <a:gs pos="100000">
-              <a:schemeClr val="dk2">
-                <a:tint val="60000"/>
-                <a:hueOff val="0"/>
-                <a:satOff val="0"/>
-                <a:lumOff val="0"/>
-                <a:alphaOff val="0"/>
-                <a:shade val="94000"/>
-                <a:satMod val="135000"/>
-              </a:schemeClr>
-            </a:gs>
-          </a:gsLst>
-          <a:lin ang="16200000" scaled="0"/>
-        </a:gradFill>
-        <a:ln>
-          <a:noFill/>
-        </a:ln>
-        <a:effectLst>
-          <a:outerShdw blurRad="40000" dist="23000" dir="5400000" rotWithShape="0">
-            <a:srgbClr val="000000">
-              <a:alpha val="35000"/>
-            </a:srgbClr>
-          </a:outerShdw>
-        </a:effectLst>
-      </dsp:spPr>
-      <dsp:style>
-        <a:lnRef idx="0">
-          <a:scrgbClr r="0" g="0" b="0"/>
-        </a:lnRef>
-        <a:fillRef idx="3">
-          <a:scrgbClr r="0" g="0" b="0"/>
-        </a:fillRef>
-        <a:effectRef idx="2">
-          <a:scrgbClr r="0" g="0" b="0"/>
-        </a:effectRef>
-        <a:fontRef idx="minor">
-          <a:schemeClr val="lt1"/>
-        </a:fontRef>
-      </dsp:style>
-      <dsp:txBody>
-        <a:bodyPr spcFirstLastPara="0" vert="horz" wrap="square" lIns="0" tIns="0" rIns="0" bIns="0" numCol="1" spcCol="1270" anchor="ctr" anchorCtr="0">
-          <a:noAutofit/>
-        </a:bodyPr>
-        <a:lstStyle/>
-        <a:p>
-          <a:pPr lvl="0" algn="ctr" defTabSz="933450">
-            <a:lnSpc>
-              <a:spcPct val="90000"/>
-            </a:lnSpc>
-            <a:spcBef>
-              <a:spcPct val="0"/>
-            </a:spcBef>
-            <a:spcAft>
-              <a:spcPct val="35000"/>
-            </a:spcAft>
-          </a:pPr>
-          <a:endParaRPr lang="de-DE" sz="2100" kern="1200"/>
-        </a:p>
-      </dsp:txBody>
-      <dsp:txXfrm>
-        <a:off x="5898091" y="2349886"/>
-        <a:ext cx="349791" cy="350733"/>
-      </dsp:txXfrm>
-    </dsp:sp>
-    <dsp:sp modelId="{2D682FDA-6E7F-4A43-8A70-4A764CE24742}">
-      <dsp:nvSpPr>
-        <dsp:cNvPr id="0" name=""/>
-        <dsp:cNvSpPr/>
-      </dsp:nvSpPr>
-      <dsp:spPr>
-        <a:xfrm>
-          <a:off x="6605216" y="1818129"/>
-          <a:ext cx="2357080" cy="1414248"/>
-        </a:xfrm>
-        <a:prstGeom prst="roundRect">
-          <a:avLst>
-            <a:gd name="adj" fmla="val 10000"/>
-          </a:avLst>
-        </a:prstGeom>
-        <a:gradFill rotWithShape="0">
-          <a:gsLst>
-            <a:gs pos="0">
-              <a:schemeClr val="dk2">
-                <a:hueOff val="0"/>
-                <a:satOff val="0"/>
-                <a:lumOff val="0"/>
-                <a:alphaOff val="0"/>
-                <a:shade val="51000"/>
-                <a:satMod val="130000"/>
-              </a:schemeClr>
-            </a:gs>
-            <a:gs pos="80000">
-              <a:schemeClr val="dk2">
-                <a:hueOff val="0"/>
-                <a:satOff val="0"/>
-                <a:lumOff val="0"/>
-                <a:alphaOff val="0"/>
-                <a:shade val="93000"/>
-                <a:satMod val="130000"/>
-              </a:schemeClr>
-            </a:gs>
-            <a:gs pos="100000">
-              <a:schemeClr val="dk2">
-                <a:hueOff val="0"/>
-                <a:satOff val="0"/>
-                <a:lumOff val="0"/>
-                <a:alphaOff val="0"/>
-                <a:shade val="94000"/>
-                <a:satMod val="135000"/>
-              </a:schemeClr>
-            </a:gs>
-          </a:gsLst>
-          <a:lin ang="16200000" scaled="0"/>
-        </a:gradFill>
-        <a:ln>
-          <a:noFill/>
-        </a:ln>
-        <a:effectLst>
-          <a:outerShdw blurRad="40000" dist="23000" dir="5400000" rotWithShape="0">
-            <a:srgbClr val="000000">
-              <a:alpha val="35000"/>
-            </a:srgbClr>
-          </a:outerShdw>
-        </a:effectLst>
-      </dsp:spPr>
-      <dsp:style>
-        <a:lnRef idx="0">
-          <a:scrgbClr r="0" g="0" b="0"/>
-        </a:lnRef>
-        <a:fillRef idx="3">
-          <a:scrgbClr r="0" g="0" b="0"/>
-        </a:fillRef>
-        <a:effectRef idx="2">
-          <a:scrgbClr r="0" g="0" b="0"/>
-        </a:effectRef>
-        <a:fontRef idx="minor">
-          <a:schemeClr val="lt1"/>
-        </a:fontRef>
-      </dsp:style>
-      <dsp:txBody>
-        <a:bodyPr spcFirstLastPara="0" vert="horz" wrap="square" lIns="99060" tIns="99060" rIns="99060" bIns="99060" numCol="1" spcCol="1270" anchor="ctr" anchorCtr="0">
-          <a:noAutofit/>
-        </a:bodyPr>
-        <a:lstStyle/>
-        <a:p>
-          <a:pPr lvl="0" algn="ctr" defTabSz="1155700">
-            <a:lnSpc>
-              <a:spcPct val="90000"/>
-            </a:lnSpc>
-            <a:spcBef>
-              <a:spcPct val="0"/>
-            </a:spcBef>
-            <a:spcAft>
-              <a:spcPct val="35000"/>
-            </a:spcAft>
-          </a:pPr>
-          <a:r>
-            <a:rPr lang="de-DE" sz="2600" kern="1200" dirty="0"/>
-            <a:t>Auslagern der Businesslogik in den Service</a:t>
-          </a:r>
-        </a:p>
-      </dsp:txBody>
-      <dsp:txXfrm>
-        <a:off x="6646638" y="1859551"/>
-        <a:ext cx="2274236" cy="1331404"/>
-      </dsp:txXfrm>
-    </dsp:sp>
-    <dsp:sp modelId="{78019554-895E-1248-B21B-5CD6309654E4}">
-      <dsp:nvSpPr>
-        <dsp:cNvPr id="0" name=""/>
-        <dsp:cNvSpPr/>
-      </dsp:nvSpPr>
-      <dsp:spPr>
-        <a:xfrm>
-          <a:off x="9198004" y="2232975"/>
-          <a:ext cx="499701" cy="584555"/>
-        </a:xfrm>
-        <a:prstGeom prst="rightArrow">
-          <a:avLst>
-            <a:gd name="adj1" fmla="val 60000"/>
-            <a:gd name="adj2" fmla="val 50000"/>
-          </a:avLst>
-        </a:prstGeom>
-        <a:gradFill rotWithShape="0">
-          <a:gsLst>
-            <a:gs pos="0">
-              <a:schemeClr val="dk2">
-                <a:tint val="60000"/>
-                <a:hueOff val="0"/>
-                <a:satOff val="0"/>
-                <a:lumOff val="0"/>
-                <a:alphaOff val="0"/>
-                <a:shade val="51000"/>
-                <a:satMod val="130000"/>
-              </a:schemeClr>
-            </a:gs>
-            <a:gs pos="80000">
-              <a:schemeClr val="dk2">
-                <a:tint val="60000"/>
-                <a:hueOff val="0"/>
-                <a:satOff val="0"/>
-                <a:lumOff val="0"/>
-                <a:alphaOff val="0"/>
-                <a:shade val="93000"/>
-                <a:satMod val="130000"/>
-              </a:schemeClr>
-            </a:gs>
-            <a:gs pos="100000">
-              <a:schemeClr val="dk2">
-                <a:tint val="60000"/>
-                <a:hueOff val="0"/>
-                <a:satOff val="0"/>
-                <a:lumOff val="0"/>
-                <a:alphaOff val="0"/>
-                <a:shade val="94000"/>
-                <a:satMod val="135000"/>
-              </a:schemeClr>
-            </a:gs>
-          </a:gsLst>
-          <a:lin ang="16200000" scaled="0"/>
-        </a:gradFill>
-        <a:ln>
-          <a:noFill/>
-        </a:ln>
-        <a:effectLst>
-          <a:outerShdw blurRad="40000" dist="23000" dir="5400000" rotWithShape="0">
-            <a:srgbClr val="000000">
-              <a:alpha val="35000"/>
-            </a:srgbClr>
-          </a:outerShdw>
-        </a:effectLst>
-      </dsp:spPr>
-      <dsp:style>
-        <a:lnRef idx="0">
-          <a:scrgbClr r="0" g="0" b="0"/>
-        </a:lnRef>
-        <a:fillRef idx="3">
-          <a:scrgbClr r="0" g="0" b="0"/>
-        </a:fillRef>
-        <a:effectRef idx="2">
-          <a:scrgbClr r="0" g="0" b="0"/>
-        </a:effectRef>
-        <a:fontRef idx="minor">
-          <a:schemeClr val="lt1"/>
-        </a:fontRef>
-      </dsp:style>
-      <dsp:txBody>
-        <a:bodyPr spcFirstLastPara="0" vert="horz" wrap="square" lIns="0" tIns="0" rIns="0" bIns="0" numCol="1" spcCol="1270" anchor="ctr" anchorCtr="0">
-          <a:noAutofit/>
-        </a:bodyPr>
-        <a:lstStyle/>
-        <a:p>
-          <a:pPr lvl="0" algn="ctr" defTabSz="933450">
-            <a:lnSpc>
-              <a:spcPct val="90000"/>
-            </a:lnSpc>
-            <a:spcBef>
-              <a:spcPct val="0"/>
-            </a:spcBef>
-            <a:spcAft>
-              <a:spcPct val="35000"/>
-            </a:spcAft>
-          </a:pPr>
-          <a:endParaRPr lang="de-DE" sz="2100" kern="1200"/>
-        </a:p>
-      </dsp:txBody>
-      <dsp:txXfrm>
-        <a:off x="9198004" y="2349886"/>
-        <a:ext cx="349791" cy="350733"/>
-      </dsp:txXfrm>
-    </dsp:sp>
-    <dsp:sp modelId="{48E1AD6C-04E3-5047-8B6E-169C4DE6C0BD}">
-      <dsp:nvSpPr>
-        <dsp:cNvPr id="0" name=""/>
-        <dsp:cNvSpPr/>
-      </dsp:nvSpPr>
-      <dsp:spPr>
-        <a:xfrm>
-          <a:off x="9905128" y="1818129"/>
-          <a:ext cx="2357080" cy="1414248"/>
-        </a:xfrm>
-        <a:prstGeom prst="roundRect">
-          <a:avLst>
-            <a:gd name="adj" fmla="val 10000"/>
-          </a:avLst>
-        </a:prstGeom>
-        <a:gradFill rotWithShape="0">
-          <a:gsLst>
-            <a:gs pos="0">
-              <a:schemeClr val="dk2">
-                <a:hueOff val="0"/>
-                <a:satOff val="0"/>
-                <a:lumOff val="0"/>
-                <a:alphaOff val="0"/>
-                <a:shade val="51000"/>
-                <a:satMod val="130000"/>
-              </a:schemeClr>
-            </a:gs>
-            <a:gs pos="80000">
-              <a:schemeClr val="dk2">
-                <a:hueOff val="0"/>
-                <a:satOff val="0"/>
-                <a:lumOff val="0"/>
-                <a:alphaOff val="0"/>
-                <a:shade val="93000"/>
-                <a:satMod val="130000"/>
-              </a:schemeClr>
-            </a:gs>
-            <a:gs pos="100000">
-              <a:schemeClr val="dk2">
-                <a:hueOff val="0"/>
-                <a:satOff val="0"/>
-                <a:lumOff val="0"/>
-                <a:alphaOff val="0"/>
-                <a:shade val="94000"/>
-                <a:satMod val="135000"/>
-              </a:schemeClr>
-            </a:gs>
-          </a:gsLst>
-          <a:lin ang="16200000" scaled="0"/>
-        </a:gradFill>
-        <a:ln>
-          <a:noFill/>
-        </a:ln>
-        <a:effectLst>
-          <a:outerShdw blurRad="40000" dist="23000" dir="5400000" rotWithShape="0">
-            <a:srgbClr val="000000">
-              <a:alpha val="35000"/>
-            </a:srgbClr>
-          </a:outerShdw>
-        </a:effectLst>
-      </dsp:spPr>
-      <dsp:style>
-        <a:lnRef idx="0">
-          <a:scrgbClr r="0" g="0" b="0"/>
-        </a:lnRef>
-        <a:fillRef idx="3">
-          <a:scrgbClr r="0" g="0" b="0"/>
-        </a:fillRef>
-        <a:effectRef idx="2">
-          <a:scrgbClr r="0" g="0" b="0"/>
-        </a:effectRef>
-        <a:fontRef idx="minor">
-          <a:schemeClr val="lt1"/>
-        </a:fontRef>
-      </dsp:style>
-      <dsp:txBody>
-        <a:bodyPr spcFirstLastPara="0" vert="horz" wrap="square" lIns="99060" tIns="99060" rIns="99060" bIns="99060" numCol="1" spcCol="1270" anchor="ctr" anchorCtr="0">
-          <a:noAutofit/>
-        </a:bodyPr>
-        <a:lstStyle/>
-        <a:p>
-          <a:pPr lvl="0" algn="ctr" defTabSz="1155700">
-            <a:lnSpc>
-              <a:spcPct val="90000"/>
-            </a:lnSpc>
-            <a:spcBef>
-              <a:spcPct val="0"/>
-            </a:spcBef>
-            <a:spcAft>
-              <a:spcPct val="35000"/>
-            </a:spcAft>
-          </a:pPr>
-          <a:r>
-            <a:rPr lang="de-DE" sz="2600" kern="1200" dirty="0"/>
-            <a:t>Verwendung des Service</a:t>
-          </a:r>
-        </a:p>
-      </dsp:txBody>
-      <dsp:txXfrm>
-        <a:off x="9946550" y="1859551"/>
-        <a:ext cx="2274236" cy="1331404"/>
-      </dsp:txXfrm>
-    </dsp:sp>
   </dsp:spTree>
 </dsp:drawing>
 </file>
 
 <file path=ppt/diagrams/drawing5.xml><?xml version="1.0" encoding="utf-8"?>
+<dsp:drawing xmlns:dgm="http://schemas.openxmlformats.org/drawingml/2006/diagram" xmlns:dsp="http://schemas.microsoft.com/office/drawing/2008/diagram" xmlns:a="http://schemas.openxmlformats.org/drawingml/2006/main">
+  <dsp:spTree>
+    <dsp:nvGrpSpPr>
+      <dsp:cNvPr id="0" name=""/>
+      <dsp:cNvGrpSpPr/>
+    </dsp:nvGrpSpPr>
+    <dsp:grpSpPr/>
+  </dsp:spTree>
+</dsp:drawing>
+</file>
+
+<file path=ppt/diagrams/drawing6.xml><?xml version="1.0" encoding="utf-8"?>
 <dsp:drawing xmlns:dgm="http://schemas.openxmlformats.org/drawingml/2006/diagram" xmlns:dsp="http://schemas.microsoft.com/office/drawing/2008/diagram" xmlns:a="http://schemas.openxmlformats.org/drawingml/2006/main">
   <dsp:spTree>
     <dsp:nvGrpSpPr>
@@ -9159,7 +6433,7 @@
           </a:pPr>
           <a:r>
             <a:rPr lang="de-DE" sz="6200" kern="1200" dirty="0"/>
-            <a:t>Anbinden von Bootstrap</a:t>
+            <a:t>Definition von Routen</a:t>
           </a:r>
         </a:p>
       </dsp:txBody>
@@ -9272,7 +6546,7 @@
         <a:ext cx="758250" cy="760294"/>
       </dsp:txXfrm>
     </dsp:sp>
-    <dsp:sp modelId="{F3798565-47D6-9C41-8AE7-D9D9868DAAE8}">
+    <dsp:sp modelId="{942B2FD4-F953-1241-B452-E01505D35646}">
       <dsp:nvSpPr>
         <dsp:cNvPr id="0" name=""/>
         <dsp:cNvSpPr/>
@@ -9366,328 +6640,6 @@
           </a:pPr>
           <a:r>
             <a:rPr lang="de-DE" sz="6200" kern="1200" dirty="0"/>
-            <a:t>Eigene Styles hinzufügen</a:t>
-          </a:r>
-        </a:p>
-      </dsp:txBody>
-      <dsp:txXfrm>
-        <a:off x="7245491" y="1082193"/>
-        <a:ext cx="4929921" cy="2886119"/>
-      </dsp:txXfrm>
-    </dsp:sp>
-  </dsp:spTree>
-</dsp:drawing>
-</file>
-
-<file path=ppt/diagrams/drawing6.xml><?xml version="1.0" encoding="utf-8"?>
-<dsp:drawing xmlns:dgm="http://schemas.openxmlformats.org/drawingml/2006/diagram" xmlns:dsp="http://schemas.microsoft.com/office/drawing/2008/diagram" xmlns:a="http://schemas.openxmlformats.org/drawingml/2006/main">
-  <dsp:spTree>
-    <dsp:nvGrpSpPr>
-      <dsp:cNvPr id="0" name=""/>
-      <dsp:cNvGrpSpPr/>
-    </dsp:nvGrpSpPr>
-    <dsp:grpSpPr/>
-    <dsp:sp modelId="{AC19049A-FF2E-864B-A995-C88CCE14464E}">
-      <dsp:nvSpPr>
-        <dsp:cNvPr id="0" name=""/>
-        <dsp:cNvSpPr/>
-      </dsp:nvSpPr>
-      <dsp:spPr>
-        <a:xfrm>
-          <a:off x="2396" y="992402"/>
-          <a:ext cx="5109503" cy="3065701"/>
-        </a:xfrm>
-        <a:prstGeom prst="roundRect">
-          <a:avLst>
-            <a:gd name="adj" fmla="val 10000"/>
-          </a:avLst>
-        </a:prstGeom>
-        <a:gradFill rotWithShape="0">
-          <a:gsLst>
-            <a:gs pos="0">
-              <a:schemeClr val="dk2">
-                <a:hueOff val="0"/>
-                <a:satOff val="0"/>
-                <a:lumOff val="0"/>
-                <a:alphaOff val="0"/>
-                <a:shade val="51000"/>
-                <a:satMod val="130000"/>
-              </a:schemeClr>
-            </a:gs>
-            <a:gs pos="80000">
-              <a:schemeClr val="dk2">
-                <a:hueOff val="0"/>
-                <a:satOff val="0"/>
-                <a:lumOff val="0"/>
-                <a:alphaOff val="0"/>
-                <a:shade val="93000"/>
-                <a:satMod val="130000"/>
-              </a:schemeClr>
-            </a:gs>
-            <a:gs pos="100000">
-              <a:schemeClr val="dk2">
-                <a:hueOff val="0"/>
-                <a:satOff val="0"/>
-                <a:lumOff val="0"/>
-                <a:alphaOff val="0"/>
-                <a:shade val="94000"/>
-                <a:satMod val="135000"/>
-              </a:schemeClr>
-            </a:gs>
-          </a:gsLst>
-          <a:lin ang="16200000" scaled="0"/>
-        </a:gradFill>
-        <a:ln>
-          <a:noFill/>
-        </a:ln>
-        <a:effectLst>
-          <a:outerShdw blurRad="40000" dist="23000" dir="5400000" rotWithShape="0">
-            <a:srgbClr val="000000">
-              <a:alpha val="35000"/>
-            </a:srgbClr>
-          </a:outerShdw>
-        </a:effectLst>
-      </dsp:spPr>
-      <dsp:style>
-        <a:lnRef idx="0">
-          <a:scrgbClr r="0" g="0" b="0"/>
-        </a:lnRef>
-        <a:fillRef idx="3">
-          <a:scrgbClr r="0" g="0" b="0"/>
-        </a:fillRef>
-        <a:effectRef idx="2">
-          <a:scrgbClr r="0" g="0" b="0"/>
-        </a:effectRef>
-        <a:fontRef idx="minor">
-          <a:schemeClr val="lt1"/>
-        </a:fontRef>
-      </dsp:style>
-      <dsp:txBody>
-        <a:bodyPr spcFirstLastPara="0" vert="horz" wrap="square" lIns="247650" tIns="247650" rIns="247650" bIns="247650" numCol="1" spcCol="1270" anchor="ctr" anchorCtr="0">
-          <a:noAutofit/>
-        </a:bodyPr>
-        <a:lstStyle/>
-        <a:p>
-          <a:pPr lvl="0" algn="ctr" defTabSz="2889250">
-            <a:lnSpc>
-              <a:spcPct val="90000"/>
-            </a:lnSpc>
-            <a:spcBef>
-              <a:spcPct val="0"/>
-            </a:spcBef>
-            <a:spcAft>
-              <a:spcPct val="35000"/>
-            </a:spcAft>
-          </a:pPr>
-          <a:r>
-            <a:rPr lang="de-DE" sz="6500" kern="1200" dirty="0"/>
-            <a:t>Definition von Routen</a:t>
-          </a:r>
-        </a:p>
-      </dsp:txBody>
-      <dsp:txXfrm>
-        <a:off x="92187" y="1082193"/>
-        <a:ext cx="4929921" cy="2886119"/>
-      </dsp:txXfrm>
-    </dsp:sp>
-    <dsp:sp modelId="{30EAC814-8F64-D74A-9EBA-0CBC6BE058AA}">
-      <dsp:nvSpPr>
-        <dsp:cNvPr id="0" name=""/>
-        <dsp:cNvSpPr/>
-      </dsp:nvSpPr>
-      <dsp:spPr>
-        <a:xfrm>
-          <a:off x="5622849" y="1891675"/>
-          <a:ext cx="1083214" cy="1267156"/>
-        </a:xfrm>
-        <a:prstGeom prst="rightArrow">
-          <a:avLst>
-            <a:gd name="adj1" fmla="val 60000"/>
-            <a:gd name="adj2" fmla="val 50000"/>
-          </a:avLst>
-        </a:prstGeom>
-        <a:gradFill rotWithShape="0">
-          <a:gsLst>
-            <a:gs pos="0">
-              <a:schemeClr val="dk2">
-                <a:tint val="60000"/>
-                <a:hueOff val="0"/>
-                <a:satOff val="0"/>
-                <a:lumOff val="0"/>
-                <a:alphaOff val="0"/>
-                <a:shade val="51000"/>
-                <a:satMod val="130000"/>
-              </a:schemeClr>
-            </a:gs>
-            <a:gs pos="80000">
-              <a:schemeClr val="dk2">
-                <a:tint val="60000"/>
-                <a:hueOff val="0"/>
-                <a:satOff val="0"/>
-                <a:lumOff val="0"/>
-                <a:alphaOff val="0"/>
-                <a:shade val="93000"/>
-                <a:satMod val="130000"/>
-              </a:schemeClr>
-            </a:gs>
-            <a:gs pos="100000">
-              <a:schemeClr val="dk2">
-                <a:tint val="60000"/>
-                <a:hueOff val="0"/>
-                <a:satOff val="0"/>
-                <a:lumOff val="0"/>
-                <a:alphaOff val="0"/>
-                <a:shade val="94000"/>
-                <a:satMod val="135000"/>
-              </a:schemeClr>
-            </a:gs>
-          </a:gsLst>
-          <a:lin ang="16200000" scaled="0"/>
-        </a:gradFill>
-        <a:ln>
-          <a:noFill/>
-        </a:ln>
-        <a:effectLst>
-          <a:outerShdw blurRad="40000" dist="23000" dir="5400000" rotWithShape="0">
-            <a:srgbClr val="000000">
-              <a:alpha val="35000"/>
-            </a:srgbClr>
-          </a:outerShdw>
-        </a:effectLst>
-      </dsp:spPr>
-      <dsp:style>
-        <a:lnRef idx="0">
-          <a:scrgbClr r="0" g="0" b="0"/>
-        </a:lnRef>
-        <a:fillRef idx="3">
-          <a:scrgbClr r="0" g="0" b="0"/>
-        </a:fillRef>
-        <a:effectRef idx="2">
-          <a:scrgbClr r="0" g="0" b="0"/>
-        </a:effectRef>
-        <a:fontRef idx="minor">
-          <a:schemeClr val="lt1"/>
-        </a:fontRef>
-      </dsp:style>
-      <dsp:txBody>
-        <a:bodyPr spcFirstLastPara="0" vert="horz" wrap="square" lIns="0" tIns="0" rIns="0" bIns="0" numCol="1" spcCol="1270" anchor="ctr" anchorCtr="0">
-          <a:noAutofit/>
-        </a:bodyPr>
-        <a:lstStyle/>
-        <a:p>
-          <a:pPr lvl="0" algn="ctr" defTabSz="2400300">
-            <a:lnSpc>
-              <a:spcPct val="90000"/>
-            </a:lnSpc>
-            <a:spcBef>
-              <a:spcPct val="0"/>
-            </a:spcBef>
-            <a:spcAft>
-              <a:spcPct val="35000"/>
-            </a:spcAft>
-          </a:pPr>
-          <a:endParaRPr lang="de-DE" sz="5400" kern="1200"/>
-        </a:p>
-      </dsp:txBody>
-      <dsp:txXfrm>
-        <a:off x="5622849" y="2145106"/>
-        <a:ext cx="758250" cy="760294"/>
-      </dsp:txXfrm>
-    </dsp:sp>
-    <dsp:sp modelId="{942B2FD4-F953-1241-B452-E01505D35646}">
-      <dsp:nvSpPr>
-        <dsp:cNvPr id="0" name=""/>
-        <dsp:cNvSpPr/>
-      </dsp:nvSpPr>
-      <dsp:spPr>
-        <a:xfrm>
-          <a:off x="7155700" y="992402"/>
-          <a:ext cx="5109503" cy="3065701"/>
-        </a:xfrm>
-        <a:prstGeom prst="roundRect">
-          <a:avLst>
-            <a:gd name="adj" fmla="val 10000"/>
-          </a:avLst>
-        </a:prstGeom>
-        <a:gradFill rotWithShape="0">
-          <a:gsLst>
-            <a:gs pos="0">
-              <a:schemeClr val="dk2">
-                <a:hueOff val="0"/>
-                <a:satOff val="0"/>
-                <a:lumOff val="0"/>
-                <a:alphaOff val="0"/>
-                <a:shade val="51000"/>
-                <a:satMod val="130000"/>
-              </a:schemeClr>
-            </a:gs>
-            <a:gs pos="80000">
-              <a:schemeClr val="dk2">
-                <a:hueOff val="0"/>
-                <a:satOff val="0"/>
-                <a:lumOff val="0"/>
-                <a:alphaOff val="0"/>
-                <a:shade val="93000"/>
-                <a:satMod val="130000"/>
-              </a:schemeClr>
-            </a:gs>
-            <a:gs pos="100000">
-              <a:schemeClr val="dk2">
-                <a:hueOff val="0"/>
-                <a:satOff val="0"/>
-                <a:lumOff val="0"/>
-                <a:alphaOff val="0"/>
-                <a:shade val="94000"/>
-                <a:satMod val="135000"/>
-              </a:schemeClr>
-            </a:gs>
-          </a:gsLst>
-          <a:lin ang="16200000" scaled="0"/>
-        </a:gradFill>
-        <a:ln>
-          <a:noFill/>
-        </a:ln>
-        <a:effectLst>
-          <a:outerShdw blurRad="40000" dist="23000" dir="5400000" rotWithShape="0">
-            <a:srgbClr val="000000">
-              <a:alpha val="35000"/>
-            </a:srgbClr>
-          </a:outerShdw>
-        </a:effectLst>
-      </dsp:spPr>
-      <dsp:style>
-        <a:lnRef idx="0">
-          <a:scrgbClr r="0" g="0" b="0"/>
-        </a:lnRef>
-        <a:fillRef idx="3">
-          <a:scrgbClr r="0" g="0" b="0"/>
-        </a:fillRef>
-        <a:effectRef idx="2">
-          <a:scrgbClr r="0" g="0" b="0"/>
-        </a:effectRef>
-        <a:fontRef idx="minor">
-          <a:schemeClr val="lt1"/>
-        </a:fontRef>
-      </dsp:style>
-      <dsp:txBody>
-        <a:bodyPr spcFirstLastPara="0" vert="horz" wrap="square" lIns="247650" tIns="247650" rIns="247650" bIns="247650" numCol="1" spcCol="1270" anchor="ctr" anchorCtr="0">
-          <a:noAutofit/>
-        </a:bodyPr>
-        <a:lstStyle/>
-        <a:p>
-          <a:pPr lvl="0" algn="ctr" defTabSz="2889250">
-            <a:lnSpc>
-              <a:spcPct val="90000"/>
-            </a:lnSpc>
-            <a:spcBef>
-              <a:spcPct val="0"/>
-            </a:spcBef>
-            <a:spcAft>
-              <a:spcPct val="35000"/>
-            </a:spcAft>
-          </a:pPr>
-          <a:r>
-            <a:rPr lang="de-DE" sz="6500" kern="1200" dirty="0"/>
             <a:t>Verwendung der Routing</a:t>
           </a:r>
         </a:p>
@@ -16868,7 +13820,7 @@
                 <a:latin typeface="Segoe UI" pitchFamily="34" charset="0"/>
               </a:rPr>
               <a:pPr/>
-              <a:t>19.10.17</a:t>
+              <a:t>19.10.2017</a:t>
             </a:fld>
             <a:endParaRPr lang="de-DE" dirty="0">
               <a:latin typeface="Segoe UI" pitchFamily="34" charset="0"/>
@@ -17047,7 +13999,7 @@
             <a:fld id="{D2E1CCC5-01B8-284F-B77B-84D835A7601B}" type="datetimeFigureOut">
               <a:rPr lang="de-DE" smtClean="0"/>
               <a:pPr/>
-              <a:t>19.10.17</a:t>
+              <a:t>19.10.2017</a:t>
             </a:fld>
             <a:endParaRPr lang="de-DE" dirty="0"/>
           </a:p>
@@ -19599,7 +16551,7 @@
           <a:noFill/>
           <a:extLst>
             <a:ext uri="{909E8E84-426E-40dd-AFC4-6F175D3DCCD1}">
-              <a14:hiddenFill xmlns:a14="http://schemas.microsoft.com/office/drawing/2010/main" xmlns="">
+              <a14:hiddenFill xmlns="" xmlns:a14="http://schemas.microsoft.com/office/drawing/2010/main">
                 <a:solidFill>
                   <a:srgbClr val="FFFFFF"/>
                 </a:solidFill>
@@ -19617,7 +16569,7 @@
           <p:nvPr userDrawn="1"/>
         </p:nvPicPr>
         <p:blipFill rotWithShape="1">
-          <a:blip r:embed="rId3">
+          <a:blip r:embed="rId3" cstate="print">
             <a:extLst>
               <a:ext uri="{28A0092B-C50C-407E-A947-70E740481C1C}">
                 <a14:useLocalDpi xmlns:a14="http://schemas.microsoft.com/office/drawing/2010/main" val="0"/>
@@ -19799,7 +16751,7 @@
           <p:cNvPr id="2" name="Datumsplatzhalter 1">
             <a:extLst>
               <a:ext uri="{FF2B5EF4-FFF2-40B4-BE49-F238E27FC236}">
-                <a16:creationId xmlns:a16="http://schemas.microsoft.com/office/drawing/2014/main" xmlns="" id="{0EE9CECA-FE53-4E0D-AD22-D4AB49ECF809}"/>
+                <a16:creationId xmlns="" xmlns:a16="http://schemas.microsoft.com/office/drawing/2014/main" id="{0EE9CECA-FE53-4E0D-AD22-D4AB49ECF809}"/>
               </a:ext>
             </a:extLst>
           </p:cNvPr>
@@ -19818,7 +16770,7 @@
             <a:fld id="{17C2562E-359A-3C42-BBEF-E02CE97BECB1}" type="datetimeFigureOut">
               <a:rPr lang="de-DE" smtClean="0"/>
               <a:pPr/>
-              <a:t>19.10.17</a:t>
+              <a:t>19.10.2017</a:t>
             </a:fld>
             <a:endParaRPr lang="de-DE" dirty="0"/>
           </a:p>
@@ -19829,7 +16781,7 @@
           <p:cNvPr id="7" name="Fußzeilenplatzhalter 6">
             <a:extLst>
               <a:ext uri="{FF2B5EF4-FFF2-40B4-BE49-F238E27FC236}">
-                <a16:creationId xmlns:a16="http://schemas.microsoft.com/office/drawing/2014/main" xmlns="" id="{C07A299E-41A7-4A08-81FA-6FBA6806F0A5}"/>
+                <a16:creationId xmlns="" xmlns:a16="http://schemas.microsoft.com/office/drawing/2014/main" id="{C07A299E-41A7-4A08-81FA-6FBA6806F0A5}"/>
               </a:ext>
             </a:extLst>
           </p:cNvPr>
@@ -19854,7 +16806,7 @@
           <p:cNvPr id="8" name="Foliennummernplatzhalter 7">
             <a:extLst>
               <a:ext uri="{FF2B5EF4-FFF2-40B4-BE49-F238E27FC236}">
-                <a16:creationId xmlns:a16="http://schemas.microsoft.com/office/drawing/2014/main" xmlns="" id="{9151A28C-FF21-4CC9-B28E-CF780807FE34}"/>
+                <a16:creationId xmlns="" xmlns:a16="http://schemas.microsoft.com/office/drawing/2014/main" id="{9151A28C-FF21-4CC9-B28E-CF780807FE34}"/>
               </a:ext>
             </a:extLst>
           </p:cNvPr>
@@ -20109,7 +17061,7 @@
           <p:cNvPr id="3" name="Datumsplatzhalter 2">
             <a:extLst>
               <a:ext uri="{FF2B5EF4-FFF2-40B4-BE49-F238E27FC236}">
-                <a16:creationId xmlns:a16="http://schemas.microsoft.com/office/drawing/2014/main" xmlns="" id="{3D332A91-9158-4543-9295-8484F133E109}"/>
+                <a16:creationId xmlns="" xmlns:a16="http://schemas.microsoft.com/office/drawing/2014/main" id="{3D332A91-9158-4543-9295-8484F133E109}"/>
               </a:ext>
             </a:extLst>
           </p:cNvPr>
@@ -20128,7 +17080,7 @@
             <a:fld id="{17C2562E-359A-3C42-BBEF-E02CE97BECB1}" type="datetimeFigureOut">
               <a:rPr lang="de-DE" smtClean="0"/>
               <a:pPr/>
-              <a:t>19.10.17</a:t>
+              <a:t>19.10.2017</a:t>
             </a:fld>
             <a:endParaRPr lang="de-DE" dirty="0"/>
           </a:p>
@@ -20139,7 +17091,7 @@
           <p:cNvPr id="7" name="Fußzeilenplatzhalter 6">
             <a:extLst>
               <a:ext uri="{FF2B5EF4-FFF2-40B4-BE49-F238E27FC236}">
-                <a16:creationId xmlns:a16="http://schemas.microsoft.com/office/drawing/2014/main" xmlns="" id="{C426E4CE-7F9D-4A7E-A795-EDD7185E3A7A}"/>
+                <a16:creationId xmlns="" xmlns:a16="http://schemas.microsoft.com/office/drawing/2014/main" id="{C426E4CE-7F9D-4A7E-A795-EDD7185E3A7A}"/>
               </a:ext>
             </a:extLst>
           </p:cNvPr>
@@ -20164,7 +17116,7 @@
           <p:cNvPr id="8" name="Foliennummernplatzhalter 7">
             <a:extLst>
               <a:ext uri="{FF2B5EF4-FFF2-40B4-BE49-F238E27FC236}">
-                <a16:creationId xmlns:a16="http://schemas.microsoft.com/office/drawing/2014/main" xmlns="" id="{73459CEF-058C-4C7D-9907-D7A5E4B23A28}"/>
+                <a16:creationId xmlns="" xmlns:a16="http://schemas.microsoft.com/office/drawing/2014/main" id="{73459CEF-058C-4C7D-9907-D7A5E4B23A28}"/>
               </a:ext>
             </a:extLst>
           </p:cNvPr>
@@ -20412,7 +17364,7 @@
           <p:cNvPr id="2" name="Datumsplatzhalter 1">
             <a:extLst>
               <a:ext uri="{FF2B5EF4-FFF2-40B4-BE49-F238E27FC236}">
-                <a16:creationId xmlns:a16="http://schemas.microsoft.com/office/drawing/2014/main" xmlns="" id="{64A9B900-82AE-4D1E-B11E-155C1B825004}"/>
+                <a16:creationId xmlns="" xmlns:a16="http://schemas.microsoft.com/office/drawing/2014/main" id="{64A9B900-82AE-4D1E-B11E-155C1B825004}"/>
               </a:ext>
             </a:extLst>
           </p:cNvPr>
@@ -20431,7 +17383,7 @@
             <a:fld id="{17C2562E-359A-3C42-BBEF-E02CE97BECB1}" type="datetimeFigureOut">
               <a:rPr lang="de-DE" smtClean="0"/>
               <a:pPr/>
-              <a:t>19.10.17</a:t>
+              <a:t>19.10.2017</a:t>
             </a:fld>
             <a:endParaRPr lang="de-DE" dirty="0"/>
           </a:p>
@@ -20442,7 +17394,7 @@
           <p:cNvPr id="7" name="Fußzeilenplatzhalter 6">
             <a:extLst>
               <a:ext uri="{FF2B5EF4-FFF2-40B4-BE49-F238E27FC236}">
-                <a16:creationId xmlns:a16="http://schemas.microsoft.com/office/drawing/2014/main" xmlns="" id="{41953AE8-A571-4BCE-AF9C-CC7A649DD8C5}"/>
+                <a16:creationId xmlns="" xmlns:a16="http://schemas.microsoft.com/office/drawing/2014/main" id="{41953AE8-A571-4BCE-AF9C-CC7A649DD8C5}"/>
               </a:ext>
             </a:extLst>
           </p:cNvPr>
@@ -20467,7 +17419,7 @@
           <p:cNvPr id="8" name="Foliennummernplatzhalter 7">
             <a:extLst>
               <a:ext uri="{FF2B5EF4-FFF2-40B4-BE49-F238E27FC236}">
-                <a16:creationId xmlns:a16="http://schemas.microsoft.com/office/drawing/2014/main" xmlns="" id="{6DCAD949-98D9-4F76-BE67-6629B37422CB}"/>
+                <a16:creationId xmlns="" xmlns:a16="http://schemas.microsoft.com/office/drawing/2014/main" id="{6DCAD949-98D9-4F76-BE67-6629B37422CB}"/>
               </a:ext>
             </a:extLst>
           </p:cNvPr>
@@ -20568,7 +17520,7 @@
           <p:cNvPr id="2" name="Datumsplatzhalter 1">
             <a:extLst>
               <a:ext uri="{FF2B5EF4-FFF2-40B4-BE49-F238E27FC236}">
-                <a16:creationId xmlns:a16="http://schemas.microsoft.com/office/drawing/2014/main" xmlns="" id="{0F48F7B5-AF2D-4886-B660-ACFD0F3CA06C}"/>
+                <a16:creationId xmlns="" xmlns:a16="http://schemas.microsoft.com/office/drawing/2014/main" id="{0F48F7B5-AF2D-4886-B660-ACFD0F3CA06C}"/>
               </a:ext>
             </a:extLst>
           </p:cNvPr>
@@ -20587,7 +17539,7 @@
             <a:fld id="{17C2562E-359A-3C42-BBEF-E02CE97BECB1}" type="datetimeFigureOut">
               <a:rPr lang="de-DE" smtClean="0"/>
               <a:pPr/>
-              <a:t>19.10.17</a:t>
+              <a:t>19.10.2017</a:t>
             </a:fld>
             <a:endParaRPr lang="de-DE" dirty="0"/>
           </a:p>
@@ -20598,7 +17550,7 @@
           <p:cNvPr id="7" name="Fußzeilenplatzhalter 6">
             <a:extLst>
               <a:ext uri="{FF2B5EF4-FFF2-40B4-BE49-F238E27FC236}">
-                <a16:creationId xmlns:a16="http://schemas.microsoft.com/office/drawing/2014/main" xmlns="" id="{C01D3F89-6DF4-4DC1-ABFC-4B69E0299624}"/>
+                <a16:creationId xmlns="" xmlns:a16="http://schemas.microsoft.com/office/drawing/2014/main" id="{C01D3F89-6DF4-4DC1-ABFC-4B69E0299624}"/>
               </a:ext>
             </a:extLst>
           </p:cNvPr>
@@ -20623,7 +17575,7 @@
           <p:cNvPr id="8" name="Foliennummernplatzhalter 7">
             <a:extLst>
               <a:ext uri="{FF2B5EF4-FFF2-40B4-BE49-F238E27FC236}">
-                <a16:creationId xmlns:a16="http://schemas.microsoft.com/office/drawing/2014/main" xmlns="" id="{BFD42FBE-0754-4285-A3CE-566D22A33C59}"/>
+                <a16:creationId xmlns="" xmlns:a16="http://schemas.microsoft.com/office/drawing/2014/main" id="{BFD42FBE-0754-4285-A3CE-566D22A33C59}"/>
               </a:ext>
             </a:extLst>
           </p:cNvPr>
@@ -20864,7 +17816,7 @@
           <p:cNvPr id="3" name="Datumsplatzhalter 2">
             <a:extLst>
               <a:ext uri="{FF2B5EF4-FFF2-40B4-BE49-F238E27FC236}">
-                <a16:creationId xmlns:a16="http://schemas.microsoft.com/office/drawing/2014/main" xmlns="" id="{434AC82E-1F55-4D6D-B12A-7355E3927B04}"/>
+                <a16:creationId xmlns="" xmlns:a16="http://schemas.microsoft.com/office/drawing/2014/main" id="{434AC82E-1F55-4D6D-B12A-7355E3927B04}"/>
               </a:ext>
             </a:extLst>
           </p:cNvPr>
@@ -20883,7 +17835,7 @@
             <a:fld id="{17C2562E-359A-3C42-BBEF-E02CE97BECB1}" type="datetimeFigureOut">
               <a:rPr lang="de-DE" smtClean="0"/>
               <a:pPr/>
-              <a:t>19.10.17</a:t>
+              <a:t>19.10.2017</a:t>
             </a:fld>
             <a:endParaRPr lang="de-DE" dirty="0"/>
           </a:p>
@@ -20894,7 +17846,7 @@
           <p:cNvPr id="7" name="Fußzeilenplatzhalter 6">
             <a:extLst>
               <a:ext uri="{FF2B5EF4-FFF2-40B4-BE49-F238E27FC236}">
-                <a16:creationId xmlns:a16="http://schemas.microsoft.com/office/drawing/2014/main" xmlns="" id="{95F90759-2A54-4A06-B304-DFA3C45AF309}"/>
+                <a16:creationId xmlns="" xmlns:a16="http://schemas.microsoft.com/office/drawing/2014/main" id="{95F90759-2A54-4A06-B304-DFA3C45AF309}"/>
               </a:ext>
             </a:extLst>
           </p:cNvPr>
@@ -20919,7 +17871,7 @@
           <p:cNvPr id="8" name="Foliennummernplatzhalter 7">
             <a:extLst>
               <a:ext uri="{FF2B5EF4-FFF2-40B4-BE49-F238E27FC236}">
-                <a16:creationId xmlns:a16="http://schemas.microsoft.com/office/drawing/2014/main" xmlns="" id="{AAA489C6-E63E-4078-89A4-7CC1709D7206}"/>
+                <a16:creationId xmlns="" xmlns:a16="http://schemas.microsoft.com/office/drawing/2014/main" id="{AAA489C6-E63E-4078-89A4-7CC1709D7206}"/>
               </a:ext>
             </a:extLst>
           </p:cNvPr>
@@ -21201,7 +18153,7 @@
           <p:cNvPr id="3" name="Datumsplatzhalter 2">
             <a:extLst>
               <a:ext uri="{FF2B5EF4-FFF2-40B4-BE49-F238E27FC236}">
-                <a16:creationId xmlns:a16="http://schemas.microsoft.com/office/drawing/2014/main" xmlns="" id="{24A5A6B0-652D-48FC-AF73-17BD8D217D8E}"/>
+                <a16:creationId xmlns="" xmlns:a16="http://schemas.microsoft.com/office/drawing/2014/main" id="{24A5A6B0-652D-48FC-AF73-17BD8D217D8E}"/>
               </a:ext>
             </a:extLst>
           </p:cNvPr>
@@ -21220,7 +18172,7 @@
             <a:fld id="{17C2562E-359A-3C42-BBEF-E02CE97BECB1}" type="datetimeFigureOut">
               <a:rPr lang="de-DE" smtClean="0"/>
               <a:pPr/>
-              <a:t>19.10.17</a:t>
+              <a:t>19.10.2017</a:t>
             </a:fld>
             <a:endParaRPr lang="de-DE" dirty="0"/>
           </a:p>
@@ -21231,7 +18183,7 @@
           <p:cNvPr id="7" name="Fußzeilenplatzhalter 6">
             <a:extLst>
               <a:ext uri="{FF2B5EF4-FFF2-40B4-BE49-F238E27FC236}">
-                <a16:creationId xmlns:a16="http://schemas.microsoft.com/office/drawing/2014/main" xmlns="" id="{239BA7E1-F103-432E-BC27-0127D2228DA4}"/>
+                <a16:creationId xmlns="" xmlns:a16="http://schemas.microsoft.com/office/drawing/2014/main" id="{239BA7E1-F103-432E-BC27-0127D2228DA4}"/>
               </a:ext>
             </a:extLst>
           </p:cNvPr>
@@ -21256,7 +18208,7 @@
           <p:cNvPr id="9" name="Foliennummernplatzhalter 8">
             <a:extLst>
               <a:ext uri="{FF2B5EF4-FFF2-40B4-BE49-F238E27FC236}">
-                <a16:creationId xmlns:a16="http://schemas.microsoft.com/office/drawing/2014/main" xmlns="" id="{E398A7F9-A765-46A7-B1D7-8FF6247ED6E8}"/>
+                <a16:creationId xmlns="" xmlns:a16="http://schemas.microsoft.com/office/drawing/2014/main" id="{E398A7F9-A765-46A7-B1D7-8FF6247ED6E8}"/>
               </a:ext>
             </a:extLst>
           </p:cNvPr>
@@ -21677,7 +18629,7 @@
           <p:cNvPr id="3" name="Datumsplatzhalter 2">
             <a:extLst>
               <a:ext uri="{FF2B5EF4-FFF2-40B4-BE49-F238E27FC236}">
-                <a16:creationId xmlns:a16="http://schemas.microsoft.com/office/drawing/2014/main" xmlns="" id="{E251BDE8-F6CD-4379-B02C-D58055E91CB7}"/>
+                <a16:creationId xmlns="" xmlns:a16="http://schemas.microsoft.com/office/drawing/2014/main" id="{E251BDE8-F6CD-4379-B02C-D58055E91CB7}"/>
               </a:ext>
             </a:extLst>
           </p:cNvPr>
@@ -21696,7 +18648,7 @@
             <a:fld id="{17C2562E-359A-3C42-BBEF-E02CE97BECB1}" type="datetimeFigureOut">
               <a:rPr lang="de-DE" smtClean="0"/>
               <a:pPr/>
-              <a:t>19.10.17</a:t>
+              <a:t>19.10.2017</a:t>
             </a:fld>
             <a:endParaRPr lang="de-DE" dirty="0"/>
           </a:p>
@@ -21707,7 +18659,7 @@
           <p:cNvPr id="7" name="Fußzeilenplatzhalter 6">
             <a:extLst>
               <a:ext uri="{FF2B5EF4-FFF2-40B4-BE49-F238E27FC236}">
-                <a16:creationId xmlns:a16="http://schemas.microsoft.com/office/drawing/2014/main" xmlns="" id="{F684EDD4-7234-4CF4-A5B8-FCC6419FE199}"/>
+                <a16:creationId xmlns="" xmlns:a16="http://schemas.microsoft.com/office/drawing/2014/main" id="{F684EDD4-7234-4CF4-A5B8-FCC6419FE199}"/>
               </a:ext>
             </a:extLst>
           </p:cNvPr>
@@ -21732,7 +18684,7 @@
           <p:cNvPr id="8" name="Foliennummernplatzhalter 7">
             <a:extLst>
               <a:ext uri="{FF2B5EF4-FFF2-40B4-BE49-F238E27FC236}">
-                <a16:creationId xmlns:a16="http://schemas.microsoft.com/office/drawing/2014/main" xmlns="" id="{81EB7AF2-AEA0-439E-B5DA-DF760778341F}"/>
+                <a16:creationId xmlns="" xmlns:a16="http://schemas.microsoft.com/office/drawing/2014/main" id="{81EB7AF2-AEA0-439E-B5DA-DF760778341F}"/>
               </a:ext>
             </a:extLst>
           </p:cNvPr>
@@ -22060,7 +19012,7 @@
           <p:cNvPr id="3" name="Datumsplatzhalter 2">
             <a:extLst>
               <a:ext uri="{FF2B5EF4-FFF2-40B4-BE49-F238E27FC236}">
-                <a16:creationId xmlns:a16="http://schemas.microsoft.com/office/drawing/2014/main" xmlns="" id="{C2E5ECD2-BEB5-47D1-A89E-69496048A8D5}"/>
+                <a16:creationId xmlns="" xmlns:a16="http://schemas.microsoft.com/office/drawing/2014/main" id="{C2E5ECD2-BEB5-47D1-A89E-69496048A8D5}"/>
               </a:ext>
             </a:extLst>
           </p:cNvPr>
@@ -22079,7 +19031,7 @@
             <a:fld id="{17C2562E-359A-3C42-BBEF-E02CE97BECB1}" type="datetimeFigureOut">
               <a:rPr lang="de-DE" smtClean="0"/>
               <a:pPr/>
-              <a:t>19.10.17</a:t>
+              <a:t>19.10.2017</a:t>
             </a:fld>
             <a:endParaRPr lang="de-DE" dirty="0"/>
           </a:p>
@@ -22090,7 +19042,7 @@
           <p:cNvPr id="7" name="Fußzeilenplatzhalter 6">
             <a:extLst>
               <a:ext uri="{FF2B5EF4-FFF2-40B4-BE49-F238E27FC236}">
-                <a16:creationId xmlns:a16="http://schemas.microsoft.com/office/drawing/2014/main" xmlns="" id="{8DADA64D-3A7A-4438-9197-BD2830657223}"/>
+                <a16:creationId xmlns="" xmlns:a16="http://schemas.microsoft.com/office/drawing/2014/main" id="{8DADA64D-3A7A-4438-9197-BD2830657223}"/>
               </a:ext>
             </a:extLst>
           </p:cNvPr>
@@ -22115,7 +19067,7 @@
           <p:cNvPr id="9" name="Foliennummernplatzhalter 8">
             <a:extLst>
               <a:ext uri="{FF2B5EF4-FFF2-40B4-BE49-F238E27FC236}">
-                <a16:creationId xmlns:a16="http://schemas.microsoft.com/office/drawing/2014/main" xmlns="" id="{3D8A091A-178E-435F-9EA9-84BA66D378CC}"/>
+                <a16:creationId xmlns="" xmlns:a16="http://schemas.microsoft.com/office/drawing/2014/main" id="{3D8A091A-178E-435F-9EA9-84BA66D378CC}"/>
               </a:ext>
             </a:extLst>
           </p:cNvPr>
@@ -22746,7 +19698,7 @@
           <p:cNvPr id="6" name="Datumsplatzhalter 5">
             <a:extLst>
               <a:ext uri="{FF2B5EF4-FFF2-40B4-BE49-F238E27FC236}">
-                <a16:creationId xmlns:a16="http://schemas.microsoft.com/office/drawing/2014/main" xmlns="" id="{E75B6010-F5BB-4F22-8221-D75D21F6EB55}"/>
+                <a16:creationId xmlns="" xmlns:a16="http://schemas.microsoft.com/office/drawing/2014/main" id="{E75B6010-F5BB-4F22-8221-D75D21F6EB55}"/>
               </a:ext>
             </a:extLst>
           </p:cNvPr>
@@ -22765,7 +19717,7 @@
             <a:fld id="{17C2562E-359A-3C42-BBEF-E02CE97BECB1}" type="datetimeFigureOut">
               <a:rPr lang="de-DE" smtClean="0"/>
               <a:pPr/>
-              <a:t>19.10.17</a:t>
+              <a:t>19.10.2017</a:t>
             </a:fld>
             <a:endParaRPr lang="de-DE" dirty="0"/>
           </a:p>
@@ -22776,7 +19728,7 @@
           <p:cNvPr id="7" name="Fußzeilenplatzhalter 6">
             <a:extLst>
               <a:ext uri="{FF2B5EF4-FFF2-40B4-BE49-F238E27FC236}">
-                <a16:creationId xmlns:a16="http://schemas.microsoft.com/office/drawing/2014/main" xmlns="" id="{26547C97-5C9B-4C14-8D49-A5E83DFFB45A}"/>
+                <a16:creationId xmlns="" xmlns:a16="http://schemas.microsoft.com/office/drawing/2014/main" id="{26547C97-5C9B-4C14-8D49-A5E83DFFB45A}"/>
               </a:ext>
             </a:extLst>
           </p:cNvPr>
@@ -22801,7 +19753,7 @@
           <p:cNvPr id="11" name="Foliennummernplatzhalter 10">
             <a:extLst>
               <a:ext uri="{FF2B5EF4-FFF2-40B4-BE49-F238E27FC236}">
-                <a16:creationId xmlns:a16="http://schemas.microsoft.com/office/drawing/2014/main" xmlns="" id="{98B57AAA-67F4-4EFE-A062-411C04E4F8A2}"/>
+                <a16:creationId xmlns="" xmlns:a16="http://schemas.microsoft.com/office/drawing/2014/main" id="{98B57AAA-67F4-4EFE-A062-411C04E4F8A2}"/>
               </a:ext>
             </a:extLst>
           </p:cNvPr>
@@ -23340,7 +20292,7 @@
           <p:cNvPr id="5" name="Datumsplatzhalter 4">
             <a:extLst>
               <a:ext uri="{FF2B5EF4-FFF2-40B4-BE49-F238E27FC236}">
-                <a16:creationId xmlns:a16="http://schemas.microsoft.com/office/drawing/2014/main" xmlns="" id="{0C7C8404-609B-40A1-85F0-0C1D3C5C6357}"/>
+                <a16:creationId xmlns="" xmlns:a16="http://schemas.microsoft.com/office/drawing/2014/main" id="{0C7C8404-609B-40A1-85F0-0C1D3C5C6357}"/>
               </a:ext>
             </a:extLst>
           </p:cNvPr>
@@ -23359,7 +20311,7 @@
             <a:fld id="{17C2562E-359A-3C42-BBEF-E02CE97BECB1}" type="datetimeFigureOut">
               <a:rPr lang="de-DE" smtClean="0"/>
               <a:pPr/>
-              <a:t>19.10.17</a:t>
+              <a:t>19.10.2017</a:t>
             </a:fld>
             <a:endParaRPr lang="de-DE" dirty="0"/>
           </a:p>
@@ -23370,7 +20322,7 @@
           <p:cNvPr id="8" name="Fußzeilenplatzhalter 7">
             <a:extLst>
               <a:ext uri="{FF2B5EF4-FFF2-40B4-BE49-F238E27FC236}">
-                <a16:creationId xmlns:a16="http://schemas.microsoft.com/office/drawing/2014/main" xmlns="" id="{3C29D00E-B305-494B-A605-238A832848F3}"/>
+                <a16:creationId xmlns="" xmlns:a16="http://schemas.microsoft.com/office/drawing/2014/main" id="{3C29D00E-B305-494B-A605-238A832848F3}"/>
               </a:ext>
             </a:extLst>
           </p:cNvPr>
@@ -23395,7 +20347,7 @@
           <p:cNvPr id="9" name="Foliennummernplatzhalter 8">
             <a:extLst>
               <a:ext uri="{FF2B5EF4-FFF2-40B4-BE49-F238E27FC236}">
-                <a16:creationId xmlns:a16="http://schemas.microsoft.com/office/drawing/2014/main" xmlns="" id="{7FC7C27A-51A6-4577-BAAE-22B90EFD1D16}"/>
+                <a16:creationId xmlns="" xmlns:a16="http://schemas.microsoft.com/office/drawing/2014/main" id="{7FC7C27A-51A6-4577-BAAE-22B90EFD1D16}"/>
               </a:ext>
             </a:extLst>
           </p:cNvPr>
@@ -24164,7 +21116,7 @@
           <p:cNvPr id="5" name="Datumsplatzhalter 4">
             <a:extLst>
               <a:ext uri="{FF2B5EF4-FFF2-40B4-BE49-F238E27FC236}">
-                <a16:creationId xmlns:a16="http://schemas.microsoft.com/office/drawing/2014/main" xmlns="" id="{33D616DE-E3B4-4D35-BB61-A1FFAD7A5AAF}"/>
+                <a16:creationId xmlns="" xmlns:a16="http://schemas.microsoft.com/office/drawing/2014/main" id="{33D616DE-E3B4-4D35-BB61-A1FFAD7A5AAF}"/>
               </a:ext>
             </a:extLst>
           </p:cNvPr>
@@ -24183,7 +21135,7 @@
             <a:fld id="{17C2562E-359A-3C42-BBEF-E02CE97BECB1}" type="datetimeFigureOut">
               <a:rPr lang="de-DE" smtClean="0"/>
               <a:pPr/>
-              <a:t>19.10.17</a:t>
+              <a:t>19.10.2017</a:t>
             </a:fld>
             <a:endParaRPr lang="de-DE" dirty="0"/>
           </a:p>
@@ -24194,7 +21146,7 @@
           <p:cNvPr id="7" name="Fußzeilenplatzhalter 6">
             <a:extLst>
               <a:ext uri="{FF2B5EF4-FFF2-40B4-BE49-F238E27FC236}">
-                <a16:creationId xmlns:a16="http://schemas.microsoft.com/office/drawing/2014/main" xmlns="" id="{009571DE-76C3-4B92-A98C-31AD1C84E96F}"/>
+                <a16:creationId xmlns="" xmlns:a16="http://schemas.microsoft.com/office/drawing/2014/main" id="{009571DE-76C3-4B92-A98C-31AD1C84E96F}"/>
               </a:ext>
             </a:extLst>
           </p:cNvPr>
@@ -24219,7 +21171,7 @@
           <p:cNvPr id="10" name="Foliennummernplatzhalter 9">
             <a:extLst>
               <a:ext uri="{FF2B5EF4-FFF2-40B4-BE49-F238E27FC236}">
-                <a16:creationId xmlns:a16="http://schemas.microsoft.com/office/drawing/2014/main" xmlns="" id="{A873DEEA-A3E3-4201-A6F9-C92D0EB9E730}"/>
+                <a16:creationId xmlns="" xmlns:a16="http://schemas.microsoft.com/office/drawing/2014/main" id="{A873DEEA-A3E3-4201-A6F9-C92D0EB9E730}"/>
               </a:ext>
             </a:extLst>
           </p:cNvPr>
@@ -24644,7 +21596,7 @@
           <p:cNvPr id="6" name="Datumsplatzhalter 5">
             <a:extLst>
               <a:ext uri="{FF2B5EF4-FFF2-40B4-BE49-F238E27FC236}">
-                <a16:creationId xmlns:a16="http://schemas.microsoft.com/office/drawing/2014/main" xmlns="" id="{BE1F9E44-CCA9-4032-B773-94D7E2DF8ED5}"/>
+                <a16:creationId xmlns="" xmlns:a16="http://schemas.microsoft.com/office/drawing/2014/main" id="{BE1F9E44-CCA9-4032-B773-94D7E2DF8ED5}"/>
               </a:ext>
             </a:extLst>
           </p:cNvPr>
@@ -24663,7 +21615,7 @@
             <a:fld id="{17C2562E-359A-3C42-BBEF-E02CE97BECB1}" type="datetimeFigureOut">
               <a:rPr lang="de-DE" smtClean="0"/>
               <a:pPr/>
-              <a:t>19.10.17</a:t>
+              <a:t>19.10.2017</a:t>
             </a:fld>
             <a:endParaRPr lang="de-DE" dirty="0"/>
           </a:p>
@@ -24674,7 +21626,7 @@
           <p:cNvPr id="7" name="Fußzeilenplatzhalter 6">
             <a:extLst>
               <a:ext uri="{FF2B5EF4-FFF2-40B4-BE49-F238E27FC236}">
-                <a16:creationId xmlns:a16="http://schemas.microsoft.com/office/drawing/2014/main" xmlns="" id="{4D3B4066-4E5D-4AAB-A33C-01B8A1CAA20D}"/>
+                <a16:creationId xmlns="" xmlns:a16="http://schemas.microsoft.com/office/drawing/2014/main" id="{4D3B4066-4E5D-4AAB-A33C-01B8A1CAA20D}"/>
               </a:ext>
             </a:extLst>
           </p:cNvPr>
@@ -24699,7 +21651,7 @@
           <p:cNvPr id="8" name="Foliennummernplatzhalter 7">
             <a:extLst>
               <a:ext uri="{FF2B5EF4-FFF2-40B4-BE49-F238E27FC236}">
-                <a16:creationId xmlns:a16="http://schemas.microsoft.com/office/drawing/2014/main" xmlns="" id="{52AE4811-CB7B-4E63-92A7-E2967B6AEBEE}"/>
+                <a16:creationId xmlns="" xmlns:a16="http://schemas.microsoft.com/office/drawing/2014/main" id="{52AE4811-CB7B-4E63-92A7-E2967B6AEBEE}"/>
               </a:ext>
             </a:extLst>
           </p:cNvPr>
@@ -25486,7 +22438,7 @@
           <p:cNvPr id="5" name="Datumsplatzhalter 4">
             <a:extLst>
               <a:ext uri="{FF2B5EF4-FFF2-40B4-BE49-F238E27FC236}">
-                <a16:creationId xmlns:a16="http://schemas.microsoft.com/office/drawing/2014/main" xmlns="" id="{7AEDF8C5-F6FB-4119-B6A3-908B246DAB0B}"/>
+                <a16:creationId xmlns="" xmlns:a16="http://schemas.microsoft.com/office/drawing/2014/main" id="{7AEDF8C5-F6FB-4119-B6A3-908B246DAB0B}"/>
               </a:ext>
             </a:extLst>
           </p:cNvPr>
@@ -25505,7 +22457,7 @@
             <a:fld id="{17C2562E-359A-3C42-BBEF-E02CE97BECB1}" type="datetimeFigureOut">
               <a:rPr lang="de-DE" smtClean="0"/>
               <a:pPr/>
-              <a:t>19.10.17</a:t>
+              <a:t>19.10.2017</a:t>
             </a:fld>
             <a:endParaRPr lang="de-DE" dirty="0"/>
           </a:p>
@@ -25516,7 +22468,7 @@
           <p:cNvPr id="7" name="Fußzeilenplatzhalter 6">
             <a:extLst>
               <a:ext uri="{FF2B5EF4-FFF2-40B4-BE49-F238E27FC236}">
-                <a16:creationId xmlns:a16="http://schemas.microsoft.com/office/drawing/2014/main" xmlns="" id="{4CCDEB9D-85DD-4CF0-96C7-BA711D11F2BE}"/>
+                <a16:creationId xmlns="" xmlns:a16="http://schemas.microsoft.com/office/drawing/2014/main" id="{4CCDEB9D-85DD-4CF0-96C7-BA711D11F2BE}"/>
               </a:ext>
             </a:extLst>
           </p:cNvPr>
@@ -25541,7 +22493,7 @@
           <p:cNvPr id="9" name="Foliennummernplatzhalter 8">
             <a:extLst>
               <a:ext uri="{FF2B5EF4-FFF2-40B4-BE49-F238E27FC236}">
-                <a16:creationId xmlns:a16="http://schemas.microsoft.com/office/drawing/2014/main" xmlns="" id="{418E80D9-3450-43BD-94A9-22C9BF91B1C0}"/>
+                <a16:creationId xmlns="" xmlns:a16="http://schemas.microsoft.com/office/drawing/2014/main" id="{418E80D9-3450-43BD-94A9-22C9BF91B1C0}"/>
               </a:ext>
             </a:extLst>
           </p:cNvPr>
@@ -26287,7 +23239,7 @@
           <p:cNvPr id="3" name="Datumsplatzhalter 2">
             <a:extLst>
               <a:ext uri="{FF2B5EF4-FFF2-40B4-BE49-F238E27FC236}">
-                <a16:creationId xmlns:a16="http://schemas.microsoft.com/office/drawing/2014/main" xmlns="" id="{25D8C277-6F42-4B11-AB90-EBE3A1238A85}"/>
+                <a16:creationId xmlns="" xmlns:a16="http://schemas.microsoft.com/office/drawing/2014/main" id="{25D8C277-6F42-4B11-AB90-EBE3A1238A85}"/>
               </a:ext>
             </a:extLst>
           </p:cNvPr>
@@ -26306,7 +23258,7 @@
             <a:fld id="{17C2562E-359A-3C42-BBEF-E02CE97BECB1}" type="datetimeFigureOut">
               <a:rPr lang="de-DE" smtClean="0"/>
               <a:pPr/>
-              <a:t>19.10.17</a:t>
+              <a:t>19.10.2017</a:t>
             </a:fld>
             <a:endParaRPr lang="de-DE" dirty="0"/>
           </a:p>
@@ -26317,7 +23269,7 @@
           <p:cNvPr id="4" name="Fußzeilenplatzhalter 3">
             <a:extLst>
               <a:ext uri="{FF2B5EF4-FFF2-40B4-BE49-F238E27FC236}">
-                <a16:creationId xmlns:a16="http://schemas.microsoft.com/office/drawing/2014/main" xmlns="" id="{4815A052-9443-41A9-9F46-0AA437EEDDA5}"/>
+                <a16:creationId xmlns="" xmlns:a16="http://schemas.microsoft.com/office/drawing/2014/main" id="{4815A052-9443-41A9-9F46-0AA437EEDDA5}"/>
               </a:ext>
             </a:extLst>
           </p:cNvPr>
@@ -26342,7 +23294,7 @@
           <p:cNvPr id="5" name="Foliennummernplatzhalter 4">
             <a:extLst>
               <a:ext uri="{FF2B5EF4-FFF2-40B4-BE49-F238E27FC236}">
-                <a16:creationId xmlns:a16="http://schemas.microsoft.com/office/drawing/2014/main" xmlns="" id="{5F7C50D9-9DEA-4EFD-ACE3-677BBD4DEB55}"/>
+                <a16:creationId xmlns="" xmlns:a16="http://schemas.microsoft.com/office/drawing/2014/main" id="{5F7C50D9-9DEA-4EFD-ACE3-677BBD4DEB55}"/>
               </a:ext>
             </a:extLst>
           </p:cNvPr>
@@ -26808,7 +23760,7 @@
           <p:cNvPr id="5" name="Datumsplatzhalter 4">
             <a:extLst>
               <a:ext uri="{FF2B5EF4-FFF2-40B4-BE49-F238E27FC236}">
-                <a16:creationId xmlns:a16="http://schemas.microsoft.com/office/drawing/2014/main" xmlns="" id="{6B4135B1-E114-41F0-9C64-3A26186B834F}"/>
+                <a16:creationId xmlns="" xmlns:a16="http://schemas.microsoft.com/office/drawing/2014/main" id="{6B4135B1-E114-41F0-9C64-3A26186B834F}"/>
               </a:ext>
             </a:extLst>
           </p:cNvPr>
@@ -26827,7 +23779,7 @@
             <a:fld id="{17C2562E-359A-3C42-BBEF-E02CE97BECB1}" type="datetimeFigureOut">
               <a:rPr lang="de-DE" smtClean="0"/>
               <a:pPr/>
-              <a:t>19.10.17</a:t>
+              <a:t>19.10.2017</a:t>
             </a:fld>
             <a:endParaRPr lang="de-DE" dirty="0"/>
           </a:p>
@@ -26838,7 +23790,7 @@
           <p:cNvPr id="7" name="Fußzeilenplatzhalter 6">
             <a:extLst>
               <a:ext uri="{FF2B5EF4-FFF2-40B4-BE49-F238E27FC236}">
-                <a16:creationId xmlns:a16="http://schemas.microsoft.com/office/drawing/2014/main" xmlns="" id="{84D81854-B37F-4ADF-A34F-BF0CCA2926F2}"/>
+                <a16:creationId xmlns="" xmlns:a16="http://schemas.microsoft.com/office/drawing/2014/main" id="{84D81854-B37F-4ADF-A34F-BF0CCA2926F2}"/>
               </a:ext>
             </a:extLst>
           </p:cNvPr>
@@ -26863,7 +23815,7 @@
           <p:cNvPr id="9" name="Foliennummernplatzhalter 8">
             <a:extLst>
               <a:ext uri="{FF2B5EF4-FFF2-40B4-BE49-F238E27FC236}">
-                <a16:creationId xmlns:a16="http://schemas.microsoft.com/office/drawing/2014/main" xmlns="" id="{2EE17D9C-06FE-45C8-B312-4C5617C49000}"/>
+                <a16:creationId xmlns="" xmlns:a16="http://schemas.microsoft.com/office/drawing/2014/main" id="{2EE17D9C-06FE-45C8-B312-4C5617C49000}"/>
               </a:ext>
             </a:extLst>
           </p:cNvPr>
@@ -27288,7 +24240,7 @@
           <p:cNvPr id="10" name="Datumsplatzhalter 9">
             <a:extLst>
               <a:ext uri="{FF2B5EF4-FFF2-40B4-BE49-F238E27FC236}">
-                <a16:creationId xmlns:a16="http://schemas.microsoft.com/office/drawing/2014/main" xmlns="" id="{F92E0490-C295-4C99-B9D1-6310B9164EDD}"/>
+                <a16:creationId xmlns="" xmlns:a16="http://schemas.microsoft.com/office/drawing/2014/main" id="{F92E0490-C295-4C99-B9D1-6310B9164EDD}"/>
               </a:ext>
             </a:extLst>
           </p:cNvPr>
@@ -27307,7 +24259,7 @@
             <a:fld id="{17C2562E-359A-3C42-BBEF-E02CE97BECB1}" type="datetimeFigureOut">
               <a:rPr lang="de-DE" smtClean="0"/>
               <a:pPr/>
-              <a:t>19.10.17</a:t>
+              <a:t>19.10.2017</a:t>
             </a:fld>
             <a:endParaRPr lang="de-DE" dirty="0"/>
           </a:p>
@@ -27318,7 +24270,7 @@
           <p:cNvPr id="11" name="Fußzeilenplatzhalter 10">
             <a:extLst>
               <a:ext uri="{FF2B5EF4-FFF2-40B4-BE49-F238E27FC236}">
-                <a16:creationId xmlns:a16="http://schemas.microsoft.com/office/drawing/2014/main" xmlns="" id="{DD98C48F-3C69-4703-B4CC-632DDDDB497C}"/>
+                <a16:creationId xmlns="" xmlns:a16="http://schemas.microsoft.com/office/drawing/2014/main" id="{DD98C48F-3C69-4703-B4CC-632DDDDB497C}"/>
               </a:ext>
             </a:extLst>
           </p:cNvPr>
@@ -27343,7 +24295,7 @@
           <p:cNvPr id="15" name="Foliennummernplatzhalter 14">
             <a:extLst>
               <a:ext uri="{FF2B5EF4-FFF2-40B4-BE49-F238E27FC236}">
-                <a16:creationId xmlns:a16="http://schemas.microsoft.com/office/drawing/2014/main" xmlns="" id="{1968527D-44A1-407F-99A6-2ACAB46FBD28}"/>
+                <a16:creationId xmlns="" xmlns:a16="http://schemas.microsoft.com/office/drawing/2014/main" id="{1968527D-44A1-407F-99A6-2ACAB46FBD28}"/>
               </a:ext>
             </a:extLst>
           </p:cNvPr>
@@ -28130,7 +25082,7 @@
           <p:cNvPr id="5" name="Datumsplatzhalter 4">
             <a:extLst>
               <a:ext uri="{FF2B5EF4-FFF2-40B4-BE49-F238E27FC236}">
-                <a16:creationId xmlns:a16="http://schemas.microsoft.com/office/drawing/2014/main" xmlns="" id="{8AFAB162-0FDB-4A37-A4FD-CBFC89474486}"/>
+                <a16:creationId xmlns="" xmlns:a16="http://schemas.microsoft.com/office/drawing/2014/main" id="{8AFAB162-0FDB-4A37-A4FD-CBFC89474486}"/>
               </a:ext>
             </a:extLst>
           </p:cNvPr>
@@ -28149,7 +25101,7 @@
             <a:fld id="{17C2562E-359A-3C42-BBEF-E02CE97BECB1}" type="datetimeFigureOut">
               <a:rPr lang="de-DE" smtClean="0"/>
               <a:pPr/>
-              <a:t>19.10.17</a:t>
+              <a:t>19.10.2017</a:t>
             </a:fld>
             <a:endParaRPr lang="de-DE" dirty="0"/>
           </a:p>
@@ -28160,7 +25112,7 @@
           <p:cNvPr id="7" name="Fußzeilenplatzhalter 6">
             <a:extLst>
               <a:ext uri="{FF2B5EF4-FFF2-40B4-BE49-F238E27FC236}">
-                <a16:creationId xmlns:a16="http://schemas.microsoft.com/office/drawing/2014/main" xmlns="" id="{46B12C25-0691-43C5-8596-6B8AD0039874}"/>
+                <a16:creationId xmlns="" xmlns:a16="http://schemas.microsoft.com/office/drawing/2014/main" id="{46B12C25-0691-43C5-8596-6B8AD0039874}"/>
               </a:ext>
             </a:extLst>
           </p:cNvPr>
@@ -28185,7 +25137,7 @@
           <p:cNvPr id="9" name="Foliennummernplatzhalter 8">
             <a:extLst>
               <a:ext uri="{FF2B5EF4-FFF2-40B4-BE49-F238E27FC236}">
-                <a16:creationId xmlns:a16="http://schemas.microsoft.com/office/drawing/2014/main" xmlns="" id="{7C5C2594-4A54-4AE0-88EE-FB17FDD4570C}"/>
+                <a16:creationId xmlns="" xmlns:a16="http://schemas.microsoft.com/office/drawing/2014/main" id="{7C5C2594-4A54-4AE0-88EE-FB17FDD4570C}"/>
               </a:ext>
             </a:extLst>
           </p:cNvPr>
@@ -28931,7 +25883,7 @@
           <p:cNvPr id="5" name="Datumsplatzhalter 4">
             <a:extLst>
               <a:ext uri="{FF2B5EF4-FFF2-40B4-BE49-F238E27FC236}">
-                <a16:creationId xmlns:a16="http://schemas.microsoft.com/office/drawing/2014/main" xmlns="" id="{D1D6952B-45CB-46FF-9F9B-1F98CC255417}"/>
+                <a16:creationId xmlns="" xmlns:a16="http://schemas.microsoft.com/office/drawing/2014/main" id="{D1D6952B-45CB-46FF-9F9B-1F98CC255417}"/>
               </a:ext>
             </a:extLst>
           </p:cNvPr>
@@ -28950,7 +25902,7 @@
             <a:fld id="{17C2562E-359A-3C42-BBEF-E02CE97BECB1}" type="datetimeFigureOut">
               <a:rPr lang="de-DE" smtClean="0"/>
               <a:pPr/>
-              <a:t>19.10.17</a:t>
+              <a:t>19.10.2017</a:t>
             </a:fld>
             <a:endParaRPr lang="de-DE" dirty="0"/>
           </a:p>
@@ -28961,7 +25913,7 @@
           <p:cNvPr id="7" name="Fußzeilenplatzhalter 6">
             <a:extLst>
               <a:ext uri="{FF2B5EF4-FFF2-40B4-BE49-F238E27FC236}">
-                <a16:creationId xmlns:a16="http://schemas.microsoft.com/office/drawing/2014/main" xmlns="" id="{3C08D0C6-0E40-46E2-9D6C-74181D953DFE}"/>
+                <a16:creationId xmlns="" xmlns:a16="http://schemas.microsoft.com/office/drawing/2014/main" id="{3C08D0C6-0E40-46E2-9D6C-74181D953DFE}"/>
               </a:ext>
             </a:extLst>
           </p:cNvPr>
@@ -28986,7 +25938,7 @@
           <p:cNvPr id="8" name="Foliennummernplatzhalter 7">
             <a:extLst>
               <a:ext uri="{FF2B5EF4-FFF2-40B4-BE49-F238E27FC236}">
-                <a16:creationId xmlns:a16="http://schemas.microsoft.com/office/drawing/2014/main" xmlns="" id="{EA500A2A-E0AD-4AD6-AB58-61BF900F0E2C}"/>
+                <a16:creationId xmlns="" xmlns:a16="http://schemas.microsoft.com/office/drawing/2014/main" id="{EA500A2A-E0AD-4AD6-AB58-61BF900F0E2C}"/>
               </a:ext>
             </a:extLst>
           </p:cNvPr>
@@ -29090,7 +26042,7 @@
           <p:cNvPr id="5" name="Datumsplatzhalter 4">
             <a:extLst>
               <a:ext uri="{FF2B5EF4-FFF2-40B4-BE49-F238E27FC236}">
-                <a16:creationId xmlns:a16="http://schemas.microsoft.com/office/drawing/2014/main" xmlns="" id="{A181F7F8-D379-4070-8216-3B81228BAEC6}"/>
+                <a16:creationId xmlns="" xmlns:a16="http://schemas.microsoft.com/office/drawing/2014/main" id="{A181F7F8-D379-4070-8216-3B81228BAEC6}"/>
               </a:ext>
             </a:extLst>
           </p:cNvPr>
@@ -29109,7 +26061,7 @@
             <a:fld id="{17C2562E-359A-3C42-BBEF-E02CE97BECB1}" type="datetimeFigureOut">
               <a:rPr lang="de-DE" smtClean="0"/>
               <a:pPr/>
-              <a:t>19.10.17</a:t>
+              <a:t>19.10.2017</a:t>
             </a:fld>
             <a:endParaRPr lang="de-DE" dirty="0"/>
           </a:p>
@@ -29120,7 +26072,7 @@
           <p:cNvPr id="7" name="Fußzeilenplatzhalter 6">
             <a:extLst>
               <a:ext uri="{FF2B5EF4-FFF2-40B4-BE49-F238E27FC236}">
-                <a16:creationId xmlns:a16="http://schemas.microsoft.com/office/drawing/2014/main" xmlns="" id="{D8E0E4FD-5CC1-4D23-A3E8-7DAB1134A4FA}"/>
+                <a16:creationId xmlns="" xmlns:a16="http://schemas.microsoft.com/office/drawing/2014/main" id="{D8E0E4FD-5CC1-4D23-A3E8-7DAB1134A4FA}"/>
               </a:ext>
             </a:extLst>
           </p:cNvPr>
@@ -29145,7 +26097,7 @@
           <p:cNvPr id="8" name="Foliennummernplatzhalter 7">
             <a:extLst>
               <a:ext uri="{FF2B5EF4-FFF2-40B4-BE49-F238E27FC236}">
-                <a16:creationId xmlns:a16="http://schemas.microsoft.com/office/drawing/2014/main" xmlns="" id="{6D72C792-B02A-4A44-BF65-9B261DE5D43D}"/>
+                <a16:creationId xmlns="" xmlns:a16="http://schemas.microsoft.com/office/drawing/2014/main" id="{6D72C792-B02A-4A44-BF65-9B261DE5D43D}"/>
               </a:ext>
             </a:extLst>
           </p:cNvPr>
@@ -29542,7 +26494,7 @@
           <p:cNvPr id="2" name="Datumsplatzhalter 1">
             <a:extLst>
               <a:ext uri="{FF2B5EF4-FFF2-40B4-BE49-F238E27FC236}">
-                <a16:creationId xmlns:a16="http://schemas.microsoft.com/office/drawing/2014/main" xmlns="" id="{B1E6CA30-BA19-47F1-BFEE-B5E43CCEC731}"/>
+                <a16:creationId xmlns="" xmlns:a16="http://schemas.microsoft.com/office/drawing/2014/main" id="{B1E6CA30-BA19-47F1-BFEE-B5E43CCEC731}"/>
               </a:ext>
             </a:extLst>
           </p:cNvPr>
@@ -29561,7 +26513,7 @@
             <a:fld id="{17C2562E-359A-3C42-BBEF-E02CE97BECB1}" type="datetimeFigureOut">
               <a:rPr lang="de-DE" smtClean="0"/>
               <a:pPr/>
-              <a:t>19.10.17</a:t>
+              <a:t>19.10.2017</a:t>
             </a:fld>
             <a:endParaRPr lang="de-DE" dirty="0"/>
           </a:p>
@@ -29572,7 +26524,7 @@
           <p:cNvPr id="14" name="Fußzeilenplatzhalter 13">
             <a:extLst>
               <a:ext uri="{FF2B5EF4-FFF2-40B4-BE49-F238E27FC236}">
-                <a16:creationId xmlns:a16="http://schemas.microsoft.com/office/drawing/2014/main" xmlns="" id="{06236A5B-AF48-4E5C-BD02-27BC73328D88}"/>
+                <a16:creationId xmlns="" xmlns:a16="http://schemas.microsoft.com/office/drawing/2014/main" id="{06236A5B-AF48-4E5C-BD02-27BC73328D88}"/>
               </a:ext>
             </a:extLst>
           </p:cNvPr>
@@ -29597,7 +26549,7 @@
           <p:cNvPr id="15" name="Foliennummernplatzhalter 14">
             <a:extLst>
               <a:ext uri="{FF2B5EF4-FFF2-40B4-BE49-F238E27FC236}">
-                <a16:creationId xmlns:a16="http://schemas.microsoft.com/office/drawing/2014/main" xmlns="" id="{6C539E6F-C163-4DFD-A93D-F463843C6D4E}"/>
+                <a16:creationId xmlns="" xmlns:a16="http://schemas.microsoft.com/office/drawing/2014/main" id="{6C539E6F-C163-4DFD-A93D-F463843C6D4E}"/>
               </a:ext>
             </a:extLst>
           </p:cNvPr>
@@ -29913,7 +26865,7 @@
           <p:cNvPr id="7" name="Datumsplatzhalter 6">
             <a:extLst>
               <a:ext uri="{FF2B5EF4-FFF2-40B4-BE49-F238E27FC236}">
-                <a16:creationId xmlns:a16="http://schemas.microsoft.com/office/drawing/2014/main" xmlns="" id="{E9F2D5EB-EB07-4AC4-94D4-FA6BD7E87398}"/>
+                <a16:creationId xmlns="" xmlns:a16="http://schemas.microsoft.com/office/drawing/2014/main" id="{E9F2D5EB-EB07-4AC4-94D4-FA6BD7E87398}"/>
               </a:ext>
             </a:extLst>
           </p:cNvPr>
@@ -29932,7 +26884,7 @@
             <a:fld id="{17C2562E-359A-3C42-BBEF-E02CE97BECB1}" type="datetimeFigureOut">
               <a:rPr lang="de-DE" smtClean="0"/>
               <a:pPr/>
-              <a:t>19.10.17</a:t>
+              <a:t>19.10.2017</a:t>
             </a:fld>
             <a:endParaRPr lang="de-DE" dirty="0"/>
           </a:p>
@@ -29943,7 +26895,7 @@
           <p:cNvPr id="8" name="Fußzeilenplatzhalter 7">
             <a:extLst>
               <a:ext uri="{FF2B5EF4-FFF2-40B4-BE49-F238E27FC236}">
-                <a16:creationId xmlns:a16="http://schemas.microsoft.com/office/drawing/2014/main" xmlns="" id="{947F1BF2-5B5A-4E3F-9A69-A7FC06CEE6DA}"/>
+                <a16:creationId xmlns="" xmlns:a16="http://schemas.microsoft.com/office/drawing/2014/main" id="{947F1BF2-5B5A-4E3F-9A69-A7FC06CEE6DA}"/>
               </a:ext>
             </a:extLst>
           </p:cNvPr>
@@ -29968,7 +26920,7 @@
           <p:cNvPr id="9" name="Foliennummernplatzhalter 8">
             <a:extLst>
               <a:ext uri="{FF2B5EF4-FFF2-40B4-BE49-F238E27FC236}">
-                <a16:creationId xmlns:a16="http://schemas.microsoft.com/office/drawing/2014/main" xmlns="" id="{B0D6E36A-E68C-4CFF-A1B3-ADE80884E18E}"/>
+                <a16:creationId xmlns="" xmlns:a16="http://schemas.microsoft.com/office/drawing/2014/main" id="{B0D6E36A-E68C-4CFF-A1B3-ADE80884E18E}"/>
               </a:ext>
             </a:extLst>
           </p:cNvPr>
@@ -30059,7 +27011,7 @@
           <a:noFill/>
           <a:extLst>
             <a:ext uri="{909E8E84-426E-40dd-AFC4-6F175D3DCCD1}">
-              <a14:hiddenFill xmlns:a14="http://schemas.microsoft.com/office/drawing/2010/main" xmlns="">
+              <a14:hiddenFill xmlns="" xmlns:a14="http://schemas.microsoft.com/office/drawing/2010/main">
                 <a:solidFill>
                   <a:srgbClr val="FFFFFF"/>
                 </a:solidFill>
@@ -30139,7 +27091,7 @@
           <a:noFill/>
           <a:extLst>
             <a:ext uri="{909E8E84-426E-40dd-AFC4-6F175D3DCCD1}">
-              <a14:hiddenFill xmlns:a14="http://schemas.microsoft.com/office/drawing/2010/main" xmlns="">
+              <a14:hiddenFill xmlns="" xmlns:a14="http://schemas.microsoft.com/office/drawing/2010/main">
                 <a:solidFill>
                   <a:srgbClr val="FFFFFF"/>
                 </a:solidFill>
@@ -30442,7 +27394,7 @@
           <p:cNvPr id="5" name="Datumsplatzhalter 4">
             <a:extLst>
               <a:ext uri="{FF2B5EF4-FFF2-40B4-BE49-F238E27FC236}">
-                <a16:creationId xmlns:a16="http://schemas.microsoft.com/office/drawing/2014/main" xmlns="" id="{368DD9D8-7FE8-48F0-AE91-AE98EA3DCA20}"/>
+                <a16:creationId xmlns="" xmlns:a16="http://schemas.microsoft.com/office/drawing/2014/main" id="{368DD9D8-7FE8-48F0-AE91-AE98EA3DCA20}"/>
               </a:ext>
             </a:extLst>
           </p:cNvPr>
@@ -30461,7 +27413,7 @@
             <a:fld id="{17C2562E-359A-3C42-BBEF-E02CE97BECB1}" type="datetimeFigureOut">
               <a:rPr lang="de-DE" smtClean="0"/>
               <a:pPr/>
-              <a:t>19.10.17</a:t>
+              <a:t>19.10.2017</a:t>
             </a:fld>
             <a:endParaRPr lang="de-DE" dirty="0"/>
           </a:p>
@@ -30472,7 +27424,7 @@
           <p:cNvPr id="7" name="Fußzeilenplatzhalter 6">
             <a:extLst>
               <a:ext uri="{FF2B5EF4-FFF2-40B4-BE49-F238E27FC236}">
-                <a16:creationId xmlns:a16="http://schemas.microsoft.com/office/drawing/2014/main" xmlns="" id="{DD743ADB-89F1-48B5-A397-7FB83734730F}"/>
+                <a16:creationId xmlns="" xmlns:a16="http://schemas.microsoft.com/office/drawing/2014/main" id="{DD743ADB-89F1-48B5-A397-7FB83734730F}"/>
               </a:ext>
             </a:extLst>
           </p:cNvPr>
@@ -30497,7 +27449,7 @@
           <p:cNvPr id="8" name="Foliennummernplatzhalter 7">
             <a:extLst>
               <a:ext uri="{FF2B5EF4-FFF2-40B4-BE49-F238E27FC236}">
-                <a16:creationId xmlns:a16="http://schemas.microsoft.com/office/drawing/2014/main" xmlns="" id="{E9AACC46-EA1E-4E6F-8F9D-AC4B57F09904}"/>
+                <a16:creationId xmlns="" xmlns:a16="http://schemas.microsoft.com/office/drawing/2014/main" id="{E9AACC46-EA1E-4E6F-8F9D-AC4B57F09904}"/>
               </a:ext>
             </a:extLst>
           </p:cNvPr>
@@ -30804,7 +27756,7 @@
           <p:cNvPr id="6" name="Datumsplatzhalter 5">
             <a:extLst>
               <a:ext uri="{FF2B5EF4-FFF2-40B4-BE49-F238E27FC236}">
-                <a16:creationId xmlns:a16="http://schemas.microsoft.com/office/drawing/2014/main" xmlns="" id="{39EC82D5-F468-46F1-8BE2-F62E4D04C5CD}"/>
+                <a16:creationId xmlns="" xmlns:a16="http://schemas.microsoft.com/office/drawing/2014/main" id="{39EC82D5-F468-46F1-8BE2-F62E4D04C5CD}"/>
               </a:ext>
             </a:extLst>
           </p:cNvPr>
@@ -30823,7 +27775,7 @@
             <a:fld id="{17C2562E-359A-3C42-BBEF-E02CE97BECB1}" type="datetimeFigureOut">
               <a:rPr lang="de-DE" smtClean="0"/>
               <a:pPr/>
-              <a:t>19.10.17</a:t>
+              <a:t>19.10.2017</a:t>
             </a:fld>
             <a:endParaRPr lang="de-DE" dirty="0"/>
           </a:p>
@@ -30834,7 +27786,7 @@
           <p:cNvPr id="7" name="Fußzeilenplatzhalter 6">
             <a:extLst>
               <a:ext uri="{FF2B5EF4-FFF2-40B4-BE49-F238E27FC236}">
-                <a16:creationId xmlns:a16="http://schemas.microsoft.com/office/drawing/2014/main" xmlns="" id="{32A29AE2-1FA8-458C-9BDD-E35CA69A9340}"/>
+                <a16:creationId xmlns="" xmlns:a16="http://schemas.microsoft.com/office/drawing/2014/main" id="{32A29AE2-1FA8-458C-9BDD-E35CA69A9340}"/>
               </a:ext>
             </a:extLst>
           </p:cNvPr>
@@ -30859,7 +27811,7 @@
           <p:cNvPr id="8" name="Foliennummernplatzhalter 7">
             <a:extLst>
               <a:ext uri="{FF2B5EF4-FFF2-40B4-BE49-F238E27FC236}">
-                <a16:creationId xmlns:a16="http://schemas.microsoft.com/office/drawing/2014/main" xmlns="" id="{DC4135BE-88E8-4C4B-B3FF-FC61855E0C9F}"/>
+                <a16:creationId xmlns="" xmlns:a16="http://schemas.microsoft.com/office/drawing/2014/main" id="{DC4135BE-88E8-4C4B-B3FF-FC61855E0C9F}"/>
               </a:ext>
             </a:extLst>
           </p:cNvPr>
@@ -31170,7 +28122,7 @@
           <p:cNvPr id="5" name="Datumsplatzhalter 4">
             <a:extLst>
               <a:ext uri="{FF2B5EF4-FFF2-40B4-BE49-F238E27FC236}">
-                <a16:creationId xmlns:a16="http://schemas.microsoft.com/office/drawing/2014/main" xmlns="" id="{42621BA8-D298-4AAA-B27E-2D5702596736}"/>
+                <a16:creationId xmlns="" xmlns:a16="http://schemas.microsoft.com/office/drawing/2014/main" id="{42621BA8-D298-4AAA-B27E-2D5702596736}"/>
               </a:ext>
             </a:extLst>
           </p:cNvPr>
@@ -31189,7 +28141,7 @@
             <a:fld id="{17C2562E-359A-3C42-BBEF-E02CE97BECB1}" type="datetimeFigureOut">
               <a:rPr lang="de-DE" smtClean="0"/>
               <a:pPr/>
-              <a:t>19.10.17</a:t>
+              <a:t>19.10.2017</a:t>
             </a:fld>
             <a:endParaRPr lang="de-DE" dirty="0"/>
           </a:p>
@@ -31200,7 +28152,7 @@
           <p:cNvPr id="6" name="Fußzeilenplatzhalter 5">
             <a:extLst>
               <a:ext uri="{FF2B5EF4-FFF2-40B4-BE49-F238E27FC236}">
-                <a16:creationId xmlns:a16="http://schemas.microsoft.com/office/drawing/2014/main" xmlns="" id="{59687A69-8E9C-4168-AA2A-7D487587D19D}"/>
+                <a16:creationId xmlns="" xmlns:a16="http://schemas.microsoft.com/office/drawing/2014/main" id="{59687A69-8E9C-4168-AA2A-7D487587D19D}"/>
               </a:ext>
             </a:extLst>
           </p:cNvPr>
@@ -31225,7 +28177,7 @@
           <p:cNvPr id="7" name="Foliennummernplatzhalter 6">
             <a:extLst>
               <a:ext uri="{FF2B5EF4-FFF2-40B4-BE49-F238E27FC236}">
-                <a16:creationId xmlns:a16="http://schemas.microsoft.com/office/drawing/2014/main" xmlns="" id="{536244A4-4C24-4CD2-82E9-C547A6F8C84B}"/>
+                <a16:creationId xmlns="" xmlns:a16="http://schemas.microsoft.com/office/drawing/2014/main" id="{536244A4-4C24-4CD2-82E9-C547A6F8C84B}"/>
               </a:ext>
             </a:extLst>
           </p:cNvPr>
@@ -31529,7 +28481,7 @@
           <p:cNvPr id="6" name="Datumsplatzhalter 5">
             <a:extLst>
               <a:ext uri="{FF2B5EF4-FFF2-40B4-BE49-F238E27FC236}">
-                <a16:creationId xmlns:a16="http://schemas.microsoft.com/office/drawing/2014/main" xmlns="" id="{BF6F2AC7-7673-45B2-B727-C8AE32F0AB56}"/>
+                <a16:creationId xmlns="" xmlns:a16="http://schemas.microsoft.com/office/drawing/2014/main" id="{BF6F2AC7-7673-45B2-B727-C8AE32F0AB56}"/>
               </a:ext>
             </a:extLst>
           </p:cNvPr>
@@ -31548,7 +28500,7 @@
             <a:fld id="{17C2562E-359A-3C42-BBEF-E02CE97BECB1}" type="datetimeFigureOut">
               <a:rPr lang="de-DE" smtClean="0"/>
               <a:pPr/>
-              <a:t>19.10.17</a:t>
+              <a:t>19.10.2017</a:t>
             </a:fld>
             <a:endParaRPr lang="de-DE" dirty="0"/>
           </a:p>
@@ -31559,7 +28511,7 @@
           <p:cNvPr id="7" name="Fußzeilenplatzhalter 6">
             <a:extLst>
               <a:ext uri="{FF2B5EF4-FFF2-40B4-BE49-F238E27FC236}">
-                <a16:creationId xmlns:a16="http://schemas.microsoft.com/office/drawing/2014/main" xmlns="" id="{92A772BA-DCE7-4C4E-83BA-CF4FFCC183EE}"/>
+                <a16:creationId xmlns="" xmlns:a16="http://schemas.microsoft.com/office/drawing/2014/main" id="{92A772BA-DCE7-4C4E-83BA-CF4FFCC183EE}"/>
               </a:ext>
             </a:extLst>
           </p:cNvPr>
@@ -31584,7 +28536,7 @@
           <p:cNvPr id="8" name="Foliennummernplatzhalter 7">
             <a:extLst>
               <a:ext uri="{FF2B5EF4-FFF2-40B4-BE49-F238E27FC236}">
-                <a16:creationId xmlns:a16="http://schemas.microsoft.com/office/drawing/2014/main" xmlns="" id="{E51D4D1D-A3D0-476F-93F4-F41207D05396}"/>
+                <a16:creationId xmlns="" xmlns:a16="http://schemas.microsoft.com/office/drawing/2014/main" id="{E51D4D1D-A3D0-476F-93F4-F41207D05396}"/>
               </a:ext>
             </a:extLst>
           </p:cNvPr>
@@ -31884,7 +28836,7 @@
           <p:cNvPr id="4" name="Datumsplatzhalter 3">
             <a:extLst>
               <a:ext uri="{FF2B5EF4-FFF2-40B4-BE49-F238E27FC236}">
-                <a16:creationId xmlns:a16="http://schemas.microsoft.com/office/drawing/2014/main" xmlns="" id="{37D39D12-6498-4172-8CA5-163DBEBBD0CB}"/>
+                <a16:creationId xmlns="" xmlns:a16="http://schemas.microsoft.com/office/drawing/2014/main" id="{37D39D12-6498-4172-8CA5-163DBEBBD0CB}"/>
               </a:ext>
             </a:extLst>
           </p:cNvPr>
@@ -31903,7 +28855,7 @@
             <a:fld id="{17C2562E-359A-3C42-BBEF-E02CE97BECB1}" type="datetimeFigureOut">
               <a:rPr lang="de-DE" smtClean="0"/>
               <a:pPr/>
-              <a:t>19.10.17</a:t>
+              <a:t>19.10.2017</a:t>
             </a:fld>
             <a:endParaRPr lang="de-DE" dirty="0"/>
           </a:p>
@@ -31914,7 +28866,7 @@
           <p:cNvPr id="7" name="Fußzeilenplatzhalter 6">
             <a:extLst>
               <a:ext uri="{FF2B5EF4-FFF2-40B4-BE49-F238E27FC236}">
-                <a16:creationId xmlns:a16="http://schemas.microsoft.com/office/drawing/2014/main" xmlns="" id="{F310451D-2AF2-4222-AA5C-04DDCF6CA55F}"/>
+                <a16:creationId xmlns="" xmlns:a16="http://schemas.microsoft.com/office/drawing/2014/main" id="{F310451D-2AF2-4222-AA5C-04DDCF6CA55F}"/>
               </a:ext>
             </a:extLst>
           </p:cNvPr>
@@ -31939,7 +28891,7 @@
           <p:cNvPr id="8" name="Foliennummernplatzhalter 7">
             <a:extLst>
               <a:ext uri="{FF2B5EF4-FFF2-40B4-BE49-F238E27FC236}">
-                <a16:creationId xmlns:a16="http://schemas.microsoft.com/office/drawing/2014/main" xmlns="" id="{8546ADD4-A434-4A15-B639-BB0897136588}"/>
+                <a16:creationId xmlns="" xmlns:a16="http://schemas.microsoft.com/office/drawing/2014/main" id="{8546ADD4-A434-4A15-B639-BB0897136588}"/>
               </a:ext>
             </a:extLst>
           </p:cNvPr>
@@ -32178,7 +29130,7 @@
           <p:cNvPr id="2" name="Datumsplatzhalter 1">
             <a:extLst>
               <a:ext uri="{FF2B5EF4-FFF2-40B4-BE49-F238E27FC236}">
-                <a16:creationId xmlns:a16="http://schemas.microsoft.com/office/drawing/2014/main" xmlns="" id="{A19FBC2B-4138-47A7-96C3-6075667C774D}"/>
+                <a16:creationId xmlns="" xmlns:a16="http://schemas.microsoft.com/office/drawing/2014/main" id="{A19FBC2B-4138-47A7-96C3-6075667C774D}"/>
               </a:ext>
             </a:extLst>
           </p:cNvPr>
@@ -32197,7 +29149,7 @@
             <a:fld id="{17C2562E-359A-3C42-BBEF-E02CE97BECB1}" type="datetimeFigureOut">
               <a:rPr lang="de-DE" smtClean="0"/>
               <a:pPr/>
-              <a:t>19.10.17</a:t>
+              <a:t>19.10.2017</a:t>
             </a:fld>
             <a:endParaRPr lang="de-DE" dirty="0"/>
           </a:p>
@@ -32208,7 +29160,7 @@
           <p:cNvPr id="8" name="Fußzeilenplatzhalter 7">
             <a:extLst>
               <a:ext uri="{FF2B5EF4-FFF2-40B4-BE49-F238E27FC236}">
-                <a16:creationId xmlns:a16="http://schemas.microsoft.com/office/drawing/2014/main" xmlns="" id="{193B0760-28CB-4559-9AEF-4866F2FCE0E4}"/>
+                <a16:creationId xmlns="" xmlns:a16="http://schemas.microsoft.com/office/drawing/2014/main" id="{193B0760-28CB-4559-9AEF-4866F2FCE0E4}"/>
               </a:ext>
             </a:extLst>
           </p:cNvPr>
@@ -32233,7 +29185,7 @@
           <p:cNvPr id="11" name="Foliennummernplatzhalter 10">
             <a:extLst>
               <a:ext uri="{FF2B5EF4-FFF2-40B4-BE49-F238E27FC236}">
-                <a16:creationId xmlns:a16="http://schemas.microsoft.com/office/drawing/2014/main" xmlns="" id="{A263DBAA-5BAE-421E-BCAE-39992A39B610}"/>
+                <a16:creationId xmlns="" xmlns:a16="http://schemas.microsoft.com/office/drawing/2014/main" id="{A263DBAA-5BAE-421E-BCAE-39992A39B610}"/>
               </a:ext>
             </a:extLst>
           </p:cNvPr>
@@ -32440,7 +29392,7 @@
             <a:fld id="{17C2562E-359A-3C42-BBEF-E02CE97BECB1}" type="datetimeFigureOut">
               <a:rPr lang="de-DE" smtClean="0"/>
               <a:pPr/>
-              <a:t>19.10.17</a:t>
+              <a:t>19.10.2017</a:t>
             </a:fld>
             <a:endParaRPr lang="de-DE" dirty="0"/>
           </a:p>
@@ -33015,7 +29967,7 @@
             <a:fld id="{17C2562E-359A-3C42-BBEF-E02CE97BECB1}" type="datetimeFigureOut">
               <a:rPr lang="de-DE" smtClean="0"/>
               <a:pPr/>
-              <a:t>19.10.17</a:t>
+              <a:t>19.10.2017</a:t>
             </a:fld>
             <a:endParaRPr lang="de-DE" dirty="0"/>
           </a:p>
@@ -33139,7 +30091,7 @@
           <p:cNvPr id="11" name="Titel 1">
             <a:extLst>
               <a:ext uri="{FF2B5EF4-FFF2-40B4-BE49-F238E27FC236}">
-                <a16:creationId xmlns:a16="http://schemas.microsoft.com/office/drawing/2014/main" xmlns="" id="{251058B0-31BE-410A-BE50-41D5389B0AAB}"/>
+                <a16:creationId xmlns="" xmlns:a16="http://schemas.microsoft.com/office/drawing/2014/main" id="{251058B0-31BE-410A-BE50-41D5389B0AAB}"/>
               </a:ext>
             </a:extLst>
           </p:cNvPr>
@@ -34604,7 +31556,7 @@
           <p:cNvPr id="2" name="Textplatzhalter 1">
             <a:extLst>
               <a:ext uri="{FF2B5EF4-FFF2-40B4-BE49-F238E27FC236}">
-                <a16:creationId xmlns:a16="http://schemas.microsoft.com/office/drawing/2014/main" xmlns="" id="{45003885-0277-4A8A-9B32-2C0872306E13}"/>
+                <a16:creationId xmlns="" xmlns:a16="http://schemas.microsoft.com/office/drawing/2014/main" id="{45003885-0277-4A8A-9B32-2C0872306E13}"/>
               </a:ext>
             </a:extLst>
           </p:cNvPr>
@@ -34644,7 +31596,7 @@
           <p:cNvPr id="3" name="Titel 2">
             <a:extLst>
               <a:ext uri="{FF2B5EF4-FFF2-40B4-BE49-F238E27FC236}">
-                <a16:creationId xmlns:a16="http://schemas.microsoft.com/office/drawing/2014/main" xmlns="" id="{EA92ABC8-8A1F-45BA-8C5F-D5DEF58C8920}"/>
+                <a16:creationId xmlns="" xmlns:a16="http://schemas.microsoft.com/office/drawing/2014/main" id="{EA92ABC8-8A1F-45BA-8C5F-D5DEF58C8920}"/>
               </a:ext>
             </a:extLst>
           </p:cNvPr>
@@ -34927,7 +31879,7 @@
             <a:fld id="{17C2562E-359A-3C42-BBEF-E02CE97BECB1}" type="datetimeFigureOut">
               <a:rPr lang="de-DE" smtClean="0"/>
               <a:pPr/>
-              <a:t>19.10.17</a:t>
+              <a:t>19.10.2017</a:t>
             </a:fld>
             <a:endParaRPr lang="de-DE" dirty="0"/>
           </a:p>
@@ -35162,7 +32114,7 @@
             <a:fld id="{17C2562E-359A-3C42-BBEF-E02CE97BECB1}" type="datetimeFigureOut">
               <a:rPr lang="de-DE" smtClean="0"/>
               <a:pPr/>
-              <a:t>19.10.17</a:t>
+              <a:t>19.10.2017</a:t>
             </a:fld>
             <a:endParaRPr lang="de-DE" dirty="0"/>
           </a:p>
@@ -35472,7 +32424,7 @@
             <a:fld id="{17C2562E-359A-3C42-BBEF-E02CE97BECB1}" type="datetimeFigureOut">
               <a:rPr lang="de-DE" smtClean="0"/>
               <a:pPr/>
-              <a:t>19.10.17</a:t>
+              <a:t>19.10.2017</a:t>
             </a:fld>
             <a:endParaRPr lang="de-DE" dirty="0"/>
           </a:p>
@@ -35638,7 +32590,7 @@
             <a:fld id="{17C2562E-359A-3C42-BBEF-E02CE97BECB1}" type="datetimeFigureOut">
               <a:rPr lang="de-DE" smtClean="0"/>
               <a:pPr/>
-              <a:t>19.10.17</a:t>
+              <a:t>19.10.2017</a:t>
             </a:fld>
             <a:endParaRPr lang="de-DE" dirty="0"/>
           </a:p>
@@ -35879,7 +32831,7 @@
             <a:fld id="{17C2562E-359A-3C42-BBEF-E02CE97BECB1}" type="datetimeFigureOut">
               <a:rPr lang="de-DE" smtClean="0"/>
               <a:pPr/>
-              <a:t>19.10.17</a:t>
+              <a:t>19.10.2017</a:t>
             </a:fld>
             <a:endParaRPr lang="de-DE" dirty="0"/>
           </a:p>
@@ -36140,7 +33092,7 @@
             <a:fld id="{17C2562E-359A-3C42-BBEF-E02CE97BECB1}" type="datetimeFigureOut">
               <a:rPr lang="de-DE" smtClean="0"/>
               <a:pPr/>
-              <a:t>19.10.17</a:t>
+              <a:t>19.10.2017</a:t>
             </a:fld>
             <a:endParaRPr lang="de-DE" dirty="0"/>
           </a:p>
@@ -36306,7 +33258,7 @@
             <a:fld id="{17C2562E-359A-3C42-BBEF-E02CE97BECB1}" type="datetimeFigureOut">
               <a:rPr lang="de-DE" smtClean="0"/>
               <a:pPr/>
-              <a:t>19.10.17</a:t>
+              <a:t>19.10.2017</a:t>
             </a:fld>
             <a:endParaRPr lang="de-DE" dirty="0"/>
           </a:p>
@@ -36544,7 +33496,7 @@
             <a:fld id="{17C2562E-359A-3C42-BBEF-E02CE97BECB1}" type="datetimeFigureOut">
               <a:rPr lang="de-DE" smtClean="0"/>
               <a:pPr/>
-              <a:t>19.10.17</a:t>
+              <a:t>19.10.2017</a:t>
             </a:fld>
             <a:endParaRPr lang="de-DE" dirty="0"/>
           </a:p>
@@ -36822,7 +33774,7 @@
             <a:fld id="{17C2562E-359A-3C42-BBEF-E02CE97BECB1}" type="datetimeFigureOut">
               <a:rPr lang="de-DE" smtClean="0"/>
               <a:pPr/>
-              <a:t>19.10.17</a:t>
+              <a:t>19.10.2017</a:t>
             </a:fld>
             <a:endParaRPr lang="de-DE" dirty="0"/>
           </a:p>
@@ -37126,7 +34078,7 @@
             <a:fld id="{17C2562E-359A-3C42-BBEF-E02CE97BECB1}" type="datetimeFigureOut">
               <a:rPr lang="de-DE" smtClean="0"/>
               <a:pPr/>
-              <a:t>19.10.17</a:t>
+              <a:t>19.10.2017</a:t>
             </a:fld>
             <a:endParaRPr lang="de-DE" dirty="0"/>
           </a:p>
@@ -37471,7 +34423,7 @@
             <a:fld id="{17C2562E-359A-3C42-BBEF-E02CE97BECB1}" type="datetimeFigureOut">
               <a:rPr lang="de-DE" smtClean="0"/>
               <a:pPr/>
-              <a:t>19.10.17</a:t>
+              <a:t>19.10.2017</a:t>
             </a:fld>
             <a:endParaRPr lang="de-DE" dirty="0"/>
           </a:p>
@@ -37689,7 +34641,7 @@
             <a:fld id="{17C2562E-359A-3C42-BBEF-E02CE97BECB1}" type="datetimeFigureOut">
               <a:rPr lang="de-DE" smtClean="0"/>
               <a:pPr/>
-              <a:t>19.10.17</a:t>
+              <a:t>19.10.2017</a:t>
             </a:fld>
             <a:endParaRPr lang="de-DE" dirty="0"/>
           </a:p>
@@ -37980,7 +34932,7 @@
             <a:fld id="{17C2562E-359A-3C42-BBEF-E02CE97BECB1}" type="datetimeFigureOut">
               <a:rPr lang="de-DE" smtClean="0"/>
               <a:pPr/>
-              <a:t>19.10.17</a:t>
+              <a:t>19.10.2017</a:t>
             </a:fld>
             <a:endParaRPr lang="de-DE" dirty="0"/>
           </a:p>
@@ -38204,7 +35156,7 @@
             <a:fld id="{17C2562E-359A-3C42-BBEF-E02CE97BECB1}" type="datetimeFigureOut">
               <a:rPr lang="de-DE" smtClean="0"/>
               <a:pPr/>
-              <a:t>19.10.17</a:t>
+              <a:t>19.10.2017</a:t>
             </a:fld>
             <a:endParaRPr lang="de-DE" dirty="0"/>
           </a:p>
@@ -38441,7 +35393,7 @@
             <a:fld id="{17C2562E-359A-3C42-BBEF-E02CE97BECB1}" type="datetimeFigureOut">
               <a:rPr lang="de-DE" smtClean="0"/>
               <a:pPr/>
-              <a:t>19.10.17</a:t>
+              <a:t>19.10.2017</a:t>
             </a:fld>
             <a:endParaRPr lang="de-DE" dirty="0"/>
           </a:p>
@@ -38607,7 +35559,7 @@
             <a:fld id="{17C2562E-359A-3C42-BBEF-E02CE97BECB1}" type="datetimeFigureOut">
               <a:rPr lang="de-DE" smtClean="0"/>
               <a:pPr/>
-              <a:t>19.10.17</a:t>
+              <a:t>19.10.2017</a:t>
             </a:fld>
             <a:endParaRPr lang="de-DE" dirty="0"/>
           </a:p>
@@ -38897,7 +35849,7 @@
             <a:fld id="{17C2562E-359A-3C42-BBEF-E02CE97BECB1}" type="datetimeFigureOut">
               <a:rPr lang="de-DE" smtClean="0"/>
               <a:pPr/>
-              <a:t>19.10.17</a:t>
+              <a:t>19.10.2017</a:t>
             </a:fld>
             <a:endParaRPr lang="de-DE" dirty="0"/>
           </a:p>
@@ -39063,7 +36015,7 @@
             <a:fld id="{17C2562E-359A-3C42-BBEF-E02CE97BECB1}" type="datetimeFigureOut">
               <a:rPr lang="de-DE" smtClean="0"/>
               <a:pPr/>
-              <a:t>19.10.17</a:t>
+              <a:t>19.10.2017</a:t>
             </a:fld>
             <a:endParaRPr lang="de-DE" dirty="0"/>
           </a:p>
@@ -39130,6 +36082,253 @@
 </file>
 
 <file path=ppt/slides/slide27.xml><?xml version="1.0" encoding="utf-8"?>
+<p:sld xmlns:a="http://schemas.openxmlformats.org/drawingml/2006/main" xmlns:r="http://schemas.openxmlformats.org/officeDocument/2006/relationships" xmlns:p="http://schemas.openxmlformats.org/presentationml/2006/main" show="0">
+  <p:cSld>
+    <p:spTree>
+      <p:nvGrpSpPr>
+        <p:cNvPr id="1" name=""/>
+        <p:cNvGrpSpPr/>
+        <p:nvPr/>
+      </p:nvGrpSpPr>
+      <p:grpSpPr>
+        <a:xfrm>
+          <a:off x="0" y="0"/>
+          <a:ext cx="0" cy="0"/>
+          <a:chOff x="0" y="0"/>
+          <a:chExt cx="0" cy="0"/>
+        </a:xfrm>
+      </p:grpSpPr>
+      <p:sp>
+        <p:nvSpPr>
+          <p:cNvPr id="2" name="Titel 1"/>
+          <p:cNvSpPr>
+            <a:spLocks noGrp="1"/>
+          </p:cNvSpPr>
+          <p:nvPr>
+            <p:ph type="title"/>
+          </p:nvPr>
+        </p:nvSpPr>
+        <p:spPr>
+          <a:solidFill>
+            <a:schemeClr val="accent2"/>
+          </a:solidFill>
+        </p:spPr>
+        <p:txBody>
+          <a:bodyPr/>
+          <a:lstStyle/>
+          <a:p>
+            <a:r>
+              <a:rPr lang="de-DE" dirty="0">
+                <a:solidFill>
+                  <a:schemeClr val="bg1"/>
+                </a:solidFill>
+              </a:rPr>
+              <a:t>Live </a:t>
+            </a:r>
+            <a:r>
+              <a:rPr lang="de-DE" dirty="0" err="1" smtClean="0">
+                <a:solidFill>
+                  <a:schemeClr val="bg1"/>
+                </a:solidFill>
+              </a:rPr>
+              <a:t>Coding</a:t>
+            </a:r>
+            <a:r>
+              <a:rPr lang="de-DE" dirty="0" smtClean="0">
+                <a:solidFill>
+                  <a:schemeClr val="bg1"/>
+                </a:solidFill>
+              </a:rPr>
+              <a:t> – Daten von </a:t>
+            </a:r>
+            <a:r>
+              <a:rPr lang="de-DE" dirty="0" smtClean="0">
+                <a:solidFill>
+                  <a:schemeClr val="bg1"/>
+                </a:solidFill>
+                <a:hlinkClick r:id="rId2"/>
+              </a:rPr>
+              <a:t>www.swapi.org</a:t>
+            </a:r>
+            <a:r>
+              <a:rPr lang="de-DE" dirty="0" smtClean="0">
+                <a:solidFill>
+                  <a:schemeClr val="bg1"/>
+                </a:solidFill>
+              </a:rPr>
+              <a:t> laden</a:t>
+            </a:r>
+            <a:endParaRPr lang="de-DE" dirty="0">
+              <a:solidFill>
+                <a:schemeClr val="bg1"/>
+              </a:solidFill>
+            </a:endParaRPr>
+          </a:p>
+        </p:txBody>
+      </p:sp>
+      <p:sp>
+        <p:nvSpPr>
+          <p:cNvPr id="4" name="Datumsplatzhalter 3"/>
+          <p:cNvSpPr>
+            <a:spLocks noGrp="1"/>
+          </p:cNvSpPr>
+          <p:nvPr>
+            <p:ph type="dt" sz="half" idx="31"/>
+          </p:nvPr>
+        </p:nvSpPr>
+        <p:spPr/>
+        <p:txBody>
+          <a:bodyPr/>
+          <a:lstStyle/>
+          <a:p>
+            <a:fld id="{17C2562E-359A-3C42-BBEF-E02CE97BECB1}" type="datetimeFigureOut">
+              <a:rPr lang="de-DE" smtClean="0"/>
+              <a:pPr/>
+              <a:t>19.10.2017</a:t>
+            </a:fld>
+            <a:endParaRPr lang="de-DE" dirty="0"/>
+          </a:p>
+        </p:txBody>
+      </p:sp>
+      <p:sp>
+        <p:nvSpPr>
+          <p:cNvPr id="5" name="Fußzeilenplatzhalter 4"/>
+          <p:cNvSpPr>
+            <a:spLocks noGrp="1"/>
+          </p:cNvSpPr>
+          <p:nvPr>
+            <p:ph type="ftr" sz="quarter" idx="32"/>
+          </p:nvPr>
+        </p:nvSpPr>
+        <p:spPr/>
+        <p:txBody>
+          <a:bodyPr/>
+          <a:lstStyle/>
+          <a:p>
+            <a:endParaRPr lang="de-DE" dirty="0"/>
+          </a:p>
+        </p:txBody>
+      </p:sp>
+      <p:sp>
+        <p:nvSpPr>
+          <p:cNvPr id="6" name="Foliennummernplatzhalter 5"/>
+          <p:cNvSpPr>
+            <a:spLocks noGrp="1"/>
+          </p:cNvSpPr>
+          <p:nvPr>
+            <p:ph type="sldNum" sz="quarter" idx="33"/>
+          </p:nvPr>
+        </p:nvSpPr>
+        <p:spPr/>
+        <p:txBody>
+          <a:bodyPr/>
+          <a:lstStyle/>
+          <a:p>
+            <a:r>
+              <a:rPr lang="de-DE"/>
+              <a:t>Seite </a:t>
+            </a:r>
+            <a:fld id="{38661448-4A48-D446-A2DB-27E795148D92}" type="slidenum">
+              <a:rPr lang="de-DE" smtClean="0"/>
+              <a:pPr/>
+              <a:t>27</a:t>
+            </a:fld>
+            <a:endParaRPr lang="de-DE" dirty="0"/>
+          </a:p>
+        </p:txBody>
+      </p:sp>
+      <p:sp>
+        <p:nvSpPr>
+          <p:cNvPr id="3" name="Textfeld 2"/>
+          <p:cNvSpPr txBox="1"/>
+          <p:nvPr/>
+        </p:nvSpPr>
+        <p:spPr>
+          <a:xfrm>
+            <a:off x="5644675" y="6325497"/>
+            <a:ext cx="7165488" cy="307777"/>
+          </a:xfrm>
+          <a:prstGeom prst="rect">
+            <a:avLst/>
+          </a:prstGeom>
+          <a:noFill/>
+        </p:spPr>
+        <p:txBody>
+          <a:bodyPr wrap="none" rtlCol="0">
+            <a:spAutoFit/>
+          </a:bodyPr>
+          <a:lstStyle/>
+          <a:p>
+            <a:r>
+              <a:rPr lang="de-DE" sz="1400" dirty="0"/>
+              <a:t>Quelle: https://www.phactual.com/wp-content/uploads/2014/11/star-wars-1024x640.jpg</a:t>
+            </a:r>
+          </a:p>
+        </p:txBody>
+      </p:sp>
+      <p:pic>
+        <p:nvPicPr>
+          <p:cNvPr id="1028" name="Picture 4" descr="https://www.phactual.com/wp-content/uploads/2014/11/star-wars-1024x640.jpg"/>
+          <p:cNvPicPr>
+            <a:picLocks noChangeAspect="1" noChangeArrowheads="1"/>
+          </p:cNvPicPr>
+          <p:nvPr/>
+        </p:nvPicPr>
+        <p:blipFill>
+          <a:blip r:embed="rId3">
+            <a:extLst>
+              <a:ext uri="{28A0092B-C50C-407E-A947-70E740481C1C}">
+                <a14:useLocalDpi xmlns:a14="http://schemas.microsoft.com/office/drawing/2010/main" val="0"/>
+              </a:ext>
+            </a:extLst>
+          </a:blip>
+          <a:srcRect/>
+          <a:stretch>
+            <a:fillRect/>
+          </a:stretch>
+        </p:blipFill>
+        <p:spPr bwMode="auto">
+          <a:xfrm>
+            <a:off x="2658021" y="1503837"/>
+            <a:ext cx="7714655" cy="4821660"/>
+          </a:xfrm>
+          <a:prstGeom prst="rect">
+            <a:avLst/>
+          </a:prstGeom>
+          <a:noFill/>
+          <a:extLst>
+            <a:ext uri="{909E8E84-426E-40DD-AFC4-6F175D3DCCD1}">
+              <a14:hiddenFill xmlns:a14="http://schemas.microsoft.com/office/drawing/2010/main">
+                <a:solidFill>
+                  <a:srgbClr val="FFFFFF"/>
+                </a:solidFill>
+              </a14:hiddenFill>
+            </a:ext>
+          </a:extLst>
+        </p:spPr>
+      </p:pic>
+    </p:spTree>
+    <p:extLst>
+      <p:ext uri="{BB962C8B-B14F-4D97-AF65-F5344CB8AC3E}">
+        <p14:creationId xmlns:p14="http://schemas.microsoft.com/office/powerpoint/2010/main" val="1113322747"/>
+      </p:ext>
+    </p:extLst>
+  </p:cSld>
+  <p:clrMapOvr>
+    <a:masterClrMapping/>
+  </p:clrMapOvr>
+  <mc:AlternateContent xmlns:mc="http://schemas.openxmlformats.org/markup-compatibility/2006">
+    <mc:Choice xmlns:p14="http://schemas.microsoft.com/office/powerpoint/2010/main" Requires="p14">
+      <p:transition spd="slow" p14:dur="2000"/>
+    </mc:Choice>
+    <mc:Fallback>
+      <p:transition spd="slow"/>
+    </mc:Fallback>
+  </mc:AlternateContent>
+</p:sld>
+</file>
+
+<file path=ppt/slides/slide28.xml><?xml version="1.0" encoding="utf-8"?>
 <p:sld xmlns:a="http://schemas.openxmlformats.org/drawingml/2006/main" xmlns:r="http://schemas.openxmlformats.org/officeDocument/2006/relationships" xmlns:p="http://schemas.openxmlformats.org/presentationml/2006/main">
   <p:cSld>
     <p:spTree>
@@ -39213,7 +36412,7 @@
             <a:fld id="{17C2562E-359A-3C42-BBEF-E02CE97BECB1}" type="datetimeFigureOut">
               <a:rPr lang="de-DE" smtClean="0"/>
               <a:pPr/>
-              <a:t>19.10.17</a:t>
+              <a:t>19.10.2017</a:t>
             </a:fld>
             <a:endParaRPr lang="de-DE" dirty="0"/>
           </a:p>
@@ -39260,7 +36459,7 @@
             <a:fld id="{38661448-4A48-D446-A2DB-27E795148D92}" type="slidenum">
               <a:rPr lang="de-DE" smtClean="0"/>
               <a:pPr/>
-              <a:t>27</a:t>
+              <a:t>28</a:t>
             </a:fld>
             <a:endParaRPr lang="de-DE" dirty="0"/>
           </a:p>
@@ -39438,7 +36637,7 @@
           <p:cNvPr id="5" name="Datumsplatzhalter 4">
             <a:extLst>
               <a:ext uri="{FF2B5EF4-FFF2-40B4-BE49-F238E27FC236}">
-                <a16:creationId xmlns:a16="http://schemas.microsoft.com/office/drawing/2014/main" xmlns="" id="{D471591C-E430-45E7-A587-2CEC0AF88DA0}"/>
+                <a16:creationId xmlns="" xmlns:a16="http://schemas.microsoft.com/office/drawing/2014/main" id="{D471591C-E430-45E7-A587-2CEC0AF88DA0}"/>
               </a:ext>
             </a:extLst>
           </p:cNvPr>
@@ -39456,7 +36655,7 @@
           <a:p>
             <a:fld id="{D3ADFBD6-4690-496C-B9C9-0BEF0B938F74}" type="datetime1">
               <a:rPr lang="de-DE" smtClean="0"/>
-              <a:t>19.10.17</a:t>
+              <a:t>19.10.2017</a:t>
             </a:fld>
             <a:endParaRPr lang="de-DE" dirty="0"/>
           </a:p>
@@ -39467,7 +36666,7 @@
           <p:cNvPr id="6" name="Fußzeilenplatzhalter 5">
             <a:extLst>
               <a:ext uri="{FF2B5EF4-FFF2-40B4-BE49-F238E27FC236}">
-                <a16:creationId xmlns:a16="http://schemas.microsoft.com/office/drawing/2014/main" xmlns="" id="{B488671B-A101-43AC-84F6-1F2F8515424C}"/>
+                <a16:creationId xmlns="" xmlns:a16="http://schemas.microsoft.com/office/drawing/2014/main" id="{B488671B-A101-43AC-84F6-1F2F8515424C}"/>
               </a:ext>
             </a:extLst>
           </p:cNvPr>
@@ -39492,7 +36691,7 @@
           <p:cNvPr id="7" name="Foliennummernplatzhalter 6">
             <a:extLst>
               <a:ext uri="{FF2B5EF4-FFF2-40B4-BE49-F238E27FC236}">
-                <a16:creationId xmlns:a16="http://schemas.microsoft.com/office/drawing/2014/main" xmlns="" id="{8E977D85-C22B-4016-AC2C-F3FDCE1BCBEB}"/>
+                <a16:creationId xmlns="" xmlns:a16="http://schemas.microsoft.com/office/drawing/2014/main" id="{8E977D85-C22B-4016-AC2C-F3FDCE1BCBEB}"/>
               </a:ext>
             </a:extLst>
           </p:cNvPr>
@@ -39720,7 +36919,7 @@
             <a:fld id="{17C2562E-359A-3C42-BBEF-E02CE97BECB1}" type="datetimeFigureOut">
               <a:rPr lang="de-DE" smtClean="0"/>
               <a:pPr/>
-              <a:t>19.10.17</a:t>
+              <a:t>19.10.2017</a:t>
             </a:fld>
             <a:endParaRPr lang="de-DE" dirty="0"/>
           </a:p>
@@ -39843,7 +37042,7 @@
             <a:fld id="{17C2562E-359A-3C42-BBEF-E02CE97BECB1}" type="datetimeFigureOut">
               <a:rPr lang="de-DE" smtClean="0"/>
               <a:pPr/>
-              <a:t>19.10.17</a:t>
+              <a:t>19.10.2017</a:t>
             </a:fld>
             <a:endParaRPr lang="de-DE" dirty="0"/>
           </a:p>
@@ -40133,7 +37332,7 @@
             <a:fld id="{17C2562E-359A-3C42-BBEF-E02CE97BECB1}" type="datetimeFigureOut">
               <a:rPr lang="de-DE" smtClean="0"/>
               <a:pPr/>
-              <a:t>19.10.17</a:t>
+              <a:t>19.10.2017</a:t>
             </a:fld>
             <a:endParaRPr lang="de-DE" dirty="0"/>
           </a:p>
@@ -40191,7 +37390,7 @@
           <p:cNvPr id="8" name="Grafik 8">
             <a:extLst>
               <a:ext uri="{FF2B5EF4-FFF2-40B4-BE49-F238E27FC236}">
-                <a16:creationId xmlns:a16="http://schemas.microsoft.com/office/drawing/2014/main" xmlns="" id="{7CF3AEDB-FAEB-4721-8ACE-7522ACB7DC22}"/>
+                <a16:creationId xmlns="" xmlns:a16="http://schemas.microsoft.com/office/drawing/2014/main" id="{7CF3AEDB-FAEB-4721-8ACE-7522ACB7DC22}"/>
               </a:ext>
             </a:extLst>
           </p:cNvPr>
@@ -40221,7 +37420,7 @@
           <p:cNvPr id="11" name="Textfeld 10">
             <a:extLst>
               <a:ext uri="{FF2B5EF4-FFF2-40B4-BE49-F238E27FC236}">
-                <a16:creationId xmlns:a16="http://schemas.microsoft.com/office/drawing/2014/main" xmlns="" id="{E75A7EFF-4B3E-4C10-9F74-6849362D15CF}"/>
+                <a16:creationId xmlns="" xmlns:a16="http://schemas.microsoft.com/office/drawing/2014/main" id="{E75A7EFF-4B3E-4C10-9F74-6849362D15CF}"/>
               </a:ext>
             </a:extLst>
           </p:cNvPr>
@@ -40476,7 +37675,7 @@
             <a:fld id="{17C2562E-359A-3C42-BBEF-E02CE97BECB1}" type="datetimeFigureOut">
               <a:rPr lang="de-DE" smtClean="0"/>
               <a:pPr/>
-              <a:t>19.10.17</a:t>
+              <a:t>19.10.2017</a:t>
             </a:fld>
             <a:endParaRPr lang="de-DE" dirty="0"/>
           </a:p>
@@ -40661,7 +37860,7 @@
             <a:fld id="{17C2562E-359A-3C42-BBEF-E02CE97BECB1}" type="datetimeFigureOut">
               <a:rPr lang="de-DE" smtClean="0"/>
               <a:pPr/>
-              <a:t>19.10.17</a:t>
+              <a:t>19.10.2017</a:t>
             </a:fld>
             <a:endParaRPr lang="de-DE" dirty="0"/>
           </a:p>
@@ -40929,7 +38128,7 @@
             <a:fld id="{17C2562E-359A-3C42-BBEF-E02CE97BECB1}" type="datetimeFigureOut">
               <a:rPr lang="de-DE" smtClean="0"/>
               <a:pPr/>
-              <a:t>19.10.17</a:t>
+              <a:t>19.10.2017</a:t>
             </a:fld>
             <a:endParaRPr lang="de-DE" dirty="0"/>
           </a:p>

</xml_diff>

<commit_message>
Folien - tinyurl hinzugefügt
</commit_message>
<xml_diff>
--- a/docs/Angular-Workshop-20.10.pptx
+++ b/docs/Angular-Workshop-20.10.pptx
@@ -37125,10 +37125,24 @@
               <a:t>Praxisbeispiel: </a:t>
             </a:r>
             <a:r>
-              <a:rPr lang="de-DE" dirty="0">
-                <a:hlinkClick r:id="rId2"/>
-              </a:rPr>
-              <a:t>https://github.com/aawada78/angular-workshop.git</a:t>
+              <a:rPr lang="de-DE" dirty="0"/>
+              <a:t>http://</a:t>
+            </a:r>
+            <a:r>
+              <a:rPr lang="de-DE" dirty="0" err="1"/>
+              <a:t>tinyurl.com</a:t>
+            </a:r>
+            <a:r>
+              <a:rPr lang="de-DE" dirty="0"/>
+              <a:t>/</a:t>
+            </a:r>
+            <a:r>
+              <a:rPr lang="de-DE" dirty="0" err="1"/>
+              <a:t>ng</a:t>
+            </a:r>
+            <a:r>
+              <a:rPr lang="de-DE" dirty="0"/>
+              <a:t>-workshop</a:t>
             </a:r>
             <a:endParaRPr lang="de-DE" dirty="0"/>
           </a:p>
@@ -40116,10 +40130,24 @@
               <a:t>Praxisbeispiel: </a:t>
             </a:r>
             <a:r>
-              <a:rPr lang="de-DE" dirty="0">
-                <a:hlinkClick r:id="rId3"/>
-              </a:rPr>
-              <a:t>https://github.com/aawada78/angular-workshop.git</a:t>
+              <a:rPr lang="de-DE" dirty="0" smtClean="0"/>
+              <a:t>http://</a:t>
+            </a:r>
+            <a:r>
+              <a:rPr lang="de-DE" dirty="0" err="1" smtClean="0"/>
+              <a:t>tinyurl.com</a:t>
+            </a:r>
+            <a:r>
+              <a:rPr lang="de-DE" dirty="0" smtClean="0"/>
+              <a:t>/</a:t>
+            </a:r>
+            <a:r>
+              <a:rPr lang="de-DE" dirty="0" err="1" smtClean="0"/>
+              <a:t>ng</a:t>
+            </a:r>
+            <a:r>
+              <a:rPr lang="de-DE" dirty="0" smtClean="0"/>
+              <a:t>-workshop</a:t>
             </a:r>
             <a:endParaRPr lang="de-DE" dirty="0"/>
           </a:p>
@@ -40135,7 +40163,7 @@
             </a:r>
             <a:r>
               <a:rPr lang="de-DE" dirty="0">
-                <a:hlinkClick r:id="rId4"/>
+                <a:hlinkClick r:id="rId3"/>
               </a:rPr>
               <a:t>Link</a:t>
             </a:r>

</xml_diff>